<commit_message>
Added slide on complex type
</commit_message>
<xml_diff>
--- a/CPlusPlus/12_essential_cpp_numerics.pptx
+++ b/CPlusPlus/12_essential_cpp_numerics.pptx
@@ -3756,7 +3756,7 @@
         <p:spPr>
           <a:xfrm>
             <a:off x="478707" y="1682819"/>
-            <a:ext cx="4093293" cy="1323439"/>
+            <a:ext cx="6472699" cy="1815882"/>
           </a:xfrm>
           <a:prstGeom prst="rect">
             <a:avLst/>
@@ -3767,9 +3767,7 @@
             </a:schemeClr>
           </a:solidFill>
           <a:ln>
-            <a:solidFill>
-              <a:schemeClr val="tx1"/>
-            </a:solidFill>
+            <a:noFill/>
           </a:ln>
         </p:spPr>
         <p:txBody>
@@ -3783,118 +3781,29 @@
                 <a:latin typeface="Courier New" pitchFamily="49" charset="0"/>
                 <a:cs typeface="Courier New" pitchFamily="49" charset="0"/>
               </a:rPr>
-              <a:t>void </a:t>
+              <a:t>#include &lt;complex&gt;</a:t>
+            </a:r>
+          </a:p>
+          <a:p>
+            <a:endParaRPr lang="en-US" sz="1600" dirty="0">
+              <a:latin typeface="Courier New" pitchFamily="49" charset="0"/>
+              <a:cs typeface="Courier New" pitchFamily="49" charset="0"/>
+            </a:endParaRPr>
+          </a:p>
+          <a:p>
+            <a:r>
+              <a:rPr lang="en-US" sz="1600" dirty="0" smtClean="0">
+                <a:latin typeface="Courier New" pitchFamily="49" charset="0"/>
+                <a:cs typeface="Courier New" pitchFamily="49" charset="0"/>
+              </a:rPr>
+              <a:t>using namespace </a:t>
             </a:r>
             <a:r>
               <a:rPr lang="en-US" sz="1600" dirty="0" err="1" smtClean="0">
                 <a:latin typeface="Courier New" pitchFamily="49" charset="0"/>
                 <a:cs typeface="Courier New" pitchFamily="49" charset="0"/>
               </a:rPr>
-              <a:t>swap_val</a:t>
-            </a:r>
-            <a:r>
-              <a:rPr lang="en-US" sz="1600" dirty="0" smtClean="0">
-                <a:latin typeface="Courier New" pitchFamily="49" charset="0"/>
-                <a:cs typeface="Courier New" pitchFamily="49" charset="0"/>
-              </a:rPr>
-              <a:t>(</a:t>
-            </a:r>
-            <a:r>
-              <a:rPr lang="en-US" sz="1600" dirty="0" err="1" smtClean="0">
-                <a:latin typeface="Courier New" pitchFamily="49" charset="0"/>
-                <a:cs typeface="Courier New" pitchFamily="49" charset="0"/>
-              </a:rPr>
-              <a:t>int</a:t>
-            </a:r>
-            <a:r>
-              <a:rPr lang="en-US" sz="1600" dirty="0" smtClean="0">
-                <a:latin typeface="Courier New" pitchFamily="49" charset="0"/>
-                <a:cs typeface="Courier New" pitchFamily="49" charset="0"/>
-              </a:rPr>
-              <a:t>&amp; x, </a:t>
-            </a:r>
-            <a:r>
-              <a:rPr lang="en-US" sz="1600" dirty="0" err="1" smtClean="0">
-                <a:latin typeface="Courier New" pitchFamily="49" charset="0"/>
-                <a:cs typeface="Courier New" pitchFamily="49" charset="0"/>
-              </a:rPr>
-              <a:t>int</a:t>
-            </a:r>
-            <a:r>
-              <a:rPr lang="en-US" sz="1600" dirty="0" smtClean="0">
-                <a:latin typeface="Courier New" pitchFamily="49" charset="0"/>
-                <a:cs typeface="Courier New" pitchFamily="49" charset="0"/>
-              </a:rPr>
-              <a:t>&amp; y) {</a:t>
-            </a:r>
-          </a:p>
-          <a:p>
-            <a:r>
-              <a:rPr lang="en-US" sz="1600" dirty="0">
-                <a:latin typeface="Courier New" pitchFamily="49" charset="0"/>
-                <a:cs typeface="Courier New" pitchFamily="49" charset="0"/>
-              </a:rPr>
-              <a:t> </a:t>
-            </a:r>
-            <a:r>
-              <a:rPr lang="en-US" sz="1600" dirty="0" smtClean="0">
-                <a:latin typeface="Courier New" pitchFamily="49" charset="0"/>
-                <a:cs typeface="Courier New" pitchFamily="49" charset="0"/>
-              </a:rPr>
-              <a:t>   auto </a:t>
-            </a:r>
-            <a:r>
-              <a:rPr lang="en-US" sz="1600" dirty="0" err="1" smtClean="0">
-                <a:latin typeface="Courier New" pitchFamily="49" charset="0"/>
-                <a:cs typeface="Courier New" pitchFamily="49" charset="0"/>
-              </a:rPr>
-              <a:t>tmp</a:t>
-            </a:r>
-            <a:r>
-              <a:rPr lang="en-US" sz="1600" dirty="0" smtClean="0">
-                <a:latin typeface="Courier New" pitchFamily="49" charset="0"/>
-                <a:cs typeface="Courier New" pitchFamily="49" charset="0"/>
-              </a:rPr>
-              <a:t> {x};</a:t>
-            </a:r>
-          </a:p>
-          <a:p>
-            <a:r>
-              <a:rPr lang="en-US" sz="1600" dirty="0">
-                <a:latin typeface="Courier New" pitchFamily="49" charset="0"/>
-                <a:cs typeface="Courier New" pitchFamily="49" charset="0"/>
-              </a:rPr>
-              <a:t> </a:t>
-            </a:r>
-            <a:r>
-              <a:rPr lang="en-US" sz="1600" dirty="0" smtClean="0">
-                <a:latin typeface="Courier New" pitchFamily="49" charset="0"/>
-                <a:cs typeface="Courier New" pitchFamily="49" charset="0"/>
-              </a:rPr>
-              <a:t>   x = y;</a:t>
-            </a:r>
-          </a:p>
-          <a:p>
-            <a:r>
-              <a:rPr lang="en-US" sz="1600" dirty="0">
-                <a:latin typeface="Courier New" pitchFamily="49" charset="0"/>
-                <a:cs typeface="Courier New" pitchFamily="49" charset="0"/>
-              </a:rPr>
-              <a:t> </a:t>
-            </a:r>
-            <a:r>
-              <a:rPr lang="en-US" sz="1600" dirty="0" smtClean="0">
-                <a:latin typeface="Courier New" pitchFamily="49" charset="0"/>
-                <a:cs typeface="Courier New" pitchFamily="49" charset="0"/>
-              </a:rPr>
-              <a:t>   y = </a:t>
-            </a:r>
-            <a:r>
-              <a:rPr lang="en-US" sz="1600" dirty="0" err="1" smtClean="0">
-                <a:latin typeface="Courier New" pitchFamily="49" charset="0"/>
-                <a:cs typeface="Courier New" pitchFamily="49" charset="0"/>
-              </a:rPr>
-              <a:t>tmp</a:t>
+              <a:t>std</a:t>
             </a:r>
             <a:r>
               <a:rPr lang="en-US" sz="1600" dirty="0" smtClean="0">
@@ -3906,139 +3815,18 @@
           </a:p>
           <a:p>
             <a:r>
-              <a:rPr lang="en-US" sz="1600" dirty="0">
-                <a:latin typeface="Courier New" pitchFamily="49" charset="0"/>
-                <a:cs typeface="Courier New" pitchFamily="49" charset="0"/>
-              </a:rPr>
-              <a:t>}</a:t>
-            </a:r>
-            <a:endParaRPr lang="en-US" sz="1600" dirty="0" smtClean="0">
-              <a:latin typeface="Courier New" pitchFamily="49" charset="0"/>
-              <a:cs typeface="Courier New" pitchFamily="49" charset="0"/>
-            </a:endParaRPr>
-          </a:p>
-        </p:txBody>
-      </p:sp>
-      <p:sp>
-        <p:nvSpPr>
-          <p:cNvPr id="8" name="TextBox 7"/>
-          <p:cNvSpPr txBox="1"/>
-          <p:nvPr/>
-        </p:nvSpPr>
-        <p:spPr>
-          <a:xfrm>
-            <a:off x="3205931" y="2274020"/>
-            <a:ext cx="4798141" cy="1323439"/>
-          </a:xfrm>
-          <a:prstGeom prst="rect">
-            <a:avLst/>
-          </a:prstGeom>
-          <a:solidFill>
-            <a:schemeClr val="bg1">
-              <a:lumMod val="75000"/>
-            </a:schemeClr>
-          </a:solidFill>
-          <a:ln>
-            <a:solidFill>
-              <a:schemeClr val="tx1"/>
-            </a:solidFill>
-          </a:ln>
-        </p:spPr>
-        <p:txBody>
-          <a:bodyPr wrap="square" rtlCol="0">
-            <a:spAutoFit/>
-          </a:bodyPr>
-          <a:lstStyle/>
-          <a:p>
-            <a:r>
               <a:rPr lang="en-US" sz="1600" dirty="0" smtClean="0">
                 <a:latin typeface="Courier New" pitchFamily="49" charset="0"/>
                 <a:cs typeface="Courier New" pitchFamily="49" charset="0"/>
               </a:rPr>
-              <a:t>void </a:t>
+              <a:t>using namespace </a:t>
             </a:r>
             <a:r>
               <a:rPr lang="en-US" sz="1600" dirty="0" err="1" smtClean="0">
                 <a:latin typeface="Courier New" pitchFamily="49" charset="0"/>
                 <a:cs typeface="Courier New" pitchFamily="49" charset="0"/>
               </a:rPr>
-              <a:t>swap_val</a:t>
-            </a:r>
-            <a:r>
-              <a:rPr lang="en-US" sz="1600" dirty="0" smtClean="0">
-                <a:latin typeface="Courier New" pitchFamily="49" charset="0"/>
-                <a:cs typeface="Courier New" pitchFamily="49" charset="0"/>
-              </a:rPr>
-              <a:t>(double&amp; x, double&amp; y) {</a:t>
-            </a:r>
-          </a:p>
-          <a:p>
-            <a:r>
-              <a:rPr lang="en-US" sz="1600" dirty="0">
-                <a:latin typeface="Courier New" pitchFamily="49" charset="0"/>
-                <a:cs typeface="Courier New" pitchFamily="49" charset="0"/>
-              </a:rPr>
-              <a:t> </a:t>
-            </a:r>
-            <a:r>
-              <a:rPr lang="en-US" sz="1600" dirty="0" smtClean="0">
-                <a:latin typeface="Courier New" pitchFamily="49" charset="0"/>
-                <a:cs typeface="Courier New" pitchFamily="49" charset="0"/>
-              </a:rPr>
-              <a:t>   auto </a:t>
-            </a:r>
-            <a:r>
-              <a:rPr lang="en-US" sz="1600" dirty="0" err="1" smtClean="0">
-                <a:latin typeface="Courier New" pitchFamily="49" charset="0"/>
-                <a:cs typeface="Courier New" pitchFamily="49" charset="0"/>
-              </a:rPr>
-              <a:t>tmp</a:t>
-            </a:r>
-            <a:r>
-              <a:rPr lang="en-US" sz="1600" dirty="0" smtClean="0">
-                <a:latin typeface="Courier New" pitchFamily="49" charset="0"/>
-                <a:cs typeface="Courier New" pitchFamily="49" charset="0"/>
-              </a:rPr>
-              <a:t> {x};</a:t>
-            </a:r>
-          </a:p>
-          <a:p>
-            <a:r>
-              <a:rPr lang="en-US" sz="1600" dirty="0">
-                <a:latin typeface="Courier New" pitchFamily="49" charset="0"/>
-                <a:cs typeface="Courier New" pitchFamily="49" charset="0"/>
-              </a:rPr>
-              <a:t> </a:t>
-            </a:r>
-            <a:r>
-              <a:rPr lang="en-US" sz="1600" dirty="0" smtClean="0">
-                <a:latin typeface="Courier New" pitchFamily="49" charset="0"/>
-                <a:cs typeface="Courier New" pitchFamily="49" charset="0"/>
-              </a:rPr>
-              <a:t>   x = y;</a:t>
-            </a:r>
-          </a:p>
-          <a:p>
-            <a:r>
-              <a:rPr lang="en-US" sz="1600" dirty="0">
-                <a:latin typeface="Courier New" pitchFamily="49" charset="0"/>
-                <a:cs typeface="Courier New" pitchFamily="49" charset="0"/>
-              </a:rPr>
-              <a:t> </a:t>
-            </a:r>
-            <a:r>
-              <a:rPr lang="en-US" sz="1600" dirty="0" smtClean="0">
-                <a:latin typeface="Courier New" pitchFamily="49" charset="0"/>
-                <a:cs typeface="Courier New" pitchFamily="49" charset="0"/>
-              </a:rPr>
-              <a:t>   y = </a:t>
-            </a:r>
-            <a:r>
-              <a:rPr lang="en-US" sz="1600" dirty="0" err="1" smtClean="0">
-                <a:latin typeface="Courier New" pitchFamily="49" charset="0"/>
-                <a:cs typeface="Courier New" pitchFamily="49" charset="0"/>
-              </a:rPr>
-              <a:t>tmp</a:t>
+              <a:t>complex_literal</a:t>
             </a:r>
             <a:r>
               <a:rPr lang="en-US" sz="1600" dirty="0" smtClean="0">
@@ -4050,11 +3838,106 @@
           </a:p>
           <a:p>
             <a:r>
-              <a:rPr lang="en-US" sz="1600" dirty="0">
+              <a:rPr lang="en-US" sz="1600" dirty="0" smtClean="0">
                 <a:latin typeface="Courier New" pitchFamily="49" charset="0"/>
                 <a:cs typeface="Courier New" pitchFamily="49" charset="0"/>
               </a:rPr>
-              <a:t>}</a:t>
+              <a:t>complex&lt;double&gt; a {2 + </a:t>
+            </a:r>
+            <a:r>
+              <a:rPr lang="en-US" sz="1600" dirty="0" smtClean="0">
+                <a:latin typeface="Courier New" pitchFamily="49" charset="0"/>
+                <a:cs typeface="Courier New" pitchFamily="49" charset="0"/>
+              </a:rPr>
+              <a:t>3i};</a:t>
+            </a:r>
+          </a:p>
+          <a:p>
+            <a:r>
+              <a:rPr lang="en-US" sz="1600" dirty="0" err="1" smtClean="0">
+                <a:latin typeface="Courier New" pitchFamily="49" charset="0"/>
+                <a:cs typeface="Courier New" pitchFamily="49" charset="0"/>
+              </a:rPr>
+              <a:t>cout</a:t>
+            </a:r>
+            <a:r>
+              <a:rPr lang="en-US" sz="1600" dirty="0" smtClean="0">
+                <a:latin typeface="Courier New" pitchFamily="49" charset="0"/>
+                <a:cs typeface="Courier New" pitchFamily="49" charset="0"/>
+              </a:rPr>
+              <a:t> &lt;&lt; real(a) &lt;&lt; ", " &lt;&lt; </a:t>
+            </a:r>
+            <a:r>
+              <a:rPr lang="en-US" sz="1600" dirty="0" err="1" smtClean="0">
+                <a:latin typeface="Courier New" pitchFamily="49" charset="0"/>
+                <a:cs typeface="Courier New" pitchFamily="49" charset="0"/>
+              </a:rPr>
+              <a:t>imag</a:t>
+            </a:r>
+            <a:r>
+              <a:rPr lang="en-US" sz="1600" dirty="0" smtClean="0">
+                <a:latin typeface="Courier New" pitchFamily="49" charset="0"/>
+                <a:cs typeface="Courier New" pitchFamily="49" charset="0"/>
+              </a:rPr>
+              <a:t>(a) &lt;&lt; </a:t>
+            </a:r>
+            <a:r>
+              <a:rPr lang="en-US" sz="1600" dirty="0" err="1" smtClean="0">
+                <a:latin typeface="Courier New" pitchFamily="49" charset="0"/>
+                <a:cs typeface="Courier New" pitchFamily="49" charset="0"/>
+              </a:rPr>
+              <a:t>endl</a:t>
+            </a:r>
+            <a:r>
+              <a:rPr lang="en-US" sz="1600" dirty="0" smtClean="0">
+                <a:latin typeface="Courier New" pitchFamily="49" charset="0"/>
+                <a:cs typeface="Courier New" pitchFamily="49" charset="0"/>
+              </a:rPr>
+              <a:t>;</a:t>
+            </a:r>
+          </a:p>
+          <a:p>
+            <a:r>
+              <a:rPr lang="en-US" sz="1600" dirty="0" err="1" smtClean="0">
+                <a:latin typeface="Courier New" pitchFamily="49" charset="0"/>
+                <a:cs typeface="Courier New" pitchFamily="49" charset="0"/>
+              </a:rPr>
+              <a:t>cout</a:t>
+            </a:r>
+            <a:r>
+              <a:rPr lang="en-US" sz="1600" dirty="0" smtClean="0">
+                <a:latin typeface="Courier New" pitchFamily="49" charset="0"/>
+                <a:cs typeface="Courier New" pitchFamily="49" charset="0"/>
+              </a:rPr>
+              <a:t> &lt;&lt; </a:t>
+            </a:r>
+            <a:r>
+              <a:rPr lang="en-US" sz="1600" dirty="0" err="1" smtClean="0">
+                <a:latin typeface="Courier New" pitchFamily="49" charset="0"/>
+                <a:cs typeface="Courier New" pitchFamily="49" charset="0"/>
+              </a:rPr>
+              <a:t>sqrt</a:t>
+            </a:r>
+            <a:r>
+              <a:rPr lang="en-US" sz="1600" dirty="0" smtClean="0">
+                <a:latin typeface="Courier New" pitchFamily="49" charset="0"/>
+                <a:cs typeface="Courier New" pitchFamily="49" charset="0"/>
+              </a:rPr>
+              <a:t>(a) &lt;&lt; </a:t>
+            </a:r>
+            <a:r>
+              <a:rPr lang="en-US" sz="1600" dirty="0" err="1" smtClean="0">
+                <a:latin typeface="Courier New" pitchFamily="49" charset="0"/>
+                <a:cs typeface="Courier New" pitchFamily="49" charset="0"/>
+              </a:rPr>
+              <a:t>endl</a:t>
+            </a:r>
+            <a:r>
+              <a:rPr lang="en-US" sz="1600" dirty="0" smtClean="0">
+                <a:latin typeface="Courier New" pitchFamily="49" charset="0"/>
+                <a:cs typeface="Courier New" pitchFamily="49" charset="0"/>
+              </a:rPr>
+              <a:t>;</a:t>
             </a:r>
             <a:endParaRPr lang="en-US" sz="1600" dirty="0" smtClean="0">
               <a:latin typeface="Courier New" pitchFamily="49" charset="0"/>
@@ -4063,296 +3946,6 @@
           </a:p>
         </p:txBody>
       </p:sp>
-      <p:grpSp>
-        <p:nvGrpSpPr>
-          <p:cNvPr id="16" name="Group 15"/>
-          <p:cNvGrpSpPr/>
-          <p:nvPr/>
-        </p:nvGrpSpPr>
-        <p:grpSpPr>
-          <a:xfrm>
-            <a:off x="7399042" y="2942583"/>
-            <a:ext cx="1682980" cy="979878"/>
-            <a:chOff x="6457950" y="2819376"/>
-            <a:chExt cx="1682980" cy="979878"/>
-          </a:xfrm>
-        </p:grpSpPr>
-        <p:grpSp>
-          <p:nvGrpSpPr>
-            <p:cNvPr id="11" name="Group 10"/>
-            <p:cNvGrpSpPr/>
-            <p:nvPr/>
-          </p:nvGrpSpPr>
-          <p:grpSpPr>
-            <a:xfrm>
-              <a:off x="6457950" y="2819376"/>
-              <a:ext cx="786581" cy="923330"/>
-              <a:chOff x="393290" y="3303639"/>
-              <a:chExt cx="786581" cy="923330"/>
-            </a:xfrm>
-          </p:grpSpPr>
-          <p:sp>
-            <p:nvSpPr>
-              <p:cNvPr id="9" name="Rounded Rectangle 8"/>
-              <p:cNvSpPr/>
-              <p:nvPr/>
-            </p:nvSpPr>
-            <p:spPr>
-              <a:xfrm>
-                <a:off x="393290" y="3716594"/>
-                <a:ext cx="786581" cy="432619"/>
-              </a:xfrm>
-              <a:prstGeom prst="roundRect">
-                <a:avLst/>
-              </a:prstGeom>
-              <a:solidFill>
-                <a:schemeClr val="bg1"/>
-              </a:solidFill>
-              <a:ln w="28575">
-                <a:solidFill>
-                  <a:srgbClr val="C00000"/>
-                </a:solidFill>
-              </a:ln>
-            </p:spPr>
-            <p:style>
-              <a:lnRef idx="2">
-                <a:schemeClr val="accent1">
-                  <a:shade val="50000"/>
-                </a:schemeClr>
-              </a:lnRef>
-              <a:fillRef idx="1">
-                <a:schemeClr val="accent1"/>
-              </a:fillRef>
-              <a:effectRef idx="0">
-                <a:schemeClr val="accent1"/>
-              </a:effectRef>
-              <a:fontRef idx="minor">
-                <a:schemeClr val="lt1"/>
-              </a:fontRef>
-            </p:style>
-            <p:txBody>
-              <a:bodyPr rtlCol="0" anchor="ctr"/>
-              <a:lstStyle/>
-              <a:p>
-                <a:pPr algn="ctr"/>
-                <a:endParaRPr lang="en-US"/>
-              </a:p>
-            </p:txBody>
-          </p:sp>
-          <p:sp>
-            <p:nvSpPr>
-              <p:cNvPr id="10" name="TextBox 9"/>
-              <p:cNvSpPr txBox="1"/>
-              <p:nvPr/>
-            </p:nvSpPr>
-            <p:spPr>
-              <a:xfrm>
-                <a:off x="468350" y="3303639"/>
-                <a:ext cx="662361" cy="923330"/>
-              </a:xfrm>
-              <a:prstGeom prst="rect">
-                <a:avLst/>
-              </a:prstGeom>
-              <a:noFill/>
-            </p:spPr>
-            <p:txBody>
-              <a:bodyPr wrap="none" rtlCol="0">
-                <a:spAutoFit/>
-              </a:bodyPr>
-              <a:lstStyle/>
-              <a:p>
-                <a:r>
-                  <a:rPr lang="en-US" sz="5400" dirty="0" smtClean="0"/>
-                  <a:t>…</a:t>
-                </a:r>
-                <a:endParaRPr lang="en-US" sz="5400" dirty="0"/>
-              </a:p>
-            </p:txBody>
-          </p:sp>
-        </p:grpSp>
-        <p:sp>
-          <p:nvSpPr>
-            <p:cNvPr id="12" name="TextBox 11"/>
-            <p:cNvSpPr txBox="1"/>
-            <p:nvPr/>
-          </p:nvSpPr>
-          <p:spPr>
-            <a:xfrm>
-              <a:off x="7244531" y="3091368"/>
-              <a:ext cx="896399" cy="707886"/>
-            </a:xfrm>
-            <a:prstGeom prst="rect">
-              <a:avLst/>
-            </a:prstGeom>
-            <a:noFill/>
-          </p:spPr>
-          <p:txBody>
-            <a:bodyPr wrap="none" rtlCol="0">
-              <a:spAutoFit/>
-            </a:bodyPr>
-            <a:lstStyle/>
-            <a:p>
-              <a:r>
-                <a:rPr lang="en-US" sz="4000" dirty="0" smtClean="0">
-                  <a:solidFill>
-                    <a:srgbClr val="C00000"/>
-                  </a:solidFill>
-                </a:rPr>
-                <a:t>???</a:t>
-              </a:r>
-              <a:endParaRPr lang="en-US" sz="4000" dirty="0">
-                <a:solidFill>
-                  <a:srgbClr val="C00000"/>
-                </a:solidFill>
-              </a:endParaRPr>
-            </a:p>
-          </p:txBody>
-        </p:sp>
-      </p:grpSp>
-      <p:grpSp>
-        <p:nvGrpSpPr>
-          <p:cNvPr id="15" name="Group 14"/>
-          <p:cNvGrpSpPr/>
-          <p:nvPr/>
-        </p:nvGrpSpPr>
-        <p:grpSpPr>
-          <a:xfrm>
-            <a:off x="1218125" y="4247463"/>
-            <a:ext cx="6500197" cy="1967852"/>
-            <a:chOff x="1060808" y="4080315"/>
-            <a:chExt cx="6500197" cy="1967852"/>
-          </a:xfrm>
-        </p:grpSpPr>
-        <p:sp>
-          <p:nvSpPr>
-            <p:cNvPr id="5" name="TextBox 4"/>
-            <p:cNvSpPr txBox="1"/>
-            <p:nvPr/>
-          </p:nvSpPr>
-          <p:spPr>
-            <a:xfrm>
-              <a:off x="1060808" y="4724728"/>
-              <a:ext cx="6500197" cy="1323439"/>
-            </a:xfrm>
-            <a:prstGeom prst="rect">
-              <a:avLst/>
-            </a:prstGeom>
-            <a:solidFill>
-              <a:schemeClr val="bg1">
-                <a:lumMod val="75000"/>
-              </a:schemeClr>
-            </a:solidFill>
-          </p:spPr>
-          <p:txBody>
-            <a:bodyPr wrap="square" rtlCol="0">
-              <a:spAutoFit/>
-            </a:bodyPr>
-            <a:lstStyle/>
-            <a:p>
-              <a:r>
-                <a:rPr lang="nn-NO" sz="1600" dirty="0" smtClean="0">
-                  <a:latin typeface="Courier New" pitchFamily="49" charset="0"/>
-                  <a:cs typeface="Courier New" pitchFamily="49" charset="0"/>
-                </a:rPr>
-                <a:t>template&lt;typename T&gt; void swap_val(T&amp; v1, T&amp; v2) {</a:t>
-              </a:r>
-            </a:p>
-            <a:p>
-              <a:r>
-                <a:rPr lang="nn-NO" sz="1600" dirty="0">
-                  <a:latin typeface="Courier New" pitchFamily="49" charset="0"/>
-                  <a:cs typeface="Courier New" pitchFamily="49" charset="0"/>
-                </a:rPr>
-                <a:t> </a:t>
-              </a:r>
-              <a:r>
-                <a:rPr lang="nn-NO" sz="1600" dirty="0" smtClean="0">
-                  <a:latin typeface="Courier New" pitchFamily="49" charset="0"/>
-                  <a:cs typeface="Courier New" pitchFamily="49" charset="0"/>
-                </a:rPr>
-                <a:t>   auto tmp = v1;</a:t>
-              </a:r>
-            </a:p>
-            <a:p>
-              <a:r>
-                <a:rPr lang="nn-NO" sz="1600" dirty="0">
-                  <a:latin typeface="Courier New" pitchFamily="49" charset="0"/>
-                  <a:cs typeface="Courier New" pitchFamily="49" charset="0"/>
-                </a:rPr>
-                <a:t> </a:t>
-              </a:r>
-              <a:r>
-                <a:rPr lang="nn-NO" sz="1600" dirty="0" smtClean="0">
-                  <a:latin typeface="Courier New" pitchFamily="49" charset="0"/>
-                  <a:cs typeface="Courier New" pitchFamily="49" charset="0"/>
-                </a:rPr>
-                <a:t>   v1 = v2;</a:t>
-              </a:r>
-            </a:p>
-            <a:p>
-              <a:r>
-                <a:rPr lang="nn-NO" sz="1600" dirty="0">
-                  <a:latin typeface="Courier New" pitchFamily="49" charset="0"/>
-                  <a:cs typeface="Courier New" pitchFamily="49" charset="0"/>
-                </a:rPr>
-                <a:t> </a:t>
-              </a:r>
-              <a:r>
-                <a:rPr lang="nn-NO" sz="1600" dirty="0" smtClean="0">
-                  <a:latin typeface="Courier New" pitchFamily="49" charset="0"/>
-                  <a:cs typeface="Courier New" pitchFamily="49" charset="0"/>
-                </a:rPr>
-                <a:t>   v2 = tmp;</a:t>
-              </a:r>
-            </a:p>
-            <a:p>
-              <a:r>
-                <a:rPr lang="nn-NO" sz="1600" dirty="0">
-                  <a:latin typeface="Courier New" pitchFamily="49" charset="0"/>
-                  <a:cs typeface="Courier New" pitchFamily="49" charset="0"/>
-                </a:rPr>
-                <a:t>}</a:t>
-              </a:r>
-            </a:p>
-          </p:txBody>
-        </p:sp>
-        <p:cxnSp>
-          <p:nvCxnSpPr>
-            <p:cNvPr id="14" name="Straight Arrow Connector 13"/>
-            <p:cNvCxnSpPr/>
-            <p:nvPr/>
-          </p:nvCxnSpPr>
-          <p:spPr>
-            <a:xfrm>
-              <a:off x="4365522" y="4080315"/>
-              <a:ext cx="0" cy="556541"/>
-            </a:xfrm>
-            <a:prstGeom prst="straightConnector1">
-              <a:avLst/>
-            </a:prstGeom>
-            <a:ln w="57150">
-              <a:solidFill>
-                <a:schemeClr val="tx1"/>
-              </a:solidFill>
-              <a:tailEnd type="stealth"/>
-            </a:ln>
-          </p:spPr>
-          <p:style>
-            <a:lnRef idx="1">
-              <a:schemeClr val="accent1"/>
-            </a:lnRef>
-            <a:fillRef idx="0">
-              <a:schemeClr val="accent1"/>
-            </a:fillRef>
-            <a:effectRef idx="0">
-              <a:schemeClr val="accent1"/>
-            </a:effectRef>
-            <a:fontRef idx="minor">
-              <a:schemeClr val="tx1"/>
-            </a:fontRef>
-          </p:style>
-        </p:cxnSp>
-      </p:grpSp>
     </p:spTree>
     <p:extLst>
       <p:ext uri="{BB962C8B-B14F-4D97-AF65-F5344CB8AC3E}">
@@ -4366,170 +3959,9 @@
   <p:timing>
     <p:tnLst>
       <p:par>
-        <p:cTn id="1" dur="indefinite" restart="never" nodeType="tmRoot">
-          <p:childTnLst>
-            <p:seq concurrent="1" nextAc="seek">
-              <p:cTn id="2" dur="indefinite" nodeType="mainSeq">
-                <p:childTnLst>
-                  <p:par>
-                    <p:cTn id="3" fill="hold">
-                      <p:stCondLst>
-                        <p:cond delay="indefinite"/>
-                      </p:stCondLst>
-                      <p:childTnLst>
-                        <p:par>
-                          <p:cTn id="4" fill="hold">
-                            <p:stCondLst>
-                              <p:cond delay="0"/>
-                            </p:stCondLst>
-                            <p:childTnLst>
-                              <p:par>
-                                <p:cTn id="5" presetID="1" presetClass="entr" presetSubtype="0" fill="hold" grpId="0" nodeType="clickEffect">
-                                  <p:stCondLst>
-                                    <p:cond delay="0"/>
-                                  </p:stCondLst>
-                                  <p:childTnLst>
-                                    <p:set>
-                                      <p:cBhvr>
-                                        <p:cTn id="6" dur="1" fill="hold">
-                                          <p:stCondLst>
-                                            <p:cond delay="0"/>
-                                          </p:stCondLst>
-                                        </p:cTn>
-                                        <p:tgtEl>
-                                          <p:spTgt spid="8"/>
-                                        </p:tgtEl>
-                                        <p:attrNameLst>
-                                          <p:attrName>style.visibility</p:attrName>
-                                        </p:attrNameLst>
-                                      </p:cBhvr>
-                                      <p:to>
-                                        <p:strVal val="visible"/>
-                                      </p:to>
-                                    </p:set>
-                                  </p:childTnLst>
-                                </p:cTn>
-                              </p:par>
-                            </p:childTnLst>
-                          </p:cTn>
-                        </p:par>
-                      </p:childTnLst>
-                    </p:cTn>
-                  </p:par>
-                  <p:par>
-                    <p:cTn id="7" fill="hold">
-                      <p:stCondLst>
-                        <p:cond delay="indefinite"/>
-                      </p:stCondLst>
-                      <p:childTnLst>
-                        <p:par>
-                          <p:cTn id="8" fill="hold">
-                            <p:stCondLst>
-                              <p:cond delay="0"/>
-                            </p:stCondLst>
-                            <p:childTnLst>
-                              <p:par>
-                                <p:cTn id="9" presetID="1" presetClass="entr" presetSubtype="0" fill="hold" nodeType="clickEffect">
-                                  <p:stCondLst>
-                                    <p:cond delay="0"/>
-                                  </p:stCondLst>
-                                  <p:childTnLst>
-                                    <p:set>
-                                      <p:cBhvr>
-                                        <p:cTn id="10" dur="1" fill="hold">
-                                          <p:stCondLst>
-                                            <p:cond delay="0"/>
-                                          </p:stCondLst>
-                                        </p:cTn>
-                                        <p:tgtEl>
-                                          <p:spTgt spid="16"/>
-                                        </p:tgtEl>
-                                        <p:attrNameLst>
-                                          <p:attrName>style.visibility</p:attrName>
-                                        </p:attrNameLst>
-                                      </p:cBhvr>
-                                      <p:to>
-                                        <p:strVal val="visible"/>
-                                      </p:to>
-                                    </p:set>
-                                  </p:childTnLst>
-                                </p:cTn>
-                              </p:par>
-                            </p:childTnLst>
-                          </p:cTn>
-                        </p:par>
-                      </p:childTnLst>
-                    </p:cTn>
-                  </p:par>
-                  <p:par>
-                    <p:cTn id="11" fill="hold">
-                      <p:stCondLst>
-                        <p:cond delay="indefinite"/>
-                      </p:stCondLst>
-                      <p:childTnLst>
-                        <p:par>
-                          <p:cTn id="12" fill="hold">
-                            <p:stCondLst>
-                              <p:cond delay="0"/>
-                            </p:stCondLst>
-                            <p:childTnLst>
-                              <p:par>
-                                <p:cTn id="13" presetID="1" presetClass="entr" presetSubtype="0" fill="hold" nodeType="clickEffect">
-                                  <p:stCondLst>
-                                    <p:cond delay="0"/>
-                                  </p:stCondLst>
-                                  <p:childTnLst>
-                                    <p:set>
-                                      <p:cBhvr>
-                                        <p:cTn id="14" dur="1" fill="hold">
-                                          <p:stCondLst>
-                                            <p:cond delay="0"/>
-                                          </p:stCondLst>
-                                        </p:cTn>
-                                        <p:tgtEl>
-                                          <p:spTgt spid="15"/>
-                                        </p:tgtEl>
-                                        <p:attrNameLst>
-                                          <p:attrName>style.visibility</p:attrName>
-                                        </p:attrNameLst>
-                                      </p:cBhvr>
-                                      <p:to>
-                                        <p:strVal val="visible"/>
-                                      </p:to>
-                                    </p:set>
-                                  </p:childTnLst>
-                                </p:cTn>
-                              </p:par>
-                            </p:childTnLst>
-                          </p:cTn>
-                        </p:par>
-                      </p:childTnLst>
-                    </p:cTn>
-                  </p:par>
-                </p:childTnLst>
-              </p:cTn>
-              <p:prevCondLst>
-                <p:cond evt="onPrev" delay="0">
-                  <p:tgtEl>
-                    <p:sldTgt/>
-                  </p:tgtEl>
-                </p:cond>
-              </p:prevCondLst>
-              <p:nextCondLst>
-                <p:cond evt="onNext" delay="0">
-                  <p:tgtEl>
-                    <p:sldTgt/>
-                  </p:tgtEl>
-                </p:cond>
-              </p:nextCondLst>
-            </p:seq>
-          </p:childTnLst>
-        </p:cTn>
+        <p:cTn id="1" dur="indefinite" restart="never" nodeType="tmRoot"/>
       </p:par>
     </p:tnLst>
-    <p:bldLst>
-      <p:bldP spid="8" grpId="0" animBg="1"/>
-    </p:bldLst>
   </p:timing>
 </p:sld>
 </file>

</xml_diff>

<commit_message>
Added remarks to slide on complex numbers
</commit_message>
<xml_diff>
--- a/CPlusPlus/12_essential_cpp_numerics.pptx
+++ b/CPlusPlus/12_essential_cpp_numerics.pptx
@@ -200,7 +200,7 @@
           <a:p>
             <a:fld id="{79B8B1BA-E8A9-48CD-886E-2AED8C4BE354}" type="datetimeFigureOut">
               <a:rPr lang="en-US" smtClean="0"/>
-              <a:t>2017-03-24</a:t>
+              <a:t>2017-03-28</a:t>
             </a:fld>
             <a:endParaRPr lang="en-US"/>
           </a:p>
@@ -599,7 +599,7 @@
           <a:p>
             <a:fld id="{ABE0EDF4-4C0E-4772-84AE-1357C6001391}" type="datetime1">
               <a:rPr lang="en-US" smtClean="0"/>
-              <a:t>2017-03-24</a:t>
+              <a:t>2017-03-28</a:t>
             </a:fld>
             <a:endParaRPr lang="en-US"/>
           </a:p>
@@ -769,7 +769,7 @@
           <a:p>
             <a:fld id="{88C05809-344B-440B-9F88-C5B18C79382B}" type="datetime1">
               <a:rPr lang="en-US" smtClean="0"/>
-              <a:t>2017-03-24</a:t>
+              <a:t>2017-03-28</a:t>
             </a:fld>
             <a:endParaRPr lang="en-US"/>
           </a:p>
@@ -949,7 +949,7 @@
           <a:p>
             <a:fld id="{90F74260-95EE-4CD2-908E-53F4ED138E6A}" type="datetime1">
               <a:rPr lang="en-US" smtClean="0"/>
-              <a:t>2017-03-24</a:t>
+              <a:t>2017-03-28</a:t>
             </a:fld>
             <a:endParaRPr lang="en-US"/>
           </a:p>
@@ -1119,7 +1119,7 @@
           <a:p>
             <a:fld id="{1E3FA7D4-BD38-43A8-9130-CCA4F61A0EF1}" type="datetime1">
               <a:rPr lang="en-US" smtClean="0"/>
-              <a:t>2017-03-24</a:t>
+              <a:t>2017-03-28</a:t>
             </a:fld>
             <a:endParaRPr lang="en-US"/>
           </a:p>
@@ -1363,7 +1363,7 @@
           <a:p>
             <a:fld id="{096F3732-D81D-4EEE-A6C0-1A86B50EC6E7}" type="datetime1">
               <a:rPr lang="en-US" smtClean="0"/>
-              <a:t>2017-03-24</a:t>
+              <a:t>2017-03-28</a:t>
             </a:fld>
             <a:endParaRPr lang="en-US"/>
           </a:p>
@@ -1595,7 +1595,7 @@
           <a:p>
             <a:fld id="{08790459-F51D-4E85-A354-E358228D776E}" type="datetime1">
               <a:rPr lang="en-US" smtClean="0"/>
-              <a:t>2017-03-24</a:t>
+              <a:t>2017-03-28</a:t>
             </a:fld>
             <a:endParaRPr lang="en-US"/>
           </a:p>
@@ -1962,7 +1962,7 @@
           <a:p>
             <a:fld id="{B95FD88B-5497-4442-BF08-DF52AECDDAFE}" type="datetime1">
               <a:rPr lang="en-US" smtClean="0"/>
-              <a:t>2017-03-24</a:t>
+              <a:t>2017-03-28</a:t>
             </a:fld>
             <a:endParaRPr lang="en-US"/>
           </a:p>
@@ -2080,7 +2080,7 @@
           <a:p>
             <a:fld id="{CF2C86E3-CF93-475C-AE85-C652B2D2F9B5}" type="datetime1">
               <a:rPr lang="en-US" smtClean="0"/>
-              <a:t>2017-03-24</a:t>
+              <a:t>2017-03-28</a:t>
             </a:fld>
             <a:endParaRPr lang="en-US"/>
           </a:p>
@@ -2175,7 +2175,7 @@
           <a:p>
             <a:fld id="{F7F6E503-4705-4A51-BD29-968EA406E3C8}" type="datetime1">
               <a:rPr lang="en-US" smtClean="0"/>
-              <a:t>2017-03-24</a:t>
+              <a:t>2017-03-28</a:t>
             </a:fld>
             <a:endParaRPr lang="en-US"/>
           </a:p>
@@ -2452,7 +2452,7 @@
           <a:p>
             <a:fld id="{AF0FBBBB-E740-40DF-A365-D9B13EA44EB5}" type="datetime1">
               <a:rPr lang="en-US" smtClean="0"/>
-              <a:t>2017-03-24</a:t>
+              <a:t>2017-03-28</a:t>
             </a:fld>
             <a:endParaRPr lang="en-US"/>
           </a:p>
@@ -2709,7 +2709,7 @@
           <a:p>
             <a:fld id="{72BE145B-3D39-424D-9562-97A98B9610A2}" type="datetime1">
               <a:rPr lang="en-US" smtClean="0"/>
-              <a:t>2017-03-24</a:t>
+              <a:t>2017-03-28</a:t>
             </a:fld>
             <a:endParaRPr lang="en-US"/>
           </a:p>
@@ -2922,7 +2922,7 @@
           <a:p>
             <a:fld id="{623F5BA7-E58A-4B83-91F8-3B23CADD8CED}" type="datetime1">
               <a:rPr lang="en-US" smtClean="0"/>
-              <a:t>2017-03-24</a:t>
+              <a:t>2017-03-28</a:t>
             </a:fld>
             <a:endParaRPr lang="en-US"/>
           </a:p>
@@ -3756,7 +3756,7 @@
         <p:spPr>
           <a:xfrm>
             <a:off x="478707" y="1682819"/>
-            <a:ext cx="6472699" cy="1815882"/>
+            <a:ext cx="6472699" cy="2062103"/>
           </a:xfrm>
           <a:prstGeom prst="rect">
             <a:avLst/>
@@ -3785,6 +3785,13 @@
             </a:r>
           </a:p>
           <a:p>
+            <a:r>
+              <a:rPr lang="en-US" sz="1600" dirty="0" smtClean="0">
+                <a:latin typeface="Courier New" pitchFamily="49" charset="0"/>
+                <a:cs typeface="Courier New" pitchFamily="49" charset="0"/>
+              </a:rPr>
+              <a:t>…</a:t>
+            </a:r>
             <a:endParaRPr lang="en-US" sz="1600" dirty="0">
               <a:latin typeface="Courier New" pitchFamily="49" charset="0"/>
               <a:cs typeface="Courier New" pitchFamily="49" charset="0"/>
@@ -3842,14 +3849,20 @@
                 <a:latin typeface="Courier New" pitchFamily="49" charset="0"/>
                 <a:cs typeface="Courier New" pitchFamily="49" charset="0"/>
               </a:rPr>
-              <a:t>complex&lt;double&gt; a {2 + </a:t>
-            </a:r>
+              <a:t>…</a:t>
+            </a:r>
+            <a:endParaRPr lang="en-US" sz="1600" dirty="0" smtClean="0">
+              <a:latin typeface="Courier New" pitchFamily="49" charset="0"/>
+              <a:cs typeface="Courier New" pitchFamily="49" charset="0"/>
+            </a:endParaRPr>
+          </a:p>
+          <a:p>
             <a:r>
               <a:rPr lang="en-US" sz="1600" dirty="0" smtClean="0">
                 <a:latin typeface="Courier New" pitchFamily="49" charset="0"/>
                 <a:cs typeface="Courier New" pitchFamily="49" charset="0"/>
               </a:rPr>
-              <a:t>3i};</a:t>
+              <a:t>complex&lt;double&gt; a {2 + 3i};</a:t>
             </a:r>
           </a:p>
           <a:p>
@@ -3939,13 +3952,234 @@
               </a:rPr>
               <a:t>;</a:t>
             </a:r>
-            <a:endParaRPr lang="en-US" sz="1600" dirty="0" smtClean="0">
-              <a:latin typeface="Courier New" pitchFamily="49" charset="0"/>
-              <a:cs typeface="Courier New" pitchFamily="49" charset="0"/>
-            </a:endParaRPr>
-          </a:p>
-        </p:txBody>
-      </p:sp>
+          </a:p>
+        </p:txBody>
+      </p:sp>
+      <p:grpSp>
+        <p:nvGrpSpPr>
+          <p:cNvPr id="13" name="Group 12"/>
+          <p:cNvGrpSpPr/>
+          <p:nvPr/>
+        </p:nvGrpSpPr>
+        <p:grpSpPr>
+          <a:xfrm>
+            <a:off x="4011561" y="1905246"/>
+            <a:ext cx="4103112" cy="1191915"/>
+            <a:chOff x="4011561" y="1905246"/>
+            <a:chExt cx="4103112" cy="1191915"/>
+          </a:xfrm>
+        </p:grpSpPr>
+        <p:sp>
+          <p:nvSpPr>
+            <p:cNvPr id="3" name="TextBox 2"/>
+            <p:cNvSpPr txBox="1"/>
+            <p:nvPr/>
+          </p:nvSpPr>
+          <p:spPr>
+            <a:xfrm>
+              <a:off x="5788139" y="1905246"/>
+              <a:ext cx="2326534" cy="646331"/>
+            </a:xfrm>
+            <a:prstGeom prst="rect">
+              <a:avLst/>
+            </a:prstGeom>
+            <a:solidFill>
+              <a:schemeClr val="bg1"/>
+            </a:solidFill>
+            <a:ln>
+              <a:solidFill>
+                <a:schemeClr val="tx1"/>
+              </a:solidFill>
+            </a:ln>
+          </p:spPr>
+          <p:txBody>
+            <a:bodyPr wrap="none" rtlCol="0">
+              <a:spAutoFit/>
+            </a:bodyPr>
+            <a:lstStyle/>
+            <a:p>
+              <a:r>
+                <a:rPr lang="en-US" dirty="0" smtClean="0"/>
+                <a:t>Conveniently work</a:t>
+              </a:r>
+              <a:br>
+                <a:rPr lang="en-US" dirty="0" smtClean="0"/>
+              </a:br>
+              <a:r>
+                <a:rPr lang="en-US" dirty="0" smtClean="0"/>
+                <a:t>with complex numbers</a:t>
+              </a:r>
+              <a:endParaRPr lang="en-US" dirty="0"/>
+            </a:p>
+          </p:txBody>
+        </p:sp>
+        <p:cxnSp>
+          <p:nvCxnSpPr>
+            <p:cNvPr id="5" name="Straight Arrow Connector 4"/>
+            <p:cNvCxnSpPr>
+              <a:stCxn id="3" idx="1"/>
+            </p:cNvCxnSpPr>
+            <p:nvPr/>
+          </p:nvCxnSpPr>
+          <p:spPr>
+            <a:xfrm flipH="1">
+              <a:off x="4572001" y="2228412"/>
+              <a:ext cx="1216138" cy="337807"/>
+            </a:xfrm>
+            <a:prstGeom prst="straightConnector1">
+              <a:avLst/>
+            </a:prstGeom>
+            <a:ln>
+              <a:solidFill>
+                <a:schemeClr val="tx1"/>
+              </a:solidFill>
+              <a:tailEnd type="stealth" w="lg" len="lg"/>
+            </a:ln>
+          </p:spPr>
+          <p:style>
+            <a:lnRef idx="1">
+              <a:schemeClr val="accent1"/>
+            </a:lnRef>
+            <a:fillRef idx="0">
+              <a:schemeClr val="accent1"/>
+            </a:fillRef>
+            <a:effectRef idx="0">
+              <a:schemeClr val="accent1"/>
+            </a:effectRef>
+            <a:fontRef idx="minor">
+              <a:schemeClr val="tx1"/>
+            </a:fontRef>
+          </p:style>
+        </p:cxnSp>
+        <p:cxnSp>
+          <p:nvCxnSpPr>
+            <p:cNvPr id="8" name="Straight Arrow Connector 7"/>
+            <p:cNvCxnSpPr>
+              <a:stCxn id="3" idx="1"/>
+            </p:cNvCxnSpPr>
+            <p:nvPr/>
+          </p:nvCxnSpPr>
+          <p:spPr>
+            <a:xfrm flipH="1">
+              <a:off x="4011561" y="2228412"/>
+              <a:ext cx="1776578" cy="868749"/>
+            </a:xfrm>
+            <a:prstGeom prst="straightConnector1">
+              <a:avLst/>
+            </a:prstGeom>
+            <a:ln>
+              <a:solidFill>
+                <a:schemeClr val="tx1"/>
+              </a:solidFill>
+              <a:tailEnd type="stealth" w="lg" len="lg"/>
+            </a:ln>
+          </p:spPr>
+          <p:style>
+            <a:lnRef idx="1">
+              <a:schemeClr val="accent1"/>
+            </a:lnRef>
+            <a:fillRef idx="0">
+              <a:schemeClr val="accent1"/>
+            </a:fillRef>
+            <a:effectRef idx="0">
+              <a:schemeClr val="accent1"/>
+            </a:effectRef>
+            <a:fontRef idx="minor">
+              <a:schemeClr val="tx1"/>
+            </a:fontRef>
+          </p:style>
+        </p:cxnSp>
+      </p:grpSp>
+      <p:grpSp>
+        <p:nvGrpSpPr>
+          <p:cNvPr id="18" name="Group 17"/>
+          <p:cNvGrpSpPr/>
+          <p:nvPr/>
+        </p:nvGrpSpPr>
+        <p:grpSpPr>
+          <a:xfrm>
+            <a:off x="1997804" y="3744922"/>
+            <a:ext cx="2892587" cy="795992"/>
+            <a:chOff x="1997804" y="3744922"/>
+            <a:chExt cx="2892587" cy="795992"/>
+          </a:xfrm>
+        </p:grpSpPr>
+        <p:sp>
+          <p:nvSpPr>
+            <p:cNvPr id="14" name="TextBox 13"/>
+            <p:cNvSpPr txBox="1"/>
+            <p:nvPr/>
+          </p:nvSpPr>
+          <p:spPr>
+            <a:xfrm>
+              <a:off x="1997804" y="4171582"/>
+              <a:ext cx="2892587" cy="369332"/>
+            </a:xfrm>
+            <a:prstGeom prst="rect">
+              <a:avLst/>
+            </a:prstGeom>
+            <a:solidFill>
+              <a:schemeClr val="bg1"/>
+            </a:solidFill>
+            <a:ln>
+              <a:solidFill>
+                <a:schemeClr val="tx1"/>
+              </a:solidFill>
+            </a:ln>
+          </p:spPr>
+          <p:txBody>
+            <a:bodyPr wrap="none" rtlCol="0">
+              <a:spAutoFit/>
+            </a:bodyPr>
+            <a:lstStyle/>
+            <a:p>
+              <a:r>
+                <a:rPr lang="en-US" dirty="0" smtClean="0"/>
+                <a:t>(Overloaded) math functions</a:t>
+              </a:r>
+              <a:endParaRPr lang="en-US" dirty="0"/>
+            </a:p>
+          </p:txBody>
+        </p:sp>
+        <p:cxnSp>
+          <p:nvCxnSpPr>
+            <p:cNvPr id="15" name="Straight Arrow Connector 14"/>
+            <p:cNvCxnSpPr>
+              <a:stCxn id="14" idx="0"/>
+            </p:cNvCxnSpPr>
+            <p:nvPr/>
+          </p:nvCxnSpPr>
+          <p:spPr>
+            <a:xfrm flipH="1" flipV="1">
+              <a:off x="1997804" y="3744922"/>
+              <a:ext cx="1446294" cy="426660"/>
+            </a:xfrm>
+            <a:prstGeom prst="straightConnector1">
+              <a:avLst/>
+            </a:prstGeom>
+            <a:ln>
+              <a:solidFill>
+                <a:schemeClr val="tx1"/>
+              </a:solidFill>
+              <a:tailEnd type="stealth" w="lg" len="lg"/>
+            </a:ln>
+          </p:spPr>
+          <p:style>
+            <a:lnRef idx="1">
+              <a:schemeClr val="accent1"/>
+            </a:lnRef>
+            <a:fillRef idx="0">
+              <a:schemeClr val="accent1"/>
+            </a:fillRef>
+            <a:effectRef idx="0">
+              <a:schemeClr val="accent1"/>
+            </a:effectRef>
+            <a:fontRef idx="minor">
+              <a:schemeClr val="tx1"/>
+            </a:fontRef>
+          </p:style>
+        </p:cxnSp>
+      </p:grpSp>
     </p:spTree>
     <p:extLst>
       <p:ext uri="{BB962C8B-B14F-4D97-AF65-F5344CB8AC3E}">
@@ -3959,7 +4193,120 @@
   <p:timing>
     <p:tnLst>
       <p:par>
-        <p:cTn id="1" dur="indefinite" restart="never" nodeType="tmRoot"/>
+        <p:cTn id="1" dur="indefinite" restart="never" nodeType="tmRoot">
+          <p:childTnLst>
+            <p:seq concurrent="1" nextAc="seek">
+              <p:cTn id="2" dur="indefinite" nodeType="mainSeq">
+                <p:childTnLst>
+                  <p:par>
+                    <p:cTn id="3" fill="hold">
+                      <p:stCondLst>
+                        <p:cond delay="indefinite"/>
+                      </p:stCondLst>
+                      <p:childTnLst>
+                        <p:par>
+                          <p:cTn id="4" fill="hold">
+                            <p:stCondLst>
+                              <p:cond delay="0"/>
+                            </p:stCondLst>
+                            <p:childTnLst>
+                              <p:par>
+                                <p:cTn id="5" presetID="1" presetClass="entr" presetSubtype="0" fill="hold" nodeType="clickEffect">
+                                  <p:stCondLst>
+                                    <p:cond delay="0"/>
+                                  </p:stCondLst>
+                                  <p:childTnLst>
+                                    <p:set>
+                                      <p:cBhvr>
+                                        <p:cTn id="6" dur="1" fill="hold">
+                                          <p:stCondLst>
+                                            <p:cond delay="0"/>
+                                          </p:stCondLst>
+                                        </p:cTn>
+                                        <p:tgtEl>
+                                          <p:spTgt spid="13"/>
+                                        </p:tgtEl>
+                                        <p:attrNameLst>
+                                          <p:attrName>style.visibility</p:attrName>
+                                        </p:attrNameLst>
+                                      </p:cBhvr>
+                                      <p:to>
+                                        <p:strVal val="visible"/>
+                                      </p:to>
+                                    </p:set>
+                                  </p:childTnLst>
+                                </p:cTn>
+                              </p:par>
+                            </p:childTnLst>
+                          </p:cTn>
+                        </p:par>
+                      </p:childTnLst>
+                    </p:cTn>
+                  </p:par>
+                  <p:par>
+                    <p:cTn id="7" fill="hold">
+                      <p:stCondLst>
+                        <p:cond delay="indefinite"/>
+                      </p:stCondLst>
+                      <p:childTnLst>
+                        <p:par>
+                          <p:cTn id="8" fill="hold">
+                            <p:stCondLst>
+                              <p:cond delay="0"/>
+                            </p:stCondLst>
+                            <p:childTnLst>
+                              <p:par>
+                                <p:cTn id="9" presetID="1" presetClass="entr" presetSubtype="0" fill="hold" nodeType="clickEffect">
+                                  <p:stCondLst>
+                                    <p:cond delay="0"/>
+                                  </p:stCondLst>
+                                  <p:childTnLst>
+                                    <p:set>
+                                      <p:cBhvr>
+                                        <p:cTn id="10" dur="1" fill="hold">
+                                          <p:stCondLst>
+                                            <p:cond delay="0"/>
+                                          </p:stCondLst>
+                                        </p:cTn>
+                                        <p:tgtEl>
+                                          <p:spTgt spid="18"/>
+                                        </p:tgtEl>
+                                        <p:attrNameLst>
+                                          <p:attrName>style.visibility</p:attrName>
+                                        </p:attrNameLst>
+                                      </p:cBhvr>
+                                      <p:to>
+                                        <p:strVal val="visible"/>
+                                      </p:to>
+                                    </p:set>
+                                  </p:childTnLst>
+                                </p:cTn>
+                              </p:par>
+                            </p:childTnLst>
+                          </p:cTn>
+                        </p:par>
+                      </p:childTnLst>
+                    </p:cTn>
+                  </p:par>
+                </p:childTnLst>
+              </p:cTn>
+              <p:prevCondLst>
+                <p:cond evt="onPrev" delay="0">
+                  <p:tgtEl>
+                    <p:sldTgt/>
+                  </p:tgtEl>
+                </p:cond>
+              </p:prevCondLst>
+              <p:nextCondLst>
+                <p:cond evt="onNext" delay="0">
+                  <p:tgtEl>
+                    <p:sldTgt/>
+                  </p:tgtEl>
+                </p:cond>
+              </p:nextCondLst>
+            </p:seq>
+          </p:childTnLst>
+        </p:cTn>
       </p:par>
     </p:tnLst>
   </p:timing>
@@ -4032,7 +4379,6 @@
               <a:rPr lang="en-US" dirty="0" smtClean="0"/>
               <a:t>Value arrays, see section on containers</a:t>
             </a:r>
-            <a:endParaRPr lang="en-US" dirty="0" smtClean="0"/>
           </a:p>
           <a:p>
             <a:r>
@@ -4046,7 +4392,6 @@
               <a:rPr lang="en-US" dirty="0" smtClean="0"/>
               <a:t>ODEs with Boost</a:t>
             </a:r>
-            <a:endParaRPr lang="en-US" dirty="0" smtClean="0"/>
           </a:p>
           <a:p>
             <a:pPr lvl="1"/>

</xml_diff>

<commit_message>
Removed comment about non-standard complex number literals definitions
</commit_message>
<xml_diff>
--- a/CPlusPlus/12_essential_cpp_numerics.pptx
+++ b/CPlusPlus/12_essential_cpp_numerics.pptx
@@ -200,7 +200,7 @@
           <a:p>
             <a:fld id="{79B8B1BA-E8A9-48CD-886E-2AED8C4BE354}" type="datetimeFigureOut">
               <a:rPr lang="en-US" smtClean="0"/>
-              <a:t>2017-03-28</a:t>
+              <a:t>2017-03-30</a:t>
             </a:fld>
             <a:endParaRPr lang="en-US"/>
           </a:p>
@@ -599,7 +599,7 @@
           <a:p>
             <a:fld id="{ABE0EDF4-4C0E-4772-84AE-1357C6001391}" type="datetime1">
               <a:rPr lang="en-US" smtClean="0"/>
-              <a:t>2017-03-28</a:t>
+              <a:t>2017-03-30</a:t>
             </a:fld>
             <a:endParaRPr lang="en-US"/>
           </a:p>
@@ -769,7 +769,7 @@
           <a:p>
             <a:fld id="{88C05809-344B-440B-9F88-C5B18C79382B}" type="datetime1">
               <a:rPr lang="en-US" smtClean="0"/>
-              <a:t>2017-03-28</a:t>
+              <a:t>2017-03-30</a:t>
             </a:fld>
             <a:endParaRPr lang="en-US"/>
           </a:p>
@@ -949,7 +949,7 @@
           <a:p>
             <a:fld id="{90F74260-95EE-4CD2-908E-53F4ED138E6A}" type="datetime1">
               <a:rPr lang="en-US" smtClean="0"/>
-              <a:t>2017-03-28</a:t>
+              <a:t>2017-03-30</a:t>
             </a:fld>
             <a:endParaRPr lang="en-US"/>
           </a:p>
@@ -1119,7 +1119,7 @@
           <a:p>
             <a:fld id="{1E3FA7D4-BD38-43A8-9130-CCA4F61A0EF1}" type="datetime1">
               <a:rPr lang="en-US" smtClean="0"/>
-              <a:t>2017-03-28</a:t>
+              <a:t>2017-03-30</a:t>
             </a:fld>
             <a:endParaRPr lang="en-US"/>
           </a:p>
@@ -1363,7 +1363,7 @@
           <a:p>
             <a:fld id="{096F3732-D81D-4EEE-A6C0-1A86B50EC6E7}" type="datetime1">
               <a:rPr lang="en-US" smtClean="0"/>
-              <a:t>2017-03-28</a:t>
+              <a:t>2017-03-30</a:t>
             </a:fld>
             <a:endParaRPr lang="en-US"/>
           </a:p>
@@ -1595,7 +1595,7 @@
           <a:p>
             <a:fld id="{08790459-F51D-4E85-A354-E358228D776E}" type="datetime1">
               <a:rPr lang="en-US" smtClean="0"/>
-              <a:t>2017-03-28</a:t>
+              <a:t>2017-03-30</a:t>
             </a:fld>
             <a:endParaRPr lang="en-US"/>
           </a:p>
@@ -1962,7 +1962,7 @@
           <a:p>
             <a:fld id="{B95FD88B-5497-4442-BF08-DF52AECDDAFE}" type="datetime1">
               <a:rPr lang="en-US" smtClean="0"/>
-              <a:t>2017-03-28</a:t>
+              <a:t>2017-03-30</a:t>
             </a:fld>
             <a:endParaRPr lang="en-US"/>
           </a:p>
@@ -2080,7 +2080,7 @@
           <a:p>
             <a:fld id="{CF2C86E3-CF93-475C-AE85-C652B2D2F9B5}" type="datetime1">
               <a:rPr lang="en-US" smtClean="0"/>
-              <a:t>2017-03-28</a:t>
+              <a:t>2017-03-30</a:t>
             </a:fld>
             <a:endParaRPr lang="en-US"/>
           </a:p>
@@ -2175,7 +2175,7 @@
           <a:p>
             <a:fld id="{F7F6E503-4705-4A51-BD29-968EA406E3C8}" type="datetime1">
               <a:rPr lang="en-US" smtClean="0"/>
-              <a:t>2017-03-28</a:t>
+              <a:t>2017-03-30</a:t>
             </a:fld>
             <a:endParaRPr lang="en-US"/>
           </a:p>
@@ -2452,7 +2452,7 @@
           <a:p>
             <a:fld id="{AF0FBBBB-E740-40DF-A365-D9B13EA44EB5}" type="datetime1">
               <a:rPr lang="en-US" smtClean="0"/>
-              <a:t>2017-03-28</a:t>
+              <a:t>2017-03-30</a:t>
             </a:fld>
             <a:endParaRPr lang="en-US"/>
           </a:p>
@@ -2709,7 +2709,7 @@
           <a:p>
             <a:fld id="{72BE145B-3D39-424D-9562-97A98B9610A2}" type="datetime1">
               <a:rPr lang="en-US" smtClean="0"/>
-              <a:t>2017-03-28</a:t>
+              <a:t>2017-03-30</a:t>
             </a:fld>
             <a:endParaRPr lang="en-US"/>
           </a:p>
@@ -2922,7 +2922,7 @@
           <a:p>
             <a:fld id="{623F5BA7-E58A-4B83-91F8-3B23CADD8CED}" type="datetime1">
               <a:rPr lang="en-US" smtClean="0"/>
-              <a:t>2017-03-28</a:t>
+              <a:t>2017-03-30</a:t>
             </a:fld>
             <a:endParaRPr lang="en-US"/>
           </a:p>
@@ -3756,7 +3756,7 @@
         <p:spPr>
           <a:xfrm>
             <a:off x="478707" y="1682819"/>
-            <a:ext cx="6472699" cy="2062103"/>
+            <a:ext cx="6472699" cy="1815882"/>
           </a:xfrm>
           <a:prstGeom prst="rect">
             <a:avLst/>
@@ -3826,14 +3826,68 @@
                 <a:latin typeface="Courier New" pitchFamily="49" charset="0"/>
                 <a:cs typeface="Courier New" pitchFamily="49" charset="0"/>
               </a:rPr>
-              <a:t>using namespace </a:t>
-            </a:r>
+              <a:t>…</a:t>
+            </a:r>
+            <a:endParaRPr lang="en-US" sz="1600" dirty="0" smtClean="0">
+              <a:latin typeface="Courier New" pitchFamily="49" charset="0"/>
+              <a:cs typeface="Courier New" pitchFamily="49" charset="0"/>
+            </a:endParaRPr>
+          </a:p>
+          <a:p>
+            <a:r>
+              <a:rPr lang="en-US" sz="1600" dirty="0" smtClean="0">
+                <a:latin typeface="Courier New" pitchFamily="49" charset="0"/>
+                <a:cs typeface="Courier New" pitchFamily="49" charset="0"/>
+              </a:rPr>
+              <a:t>complex&lt;double&gt; </a:t>
+            </a:r>
+            <a:r>
+              <a:rPr lang="en-US" sz="1600" dirty="0" smtClean="0">
+                <a:latin typeface="Courier New" pitchFamily="49" charset="0"/>
+                <a:cs typeface="Courier New" pitchFamily="49" charset="0"/>
+              </a:rPr>
+              <a:t>a(2, 3);</a:t>
+            </a:r>
+            <a:endParaRPr lang="en-US" sz="1600" dirty="0" smtClean="0">
+              <a:latin typeface="Courier New" pitchFamily="49" charset="0"/>
+              <a:cs typeface="Courier New" pitchFamily="49" charset="0"/>
+            </a:endParaRPr>
+          </a:p>
+          <a:p>
             <a:r>
               <a:rPr lang="en-US" sz="1600" dirty="0" err="1" smtClean="0">
                 <a:latin typeface="Courier New" pitchFamily="49" charset="0"/>
                 <a:cs typeface="Courier New" pitchFamily="49" charset="0"/>
               </a:rPr>
-              <a:t>complex_literal</a:t>
+              <a:t>cout</a:t>
+            </a:r>
+            <a:r>
+              <a:rPr lang="en-US" sz="1600" dirty="0" smtClean="0">
+                <a:latin typeface="Courier New" pitchFamily="49" charset="0"/>
+                <a:cs typeface="Courier New" pitchFamily="49" charset="0"/>
+              </a:rPr>
+              <a:t> &lt;&lt; real(a) &lt;&lt; ", " &lt;&lt; </a:t>
+            </a:r>
+            <a:r>
+              <a:rPr lang="en-US" sz="1600" dirty="0" err="1" smtClean="0">
+                <a:latin typeface="Courier New" pitchFamily="49" charset="0"/>
+                <a:cs typeface="Courier New" pitchFamily="49" charset="0"/>
+              </a:rPr>
+              <a:t>imag</a:t>
+            </a:r>
+            <a:r>
+              <a:rPr lang="en-US" sz="1600" dirty="0" smtClean="0">
+                <a:latin typeface="Courier New" pitchFamily="49" charset="0"/>
+                <a:cs typeface="Courier New" pitchFamily="49" charset="0"/>
+              </a:rPr>
+              <a:t>(a) &lt;&lt; </a:t>
+            </a:r>
+            <a:r>
+              <a:rPr lang="en-US" sz="1600" dirty="0" err="1" smtClean="0">
+                <a:latin typeface="Courier New" pitchFamily="49" charset="0"/>
+                <a:cs typeface="Courier New" pitchFamily="49" charset="0"/>
+              </a:rPr>
+              <a:t>endl</a:t>
             </a:r>
             <a:r>
               <a:rPr lang="en-US" sz="1600" dirty="0" smtClean="0">
@@ -3845,28 +3899,6 @@
           </a:p>
           <a:p>
             <a:r>
-              <a:rPr lang="en-US" sz="1600" dirty="0" smtClean="0">
-                <a:latin typeface="Courier New" pitchFamily="49" charset="0"/>
-                <a:cs typeface="Courier New" pitchFamily="49" charset="0"/>
-              </a:rPr>
-              <a:t>…</a:t>
-            </a:r>
-            <a:endParaRPr lang="en-US" sz="1600" dirty="0" smtClean="0">
-              <a:latin typeface="Courier New" pitchFamily="49" charset="0"/>
-              <a:cs typeface="Courier New" pitchFamily="49" charset="0"/>
-            </a:endParaRPr>
-          </a:p>
-          <a:p>
-            <a:r>
-              <a:rPr lang="en-US" sz="1600" dirty="0" smtClean="0">
-                <a:latin typeface="Courier New" pitchFamily="49" charset="0"/>
-                <a:cs typeface="Courier New" pitchFamily="49" charset="0"/>
-              </a:rPr>
-              <a:t>complex&lt;double&gt; a {2 + 3i};</a:t>
-            </a:r>
-          </a:p>
-          <a:p>
-            <a:r>
               <a:rPr lang="en-US" sz="1600" dirty="0" err="1" smtClean="0">
                 <a:latin typeface="Courier New" pitchFamily="49" charset="0"/>
                 <a:cs typeface="Courier New" pitchFamily="49" charset="0"/>
@@ -3878,14 +3910,14 @@
                 <a:latin typeface="Courier New" pitchFamily="49" charset="0"/>
                 <a:cs typeface="Courier New" pitchFamily="49" charset="0"/>
               </a:rPr>
-              <a:t> &lt;&lt; real(a) &lt;&lt; ", " &lt;&lt; </a:t>
+              <a:t> &lt;&lt; </a:t>
             </a:r>
             <a:r>
               <a:rPr lang="en-US" sz="1600" dirty="0" err="1" smtClean="0">
                 <a:latin typeface="Courier New" pitchFamily="49" charset="0"/>
                 <a:cs typeface="Courier New" pitchFamily="49" charset="0"/>
               </a:rPr>
-              <a:t>imag</a:t>
+              <a:t>sqrt</a:t>
             </a:r>
             <a:r>
               <a:rPr lang="en-US" sz="1600" dirty="0" smtClean="0">
@@ -3909,187 +3941,8 @@
               <a:t>;</a:t>
             </a:r>
           </a:p>
-          <a:p>
-            <a:r>
-              <a:rPr lang="en-US" sz="1600" dirty="0" err="1" smtClean="0">
-                <a:latin typeface="Courier New" pitchFamily="49" charset="0"/>
-                <a:cs typeface="Courier New" pitchFamily="49" charset="0"/>
-              </a:rPr>
-              <a:t>cout</a:t>
-            </a:r>
-            <a:r>
-              <a:rPr lang="en-US" sz="1600" dirty="0" smtClean="0">
-                <a:latin typeface="Courier New" pitchFamily="49" charset="0"/>
-                <a:cs typeface="Courier New" pitchFamily="49" charset="0"/>
-              </a:rPr>
-              <a:t> &lt;&lt; </a:t>
-            </a:r>
-            <a:r>
-              <a:rPr lang="en-US" sz="1600" dirty="0" err="1" smtClean="0">
-                <a:latin typeface="Courier New" pitchFamily="49" charset="0"/>
-                <a:cs typeface="Courier New" pitchFamily="49" charset="0"/>
-              </a:rPr>
-              <a:t>sqrt</a:t>
-            </a:r>
-            <a:r>
-              <a:rPr lang="en-US" sz="1600" dirty="0" smtClean="0">
-                <a:latin typeface="Courier New" pitchFamily="49" charset="0"/>
-                <a:cs typeface="Courier New" pitchFamily="49" charset="0"/>
-              </a:rPr>
-              <a:t>(a) &lt;&lt; </a:t>
-            </a:r>
-            <a:r>
-              <a:rPr lang="en-US" sz="1600" dirty="0" err="1" smtClean="0">
-                <a:latin typeface="Courier New" pitchFamily="49" charset="0"/>
-                <a:cs typeface="Courier New" pitchFamily="49" charset="0"/>
-              </a:rPr>
-              <a:t>endl</a:t>
-            </a:r>
-            <a:r>
-              <a:rPr lang="en-US" sz="1600" dirty="0" smtClean="0">
-                <a:latin typeface="Courier New" pitchFamily="49" charset="0"/>
-                <a:cs typeface="Courier New" pitchFamily="49" charset="0"/>
-              </a:rPr>
-              <a:t>;</a:t>
-            </a:r>
-          </a:p>
-        </p:txBody>
-      </p:sp>
-      <p:grpSp>
-        <p:nvGrpSpPr>
-          <p:cNvPr id="13" name="Group 12"/>
-          <p:cNvGrpSpPr/>
-          <p:nvPr/>
-        </p:nvGrpSpPr>
-        <p:grpSpPr>
-          <a:xfrm>
-            <a:off x="4011561" y="1905246"/>
-            <a:ext cx="4103112" cy="1191915"/>
-            <a:chOff x="4011561" y="1905246"/>
-            <a:chExt cx="4103112" cy="1191915"/>
-          </a:xfrm>
-        </p:grpSpPr>
-        <p:sp>
-          <p:nvSpPr>
-            <p:cNvPr id="3" name="TextBox 2"/>
-            <p:cNvSpPr txBox="1"/>
-            <p:nvPr/>
-          </p:nvSpPr>
-          <p:spPr>
-            <a:xfrm>
-              <a:off x="5788139" y="1905246"/>
-              <a:ext cx="2326534" cy="646331"/>
-            </a:xfrm>
-            <a:prstGeom prst="rect">
-              <a:avLst/>
-            </a:prstGeom>
-            <a:solidFill>
-              <a:schemeClr val="bg1"/>
-            </a:solidFill>
-            <a:ln>
-              <a:solidFill>
-                <a:schemeClr val="tx1"/>
-              </a:solidFill>
-            </a:ln>
-          </p:spPr>
-          <p:txBody>
-            <a:bodyPr wrap="none" rtlCol="0">
-              <a:spAutoFit/>
-            </a:bodyPr>
-            <a:lstStyle/>
-            <a:p>
-              <a:r>
-                <a:rPr lang="en-US" dirty="0" smtClean="0"/>
-                <a:t>Conveniently work</a:t>
-              </a:r>
-              <a:br>
-                <a:rPr lang="en-US" dirty="0" smtClean="0"/>
-              </a:br>
-              <a:r>
-                <a:rPr lang="en-US" dirty="0" smtClean="0"/>
-                <a:t>with complex numbers</a:t>
-              </a:r>
-              <a:endParaRPr lang="en-US" dirty="0"/>
-            </a:p>
-          </p:txBody>
-        </p:sp>
-        <p:cxnSp>
-          <p:nvCxnSpPr>
-            <p:cNvPr id="5" name="Straight Arrow Connector 4"/>
-            <p:cNvCxnSpPr>
-              <a:stCxn id="3" idx="1"/>
-            </p:cNvCxnSpPr>
-            <p:nvPr/>
-          </p:nvCxnSpPr>
-          <p:spPr>
-            <a:xfrm flipH="1">
-              <a:off x="4572001" y="2228412"/>
-              <a:ext cx="1216138" cy="337807"/>
-            </a:xfrm>
-            <a:prstGeom prst="straightConnector1">
-              <a:avLst/>
-            </a:prstGeom>
-            <a:ln>
-              <a:solidFill>
-                <a:schemeClr val="tx1"/>
-              </a:solidFill>
-              <a:tailEnd type="stealth" w="lg" len="lg"/>
-            </a:ln>
-          </p:spPr>
-          <p:style>
-            <a:lnRef idx="1">
-              <a:schemeClr val="accent1"/>
-            </a:lnRef>
-            <a:fillRef idx="0">
-              <a:schemeClr val="accent1"/>
-            </a:fillRef>
-            <a:effectRef idx="0">
-              <a:schemeClr val="accent1"/>
-            </a:effectRef>
-            <a:fontRef idx="minor">
-              <a:schemeClr val="tx1"/>
-            </a:fontRef>
-          </p:style>
-        </p:cxnSp>
-        <p:cxnSp>
-          <p:nvCxnSpPr>
-            <p:cNvPr id="8" name="Straight Arrow Connector 7"/>
-            <p:cNvCxnSpPr>
-              <a:stCxn id="3" idx="1"/>
-            </p:cNvCxnSpPr>
-            <p:nvPr/>
-          </p:nvCxnSpPr>
-          <p:spPr>
-            <a:xfrm flipH="1">
-              <a:off x="4011561" y="2228412"/>
-              <a:ext cx="1776578" cy="868749"/>
-            </a:xfrm>
-            <a:prstGeom prst="straightConnector1">
-              <a:avLst/>
-            </a:prstGeom>
-            <a:ln>
-              <a:solidFill>
-                <a:schemeClr val="tx1"/>
-              </a:solidFill>
-              <a:tailEnd type="stealth" w="lg" len="lg"/>
-            </a:ln>
-          </p:spPr>
-          <p:style>
-            <a:lnRef idx="1">
-              <a:schemeClr val="accent1"/>
-            </a:lnRef>
-            <a:fillRef idx="0">
-              <a:schemeClr val="accent1"/>
-            </a:fillRef>
-            <a:effectRef idx="0">
-              <a:schemeClr val="accent1"/>
-            </a:effectRef>
-            <a:fontRef idx="minor">
-              <a:schemeClr val="tx1"/>
-            </a:fontRef>
-          </p:style>
-        </p:cxnSp>
-      </p:grpSp>
+        </p:txBody>
+      </p:sp>
       <p:grpSp>
         <p:nvGrpSpPr>
           <p:cNvPr id="18" name="Group 17"/>
@@ -4098,7 +3951,7 @@
         </p:nvGrpSpPr>
         <p:grpSpPr>
           <a:xfrm>
-            <a:off x="1997804" y="3744922"/>
+            <a:off x="1968307" y="3498701"/>
             <a:ext cx="2892587" cy="795992"/>
             <a:chOff x="1997804" y="3744922"/>
             <a:chExt cx="2892587" cy="795992"/>
@@ -4219,51 +4072,6 @@
                                     <p:set>
                                       <p:cBhvr>
                                         <p:cTn id="6" dur="1" fill="hold">
-                                          <p:stCondLst>
-                                            <p:cond delay="0"/>
-                                          </p:stCondLst>
-                                        </p:cTn>
-                                        <p:tgtEl>
-                                          <p:spTgt spid="13"/>
-                                        </p:tgtEl>
-                                        <p:attrNameLst>
-                                          <p:attrName>style.visibility</p:attrName>
-                                        </p:attrNameLst>
-                                      </p:cBhvr>
-                                      <p:to>
-                                        <p:strVal val="visible"/>
-                                      </p:to>
-                                    </p:set>
-                                  </p:childTnLst>
-                                </p:cTn>
-                              </p:par>
-                            </p:childTnLst>
-                          </p:cTn>
-                        </p:par>
-                      </p:childTnLst>
-                    </p:cTn>
-                  </p:par>
-                  <p:par>
-                    <p:cTn id="7" fill="hold">
-                      <p:stCondLst>
-                        <p:cond delay="indefinite"/>
-                      </p:stCondLst>
-                      <p:childTnLst>
-                        <p:par>
-                          <p:cTn id="8" fill="hold">
-                            <p:stCondLst>
-                              <p:cond delay="0"/>
-                            </p:stCondLst>
-                            <p:childTnLst>
-                              <p:par>
-                                <p:cTn id="9" presetID="1" presetClass="entr" presetSubtype="0" fill="hold" nodeType="clickEffect">
-                                  <p:stCondLst>
-                                    <p:cond delay="0"/>
-                                  </p:stCondLst>
-                                  <p:childTnLst>
-                                    <p:set>
-                                      <p:cBhvr>
-                                        <p:cTn id="10" dur="1" fill="hold">
                                           <p:stCondLst>
                                             <p:cond delay="0"/>
                                           </p:stCondLst>

</xml_diff>

<commit_message>
Replaced complex sample code with Julia set example
</commit_message>
<xml_diff>
--- a/CPlusPlus/12_essential_cpp_numerics.pptx
+++ b/CPlusPlus/12_essential_cpp_numerics.pptx
@@ -5,13 +5,16 @@
     <p:sldMasterId id="2147483660" r:id="rId1"/>
   </p:sldMasterIdLst>
   <p:notesMasterIdLst>
-    <p:notesMasterId r:id="rId6"/>
+    <p:notesMasterId r:id="rId9"/>
   </p:notesMasterIdLst>
   <p:sldIdLst>
     <p:sldId id="257" r:id="rId2"/>
     <p:sldId id="258" r:id="rId3"/>
     <p:sldId id="259" r:id="rId4"/>
-    <p:sldId id="260" r:id="rId5"/>
+    <p:sldId id="261" r:id="rId5"/>
+    <p:sldId id="262" r:id="rId6"/>
+    <p:sldId id="263" r:id="rId7"/>
+    <p:sldId id="260" r:id="rId8"/>
   </p:sldIdLst>
   <p:sldSz cx="9144000" cy="6858000" type="screen4x3"/>
   <p:notesSz cx="6858000" cy="9144000"/>
@@ -3756,7 +3759,7 @@
         <p:spPr>
           <a:xfrm>
             <a:off x="478707" y="1682819"/>
-            <a:ext cx="6472699" cy="1815882"/>
+            <a:ext cx="6472699" cy="3046988"/>
           </a:xfrm>
           <a:prstGeom prst="rect">
             <a:avLst/>
@@ -3828,6 +3831,36 @@
               </a:rPr>
               <a:t>…</a:t>
             </a:r>
+          </a:p>
+          <a:p>
+            <a:r>
+              <a:rPr lang="en-US" sz="1600" dirty="0" err="1" smtClean="0">
+                <a:latin typeface="Courier New" pitchFamily="49" charset="0"/>
+                <a:cs typeface="Courier New" pitchFamily="49" charset="0"/>
+              </a:rPr>
+              <a:t>const</a:t>
+            </a:r>
+            <a:r>
+              <a:rPr lang="en-US" sz="1600" dirty="0" smtClean="0">
+                <a:latin typeface="Courier New" pitchFamily="49" charset="0"/>
+                <a:cs typeface="Courier New" pitchFamily="49" charset="0"/>
+              </a:rPr>
+              <a:t> complex&lt;double&gt; </a:t>
+            </a:r>
+            <a:r>
+              <a:rPr lang="en-US" sz="1600" dirty="0">
+                <a:latin typeface="Courier New" pitchFamily="49" charset="0"/>
+                <a:cs typeface="Courier New" pitchFamily="49" charset="0"/>
+              </a:rPr>
+              <a:t>c(-0.62772, - </a:t>
+            </a:r>
+            <a:r>
+              <a:rPr lang="en-US" sz="1600" dirty="0" smtClean="0">
+                <a:latin typeface="Courier New" pitchFamily="49" charset="0"/>
+                <a:cs typeface="Courier New" pitchFamily="49" charset="0"/>
+              </a:rPr>
+              <a:t>0.42193);</a:t>
+            </a:r>
             <a:endParaRPr lang="en-US" sz="1600" dirty="0" smtClean="0">
               <a:latin typeface="Courier New" pitchFamily="49" charset="0"/>
               <a:cs typeface="Courier New" pitchFamily="49" charset="0"/>
@@ -3839,21 +3872,155 @@
                 <a:latin typeface="Courier New" pitchFamily="49" charset="0"/>
                 <a:cs typeface="Courier New" pitchFamily="49" charset="0"/>
               </a:rPr>
-              <a:t>complex&lt;double&gt; </a:t>
+              <a:t>for (double x = -1.8; x &lt; 1.8; x += 0.001)</a:t>
+            </a:r>
+          </a:p>
+          <a:p>
+            <a:r>
+              <a:rPr lang="en-US" sz="1600" dirty="0">
+                <a:latin typeface="Courier New" pitchFamily="49" charset="0"/>
+                <a:cs typeface="Courier New" pitchFamily="49" charset="0"/>
+              </a:rPr>
+              <a:t> </a:t>
             </a:r>
             <a:r>
               <a:rPr lang="en-US" sz="1600" dirty="0" smtClean="0">
                 <a:latin typeface="Courier New" pitchFamily="49" charset="0"/>
                 <a:cs typeface="Courier New" pitchFamily="49" charset="0"/>
               </a:rPr>
-              <a:t>a(2, 3);</a:t>
-            </a:r>
-            <a:endParaRPr lang="en-US" sz="1600" dirty="0" smtClean="0">
+              <a:t>   </a:t>
+            </a:r>
+            <a:r>
+              <a:rPr lang="en-US" sz="1600" dirty="0">
+                <a:latin typeface="Courier New" pitchFamily="49" charset="0"/>
+                <a:cs typeface="Courier New" pitchFamily="49" charset="0"/>
+              </a:rPr>
+              <a:t>for (double </a:t>
+            </a:r>
+            <a:r>
+              <a:rPr lang="en-US" sz="1600" dirty="0" smtClean="0">
+                <a:latin typeface="Courier New" pitchFamily="49" charset="0"/>
+                <a:cs typeface="Courier New" pitchFamily="49" charset="0"/>
+              </a:rPr>
+              <a:t>y </a:t>
+            </a:r>
+            <a:r>
+              <a:rPr lang="en-US" sz="1600" dirty="0">
+                <a:latin typeface="Courier New" pitchFamily="49" charset="0"/>
+                <a:cs typeface="Courier New" pitchFamily="49" charset="0"/>
+              </a:rPr>
+              <a:t>= -1.8; </a:t>
+            </a:r>
+            <a:r>
+              <a:rPr lang="en-US" sz="1600" dirty="0" smtClean="0">
+                <a:latin typeface="Courier New" pitchFamily="49" charset="0"/>
+                <a:cs typeface="Courier New" pitchFamily="49" charset="0"/>
+              </a:rPr>
+              <a:t>y </a:t>
+            </a:r>
+            <a:r>
+              <a:rPr lang="en-US" sz="1600" dirty="0">
+                <a:latin typeface="Courier New" pitchFamily="49" charset="0"/>
+                <a:cs typeface="Courier New" pitchFamily="49" charset="0"/>
+              </a:rPr>
+              <a:t>&lt; 1.8; </a:t>
+            </a:r>
+            <a:r>
+              <a:rPr lang="en-US" sz="1600" dirty="0" smtClean="0">
+                <a:latin typeface="Courier New" pitchFamily="49" charset="0"/>
+                <a:cs typeface="Courier New" pitchFamily="49" charset="0"/>
+              </a:rPr>
+              <a:t>y </a:t>
+            </a:r>
+            <a:r>
+              <a:rPr lang="en-US" sz="1600" dirty="0">
+                <a:latin typeface="Courier New" pitchFamily="49" charset="0"/>
+                <a:cs typeface="Courier New" pitchFamily="49" charset="0"/>
+              </a:rPr>
+              <a:t>+= 0.001</a:t>
+            </a:r>
+            <a:r>
+              <a:rPr lang="en-US" sz="1600" dirty="0" smtClean="0">
+                <a:latin typeface="Courier New" pitchFamily="49" charset="0"/>
+                <a:cs typeface="Courier New" pitchFamily="49" charset="0"/>
+              </a:rPr>
+              <a:t>) {</a:t>
+            </a:r>
+            <a:endParaRPr lang="en-US" sz="1600" dirty="0">
               <a:latin typeface="Courier New" pitchFamily="49" charset="0"/>
               <a:cs typeface="Courier New" pitchFamily="49" charset="0"/>
             </a:endParaRPr>
           </a:p>
           <a:p>
+            <a:r>
+              <a:rPr lang="en-US" sz="1600" dirty="0" smtClean="0">
+                <a:latin typeface="Courier New" pitchFamily="49" charset="0"/>
+                <a:cs typeface="Courier New" pitchFamily="49" charset="0"/>
+              </a:rPr>
+              <a:t>        complex&lt;double&gt; z(x, y);</a:t>
+            </a:r>
+          </a:p>
+          <a:p>
+            <a:r>
+              <a:rPr lang="en-US" sz="1600" dirty="0">
+                <a:latin typeface="Courier New" pitchFamily="49" charset="0"/>
+                <a:cs typeface="Courier New" pitchFamily="49" charset="0"/>
+              </a:rPr>
+              <a:t> </a:t>
+            </a:r>
+            <a:r>
+              <a:rPr lang="en-US" sz="1600" dirty="0" smtClean="0">
+                <a:latin typeface="Courier New" pitchFamily="49" charset="0"/>
+                <a:cs typeface="Courier New" pitchFamily="49" charset="0"/>
+              </a:rPr>
+              <a:t>       while (abs(z) &lt; 2.0 &amp;&amp; n++ &lt; </a:t>
+            </a:r>
+            <a:r>
+              <a:rPr lang="en-US" sz="1600" dirty="0" err="1" smtClean="0">
+                <a:latin typeface="Courier New" pitchFamily="49" charset="0"/>
+                <a:cs typeface="Courier New" pitchFamily="49" charset="0"/>
+              </a:rPr>
+              <a:t>max_n</a:t>
+            </a:r>
+            <a:r>
+              <a:rPr lang="en-US" sz="1600" dirty="0" smtClean="0">
+                <a:latin typeface="Courier New" pitchFamily="49" charset="0"/>
+                <a:cs typeface="Courier New" pitchFamily="49" charset="0"/>
+              </a:rPr>
+              <a:t>)</a:t>
+            </a:r>
+          </a:p>
+          <a:p>
+            <a:r>
+              <a:rPr lang="en-US" sz="1600" dirty="0">
+                <a:latin typeface="Courier New" pitchFamily="49" charset="0"/>
+                <a:cs typeface="Courier New" pitchFamily="49" charset="0"/>
+              </a:rPr>
+              <a:t> </a:t>
+            </a:r>
+            <a:r>
+              <a:rPr lang="en-US" sz="1600" dirty="0" smtClean="0">
+                <a:latin typeface="Courier New" pitchFamily="49" charset="0"/>
+                <a:cs typeface="Courier New" pitchFamily="49" charset="0"/>
+              </a:rPr>
+              <a:t>           z = z*z + c;</a:t>
+            </a:r>
+          </a:p>
+          <a:p>
+            <a:r>
+              <a:rPr lang="en-US" sz="1600" dirty="0">
+                <a:latin typeface="Courier New" pitchFamily="49" charset="0"/>
+                <a:cs typeface="Courier New" pitchFamily="49" charset="0"/>
+              </a:rPr>
+              <a:t> </a:t>
+            </a:r>
+            <a:r>
+              <a:rPr lang="en-US" sz="1600" dirty="0" smtClean="0">
+                <a:latin typeface="Courier New" pitchFamily="49" charset="0"/>
+                <a:cs typeface="Courier New" pitchFamily="49" charset="0"/>
+              </a:rPr>
+              <a:t>       </a:t>
+            </a:r>
             <a:r>
               <a:rPr lang="en-US" sz="1600" dirty="0" err="1" smtClean="0">
                 <a:latin typeface="Courier New" pitchFamily="49" charset="0"/>
@@ -3866,21 +4033,7 @@
                 <a:latin typeface="Courier New" pitchFamily="49" charset="0"/>
                 <a:cs typeface="Courier New" pitchFamily="49" charset="0"/>
               </a:rPr>
-              <a:t> &lt;&lt; real(a) &lt;&lt; ", " &lt;&lt; </a:t>
-            </a:r>
-            <a:r>
-              <a:rPr lang="en-US" sz="1600" dirty="0" err="1" smtClean="0">
-                <a:latin typeface="Courier New" pitchFamily="49" charset="0"/>
-                <a:cs typeface="Courier New" pitchFamily="49" charset="0"/>
-              </a:rPr>
-              <a:t>imag</a:t>
-            </a:r>
-            <a:r>
-              <a:rPr lang="en-US" sz="1600" dirty="0" smtClean="0">
-                <a:latin typeface="Courier New" pitchFamily="49" charset="0"/>
-                <a:cs typeface="Courier New" pitchFamily="49" charset="0"/>
-              </a:rPr>
-              <a:t>(a) &lt;&lt; </a:t>
+              <a:t> &lt;&lt; x &lt;&lt; " " &lt;&lt; y &lt;&lt; " " &lt;&lt; n &lt;&lt; </a:t>
             </a:r>
             <a:r>
               <a:rPr lang="en-US" sz="1600" dirty="0" err="1" smtClean="0">
@@ -3896,50 +4049,30 @@
               </a:rPr>
               <a:t>;</a:t>
             </a:r>
-          </a:p>
-          <a:p>
-            <a:r>
-              <a:rPr lang="en-US" sz="1600" dirty="0" err="1" smtClean="0">
+            <a:endParaRPr lang="en-US" sz="1600" dirty="0" smtClean="0">
+              <a:latin typeface="Courier New" pitchFamily="49" charset="0"/>
+              <a:cs typeface="Courier New" pitchFamily="49" charset="0"/>
+            </a:endParaRPr>
+          </a:p>
+          <a:p>
+            <a:r>
+              <a:rPr lang="en-US" sz="1600" dirty="0">
                 <a:latin typeface="Courier New" pitchFamily="49" charset="0"/>
                 <a:cs typeface="Courier New" pitchFamily="49" charset="0"/>
               </a:rPr>
-              <a:t>cout</a:t>
+              <a:t> </a:t>
             </a:r>
             <a:r>
               <a:rPr lang="en-US" sz="1600" dirty="0" smtClean="0">
                 <a:latin typeface="Courier New" pitchFamily="49" charset="0"/>
                 <a:cs typeface="Courier New" pitchFamily="49" charset="0"/>
               </a:rPr>
-              <a:t> &lt;&lt; </a:t>
-            </a:r>
-            <a:r>
-              <a:rPr lang="en-US" sz="1600" dirty="0" err="1" smtClean="0">
-                <a:latin typeface="Courier New" pitchFamily="49" charset="0"/>
-                <a:cs typeface="Courier New" pitchFamily="49" charset="0"/>
-              </a:rPr>
-              <a:t>sqrt</a:t>
-            </a:r>
-            <a:r>
-              <a:rPr lang="en-US" sz="1600" dirty="0" smtClean="0">
-                <a:latin typeface="Courier New" pitchFamily="49" charset="0"/>
-                <a:cs typeface="Courier New" pitchFamily="49" charset="0"/>
-              </a:rPr>
-              <a:t>(a) &lt;&lt; </a:t>
-            </a:r>
-            <a:r>
-              <a:rPr lang="en-US" sz="1600" dirty="0" err="1" smtClean="0">
-                <a:latin typeface="Courier New" pitchFamily="49" charset="0"/>
-                <a:cs typeface="Courier New" pitchFamily="49" charset="0"/>
-              </a:rPr>
-              <a:t>endl</a:t>
-            </a:r>
-            <a:r>
-              <a:rPr lang="en-US" sz="1600" dirty="0" smtClean="0">
-                <a:latin typeface="Courier New" pitchFamily="49" charset="0"/>
-                <a:cs typeface="Courier New" pitchFamily="49" charset="0"/>
-              </a:rPr>
-              <a:t>;</a:t>
-            </a:r>
+              <a:t>   }</a:t>
+            </a:r>
+            <a:endParaRPr lang="en-US" sz="1600" dirty="0" smtClean="0">
+              <a:latin typeface="Courier New" pitchFamily="49" charset="0"/>
+              <a:cs typeface="Courier New" pitchFamily="49" charset="0"/>
+            </a:endParaRPr>
           </a:p>
         </p:txBody>
       </p:sp>
@@ -3951,10 +4084,10 @@
         </p:nvGrpSpPr>
         <p:grpSpPr>
           <a:xfrm>
-            <a:off x="1968307" y="3498701"/>
-            <a:ext cx="2892587" cy="795992"/>
-            <a:chOff x="1997804" y="3744922"/>
-            <a:chExt cx="2892587" cy="795992"/>
+            <a:off x="767207" y="3923071"/>
+            <a:ext cx="2892587" cy="1403978"/>
+            <a:chOff x="1997804" y="3136936"/>
+            <a:chExt cx="2892587" cy="1403978"/>
           </a:xfrm>
         </p:grpSpPr>
         <p:sp>
@@ -4003,9 +4136,9 @@
             <p:nvPr/>
           </p:nvCxnSpPr>
           <p:spPr>
-            <a:xfrm flipH="1" flipV="1">
-              <a:off x="1997804" y="3744922"/>
-              <a:ext cx="1446294" cy="426660"/>
+            <a:xfrm flipV="1">
+              <a:off x="3444098" y="3136936"/>
+              <a:ext cx="264228" cy="1034646"/>
             </a:xfrm>
             <a:prstGeom prst="straightConnector1">
               <a:avLst/>
@@ -4032,6 +4165,146 @@
             </a:fontRef>
           </p:style>
         </p:cxnSp>
+      </p:grpSp>
+      <p:pic>
+        <p:nvPicPr>
+          <p:cNvPr id="4" name="Picture 3"/>
+          <p:cNvPicPr>
+            <a:picLocks noChangeAspect="1"/>
+          </p:cNvPicPr>
+          <p:nvPr/>
+        </p:nvPicPr>
+        <p:blipFill>
+          <a:blip r:embed="rId2"/>
+          <a:stretch>
+            <a:fillRect/>
+          </a:stretch>
+        </p:blipFill>
+        <p:spPr>
+          <a:xfrm>
+            <a:off x="5394588" y="4505941"/>
+            <a:ext cx="2925096" cy="2193822"/>
+          </a:xfrm>
+          <a:prstGeom prst="rect">
+            <a:avLst/>
+          </a:prstGeom>
+        </p:spPr>
+      </p:pic>
+      <p:grpSp>
+        <p:nvGrpSpPr>
+          <p:cNvPr id="9" name="Group 8"/>
+          <p:cNvGrpSpPr/>
+          <p:nvPr/>
+        </p:nvGrpSpPr>
+        <p:grpSpPr>
+          <a:xfrm>
+            <a:off x="344128" y="5653935"/>
+            <a:ext cx="5161937" cy="702416"/>
+            <a:chOff x="353960" y="5514361"/>
+            <a:chExt cx="5161937" cy="702416"/>
+          </a:xfrm>
+        </p:grpSpPr>
+        <p:sp>
+          <p:nvSpPr>
+            <p:cNvPr id="11" name="TextBox 10"/>
+            <p:cNvSpPr txBox="1"/>
+            <p:nvPr/>
+          </p:nvSpPr>
+          <p:spPr>
+            <a:xfrm>
+              <a:off x="395133" y="5878223"/>
+              <a:ext cx="5120764" cy="338554"/>
+            </a:xfrm>
+            <a:prstGeom prst="rect">
+              <a:avLst/>
+            </a:prstGeom>
+            <a:solidFill>
+              <a:schemeClr val="bg1">
+                <a:lumMod val="75000"/>
+              </a:schemeClr>
+            </a:solidFill>
+            <a:ln>
+              <a:noFill/>
+            </a:ln>
+          </p:spPr>
+          <p:txBody>
+            <a:bodyPr wrap="square" rtlCol="0">
+              <a:spAutoFit/>
+            </a:bodyPr>
+            <a:lstStyle/>
+            <a:p>
+              <a:r>
+                <a:rPr lang="en-US" sz="1600" dirty="0" smtClean="0">
+                  <a:latin typeface="Courier New" pitchFamily="49" charset="0"/>
+                  <a:cs typeface="Courier New" pitchFamily="49" charset="0"/>
+                </a:rPr>
+                <a:t>real(z)*real(z) + </a:t>
+              </a:r>
+              <a:r>
+                <a:rPr lang="en-US" sz="1600" dirty="0" err="1" smtClean="0">
+                  <a:latin typeface="Courier New" pitchFamily="49" charset="0"/>
+                  <a:cs typeface="Courier New" pitchFamily="49" charset="0"/>
+                </a:rPr>
+                <a:t>imag</a:t>
+              </a:r>
+              <a:r>
+                <a:rPr lang="en-US" sz="1600" dirty="0" smtClean="0">
+                  <a:latin typeface="Courier New" pitchFamily="49" charset="0"/>
+                  <a:cs typeface="Courier New" pitchFamily="49" charset="0"/>
+                </a:rPr>
+                <a:t>(z)*</a:t>
+              </a:r>
+              <a:r>
+                <a:rPr lang="en-US" sz="1600" dirty="0" err="1" smtClean="0">
+                  <a:latin typeface="Courier New" pitchFamily="49" charset="0"/>
+                  <a:cs typeface="Courier New" pitchFamily="49" charset="0"/>
+                </a:rPr>
+                <a:t>imag</a:t>
+              </a:r>
+              <a:r>
+                <a:rPr lang="en-US" sz="1600" dirty="0" smtClean="0">
+                  <a:latin typeface="Courier New" pitchFamily="49" charset="0"/>
+                  <a:cs typeface="Courier New" pitchFamily="49" charset="0"/>
+                </a:rPr>
+                <a:t>(z) &lt; 4.0</a:t>
+              </a:r>
+              <a:endParaRPr lang="en-US" sz="1600" dirty="0" smtClean="0">
+                <a:latin typeface="Courier New" pitchFamily="49" charset="0"/>
+                <a:cs typeface="Courier New" pitchFamily="49" charset="0"/>
+              </a:endParaRPr>
+            </a:p>
+          </p:txBody>
+        </p:sp>
+        <p:sp>
+          <p:nvSpPr>
+            <p:cNvPr id="8" name="TextBox 7"/>
+            <p:cNvSpPr txBox="1"/>
+            <p:nvPr/>
+          </p:nvSpPr>
+          <p:spPr>
+            <a:xfrm>
+              <a:off x="353960" y="5514361"/>
+              <a:ext cx="1579471" cy="369332"/>
+            </a:xfrm>
+            <a:prstGeom prst="rect">
+              <a:avLst/>
+            </a:prstGeom>
+            <a:noFill/>
+          </p:spPr>
+          <p:txBody>
+            <a:bodyPr wrap="none" rtlCol="0">
+              <a:spAutoFit/>
+            </a:bodyPr>
+            <a:lstStyle/>
+            <a:p>
+              <a:r>
+                <a:rPr lang="en-US" dirty="0" smtClean="0"/>
+                <a:t>More efficient:</a:t>
+              </a:r>
+              <a:endParaRPr lang="en-US" dirty="0"/>
+            </a:p>
+          </p:txBody>
+        </p:sp>
       </p:grpSp>
     </p:spTree>
     <p:extLst>
@@ -4077,7 +4350,97 @@
                                           </p:stCondLst>
                                         </p:cTn>
                                         <p:tgtEl>
+                                          <p:spTgt spid="4"/>
+                                        </p:tgtEl>
+                                        <p:attrNameLst>
+                                          <p:attrName>style.visibility</p:attrName>
+                                        </p:attrNameLst>
+                                      </p:cBhvr>
+                                      <p:to>
+                                        <p:strVal val="visible"/>
+                                      </p:to>
+                                    </p:set>
+                                  </p:childTnLst>
+                                </p:cTn>
+                              </p:par>
+                            </p:childTnLst>
+                          </p:cTn>
+                        </p:par>
+                      </p:childTnLst>
+                    </p:cTn>
+                  </p:par>
+                  <p:par>
+                    <p:cTn id="7" fill="hold">
+                      <p:stCondLst>
+                        <p:cond delay="indefinite"/>
+                      </p:stCondLst>
+                      <p:childTnLst>
+                        <p:par>
+                          <p:cTn id="8" fill="hold">
+                            <p:stCondLst>
+                              <p:cond delay="0"/>
+                            </p:stCondLst>
+                            <p:childTnLst>
+                              <p:par>
+                                <p:cTn id="9" presetID="1" presetClass="entr" presetSubtype="0" fill="hold" nodeType="clickEffect">
+                                  <p:stCondLst>
+                                    <p:cond delay="0"/>
+                                  </p:stCondLst>
+                                  <p:childTnLst>
+                                    <p:set>
+                                      <p:cBhvr>
+                                        <p:cTn id="10" dur="1" fill="hold">
+                                          <p:stCondLst>
+                                            <p:cond delay="0"/>
+                                          </p:stCondLst>
+                                        </p:cTn>
+                                        <p:tgtEl>
                                           <p:spTgt spid="18"/>
+                                        </p:tgtEl>
+                                        <p:attrNameLst>
+                                          <p:attrName>style.visibility</p:attrName>
+                                        </p:attrNameLst>
+                                      </p:cBhvr>
+                                      <p:to>
+                                        <p:strVal val="visible"/>
+                                      </p:to>
+                                    </p:set>
+                                  </p:childTnLst>
+                                </p:cTn>
+                              </p:par>
+                            </p:childTnLst>
+                          </p:cTn>
+                        </p:par>
+                      </p:childTnLst>
+                    </p:cTn>
+                  </p:par>
+                  <p:par>
+                    <p:cTn id="11" fill="hold">
+                      <p:stCondLst>
+                        <p:cond delay="indefinite"/>
+                      </p:stCondLst>
+                      <p:childTnLst>
+                        <p:par>
+                          <p:cTn id="12" fill="hold">
+                            <p:stCondLst>
+                              <p:cond delay="0"/>
+                            </p:stCondLst>
+                            <p:childTnLst>
+                              <p:par>
+                                <p:cTn id="13" presetID="1" presetClass="entr" presetSubtype="0" fill="hold" nodeType="clickEffect">
+                                  <p:stCondLst>
+                                    <p:cond delay="0"/>
+                                  </p:stCondLst>
+                                  <p:childTnLst>
+                                    <p:set>
+                                      <p:cBhvr>
+                                        <p:cTn id="14" dur="1" fill="hold">
+                                          <p:stCondLst>
+                                            <p:cond delay="0"/>
+                                          </p:stCondLst>
+                                        </p:cTn>
+                                        <p:tgtEl>
+                                          <p:spTgt spid="9"/>
                                         </p:tgtEl>
                                         <p:attrNameLst>
                                           <p:attrName>style.visibility</p:attrName>
@@ -4155,6 +4518,421 @@
           <a:p>
             <a:r>
               <a:rPr lang="en-US" dirty="0" smtClean="0"/>
+              <a:t>Numerical limits</a:t>
+            </a:r>
+            <a:endParaRPr lang="en-US" dirty="0"/>
+          </a:p>
+        </p:txBody>
+      </p:sp>
+      <p:sp>
+        <p:nvSpPr>
+          <p:cNvPr id="3" name="Slide Number Placeholder 2"/>
+          <p:cNvSpPr>
+            <a:spLocks noGrp="1"/>
+          </p:cNvSpPr>
+          <p:nvPr>
+            <p:ph type="sldNum" sz="quarter" idx="12"/>
+          </p:nvPr>
+        </p:nvSpPr>
+        <p:spPr/>
+        <p:txBody>
+          <a:bodyPr/>
+          <a:lstStyle/>
+          <a:p>
+            <a:fld id="{9CEF4966-5219-4577-B301-14467D565841}" type="slidenum">
+              <a:rPr lang="en-US" smtClean="0"/>
+              <a:t>4</a:t>
+            </a:fld>
+            <a:endParaRPr lang="en-US"/>
+          </a:p>
+        </p:txBody>
+      </p:sp>
+    </p:spTree>
+    <p:extLst>
+      <p:ext uri="{BB962C8B-B14F-4D97-AF65-F5344CB8AC3E}">
+        <p14:creationId xmlns:p14="http://schemas.microsoft.com/office/powerpoint/2010/main" val="2821645302"/>
+      </p:ext>
+    </p:extLst>
+  </p:cSld>
+  <p:clrMapOvr>
+    <a:masterClrMapping/>
+  </p:clrMapOvr>
+</p:sld>
+</file>
+
+<file path=ppt/slides/slide5.xml><?xml version="1.0" encoding="utf-8"?>
+<p:sld xmlns:a="http://schemas.openxmlformats.org/drawingml/2006/main" xmlns:r="http://schemas.openxmlformats.org/officeDocument/2006/relationships" xmlns:p="http://schemas.openxmlformats.org/presentationml/2006/main">
+  <p:cSld>
+    <p:spTree>
+      <p:nvGrpSpPr>
+        <p:cNvPr id="1" name=""/>
+        <p:cNvGrpSpPr/>
+        <p:nvPr/>
+      </p:nvGrpSpPr>
+      <p:grpSpPr>
+        <a:xfrm>
+          <a:off x="0" y="0"/>
+          <a:ext cx="0" cy="0"/>
+          <a:chOff x="0" y="0"/>
+          <a:chExt cx="0" cy="0"/>
+        </a:xfrm>
+      </p:grpSpPr>
+      <p:pic>
+        <p:nvPicPr>
+          <p:cNvPr id="1026" name="Picture 2" descr="armadillo"/>
+          <p:cNvPicPr>
+            <a:picLocks noChangeAspect="1" noChangeArrowheads="1"/>
+          </p:cNvPicPr>
+          <p:nvPr/>
+        </p:nvPicPr>
+        <p:blipFill>
+          <a:blip r:embed="rId2">
+            <a:extLst>
+              <a:ext uri="{28A0092B-C50C-407E-A947-70E740481C1C}">
+                <a14:useLocalDpi xmlns:a14="http://schemas.microsoft.com/office/drawing/2010/main" val="0"/>
+              </a:ext>
+            </a:extLst>
+          </a:blip>
+          <a:srcRect/>
+          <a:stretch>
+            <a:fillRect/>
+          </a:stretch>
+        </p:blipFill>
+        <p:spPr bwMode="auto">
+          <a:xfrm>
+            <a:off x="5012711" y="4001294"/>
+            <a:ext cx="2362200" cy="819151"/>
+          </a:xfrm>
+          <a:prstGeom prst="rect">
+            <a:avLst/>
+          </a:prstGeom>
+          <a:noFill/>
+          <a:extLst>
+            <a:ext uri="{909E8E84-426E-40DD-AFC4-6F175D3DCCD1}">
+              <a14:hiddenFill xmlns:a14="http://schemas.microsoft.com/office/drawing/2010/main">
+                <a:solidFill>
+                  <a:srgbClr val="FFFFFF"/>
+                </a:solidFill>
+              </a14:hiddenFill>
+            </a:ext>
+          </a:extLst>
+        </p:spPr>
+      </p:pic>
+      <p:sp>
+        <p:nvSpPr>
+          <p:cNvPr id="2" name="Title 1"/>
+          <p:cNvSpPr>
+            <a:spLocks noGrp="1"/>
+          </p:cNvSpPr>
+          <p:nvPr>
+            <p:ph type="title"/>
+          </p:nvPr>
+        </p:nvSpPr>
+        <p:spPr/>
+        <p:txBody>
+          <a:bodyPr/>
+          <a:lstStyle/>
+          <a:p>
+            <a:r>
+              <a:rPr lang="en-US" dirty="0" smtClean="0"/>
+              <a:t>Linear algebra</a:t>
+            </a:r>
+            <a:endParaRPr lang="en-US" dirty="0"/>
+          </a:p>
+        </p:txBody>
+      </p:sp>
+      <p:sp>
+        <p:nvSpPr>
+          <p:cNvPr id="4" name="Content Placeholder 3"/>
+          <p:cNvSpPr>
+            <a:spLocks noGrp="1"/>
+          </p:cNvSpPr>
+          <p:nvPr>
+            <p:ph idx="1"/>
+          </p:nvPr>
+        </p:nvSpPr>
+        <p:spPr/>
+        <p:txBody>
+          <a:bodyPr/>
+          <a:lstStyle/>
+          <a:p>
+            <a:r>
+              <a:rPr lang="en-US" dirty="0" smtClean="0"/>
+              <a:t>Several libraries</a:t>
+            </a:r>
+          </a:p>
+          <a:p>
+            <a:pPr lvl="1"/>
+            <a:r>
+              <a:rPr lang="en-US" dirty="0"/>
+              <a:t>Eigen (</a:t>
+            </a:r>
+            <a:r>
+              <a:rPr lang="en-US" dirty="0">
+                <a:hlinkClick r:id="rId3"/>
+              </a:rPr>
+              <a:t>http://eigen.tuxfamily.org</a:t>
+            </a:r>
+            <a:r>
+              <a:rPr lang="en-US" dirty="0" smtClean="0">
+                <a:hlinkClick r:id="rId3"/>
+              </a:rPr>
+              <a:t>/</a:t>
+            </a:r>
+            <a:r>
+              <a:rPr lang="en-US" dirty="0" smtClean="0"/>
+              <a:t>)</a:t>
+            </a:r>
+          </a:p>
+          <a:p>
+            <a:pPr lvl="2"/>
+            <a:r>
+              <a:rPr lang="en-US" dirty="0" smtClean="0"/>
+              <a:t>purely header files</a:t>
+            </a:r>
+          </a:p>
+          <a:p>
+            <a:pPr lvl="2"/>
+            <a:r>
+              <a:rPr lang="en-US" dirty="0" smtClean="0"/>
+              <a:t>trivial to install</a:t>
+            </a:r>
+          </a:p>
+          <a:p>
+            <a:pPr lvl="1"/>
+            <a:r>
+              <a:rPr lang="en-US" dirty="0"/>
+              <a:t>Armadillo (</a:t>
+            </a:r>
+            <a:r>
+              <a:rPr lang="en-US" dirty="0">
+                <a:hlinkClick r:id="rId4"/>
+              </a:rPr>
+              <a:t>http://arma.sourceforge.net</a:t>
+            </a:r>
+            <a:r>
+              <a:rPr lang="en-US" dirty="0" smtClean="0">
+                <a:hlinkClick r:id="rId4"/>
+              </a:rPr>
+              <a:t>/</a:t>
+            </a:r>
+            <a:r>
+              <a:rPr lang="en-US" dirty="0" smtClean="0"/>
+              <a:t>)</a:t>
+            </a:r>
+          </a:p>
+          <a:p>
+            <a:pPr lvl="2"/>
+            <a:r>
+              <a:rPr lang="en-US" dirty="0" smtClean="0"/>
+              <a:t>uses BLAS/</a:t>
+            </a:r>
+            <a:r>
+              <a:rPr lang="en-US" dirty="0" err="1" smtClean="0"/>
+              <a:t>Lapack</a:t>
+            </a:r>
+            <a:endParaRPr lang="en-US" dirty="0" smtClean="0"/>
+          </a:p>
+          <a:p>
+            <a:pPr lvl="2"/>
+            <a:r>
+              <a:rPr lang="en-US" dirty="0" smtClean="0"/>
+              <a:t>quite convenient</a:t>
+            </a:r>
+          </a:p>
+          <a:p>
+            <a:pPr lvl="2"/>
+            <a:r>
+              <a:rPr lang="en-US" dirty="0" smtClean="0"/>
+              <a:t>good performance</a:t>
+            </a:r>
+          </a:p>
+          <a:p>
+            <a:pPr lvl="2"/>
+            <a:r>
+              <a:rPr lang="en-US" dirty="0" smtClean="0"/>
+              <a:t>no distributed algorithms</a:t>
+            </a:r>
+          </a:p>
+          <a:p>
+            <a:pPr lvl="1"/>
+            <a:r>
+              <a:rPr lang="en-US" dirty="0" smtClean="0"/>
+              <a:t>…</a:t>
+            </a:r>
+            <a:endParaRPr lang="en-US" dirty="0"/>
+          </a:p>
+        </p:txBody>
+      </p:sp>
+      <p:sp>
+        <p:nvSpPr>
+          <p:cNvPr id="3" name="Slide Number Placeholder 2"/>
+          <p:cNvSpPr>
+            <a:spLocks noGrp="1"/>
+          </p:cNvSpPr>
+          <p:nvPr>
+            <p:ph type="sldNum" sz="quarter" idx="12"/>
+          </p:nvPr>
+        </p:nvSpPr>
+        <p:spPr/>
+        <p:txBody>
+          <a:bodyPr/>
+          <a:lstStyle/>
+          <a:p>
+            <a:fld id="{9CEF4966-5219-4577-B301-14467D565841}" type="slidenum">
+              <a:rPr lang="en-US" smtClean="0"/>
+              <a:t>5</a:t>
+            </a:fld>
+            <a:endParaRPr lang="en-US"/>
+          </a:p>
+        </p:txBody>
+      </p:sp>
+    </p:spTree>
+    <p:extLst>
+      <p:ext uri="{BB962C8B-B14F-4D97-AF65-F5344CB8AC3E}">
+        <p14:creationId xmlns:p14="http://schemas.microsoft.com/office/powerpoint/2010/main" val="968117353"/>
+      </p:ext>
+    </p:extLst>
+  </p:cSld>
+  <p:clrMapOvr>
+    <a:masterClrMapping/>
+  </p:clrMapOvr>
+</p:sld>
+</file>
+
+<file path=ppt/slides/slide6.xml><?xml version="1.0" encoding="utf-8"?>
+<p:sld xmlns:a="http://schemas.openxmlformats.org/drawingml/2006/main" xmlns:r="http://schemas.openxmlformats.org/officeDocument/2006/relationships" xmlns:p="http://schemas.openxmlformats.org/presentationml/2006/main">
+  <p:cSld>
+    <p:spTree>
+      <p:nvGrpSpPr>
+        <p:cNvPr id="1" name=""/>
+        <p:cNvGrpSpPr/>
+        <p:nvPr/>
+      </p:nvGrpSpPr>
+      <p:grpSpPr>
+        <a:xfrm>
+          <a:off x="0" y="0"/>
+          <a:ext cx="0" cy="0"/>
+          <a:chOff x="0" y="0"/>
+          <a:chExt cx="0" cy="0"/>
+        </a:xfrm>
+      </p:grpSpPr>
+      <p:sp>
+        <p:nvSpPr>
+          <p:cNvPr id="2" name="Title 1"/>
+          <p:cNvSpPr>
+            <a:spLocks noGrp="1"/>
+          </p:cNvSpPr>
+          <p:nvPr>
+            <p:ph type="title"/>
+          </p:nvPr>
+        </p:nvSpPr>
+        <p:spPr/>
+        <p:txBody>
+          <a:bodyPr/>
+          <a:lstStyle/>
+          <a:p>
+            <a:r>
+              <a:rPr lang="en-US" dirty="0" smtClean="0"/>
+              <a:t>Ordinary differential equations</a:t>
+            </a:r>
+            <a:endParaRPr lang="en-US" dirty="0"/>
+          </a:p>
+        </p:txBody>
+      </p:sp>
+      <p:sp>
+        <p:nvSpPr>
+          <p:cNvPr id="3" name="Content Placeholder 2"/>
+          <p:cNvSpPr>
+            <a:spLocks noGrp="1"/>
+          </p:cNvSpPr>
+          <p:nvPr>
+            <p:ph idx="1"/>
+          </p:nvPr>
+        </p:nvSpPr>
+        <p:spPr/>
+        <p:txBody>
+          <a:bodyPr/>
+          <a:lstStyle/>
+          <a:p>
+            <a:r>
+              <a:rPr lang="en-US" dirty="0" smtClean="0"/>
+              <a:t>Straightforward: Boost</a:t>
+            </a:r>
+            <a:endParaRPr lang="en-US" dirty="0"/>
+          </a:p>
+        </p:txBody>
+      </p:sp>
+      <p:sp>
+        <p:nvSpPr>
+          <p:cNvPr id="4" name="Slide Number Placeholder 3"/>
+          <p:cNvSpPr>
+            <a:spLocks noGrp="1"/>
+          </p:cNvSpPr>
+          <p:nvPr>
+            <p:ph type="sldNum" sz="quarter" idx="12"/>
+          </p:nvPr>
+        </p:nvSpPr>
+        <p:spPr/>
+        <p:txBody>
+          <a:bodyPr/>
+          <a:lstStyle/>
+          <a:p>
+            <a:fld id="{9CEF4966-5219-4577-B301-14467D565841}" type="slidenum">
+              <a:rPr lang="en-US" smtClean="0"/>
+              <a:t>6</a:t>
+            </a:fld>
+            <a:endParaRPr lang="en-US"/>
+          </a:p>
+        </p:txBody>
+      </p:sp>
+    </p:spTree>
+    <p:extLst>
+      <p:ext uri="{BB962C8B-B14F-4D97-AF65-F5344CB8AC3E}">
+        <p14:creationId xmlns:p14="http://schemas.microsoft.com/office/powerpoint/2010/main" val="3264396598"/>
+      </p:ext>
+    </p:extLst>
+  </p:cSld>
+  <p:clrMapOvr>
+    <a:masterClrMapping/>
+  </p:clrMapOvr>
+</p:sld>
+</file>
+
+<file path=ppt/slides/slide7.xml><?xml version="1.0" encoding="utf-8"?>
+<p:sld xmlns:a="http://schemas.openxmlformats.org/drawingml/2006/main" xmlns:r="http://schemas.openxmlformats.org/officeDocument/2006/relationships" xmlns:p="http://schemas.openxmlformats.org/presentationml/2006/main">
+  <p:cSld>
+    <p:spTree>
+      <p:nvGrpSpPr>
+        <p:cNvPr id="1" name=""/>
+        <p:cNvGrpSpPr/>
+        <p:nvPr/>
+      </p:nvGrpSpPr>
+      <p:grpSpPr>
+        <a:xfrm>
+          <a:off x="0" y="0"/>
+          <a:ext cx="0" cy="0"/>
+          <a:chOff x="0" y="0"/>
+          <a:chExt cx="0" cy="0"/>
+        </a:xfrm>
+      </p:grpSpPr>
+      <p:sp>
+        <p:nvSpPr>
+          <p:cNvPr id="2" name="Title 1"/>
+          <p:cNvSpPr>
+            <a:spLocks noGrp="1"/>
+          </p:cNvSpPr>
+          <p:nvPr>
+            <p:ph type="title"/>
+          </p:nvPr>
+        </p:nvSpPr>
+        <p:spPr/>
+        <p:txBody>
+          <a:bodyPr/>
+          <a:lstStyle/>
+          <a:p>
+            <a:r>
+              <a:rPr lang="en-US" dirty="0" smtClean="0"/>
               <a:t>What was left out/added?</a:t>
             </a:r>
             <a:endParaRPr lang="en-US" dirty="0"/>
@@ -4235,7 +5013,7 @@
           <a:p>
             <a:fld id="{9CEF4966-5219-4577-B301-14467D565841}" type="slidenum">
               <a:rPr lang="en-US" smtClean="0"/>
-              <a:t>4</a:t>
+              <a:t>7</a:t>
             </a:fld>
             <a:endParaRPr lang="en-US"/>
           </a:p>

</xml_diff>

<commit_message>
Added slide on numerical limits
</commit_message>
<xml_diff>
--- a/CPlusPlus/12_essential_cpp_numerics.pptx
+++ b/CPlusPlus/12_essential_cpp_numerics.pptx
@@ -4526,6 +4526,44 @@
       </p:sp>
       <p:sp>
         <p:nvSpPr>
+          <p:cNvPr id="5" name="Content Placeholder 4"/>
+          <p:cNvSpPr>
+            <a:spLocks noGrp="1"/>
+          </p:cNvSpPr>
+          <p:nvPr>
+            <p:ph idx="1"/>
+          </p:nvPr>
+        </p:nvSpPr>
+        <p:spPr/>
+        <p:txBody>
+          <a:bodyPr/>
+          <a:lstStyle/>
+          <a:p>
+            <a:r>
+              <a:rPr lang="en-US" dirty="0" smtClean="0"/>
+              <a:t>Integers</a:t>
+            </a:r>
+          </a:p>
+          <a:p>
+            <a:endParaRPr lang="en-US" dirty="0"/>
+          </a:p>
+          <a:p>
+            <a:endParaRPr lang="en-US" dirty="0" smtClean="0"/>
+          </a:p>
+          <a:p>
+            <a:endParaRPr lang="en-US" dirty="0"/>
+          </a:p>
+          <a:p>
+            <a:r>
+              <a:rPr lang="en-US" dirty="0" smtClean="0"/>
+              <a:t>Floating point numbers</a:t>
+            </a:r>
+            <a:endParaRPr lang="en-US" dirty="0"/>
+          </a:p>
+        </p:txBody>
+      </p:sp>
+      <p:sp>
+        <p:nvSpPr>
           <p:cNvPr id="3" name="Slide Number Placeholder 2"/>
           <p:cNvSpPr>
             <a:spLocks noGrp="1"/>
@@ -4544,6 +4582,56 @@
               <a:t>4</a:t>
             </a:fld>
             <a:endParaRPr lang="en-US"/>
+          </a:p>
+        </p:txBody>
+      </p:sp>
+      <p:sp>
+        <p:nvSpPr>
+          <p:cNvPr id="4" name="TextBox 3"/>
+          <p:cNvSpPr txBox="1"/>
+          <p:nvPr/>
+        </p:nvSpPr>
+        <p:spPr>
+          <a:xfrm>
+            <a:off x="1265288" y="2705374"/>
+            <a:ext cx="6472699" cy="338554"/>
+          </a:xfrm>
+          <a:prstGeom prst="rect">
+            <a:avLst/>
+          </a:prstGeom>
+          <a:solidFill>
+            <a:schemeClr val="bg1">
+              <a:lumMod val="75000"/>
+            </a:schemeClr>
+          </a:solidFill>
+          <a:ln>
+            <a:noFill/>
+          </a:ln>
+        </p:spPr>
+        <p:txBody>
+          <a:bodyPr wrap="square" rtlCol="0">
+            <a:spAutoFit/>
+          </a:bodyPr>
+          <a:lstStyle/>
+          <a:p>
+            <a:r>
+              <a:rPr lang="en-US" sz="1600" dirty="0" smtClean="0">
+                <a:latin typeface="Courier New" pitchFamily="49" charset="0"/>
+                <a:cs typeface="Courier New" pitchFamily="49" charset="0"/>
+              </a:rPr>
+              <a:t>#include </a:t>
+            </a:r>
+            <a:r>
+              <a:rPr lang="en-US" sz="1600" smtClean="0">
+                <a:latin typeface="Courier New" pitchFamily="49" charset="0"/>
+                <a:cs typeface="Courier New" pitchFamily="49" charset="0"/>
+              </a:rPr>
+              <a:t>&lt;limits&gt;</a:t>
+            </a:r>
+            <a:endParaRPr lang="en-US" sz="1600" dirty="0" smtClean="0">
+              <a:latin typeface="Courier New" pitchFamily="49" charset="0"/>
+              <a:cs typeface="Courier New" pitchFamily="49" charset="0"/>
+            </a:endParaRPr>
           </a:p>
         </p:txBody>
       </p:sp>
@@ -4557,6 +4645,13 @@
   <p:clrMapOvr>
     <a:masterClrMapping/>
   </p:clrMapOvr>
+  <p:timing>
+    <p:tnLst>
+      <p:par>
+        <p:cTn id="1" dur="indefinite" restart="never" nodeType="tmRoot"/>
+      </p:par>
+    </p:tnLst>
+  </p:timing>
 </p:sld>
 </file>
 

</xml_diff>

<commit_message>
Added slides on limits and precision
</commit_message>
<xml_diff>
--- a/CPlusPlus/12_essential_cpp_numerics.pptx
+++ b/CPlusPlus/12_essential_cpp_numerics.pptx
@@ -5,16 +5,18 @@
     <p:sldMasterId id="2147483660" r:id="rId1"/>
   </p:sldMasterIdLst>
   <p:notesMasterIdLst>
-    <p:notesMasterId r:id="rId9"/>
+    <p:notesMasterId r:id="rId11"/>
   </p:notesMasterIdLst>
   <p:sldIdLst>
     <p:sldId id="257" r:id="rId2"/>
     <p:sldId id="258" r:id="rId3"/>
     <p:sldId id="259" r:id="rId4"/>
     <p:sldId id="261" r:id="rId5"/>
-    <p:sldId id="262" r:id="rId6"/>
-    <p:sldId id="263" r:id="rId7"/>
-    <p:sldId id="260" r:id="rId8"/>
+    <p:sldId id="264" r:id="rId6"/>
+    <p:sldId id="265" r:id="rId7"/>
+    <p:sldId id="262" r:id="rId8"/>
+    <p:sldId id="263" r:id="rId9"/>
+    <p:sldId id="260" r:id="rId10"/>
   </p:sldIdLst>
   <p:sldSz cx="9144000" cy="6858000" type="screen4x3"/>
   <p:notesSz cx="6858000" cy="9144000"/>
@@ -4536,29 +4538,414 @@
         </p:nvSpPr>
         <p:spPr/>
         <p:txBody>
-          <a:bodyPr/>
+          <a:bodyPr>
+            <a:normAutofit fontScale="92500" lnSpcReduction="10000"/>
+          </a:bodyPr>
           <a:lstStyle/>
           <a:p>
             <a:r>
               <a:rPr lang="en-US" dirty="0" smtClean="0"/>
-              <a:t>Integers</a:t>
-            </a:r>
-          </a:p>
-          <a:p>
+              <a:t>Integer: </a:t>
+            </a:r>
+            <a:r>
+              <a:rPr lang="en-US" dirty="0" err="1" smtClean="0">
+                <a:latin typeface="Courier New" panose="02070309020205020404" pitchFamily="49" charset="0"/>
+                <a:cs typeface="Courier New" panose="02070309020205020404" pitchFamily="49" charset="0"/>
+              </a:rPr>
+              <a:t>int</a:t>
+            </a:r>
+            <a:r>
+              <a:rPr lang="en-US" dirty="0" smtClean="0"/>
+              <a:t>, </a:t>
+            </a:r>
+            <a:r>
+              <a:rPr lang="en-US" dirty="0" smtClean="0">
+                <a:latin typeface="Courier New" panose="02070309020205020404" pitchFamily="49" charset="0"/>
+                <a:cs typeface="Courier New" panose="02070309020205020404" pitchFamily="49" charset="0"/>
+              </a:rPr>
+              <a:t>long</a:t>
+            </a:r>
+            <a:r>
+              <a:rPr lang="en-US" dirty="0" smtClean="0">
+                <a:cs typeface="Courier New" panose="02070309020205020404" pitchFamily="49" charset="0"/>
+              </a:rPr>
+              <a:t>, </a:t>
+            </a:r>
+            <a:r>
+              <a:rPr lang="en-US" dirty="0" smtClean="0">
+                <a:latin typeface="Courier New" panose="02070309020205020404" pitchFamily="49" charset="0"/>
+                <a:cs typeface="Courier New" panose="02070309020205020404" pitchFamily="49" charset="0"/>
+              </a:rPr>
+              <a:t>int8_t</a:t>
+            </a:r>
+            <a:r>
+              <a:rPr lang="en-US" dirty="0" smtClean="0">
+                <a:cs typeface="Courier New" panose="02070309020205020404" pitchFamily="49" charset="0"/>
+              </a:rPr>
+              <a:t>, </a:t>
+            </a:r>
+            <a:r>
+              <a:rPr lang="en-US" dirty="0" smtClean="0">
+                <a:latin typeface="Courier New" panose="02070309020205020404" pitchFamily="49" charset="0"/>
+                <a:cs typeface="Courier New" panose="02070309020205020404" pitchFamily="49" charset="0"/>
+              </a:rPr>
+              <a:t>int16_t</a:t>
+            </a:r>
+            <a:r>
+              <a:rPr lang="en-US" dirty="0" smtClean="0">
+                <a:cs typeface="Courier New" panose="02070309020205020404" pitchFamily="49" charset="0"/>
+              </a:rPr>
+              <a:t>, </a:t>
+            </a:r>
+            <a:r>
+              <a:rPr lang="en-US" dirty="0" smtClean="0">
+                <a:latin typeface="Courier New" panose="02070309020205020404" pitchFamily="49" charset="0"/>
+                <a:cs typeface="Courier New" panose="02070309020205020404" pitchFamily="49" charset="0"/>
+              </a:rPr>
+              <a:t>int32_t</a:t>
+            </a:r>
+            <a:r>
+              <a:rPr lang="en-US" dirty="0" smtClean="0">
+                <a:cs typeface="Courier New" panose="02070309020205020404" pitchFamily="49" charset="0"/>
+              </a:rPr>
+              <a:t>, </a:t>
+            </a:r>
+            <a:r>
+              <a:rPr lang="en-US" dirty="0" smtClean="0">
+                <a:latin typeface="Courier New" panose="02070309020205020404" pitchFamily="49" charset="0"/>
+                <a:cs typeface="Courier New" panose="02070309020205020404" pitchFamily="49" charset="0"/>
+              </a:rPr>
+              <a:t>int64_t</a:t>
+            </a:r>
+          </a:p>
+          <a:p>
+            <a:pPr lvl="1"/>
+            <a:r>
+              <a:rPr lang="en-US" dirty="0" smtClean="0"/>
+              <a:t>minimum: </a:t>
+            </a:r>
+            <a:r>
+              <a:rPr lang="en-US" dirty="0" err="1" smtClean="0">
+                <a:latin typeface="Courier New" panose="02070309020205020404" pitchFamily="49" charset="0"/>
+                <a:cs typeface="Courier New" panose="02070309020205020404" pitchFamily="49" charset="0"/>
+              </a:rPr>
+              <a:t>std</a:t>
+            </a:r>
+            <a:r>
+              <a:rPr lang="en-US" dirty="0" smtClean="0">
+                <a:latin typeface="Courier New" panose="02070309020205020404" pitchFamily="49" charset="0"/>
+                <a:cs typeface="Courier New" panose="02070309020205020404" pitchFamily="49" charset="0"/>
+              </a:rPr>
+              <a:t>::</a:t>
+            </a:r>
+            <a:r>
+              <a:rPr lang="en-US" dirty="0" err="1" smtClean="0">
+                <a:latin typeface="Courier New" panose="02070309020205020404" pitchFamily="49" charset="0"/>
+                <a:cs typeface="Courier New" panose="02070309020205020404" pitchFamily="49" charset="0"/>
+              </a:rPr>
+              <a:t>numeric_limits</a:t>
+            </a:r>
+            <a:r>
+              <a:rPr lang="en-US" dirty="0" smtClean="0">
+                <a:latin typeface="Courier New" panose="02070309020205020404" pitchFamily="49" charset="0"/>
+                <a:cs typeface="Courier New" panose="02070309020205020404" pitchFamily="49" charset="0"/>
+              </a:rPr>
+              <a:t>&lt;</a:t>
+            </a:r>
+            <a:r>
+              <a:rPr lang="en-US" dirty="0" err="1" smtClean="0">
+                <a:latin typeface="Courier New" panose="02070309020205020404" pitchFamily="49" charset="0"/>
+                <a:cs typeface="Courier New" panose="02070309020205020404" pitchFamily="49" charset="0"/>
+              </a:rPr>
+              <a:t>int</a:t>
+            </a:r>
+            <a:r>
+              <a:rPr lang="en-US" dirty="0" smtClean="0">
+                <a:latin typeface="Courier New" panose="02070309020205020404" pitchFamily="49" charset="0"/>
+                <a:cs typeface="Courier New" panose="02070309020205020404" pitchFamily="49" charset="0"/>
+              </a:rPr>
+              <a:t>&gt;::min()</a:t>
+            </a:r>
+          </a:p>
+          <a:p>
+            <a:pPr lvl="1"/>
+            <a:r>
+              <a:rPr lang="en-US" dirty="0" smtClean="0"/>
+              <a:t>maximum: </a:t>
+            </a:r>
+            <a:r>
+              <a:rPr lang="en-US" dirty="0" err="1" smtClean="0">
+                <a:latin typeface="Courier New" panose="02070309020205020404" pitchFamily="49" charset="0"/>
+                <a:cs typeface="Courier New" panose="02070309020205020404" pitchFamily="49" charset="0"/>
+              </a:rPr>
+              <a:t>std</a:t>
+            </a:r>
+            <a:r>
+              <a:rPr lang="en-US" dirty="0" smtClean="0">
+                <a:latin typeface="Courier New" panose="02070309020205020404" pitchFamily="49" charset="0"/>
+                <a:cs typeface="Courier New" panose="02070309020205020404" pitchFamily="49" charset="0"/>
+              </a:rPr>
+              <a:t>::</a:t>
+            </a:r>
+            <a:r>
+              <a:rPr lang="en-US" dirty="0" err="1" smtClean="0">
+                <a:latin typeface="Courier New" panose="02070309020205020404" pitchFamily="49" charset="0"/>
+                <a:cs typeface="Courier New" panose="02070309020205020404" pitchFamily="49" charset="0"/>
+              </a:rPr>
+              <a:t>numeric_limits</a:t>
+            </a:r>
+            <a:r>
+              <a:rPr lang="en-US" dirty="0" smtClean="0">
+                <a:latin typeface="Courier New" panose="02070309020205020404" pitchFamily="49" charset="0"/>
+                <a:cs typeface="Courier New" panose="02070309020205020404" pitchFamily="49" charset="0"/>
+              </a:rPr>
+              <a:t>&lt;</a:t>
+            </a:r>
+            <a:r>
+              <a:rPr lang="en-US" dirty="0" err="1" smtClean="0">
+                <a:latin typeface="Courier New" panose="02070309020205020404" pitchFamily="49" charset="0"/>
+                <a:cs typeface="Courier New" panose="02070309020205020404" pitchFamily="49" charset="0"/>
+              </a:rPr>
+              <a:t>int</a:t>
+            </a:r>
+            <a:r>
+              <a:rPr lang="en-US" dirty="0" smtClean="0">
+                <a:latin typeface="Courier New" panose="02070309020205020404" pitchFamily="49" charset="0"/>
+                <a:cs typeface="Courier New" panose="02070309020205020404" pitchFamily="49" charset="0"/>
+              </a:rPr>
+              <a:t>&gt;::max()</a:t>
+            </a:r>
             <a:endParaRPr lang="en-US" dirty="0"/>
           </a:p>
           <a:p>
-            <a:endParaRPr lang="en-US" dirty="0" smtClean="0"/>
-          </a:p>
-          <a:p>
-            <a:endParaRPr lang="en-US" dirty="0"/>
-          </a:p>
-          <a:p>
             <a:r>
               <a:rPr lang="en-US" dirty="0" smtClean="0"/>
-              <a:t>Floating point numbers</a:t>
-            </a:r>
-            <a:endParaRPr lang="en-US" dirty="0"/>
+              <a:t>Floating point: </a:t>
+            </a:r>
+            <a:r>
+              <a:rPr lang="en-US" dirty="0" smtClean="0">
+                <a:latin typeface="Courier New" panose="02070309020205020404" pitchFamily="49" charset="0"/>
+                <a:cs typeface="Courier New" panose="02070309020205020404" pitchFamily="49" charset="0"/>
+              </a:rPr>
+              <a:t>float</a:t>
+            </a:r>
+            <a:r>
+              <a:rPr lang="en-US" dirty="0" smtClean="0"/>
+              <a:t>, </a:t>
+            </a:r>
+            <a:r>
+              <a:rPr lang="en-US" dirty="0" smtClean="0">
+                <a:latin typeface="Courier New" panose="02070309020205020404" pitchFamily="49" charset="0"/>
+                <a:cs typeface="Courier New" panose="02070309020205020404" pitchFamily="49" charset="0"/>
+              </a:rPr>
+              <a:t>double</a:t>
+            </a:r>
+            <a:r>
+              <a:rPr lang="en-US" dirty="0" smtClean="0"/>
+              <a:t>, </a:t>
+            </a:r>
+            <a:r>
+              <a:rPr lang="en-US" dirty="0" smtClean="0">
+                <a:latin typeface="Courier New" panose="02070309020205020404" pitchFamily="49" charset="0"/>
+                <a:cs typeface="Courier New" panose="02070309020205020404" pitchFamily="49" charset="0"/>
+              </a:rPr>
+              <a:t>long double</a:t>
+            </a:r>
+          </a:p>
+          <a:p>
+            <a:pPr lvl="1"/>
+            <a:r>
+              <a:rPr lang="en-US" dirty="0" smtClean="0"/>
+              <a:t>smallest number &gt; 0: </a:t>
+            </a:r>
+            <a:r>
+              <a:rPr lang="en-US" dirty="0" err="1" smtClean="0">
+                <a:latin typeface="Courier New" panose="02070309020205020404" pitchFamily="49" charset="0"/>
+                <a:cs typeface="Courier New" panose="02070309020205020404" pitchFamily="49" charset="0"/>
+              </a:rPr>
+              <a:t>std</a:t>
+            </a:r>
+            <a:r>
+              <a:rPr lang="en-US" dirty="0" smtClean="0">
+                <a:latin typeface="Courier New" panose="02070309020205020404" pitchFamily="49" charset="0"/>
+                <a:cs typeface="Courier New" panose="02070309020205020404" pitchFamily="49" charset="0"/>
+              </a:rPr>
+              <a:t>::</a:t>
+            </a:r>
+            <a:r>
+              <a:rPr lang="en-US" dirty="0" err="1" smtClean="0">
+                <a:latin typeface="Courier New" panose="02070309020205020404" pitchFamily="49" charset="0"/>
+                <a:cs typeface="Courier New" panose="02070309020205020404" pitchFamily="49" charset="0"/>
+              </a:rPr>
+              <a:t>numeric_limits</a:t>
+            </a:r>
+            <a:r>
+              <a:rPr lang="en-US" dirty="0" smtClean="0">
+                <a:latin typeface="Courier New" panose="02070309020205020404" pitchFamily="49" charset="0"/>
+                <a:cs typeface="Courier New" panose="02070309020205020404" pitchFamily="49" charset="0"/>
+              </a:rPr>
+              <a:t>&lt;double&gt;::min()</a:t>
+            </a:r>
+          </a:p>
+          <a:p>
+            <a:pPr lvl="1"/>
+            <a:r>
+              <a:rPr lang="en-US" dirty="0" smtClean="0"/>
+              <a:t>maximum: </a:t>
+            </a:r>
+            <a:r>
+              <a:rPr lang="en-US" dirty="0" err="1" smtClean="0">
+                <a:latin typeface="Courier New" panose="02070309020205020404" pitchFamily="49" charset="0"/>
+                <a:cs typeface="Courier New" panose="02070309020205020404" pitchFamily="49" charset="0"/>
+              </a:rPr>
+              <a:t>std</a:t>
+            </a:r>
+            <a:r>
+              <a:rPr lang="en-US" dirty="0" smtClean="0">
+                <a:latin typeface="Courier New" panose="02070309020205020404" pitchFamily="49" charset="0"/>
+                <a:cs typeface="Courier New" panose="02070309020205020404" pitchFamily="49" charset="0"/>
+              </a:rPr>
+              <a:t>::</a:t>
+            </a:r>
+            <a:r>
+              <a:rPr lang="en-US" dirty="0" err="1" smtClean="0">
+                <a:latin typeface="Courier New" panose="02070309020205020404" pitchFamily="49" charset="0"/>
+                <a:cs typeface="Courier New" panose="02070309020205020404" pitchFamily="49" charset="0"/>
+              </a:rPr>
+              <a:t>numeric_limits</a:t>
+            </a:r>
+            <a:r>
+              <a:rPr lang="en-US" dirty="0" smtClean="0">
+                <a:latin typeface="Courier New" panose="02070309020205020404" pitchFamily="49" charset="0"/>
+                <a:cs typeface="Courier New" panose="02070309020205020404" pitchFamily="49" charset="0"/>
+              </a:rPr>
+              <a:t>&lt;double&gt;::max()</a:t>
+            </a:r>
+          </a:p>
+          <a:p>
+            <a:pPr lvl="1"/>
+            <a:r>
+              <a:rPr lang="en-US" dirty="0" smtClean="0"/>
+              <a:t>1 &lt; 1 + </a:t>
+            </a:r>
+            <a:r>
+              <a:rPr lang="en-US" dirty="0" smtClean="0">
+                <a:sym typeface="Symbol" panose="05050102010706020507" pitchFamily="18" charset="2"/>
+              </a:rPr>
+              <a:t></a:t>
+            </a:r>
+            <a:r>
+              <a:rPr lang="en-US" dirty="0" smtClean="0"/>
+              <a:t>: </a:t>
+            </a:r>
+            <a:r>
+              <a:rPr lang="en-US" dirty="0" err="1" smtClean="0">
+                <a:latin typeface="Courier New" panose="02070309020205020404" pitchFamily="49" charset="0"/>
+                <a:cs typeface="Courier New" panose="02070309020205020404" pitchFamily="49" charset="0"/>
+              </a:rPr>
+              <a:t>std</a:t>
+            </a:r>
+            <a:r>
+              <a:rPr lang="en-US" dirty="0" smtClean="0">
+                <a:latin typeface="Courier New" panose="02070309020205020404" pitchFamily="49" charset="0"/>
+                <a:cs typeface="Courier New" panose="02070309020205020404" pitchFamily="49" charset="0"/>
+              </a:rPr>
+              <a:t>::</a:t>
+            </a:r>
+            <a:r>
+              <a:rPr lang="en-US" dirty="0" err="1" smtClean="0">
+                <a:latin typeface="Courier New" panose="02070309020205020404" pitchFamily="49" charset="0"/>
+                <a:cs typeface="Courier New" panose="02070309020205020404" pitchFamily="49" charset="0"/>
+              </a:rPr>
+              <a:t>numeric_limits</a:t>
+            </a:r>
+            <a:r>
+              <a:rPr lang="en-US" dirty="0" smtClean="0">
+                <a:latin typeface="Courier New" panose="02070309020205020404" pitchFamily="49" charset="0"/>
+                <a:cs typeface="Courier New" panose="02070309020205020404" pitchFamily="49" charset="0"/>
+              </a:rPr>
+              <a:t>&lt;double&gt;::epsilon()</a:t>
+            </a:r>
+          </a:p>
+          <a:p>
+            <a:pPr lvl="1"/>
+            <a:r>
+              <a:rPr lang="en-US" dirty="0" smtClean="0"/>
+              <a:t>significant digits, base 10: </a:t>
+            </a:r>
+            <a:r>
+              <a:rPr lang="en-US" dirty="0" err="1" smtClean="0">
+                <a:latin typeface="Courier New" panose="02070309020205020404" pitchFamily="49" charset="0"/>
+                <a:cs typeface="Courier New" panose="02070309020205020404" pitchFamily="49" charset="0"/>
+              </a:rPr>
+              <a:t>std</a:t>
+            </a:r>
+            <a:r>
+              <a:rPr lang="en-US" dirty="0" smtClean="0">
+                <a:latin typeface="Courier New" panose="02070309020205020404" pitchFamily="49" charset="0"/>
+                <a:cs typeface="Courier New" panose="02070309020205020404" pitchFamily="49" charset="0"/>
+              </a:rPr>
+              <a:t>::</a:t>
+            </a:r>
+            <a:r>
+              <a:rPr lang="en-US" dirty="0" err="1" smtClean="0">
+                <a:latin typeface="Courier New" panose="02070309020205020404" pitchFamily="49" charset="0"/>
+                <a:cs typeface="Courier New" panose="02070309020205020404" pitchFamily="49" charset="0"/>
+              </a:rPr>
+              <a:t>numeric_limits</a:t>
+            </a:r>
+            <a:r>
+              <a:rPr lang="en-US" dirty="0" smtClean="0">
+                <a:latin typeface="Courier New" panose="02070309020205020404" pitchFamily="49" charset="0"/>
+                <a:cs typeface="Courier New" panose="02070309020205020404" pitchFamily="49" charset="0"/>
+              </a:rPr>
+              <a:t>&lt;double&gt;digits10</a:t>
+            </a:r>
+          </a:p>
+          <a:p>
+            <a:pPr lvl="1"/>
+            <a:r>
+              <a:rPr lang="en-US" dirty="0" err="1" smtClean="0">
+                <a:latin typeface="Courier New" panose="02070309020205020404" pitchFamily="49" charset="0"/>
+                <a:cs typeface="Courier New" panose="02070309020205020404" pitchFamily="49" charset="0"/>
+              </a:rPr>
+              <a:t>isfinite</a:t>
+            </a:r>
+            <a:r>
+              <a:rPr lang="en-US" dirty="0" smtClean="0">
+                <a:latin typeface="Courier New" panose="02070309020205020404" pitchFamily="49" charset="0"/>
+                <a:cs typeface="Courier New" panose="02070309020205020404" pitchFamily="49" charset="0"/>
+              </a:rPr>
+              <a:t>(…)</a:t>
+            </a:r>
+            <a:r>
+              <a:rPr lang="en-US" dirty="0" smtClean="0">
+                <a:cs typeface="Courier New" panose="02070309020205020404" pitchFamily="49" charset="0"/>
+              </a:rPr>
+              <a:t>: true if not </a:t>
+            </a:r>
+            <a:r>
+              <a:rPr lang="en-US" dirty="0" smtClean="0">
+                <a:cs typeface="Courier New" panose="02070309020205020404" pitchFamily="49" charset="0"/>
+                <a:sym typeface="Symbol" panose="05050102010706020507" pitchFamily="18" charset="2"/>
+              </a:rPr>
+              <a:t></a:t>
+            </a:r>
+            <a:r>
+              <a:rPr lang="en-US" dirty="0" smtClean="0">
+                <a:cs typeface="Courier New" panose="02070309020205020404" pitchFamily="49" charset="0"/>
+              </a:rPr>
+              <a:t>infinity, or </a:t>
+            </a:r>
+            <a:r>
+              <a:rPr lang="en-US" dirty="0" err="1" smtClean="0">
+                <a:cs typeface="Courier New" panose="02070309020205020404" pitchFamily="49" charset="0"/>
+              </a:rPr>
+              <a:t>NaN</a:t>
+            </a:r>
+            <a:endParaRPr lang="en-US" dirty="0" smtClean="0">
+              <a:cs typeface="Courier New" panose="02070309020205020404" pitchFamily="49" charset="0"/>
+            </a:endParaRPr>
           </a:p>
         </p:txBody>
       </p:sp>
@@ -4593,8 +4980,8 @@
         </p:nvSpPr>
         <p:spPr>
           <a:xfrm>
-            <a:off x="1265288" y="2705374"/>
-            <a:ext cx="6472699" cy="338554"/>
+            <a:off x="5188052" y="1397377"/>
+            <a:ext cx="2539796" cy="338554"/>
           </a:xfrm>
           <a:prstGeom prst="rect">
             <a:avLst/>
@@ -4619,14 +5006,7 @@
                 <a:latin typeface="Courier New" pitchFamily="49" charset="0"/>
                 <a:cs typeface="Courier New" pitchFamily="49" charset="0"/>
               </a:rPr>
-              <a:t>#include </a:t>
-            </a:r>
-            <a:r>
-              <a:rPr lang="en-US" sz="1600" smtClean="0">
-                <a:latin typeface="Courier New" pitchFamily="49" charset="0"/>
-                <a:cs typeface="Courier New" pitchFamily="49" charset="0"/>
-              </a:rPr>
-              <a:t>&lt;limits&gt;</a:t>
+              <a:t>#include &lt;limits&gt;</a:t>
             </a:r>
             <a:endParaRPr lang="en-US" sz="1600" dirty="0" smtClean="0">
               <a:latin typeface="Courier New" pitchFamily="49" charset="0"/>
@@ -4648,14 +5028,2759 @@
   <p:timing>
     <p:tnLst>
       <p:par>
-        <p:cTn id="1" dur="indefinite" restart="never" nodeType="tmRoot"/>
+        <p:cTn id="1" dur="indefinite" restart="never" nodeType="tmRoot">
+          <p:childTnLst>
+            <p:seq concurrent="1" nextAc="seek">
+              <p:cTn id="2" dur="indefinite" nodeType="mainSeq">
+                <p:childTnLst>
+                  <p:par>
+                    <p:cTn id="3" fill="hold">
+                      <p:stCondLst>
+                        <p:cond delay="indefinite"/>
+                      </p:stCondLst>
+                      <p:childTnLst>
+                        <p:par>
+                          <p:cTn id="4" fill="hold">
+                            <p:stCondLst>
+                              <p:cond delay="0"/>
+                            </p:stCondLst>
+                            <p:childTnLst>
+                              <p:par>
+                                <p:cTn id="5" presetID="1" presetClass="entr" presetSubtype="0" fill="hold" grpId="0" nodeType="clickEffect">
+                                  <p:stCondLst>
+                                    <p:cond delay="0"/>
+                                  </p:stCondLst>
+                                  <p:childTnLst>
+                                    <p:set>
+                                      <p:cBhvr>
+                                        <p:cTn id="6" dur="1" fill="hold">
+                                          <p:stCondLst>
+                                            <p:cond delay="0"/>
+                                          </p:stCondLst>
+                                        </p:cTn>
+                                        <p:tgtEl>
+                                          <p:spTgt spid="5">
+                                            <p:txEl>
+                                              <p:pRg st="0" end="0"/>
+                                            </p:txEl>
+                                          </p:spTgt>
+                                        </p:tgtEl>
+                                        <p:attrNameLst>
+                                          <p:attrName>style.visibility</p:attrName>
+                                        </p:attrNameLst>
+                                      </p:cBhvr>
+                                      <p:to>
+                                        <p:strVal val="visible"/>
+                                      </p:to>
+                                    </p:set>
+                                  </p:childTnLst>
+                                </p:cTn>
+                              </p:par>
+                            </p:childTnLst>
+                          </p:cTn>
+                        </p:par>
+                      </p:childTnLst>
+                    </p:cTn>
+                  </p:par>
+                  <p:par>
+                    <p:cTn id="7" fill="hold">
+                      <p:stCondLst>
+                        <p:cond delay="indefinite"/>
+                      </p:stCondLst>
+                      <p:childTnLst>
+                        <p:par>
+                          <p:cTn id="8" fill="hold">
+                            <p:stCondLst>
+                              <p:cond delay="0"/>
+                            </p:stCondLst>
+                            <p:childTnLst>
+                              <p:par>
+                                <p:cTn id="9" presetID="1" presetClass="entr" presetSubtype="0" fill="hold" grpId="0" nodeType="clickEffect">
+                                  <p:stCondLst>
+                                    <p:cond delay="0"/>
+                                  </p:stCondLst>
+                                  <p:childTnLst>
+                                    <p:set>
+                                      <p:cBhvr>
+                                        <p:cTn id="10" dur="1" fill="hold">
+                                          <p:stCondLst>
+                                            <p:cond delay="0"/>
+                                          </p:stCondLst>
+                                        </p:cTn>
+                                        <p:tgtEl>
+                                          <p:spTgt spid="5">
+                                            <p:txEl>
+                                              <p:pRg st="1" end="1"/>
+                                            </p:txEl>
+                                          </p:spTgt>
+                                        </p:tgtEl>
+                                        <p:attrNameLst>
+                                          <p:attrName>style.visibility</p:attrName>
+                                        </p:attrNameLst>
+                                      </p:cBhvr>
+                                      <p:to>
+                                        <p:strVal val="visible"/>
+                                      </p:to>
+                                    </p:set>
+                                  </p:childTnLst>
+                                </p:cTn>
+                              </p:par>
+                            </p:childTnLst>
+                          </p:cTn>
+                        </p:par>
+                      </p:childTnLst>
+                    </p:cTn>
+                  </p:par>
+                  <p:par>
+                    <p:cTn id="11" fill="hold">
+                      <p:stCondLst>
+                        <p:cond delay="indefinite"/>
+                      </p:stCondLst>
+                      <p:childTnLst>
+                        <p:par>
+                          <p:cTn id="12" fill="hold">
+                            <p:stCondLst>
+                              <p:cond delay="0"/>
+                            </p:stCondLst>
+                            <p:childTnLst>
+                              <p:par>
+                                <p:cTn id="13" presetID="1" presetClass="entr" presetSubtype="0" fill="hold" grpId="0" nodeType="clickEffect">
+                                  <p:stCondLst>
+                                    <p:cond delay="0"/>
+                                  </p:stCondLst>
+                                  <p:childTnLst>
+                                    <p:set>
+                                      <p:cBhvr>
+                                        <p:cTn id="14" dur="1" fill="hold">
+                                          <p:stCondLst>
+                                            <p:cond delay="0"/>
+                                          </p:stCondLst>
+                                        </p:cTn>
+                                        <p:tgtEl>
+                                          <p:spTgt spid="5">
+                                            <p:txEl>
+                                              <p:pRg st="2" end="2"/>
+                                            </p:txEl>
+                                          </p:spTgt>
+                                        </p:tgtEl>
+                                        <p:attrNameLst>
+                                          <p:attrName>style.visibility</p:attrName>
+                                        </p:attrNameLst>
+                                      </p:cBhvr>
+                                      <p:to>
+                                        <p:strVal val="visible"/>
+                                      </p:to>
+                                    </p:set>
+                                  </p:childTnLst>
+                                </p:cTn>
+                              </p:par>
+                            </p:childTnLst>
+                          </p:cTn>
+                        </p:par>
+                      </p:childTnLst>
+                    </p:cTn>
+                  </p:par>
+                  <p:par>
+                    <p:cTn id="15" fill="hold">
+                      <p:stCondLst>
+                        <p:cond delay="indefinite"/>
+                      </p:stCondLst>
+                      <p:childTnLst>
+                        <p:par>
+                          <p:cTn id="16" fill="hold">
+                            <p:stCondLst>
+                              <p:cond delay="0"/>
+                            </p:stCondLst>
+                            <p:childTnLst>
+                              <p:par>
+                                <p:cTn id="17" presetID="1" presetClass="entr" presetSubtype="0" fill="hold" grpId="0" nodeType="clickEffect">
+                                  <p:stCondLst>
+                                    <p:cond delay="0"/>
+                                  </p:stCondLst>
+                                  <p:childTnLst>
+                                    <p:set>
+                                      <p:cBhvr>
+                                        <p:cTn id="18" dur="1" fill="hold">
+                                          <p:stCondLst>
+                                            <p:cond delay="0"/>
+                                          </p:stCondLst>
+                                        </p:cTn>
+                                        <p:tgtEl>
+                                          <p:spTgt spid="5">
+                                            <p:txEl>
+                                              <p:pRg st="3" end="3"/>
+                                            </p:txEl>
+                                          </p:spTgt>
+                                        </p:tgtEl>
+                                        <p:attrNameLst>
+                                          <p:attrName>style.visibility</p:attrName>
+                                        </p:attrNameLst>
+                                      </p:cBhvr>
+                                      <p:to>
+                                        <p:strVal val="visible"/>
+                                      </p:to>
+                                    </p:set>
+                                  </p:childTnLst>
+                                </p:cTn>
+                              </p:par>
+                            </p:childTnLst>
+                          </p:cTn>
+                        </p:par>
+                      </p:childTnLst>
+                    </p:cTn>
+                  </p:par>
+                  <p:par>
+                    <p:cTn id="19" fill="hold">
+                      <p:stCondLst>
+                        <p:cond delay="indefinite"/>
+                      </p:stCondLst>
+                      <p:childTnLst>
+                        <p:par>
+                          <p:cTn id="20" fill="hold">
+                            <p:stCondLst>
+                              <p:cond delay="0"/>
+                            </p:stCondLst>
+                            <p:childTnLst>
+                              <p:par>
+                                <p:cTn id="21" presetID="1" presetClass="entr" presetSubtype="0" fill="hold" grpId="0" nodeType="clickEffect">
+                                  <p:stCondLst>
+                                    <p:cond delay="0"/>
+                                  </p:stCondLst>
+                                  <p:childTnLst>
+                                    <p:set>
+                                      <p:cBhvr>
+                                        <p:cTn id="22" dur="1" fill="hold">
+                                          <p:stCondLst>
+                                            <p:cond delay="0"/>
+                                          </p:stCondLst>
+                                        </p:cTn>
+                                        <p:tgtEl>
+                                          <p:spTgt spid="5">
+                                            <p:txEl>
+                                              <p:pRg st="4" end="4"/>
+                                            </p:txEl>
+                                          </p:spTgt>
+                                        </p:tgtEl>
+                                        <p:attrNameLst>
+                                          <p:attrName>style.visibility</p:attrName>
+                                        </p:attrNameLst>
+                                      </p:cBhvr>
+                                      <p:to>
+                                        <p:strVal val="visible"/>
+                                      </p:to>
+                                    </p:set>
+                                  </p:childTnLst>
+                                </p:cTn>
+                              </p:par>
+                            </p:childTnLst>
+                          </p:cTn>
+                        </p:par>
+                      </p:childTnLst>
+                    </p:cTn>
+                  </p:par>
+                  <p:par>
+                    <p:cTn id="23" fill="hold">
+                      <p:stCondLst>
+                        <p:cond delay="indefinite"/>
+                      </p:stCondLst>
+                      <p:childTnLst>
+                        <p:par>
+                          <p:cTn id="24" fill="hold">
+                            <p:stCondLst>
+                              <p:cond delay="0"/>
+                            </p:stCondLst>
+                            <p:childTnLst>
+                              <p:par>
+                                <p:cTn id="25" presetID="1" presetClass="entr" presetSubtype="0" fill="hold" grpId="0" nodeType="clickEffect">
+                                  <p:stCondLst>
+                                    <p:cond delay="0"/>
+                                  </p:stCondLst>
+                                  <p:childTnLst>
+                                    <p:set>
+                                      <p:cBhvr>
+                                        <p:cTn id="26" dur="1" fill="hold">
+                                          <p:stCondLst>
+                                            <p:cond delay="0"/>
+                                          </p:stCondLst>
+                                        </p:cTn>
+                                        <p:tgtEl>
+                                          <p:spTgt spid="5">
+                                            <p:txEl>
+                                              <p:pRg st="5" end="5"/>
+                                            </p:txEl>
+                                          </p:spTgt>
+                                        </p:tgtEl>
+                                        <p:attrNameLst>
+                                          <p:attrName>style.visibility</p:attrName>
+                                        </p:attrNameLst>
+                                      </p:cBhvr>
+                                      <p:to>
+                                        <p:strVal val="visible"/>
+                                      </p:to>
+                                    </p:set>
+                                  </p:childTnLst>
+                                </p:cTn>
+                              </p:par>
+                            </p:childTnLst>
+                          </p:cTn>
+                        </p:par>
+                      </p:childTnLst>
+                    </p:cTn>
+                  </p:par>
+                  <p:par>
+                    <p:cTn id="27" fill="hold">
+                      <p:stCondLst>
+                        <p:cond delay="indefinite"/>
+                      </p:stCondLst>
+                      <p:childTnLst>
+                        <p:par>
+                          <p:cTn id="28" fill="hold">
+                            <p:stCondLst>
+                              <p:cond delay="0"/>
+                            </p:stCondLst>
+                            <p:childTnLst>
+                              <p:par>
+                                <p:cTn id="29" presetID="1" presetClass="entr" presetSubtype="0" fill="hold" grpId="0" nodeType="clickEffect">
+                                  <p:stCondLst>
+                                    <p:cond delay="0"/>
+                                  </p:stCondLst>
+                                  <p:childTnLst>
+                                    <p:set>
+                                      <p:cBhvr>
+                                        <p:cTn id="30" dur="1" fill="hold">
+                                          <p:stCondLst>
+                                            <p:cond delay="0"/>
+                                          </p:stCondLst>
+                                        </p:cTn>
+                                        <p:tgtEl>
+                                          <p:spTgt spid="5">
+                                            <p:txEl>
+                                              <p:pRg st="6" end="6"/>
+                                            </p:txEl>
+                                          </p:spTgt>
+                                        </p:tgtEl>
+                                        <p:attrNameLst>
+                                          <p:attrName>style.visibility</p:attrName>
+                                        </p:attrNameLst>
+                                      </p:cBhvr>
+                                      <p:to>
+                                        <p:strVal val="visible"/>
+                                      </p:to>
+                                    </p:set>
+                                  </p:childTnLst>
+                                </p:cTn>
+                              </p:par>
+                            </p:childTnLst>
+                          </p:cTn>
+                        </p:par>
+                      </p:childTnLst>
+                    </p:cTn>
+                  </p:par>
+                  <p:par>
+                    <p:cTn id="31" fill="hold">
+                      <p:stCondLst>
+                        <p:cond delay="indefinite"/>
+                      </p:stCondLst>
+                      <p:childTnLst>
+                        <p:par>
+                          <p:cTn id="32" fill="hold">
+                            <p:stCondLst>
+                              <p:cond delay="0"/>
+                            </p:stCondLst>
+                            <p:childTnLst>
+                              <p:par>
+                                <p:cTn id="33" presetID="1" presetClass="entr" presetSubtype="0" fill="hold" grpId="0" nodeType="clickEffect">
+                                  <p:stCondLst>
+                                    <p:cond delay="0"/>
+                                  </p:stCondLst>
+                                  <p:childTnLst>
+                                    <p:set>
+                                      <p:cBhvr>
+                                        <p:cTn id="34" dur="1" fill="hold">
+                                          <p:stCondLst>
+                                            <p:cond delay="0"/>
+                                          </p:stCondLst>
+                                        </p:cTn>
+                                        <p:tgtEl>
+                                          <p:spTgt spid="5">
+                                            <p:txEl>
+                                              <p:pRg st="7" end="7"/>
+                                            </p:txEl>
+                                          </p:spTgt>
+                                        </p:tgtEl>
+                                        <p:attrNameLst>
+                                          <p:attrName>style.visibility</p:attrName>
+                                        </p:attrNameLst>
+                                      </p:cBhvr>
+                                      <p:to>
+                                        <p:strVal val="visible"/>
+                                      </p:to>
+                                    </p:set>
+                                  </p:childTnLst>
+                                </p:cTn>
+                              </p:par>
+                            </p:childTnLst>
+                          </p:cTn>
+                        </p:par>
+                      </p:childTnLst>
+                    </p:cTn>
+                  </p:par>
+                  <p:par>
+                    <p:cTn id="35" fill="hold">
+                      <p:stCondLst>
+                        <p:cond delay="indefinite"/>
+                      </p:stCondLst>
+                      <p:childTnLst>
+                        <p:par>
+                          <p:cTn id="36" fill="hold">
+                            <p:stCondLst>
+                              <p:cond delay="0"/>
+                            </p:stCondLst>
+                            <p:childTnLst>
+                              <p:par>
+                                <p:cTn id="37" presetID="1" presetClass="entr" presetSubtype="0" fill="hold" grpId="0" nodeType="clickEffect">
+                                  <p:stCondLst>
+                                    <p:cond delay="0"/>
+                                  </p:stCondLst>
+                                  <p:childTnLst>
+                                    <p:set>
+                                      <p:cBhvr>
+                                        <p:cTn id="38" dur="1" fill="hold">
+                                          <p:stCondLst>
+                                            <p:cond delay="0"/>
+                                          </p:stCondLst>
+                                        </p:cTn>
+                                        <p:tgtEl>
+                                          <p:spTgt spid="5">
+                                            <p:txEl>
+                                              <p:pRg st="8" end="8"/>
+                                            </p:txEl>
+                                          </p:spTgt>
+                                        </p:tgtEl>
+                                        <p:attrNameLst>
+                                          <p:attrName>style.visibility</p:attrName>
+                                        </p:attrNameLst>
+                                      </p:cBhvr>
+                                      <p:to>
+                                        <p:strVal val="visible"/>
+                                      </p:to>
+                                    </p:set>
+                                  </p:childTnLst>
+                                </p:cTn>
+                              </p:par>
+                            </p:childTnLst>
+                          </p:cTn>
+                        </p:par>
+                      </p:childTnLst>
+                    </p:cTn>
+                  </p:par>
+                </p:childTnLst>
+              </p:cTn>
+              <p:prevCondLst>
+                <p:cond evt="onPrev" delay="0">
+                  <p:tgtEl>
+                    <p:sldTgt/>
+                  </p:tgtEl>
+                </p:cond>
+              </p:prevCondLst>
+              <p:nextCondLst>
+                <p:cond evt="onNext" delay="0">
+                  <p:tgtEl>
+                    <p:sldTgt/>
+                  </p:tgtEl>
+                </p:cond>
+              </p:nextCondLst>
+            </p:seq>
+          </p:childTnLst>
+        </p:cTn>
+      </p:par>
+    </p:tnLst>
+    <p:bldLst>
+      <p:bldP spid="5" grpId="0" build="p" bldLvl="2"/>
+    </p:bldLst>
+  </p:timing>
+</p:sld>
+</file>
+
+<file path=ppt/slides/slide5.xml><?xml version="1.0" encoding="utf-8"?>
+<p:sld xmlns:a="http://schemas.openxmlformats.org/drawingml/2006/main" xmlns:r="http://schemas.openxmlformats.org/officeDocument/2006/relationships" xmlns:p="http://schemas.openxmlformats.org/presentationml/2006/main">
+  <p:cSld>
+    <p:spTree>
+      <p:nvGrpSpPr>
+        <p:cNvPr id="1" name=""/>
+        <p:cNvGrpSpPr/>
+        <p:nvPr/>
+      </p:nvGrpSpPr>
+      <p:grpSpPr>
+        <a:xfrm>
+          <a:off x="0" y="0"/>
+          <a:ext cx="0" cy="0"/>
+          <a:chOff x="0" y="0"/>
+          <a:chExt cx="0" cy="0"/>
+        </a:xfrm>
+      </p:grpSpPr>
+      <p:sp>
+        <p:nvSpPr>
+          <p:cNvPr id="2" name="Title 1"/>
+          <p:cNvSpPr>
+            <a:spLocks noGrp="1"/>
+          </p:cNvSpPr>
+          <p:nvPr>
+            <p:ph type="title"/>
+          </p:nvPr>
+        </p:nvSpPr>
+        <p:spPr/>
+        <p:txBody>
+          <a:bodyPr/>
+          <a:lstStyle/>
+          <a:p>
+            <a:r>
+              <a:rPr lang="en-US" dirty="0" smtClean="0"/>
+              <a:t>Limit values</a:t>
+            </a:r>
+            <a:endParaRPr lang="en-US" dirty="0"/>
+          </a:p>
+        </p:txBody>
+      </p:sp>
+      <p:graphicFrame>
+        <p:nvGraphicFramePr>
+          <p:cNvPr id="5" name="Content Placeholder 4"/>
+          <p:cNvGraphicFramePr>
+            <a:graphicFrameLocks noGrp="1"/>
+          </p:cNvGraphicFramePr>
+          <p:nvPr>
+            <p:ph idx="1"/>
+            <p:extLst>
+              <p:ext uri="{D42A27DB-BD31-4B8C-83A1-F6EECF244321}">
+                <p14:modId xmlns:p14="http://schemas.microsoft.com/office/powerpoint/2010/main" val="962715214"/>
+              </p:ext>
+            </p:extLst>
+          </p:nvPr>
+        </p:nvGraphicFramePr>
+        <p:xfrm>
+          <a:off x="628650" y="1825625"/>
+          <a:ext cx="7886700" cy="1112520"/>
+        </p:xfrm>
+        <a:graphic>
+          <a:graphicData uri="http://schemas.openxmlformats.org/drawingml/2006/table">
+            <a:tbl>
+              <a:tblPr firstRow="1" bandRow="1">
+                <a:tableStyleId>{5C22544A-7EE6-4342-B048-85BDC9FD1C3A}</a:tableStyleId>
+              </a:tblPr>
+              <a:tblGrid>
+                <a:gridCol w="836356"/>
+                <a:gridCol w="993059"/>
+                <a:gridCol w="1396180"/>
+                <a:gridCol w="1848465"/>
+                <a:gridCol w="2812640"/>
+              </a:tblGrid>
+              <a:tr h="370840">
+                <a:tc>
+                  <a:txBody>
+                    <a:bodyPr/>
+                    <a:lstStyle/>
+                    <a:p>
+                      <a:endParaRPr lang="en-US" sz="1800" dirty="0"/>
+                    </a:p>
+                  </a:txBody>
+                  <a:tcPr/>
+                </a:tc>
+                <a:tc>
+                  <a:txBody>
+                    <a:bodyPr/>
+                    <a:lstStyle/>
+                    <a:p>
+                      <a:pPr algn="ctr"/>
+                      <a:r>
+                        <a:rPr lang="en-US" sz="1800" dirty="0" smtClean="0"/>
+                        <a:t>int8_t</a:t>
+                      </a:r>
+                      <a:endParaRPr lang="en-US" sz="1800" dirty="0"/>
+                    </a:p>
+                  </a:txBody>
+                  <a:tcPr/>
+                </a:tc>
+                <a:tc>
+                  <a:txBody>
+                    <a:bodyPr/>
+                    <a:lstStyle/>
+                    <a:p>
+                      <a:pPr algn="ctr"/>
+                      <a:r>
+                        <a:rPr lang="en-US" sz="1800" dirty="0" smtClean="0"/>
+                        <a:t>int16_t</a:t>
+                      </a:r>
+                      <a:endParaRPr lang="en-US" sz="1800" dirty="0"/>
+                    </a:p>
+                  </a:txBody>
+                  <a:tcPr/>
+                </a:tc>
+                <a:tc>
+                  <a:txBody>
+                    <a:bodyPr/>
+                    <a:lstStyle/>
+                    <a:p>
+                      <a:pPr algn="ctr"/>
+                      <a:r>
+                        <a:rPr lang="en-US" sz="1800" dirty="0" smtClean="0"/>
+                        <a:t>int32_t</a:t>
+                      </a:r>
+                      <a:endParaRPr lang="en-US" sz="1800" dirty="0"/>
+                    </a:p>
+                  </a:txBody>
+                  <a:tcPr/>
+                </a:tc>
+                <a:tc>
+                  <a:txBody>
+                    <a:bodyPr/>
+                    <a:lstStyle/>
+                    <a:p>
+                      <a:pPr algn="ctr"/>
+                      <a:r>
+                        <a:rPr lang="en-US" sz="1800" dirty="0" smtClean="0"/>
+                        <a:t>int64_t</a:t>
+                      </a:r>
+                      <a:endParaRPr lang="en-US" sz="1800" dirty="0"/>
+                    </a:p>
+                  </a:txBody>
+                  <a:tcPr/>
+                </a:tc>
+              </a:tr>
+              <a:tr h="370840">
+                <a:tc>
+                  <a:txBody>
+                    <a:bodyPr/>
+                    <a:lstStyle/>
+                    <a:p>
+                      <a:r>
+                        <a:rPr lang="en-US" sz="1800" dirty="0" smtClean="0"/>
+                        <a:t>min()</a:t>
+                      </a:r>
+                      <a:endParaRPr lang="en-US" sz="1800" dirty="0"/>
+                    </a:p>
+                  </a:txBody>
+                  <a:tcPr/>
+                </a:tc>
+                <a:tc>
+                  <a:txBody>
+                    <a:bodyPr/>
+                    <a:lstStyle/>
+                    <a:p>
+                      <a:pPr algn="r"/>
+                      <a:r>
+                        <a:rPr lang="en-US" sz="1800" dirty="0" smtClean="0"/>
+                        <a:t>-256</a:t>
+                      </a:r>
+                      <a:endParaRPr lang="en-US" sz="1800" dirty="0"/>
+                    </a:p>
+                  </a:txBody>
+                  <a:tcPr/>
+                </a:tc>
+                <a:tc>
+                  <a:txBody>
+                    <a:bodyPr/>
+                    <a:lstStyle/>
+                    <a:p>
+                      <a:pPr algn="r"/>
+                      <a:r>
+                        <a:rPr lang="en-US" sz="1800" dirty="0" smtClean="0"/>
+                        <a:t>-32768</a:t>
+                      </a:r>
+                      <a:endParaRPr lang="en-US" sz="1800" dirty="0"/>
+                    </a:p>
+                  </a:txBody>
+                  <a:tcPr/>
+                </a:tc>
+                <a:tc>
+                  <a:txBody>
+                    <a:bodyPr/>
+                    <a:lstStyle/>
+                    <a:p>
+                      <a:pPr algn="r"/>
+                      <a:r>
+                        <a:rPr lang="en-US" sz="1800" dirty="0" smtClean="0"/>
+                        <a:t>-2147483648</a:t>
+                      </a:r>
+                      <a:endParaRPr lang="en-US" sz="1800" dirty="0"/>
+                    </a:p>
+                  </a:txBody>
+                  <a:tcPr/>
+                </a:tc>
+                <a:tc>
+                  <a:txBody>
+                    <a:bodyPr/>
+                    <a:lstStyle/>
+                    <a:p>
+                      <a:pPr algn="r"/>
+                      <a:r>
+                        <a:rPr lang="en-US" sz="1800" dirty="0" smtClean="0"/>
+                        <a:t>-9223372036854775808</a:t>
+                      </a:r>
+                      <a:endParaRPr lang="en-US" sz="1800" dirty="0"/>
+                    </a:p>
+                  </a:txBody>
+                  <a:tcPr/>
+                </a:tc>
+              </a:tr>
+              <a:tr h="370840">
+                <a:tc>
+                  <a:txBody>
+                    <a:bodyPr/>
+                    <a:lstStyle/>
+                    <a:p>
+                      <a:r>
+                        <a:rPr lang="en-US" sz="1800" dirty="0" smtClean="0"/>
+                        <a:t>max()</a:t>
+                      </a:r>
+                      <a:endParaRPr lang="en-US" sz="1800" dirty="0"/>
+                    </a:p>
+                  </a:txBody>
+                  <a:tcPr/>
+                </a:tc>
+                <a:tc>
+                  <a:txBody>
+                    <a:bodyPr/>
+                    <a:lstStyle/>
+                    <a:p>
+                      <a:pPr algn="r"/>
+                      <a:r>
+                        <a:rPr lang="en-US" sz="1800" dirty="0" smtClean="0"/>
+                        <a:t>255</a:t>
+                      </a:r>
+                      <a:endParaRPr lang="en-US" sz="1800" dirty="0"/>
+                    </a:p>
+                  </a:txBody>
+                  <a:tcPr/>
+                </a:tc>
+                <a:tc>
+                  <a:txBody>
+                    <a:bodyPr/>
+                    <a:lstStyle/>
+                    <a:p>
+                      <a:pPr algn="r"/>
+                      <a:r>
+                        <a:rPr lang="en-US" sz="1800" dirty="0" smtClean="0"/>
+                        <a:t>32767</a:t>
+                      </a:r>
+                      <a:endParaRPr lang="en-US" sz="1800" dirty="0"/>
+                    </a:p>
+                  </a:txBody>
+                  <a:tcPr/>
+                </a:tc>
+                <a:tc>
+                  <a:txBody>
+                    <a:bodyPr/>
+                    <a:lstStyle/>
+                    <a:p>
+                      <a:pPr algn="r"/>
+                      <a:r>
+                        <a:rPr lang="en-US" sz="1800" dirty="0" smtClean="0"/>
+                        <a:t>2147483647</a:t>
+                      </a:r>
+                      <a:endParaRPr lang="en-US" sz="1800" dirty="0"/>
+                    </a:p>
+                  </a:txBody>
+                  <a:tcPr/>
+                </a:tc>
+                <a:tc>
+                  <a:txBody>
+                    <a:bodyPr/>
+                    <a:lstStyle/>
+                    <a:p>
+                      <a:pPr algn="r"/>
+                      <a:r>
+                        <a:rPr lang="en-US" sz="1800" dirty="0" smtClean="0"/>
+                        <a:t>9223372036854775807</a:t>
+                      </a:r>
+                      <a:endParaRPr lang="en-US" sz="1800" dirty="0"/>
+                    </a:p>
+                  </a:txBody>
+                  <a:tcPr/>
+                </a:tc>
+              </a:tr>
+            </a:tbl>
+          </a:graphicData>
+        </a:graphic>
+      </p:graphicFrame>
+      <p:sp>
+        <p:nvSpPr>
+          <p:cNvPr id="4" name="Slide Number Placeholder 3"/>
+          <p:cNvSpPr>
+            <a:spLocks noGrp="1"/>
+          </p:cNvSpPr>
+          <p:nvPr>
+            <p:ph type="sldNum" sz="quarter" idx="12"/>
+          </p:nvPr>
+        </p:nvSpPr>
+        <p:spPr/>
+        <p:txBody>
+          <a:bodyPr/>
+          <a:lstStyle/>
+          <a:p>
+            <a:fld id="{9CEF4966-5219-4577-B301-14467D565841}" type="slidenum">
+              <a:rPr lang="en-US" smtClean="0"/>
+              <a:t>5</a:t>
+            </a:fld>
+            <a:endParaRPr lang="en-US"/>
+          </a:p>
+        </p:txBody>
+      </p:sp>
+      <p:grpSp>
+        <p:nvGrpSpPr>
+          <p:cNvPr id="40" name="Group 39"/>
+          <p:cNvGrpSpPr/>
+          <p:nvPr/>
+        </p:nvGrpSpPr>
+        <p:grpSpPr>
+          <a:xfrm>
+            <a:off x="3374848" y="965343"/>
+            <a:ext cx="5072742" cy="819187"/>
+            <a:chOff x="3374848" y="965343"/>
+            <a:chExt cx="5072742" cy="819187"/>
+          </a:xfrm>
+        </p:grpSpPr>
+        <p:grpSp>
+          <p:nvGrpSpPr>
+            <p:cNvPr id="6" name="Group 5"/>
+            <p:cNvGrpSpPr/>
+            <p:nvPr/>
+          </p:nvGrpSpPr>
+          <p:grpSpPr>
+            <a:xfrm>
+              <a:off x="4868927" y="965343"/>
+              <a:ext cx="1870949" cy="819187"/>
+              <a:chOff x="5512408" y="85367"/>
+              <a:chExt cx="1870949" cy="819187"/>
+            </a:xfrm>
+          </p:grpSpPr>
+          <p:sp>
+            <p:nvSpPr>
+              <p:cNvPr id="7" name="TextBox 6"/>
+              <p:cNvSpPr txBox="1"/>
+              <p:nvPr/>
+            </p:nvSpPr>
+            <p:spPr>
+              <a:xfrm>
+                <a:off x="6078192" y="85367"/>
+                <a:ext cx="1305165" cy="369332"/>
+              </a:xfrm>
+              <a:prstGeom prst="rect">
+                <a:avLst/>
+              </a:prstGeom>
+              <a:solidFill>
+                <a:schemeClr val="bg1"/>
+              </a:solidFill>
+              <a:ln>
+                <a:solidFill>
+                  <a:schemeClr val="tx1"/>
+                </a:solidFill>
+              </a:ln>
+            </p:spPr>
+            <p:txBody>
+              <a:bodyPr wrap="none" rtlCol="0">
+                <a:spAutoFit/>
+              </a:bodyPr>
+              <a:lstStyle/>
+              <a:p>
+                <a:r>
+                  <a:rPr lang="en-US" dirty="0" smtClean="0"/>
+                  <a:t>usually </a:t>
+                </a:r>
+                <a:r>
+                  <a:rPr lang="en-US" dirty="0" err="1" smtClean="0">
+                    <a:latin typeface="Courier New" panose="02070309020205020404" pitchFamily="49" charset="0"/>
+                    <a:cs typeface="Courier New" panose="02070309020205020404" pitchFamily="49" charset="0"/>
+                  </a:rPr>
+                  <a:t>int</a:t>
+                </a:r>
+                <a:endParaRPr lang="en-US" dirty="0">
+                  <a:latin typeface="Courier New" panose="02070309020205020404" pitchFamily="49" charset="0"/>
+                  <a:cs typeface="Courier New" panose="02070309020205020404" pitchFamily="49" charset="0"/>
+                </a:endParaRPr>
+              </a:p>
+            </p:txBody>
+          </p:sp>
+          <p:cxnSp>
+            <p:nvCxnSpPr>
+              <p:cNvPr id="8" name="Straight Arrow Connector 7"/>
+              <p:cNvCxnSpPr>
+                <a:stCxn id="7" idx="2"/>
+              </p:cNvCxnSpPr>
+              <p:nvPr/>
+            </p:nvCxnSpPr>
+            <p:spPr>
+              <a:xfrm flipH="1">
+                <a:off x="5512408" y="454699"/>
+                <a:ext cx="1218367" cy="449855"/>
+              </a:xfrm>
+              <a:prstGeom prst="straightConnector1">
+                <a:avLst/>
+              </a:prstGeom>
+              <a:ln>
+                <a:solidFill>
+                  <a:schemeClr val="tx1"/>
+                </a:solidFill>
+                <a:tailEnd type="stealth" w="lg" len="lg"/>
+              </a:ln>
+            </p:spPr>
+            <p:style>
+              <a:lnRef idx="1">
+                <a:schemeClr val="accent1"/>
+              </a:lnRef>
+              <a:fillRef idx="0">
+                <a:schemeClr val="accent1"/>
+              </a:fillRef>
+              <a:effectRef idx="0">
+                <a:schemeClr val="accent1"/>
+              </a:effectRef>
+              <a:fontRef idx="minor">
+                <a:schemeClr val="tx1"/>
+              </a:fontRef>
+            </p:style>
+          </p:cxnSp>
+        </p:grpSp>
+        <p:grpSp>
+          <p:nvGrpSpPr>
+            <p:cNvPr id="12" name="Group 11"/>
+            <p:cNvGrpSpPr/>
+            <p:nvPr/>
+          </p:nvGrpSpPr>
+          <p:grpSpPr>
+            <a:xfrm>
+              <a:off x="6807635" y="965343"/>
+              <a:ext cx="1639955" cy="819187"/>
+              <a:chOff x="5881261" y="85367"/>
+              <a:chExt cx="1639955" cy="819187"/>
+            </a:xfrm>
+          </p:grpSpPr>
+          <p:sp>
+            <p:nvSpPr>
+              <p:cNvPr id="13" name="TextBox 12"/>
+              <p:cNvSpPr txBox="1"/>
+              <p:nvPr/>
+            </p:nvSpPr>
+            <p:spPr>
+              <a:xfrm>
+                <a:off x="6078192" y="85367"/>
+                <a:ext cx="1443024" cy="369332"/>
+              </a:xfrm>
+              <a:prstGeom prst="rect">
+                <a:avLst/>
+              </a:prstGeom>
+              <a:solidFill>
+                <a:schemeClr val="bg1"/>
+              </a:solidFill>
+              <a:ln>
+                <a:solidFill>
+                  <a:schemeClr val="tx1"/>
+                </a:solidFill>
+              </a:ln>
+            </p:spPr>
+            <p:txBody>
+              <a:bodyPr wrap="none" rtlCol="0">
+                <a:spAutoFit/>
+              </a:bodyPr>
+              <a:lstStyle/>
+              <a:p>
+                <a:r>
+                  <a:rPr lang="en-US" dirty="0" smtClean="0"/>
+                  <a:t>usually </a:t>
+                </a:r>
+                <a:r>
+                  <a:rPr lang="en-US" dirty="0" smtClean="0">
+                    <a:latin typeface="Courier New" panose="02070309020205020404" pitchFamily="49" charset="0"/>
+                    <a:cs typeface="Courier New" panose="02070309020205020404" pitchFamily="49" charset="0"/>
+                  </a:rPr>
+                  <a:t>long</a:t>
+                </a:r>
+                <a:endParaRPr lang="en-US" dirty="0">
+                  <a:latin typeface="Courier New" panose="02070309020205020404" pitchFamily="49" charset="0"/>
+                  <a:cs typeface="Courier New" panose="02070309020205020404" pitchFamily="49" charset="0"/>
+                </a:endParaRPr>
+              </a:p>
+            </p:txBody>
+          </p:sp>
+          <p:cxnSp>
+            <p:nvCxnSpPr>
+              <p:cNvPr id="14" name="Straight Arrow Connector 13"/>
+              <p:cNvCxnSpPr>
+                <a:stCxn id="13" idx="2"/>
+              </p:cNvCxnSpPr>
+              <p:nvPr/>
+            </p:nvCxnSpPr>
+            <p:spPr>
+              <a:xfrm flipH="1">
+                <a:off x="5881261" y="454699"/>
+                <a:ext cx="918443" cy="449855"/>
+              </a:xfrm>
+              <a:prstGeom prst="straightConnector1">
+                <a:avLst/>
+              </a:prstGeom>
+              <a:ln>
+                <a:solidFill>
+                  <a:schemeClr val="tx1"/>
+                </a:solidFill>
+                <a:tailEnd type="stealth" w="lg" len="lg"/>
+              </a:ln>
+            </p:spPr>
+            <p:style>
+              <a:lnRef idx="1">
+                <a:schemeClr val="accent1"/>
+              </a:lnRef>
+              <a:fillRef idx="0">
+                <a:schemeClr val="accent1"/>
+              </a:fillRef>
+              <a:effectRef idx="0">
+                <a:schemeClr val="accent1"/>
+              </a:effectRef>
+              <a:fontRef idx="minor">
+                <a:schemeClr val="tx1"/>
+              </a:fontRef>
+            </p:style>
+          </p:cxnSp>
+        </p:grpSp>
+        <p:grpSp>
+          <p:nvGrpSpPr>
+            <p:cNvPr id="15" name="Group 14"/>
+            <p:cNvGrpSpPr/>
+            <p:nvPr/>
+          </p:nvGrpSpPr>
+          <p:grpSpPr>
+            <a:xfrm>
+              <a:off x="3374848" y="965343"/>
+              <a:ext cx="1777814" cy="819187"/>
+              <a:chOff x="5881260" y="85367"/>
+              <a:chExt cx="1777814" cy="819187"/>
+            </a:xfrm>
+          </p:grpSpPr>
+          <p:sp>
+            <p:nvSpPr>
+              <p:cNvPr id="16" name="TextBox 15"/>
+              <p:cNvSpPr txBox="1"/>
+              <p:nvPr/>
+            </p:nvSpPr>
+            <p:spPr>
+              <a:xfrm>
+                <a:off x="6078192" y="85367"/>
+                <a:ext cx="1580882" cy="369332"/>
+              </a:xfrm>
+              <a:prstGeom prst="rect">
+                <a:avLst/>
+              </a:prstGeom>
+              <a:solidFill>
+                <a:schemeClr val="bg1"/>
+              </a:solidFill>
+              <a:ln>
+                <a:solidFill>
+                  <a:schemeClr val="tx1"/>
+                </a:solidFill>
+              </a:ln>
+            </p:spPr>
+            <p:txBody>
+              <a:bodyPr wrap="none" rtlCol="0">
+                <a:spAutoFit/>
+              </a:bodyPr>
+              <a:lstStyle/>
+              <a:p>
+                <a:r>
+                  <a:rPr lang="en-US" dirty="0" smtClean="0"/>
+                  <a:t>usually </a:t>
+                </a:r>
+                <a:r>
+                  <a:rPr lang="en-US" dirty="0" smtClean="0">
+                    <a:latin typeface="Courier New" panose="02070309020205020404" pitchFamily="49" charset="0"/>
+                    <a:cs typeface="Courier New" panose="02070309020205020404" pitchFamily="49" charset="0"/>
+                  </a:rPr>
+                  <a:t>short</a:t>
+                </a:r>
+                <a:endParaRPr lang="en-US" dirty="0">
+                  <a:latin typeface="Courier New" panose="02070309020205020404" pitchFamily="49" charset="0"/>
+                  <a:cs typeface="Courier New" panose="02070309020205020404" pitchFamily="49" charset="0"/>
+                </a:endParaRPr>
+              </a:p>
+            </p:txBody>
+          </p:sp>
+          <p:cxnSp>
+            <p:nvCxnSpPr>
+              <p:cNvPr id="17" name="Straight Arrow Connector 16"/>
+              <p:cNvCxnSpPr>
+                <a:stCxn id="16" idx="2"/>
+              </p:cNvCxnSpPr>
+              <p:nvPr/>
+            </p:nvCxnSpPr>
+            <p:spPr>
+              <a:xfrm flipH="1">
+                <a:off x="5881260" y="454699"/>
+                <a:ext cx="987373" cy="449855"/>
+              </a:xfrm>
+              <a:prstGeom prst="straightConnector1">
+                <a:avLst/>
+              </a:prstGeom>
+              <a:ln>
+                <a:solidFill>
+                  <a:schemeClr val="tx1"/>
+                </a:solidFill>
+                <a:tailEnd type="stealth" w="lg" len="lg"/>
+              </a:ln>
+            </p:spPr>
+            <p:style>
+              <a:lnRef idx="1">
+                <a:schemeClr val="accent1"/>
+              </a:lnRef>
+              <a:fillRef idx="0">
+                <a:schemeClr val="accent1"/>
+              </a:fillRef>
+              <a:effectRef idx="0">
+                <a:schemeClr val="accent1"/>
+              </a:effectRef>
+              <a:fontRef idx="minor">
+                <a:schemeClr val="tx1"/>
+              </a:fontRef>
+            </p:style>
+          </p:cxnSp>
+        </p:grpSp>
+      </p:grpSp>
+      <p:sp>
+        <p:nvSpPr>
+          <p:cNvPr id="19" name="TextBox 18"/>
+          <p:cNvSpPr txBox="1"/>
+          <p:nvPr/>
+        </p:nvSpPr>
+        <p:spPr>
+          <a:xfrm>
+            <a:off x="5308141" y="2888415"/>
+            <a:ext cx="623889" cy="369332"/>
+          </a:xfrm>
+          <a:prstGeom prst="rect">
+            <a:avLst/>
+          </a:prstGeom>
+          <a:solidFill>
+            <a:schemeClr val="bg1"/>
+          </a:solidFill>
+          <a:ln>
+            <a:solidFill>
+              <a:schemeClr val="tx1"/>
+            </a:solidFill>
+          </a:ln>
+        </p:spPr>
+        <p:txBody>
+          <a:bodyPr wrap="none" rtlCol="0">
+            <a:spAutoFit/>
+          </a:bodyPr>
+          <a:lstStyle/>
+          <a:p>
+            <a:r>
+              <a:rPr lang="en-US" dirty="0" smtClean="0">
+                <a:sym typeface="Symbol" panose="05050102010706020507" pitchFamily="18" charset="2"/>
+              </a:rPr>
+              <a:t></a:t>
+            </a:r>
+            <a:r>
+              <a:rPr lang="en-US" dirty="0" smtClean="0"/>
+              <a:t>10</a:t>
+            </a:r>
+            <a:r>
+              <a:rPr lang="en-US" baseline="30000" dirty="0" smtClean="0"/>
+              <a:t>9</a:t>
+            </a:r>
+            <a:endParaRPr lang="en-US" baseline="30000" dirty="0"/>
+          </a:p>
+        </p:txBody>
+      </p:sp>
+      <p:sp>
+        <p:nvSpPr>
+          <p:cNvPr id="20" name="TextBox 19"/>
+          <p:cNvSpPr txBox="1"/>
+          <p:nvPr/>
+        </p:nvSpPr>
+        <p:spPr>
+          <a:xfrm>
+            <a:off x="8210550" y="2888415"/>
+            <a:ext cx="755335" cy="369332"/>
+          </a:xfrm>
+          <a:prstGeom prst="rect">
+            <a:avLst/>
+          </a:prstGeom>
+          <a:solidFill>
+            <a:schemeClr val="bg1"/>
+          </a:solidFill>
+          <a:ln>
+            <a:solidFill>
+              <a:schemeClr val="tx1"/>
+            </a:solidFill>
+          </a:ln>
+        </p:spPr>
+        <p:txBody>
+          <a:bodyPr wrap="none" rtlCol="0">
+            <a:spAutoFit/>
+          </a:bodyPr>
+          <a:lstStyle/>
+          <a:p>
+            <a:r>
+              <a:rPr lang="en-US" dirty="0">
+                <a:sym typeface="Symbol" panose="05050102010706020507" pitchFamily="18" charset="2"/>
+              </a:rPr>
+              <a:t> </a:t>
+            </a:r>
+            <a:r>
+              <a:rPr lang="en-US" dirty="0" smtClean="0"/>
+              <a:t>10</a:t>
+            </a:r>
+            <a:r>
+              <a:rPr lang="en-US" baseline="30000" dirty="0" smtClean="0"/>
+              <a:t>19</a:t>
+            </a:r>
+            <a:endParaRPr lang="en-US" baseline="30000" dirty="0"/>
+          </a:p>
+        </p:txBody>
+      </p:sp>
+      <p:graphicFrame>
+        <p:nvGraphicFramePr>
+          <p:cNvPr id="21" name="Table 20"/>
+          <p:cNvGraphicFramePr>
+            <a:graphicFrameLocks noGrp="1"/>
+          </p:cNvGraphicFramePr>
+          <p:nvPr>
+            <p:extLst>
+              <p:ext uri="{D42A27DB-BD31-4B8C-83A1-F6EECF244321}">
+                <p14:modId xmlns:p14="http://schemas.microsoft.com/office/powerpoint/2010/main" val="1307075112"/>
+              </p:ext>
+            </p:extLst>
+          </p:nvPr>
+        </p:nvGraphicFramePr>
+        <p:xfrm>
+          <a:off x="711635" y="3639364"/>
+          <a:ext cx="6096000" cy="1854200"/>
+        </p:xfrm>
+        <a:graphic>
+          <a:graphicData uri="http://schemas.openxmlformats.org/drawingml/2006/table">
+            <a:tbl>
+              <a:tblPr firstRow="1" bandRow="1">
+                <a:tableStyleId>{5C22544A-7EE6-4342-B048-85BDC9FD1C3A}</a:tableStyleId>
+              </a:tblPr>
+              <a:tblGrid>
+                <a:gridCol w="1524000"/>
+                <a:gridCol w="1524000"/>
+                <a:gridCol w="1524000"/>
+                <a:gridCol w="1524000"/>
+              </a:tblGrid>
+              <a:tr h="370840">
+                <a:tc>
+                  <a:txBody>
+                    <a:bodyPr/>
+                    <a:lstStyle/>
+                    <a:p>
+                      <a:endParaRPr lang="en-US" dirty="0"/>
+                    </a:p>
+                  </a:txBody>
+                  <a:tcPr/>
+                </a:tc>
+                <a:tc>
+                  <a:txBody>
+                    <a:bodyPr/>
+                    <a:lstStyle/>
+                    <a:p>
+                      <a:r>
+                        <a:rPr lang="en-US" dirty="0" smtClean="0"/>
+                        <a:t>float</a:t>
+                      </a:r>
+                      <a:endParaRPr lang="en-US" dirty="0"/>
+                    </a:p>
+                  </a:txBody>
+                  <a:tcPr/>
+                </a:tc>
+                <a:tc>
+                  <a:txBody>
+                    <a:bodyPr/>
+                    <a:lstStyle/>
+                    <a:p>
+                      <a:r>
+                        <a:rPr lang="en-US" dirty="0" smtClean="0"/>
+                        <a:t>double</a:t>
+                      </a:r>
+                      <a:endParaRPr lang="en-US" dirty="0"/>
+                    </a:p>
+                  </a:txBody>
+                  <a:tcPr/>
+                </a:tc>
+                <a:tc>
+                  <a:txBody>
+                    <a:bodyPr/>
+                    <a:lstStyle/>
+                    <a:p>
+                      <a:r>
+                        <a:rPr lang="en-US" dirty="0" smtClean="0"/>
+                        <a:t>long double</a:t>
+                      </a:r>
+                      <a:endParaRPr lang="en-US" dirty="0"/>
+                    </a:p>
+                  </a:txBody>
+                  <a:tcPr/>
+                </a:tc>
+              </a:tr>
+              <a:tr h="370840">
+                <a:tc>
+                  <a:txBody>
+                    <a:bodyPr/>
+                    <a:lstStyle/>
+                    <a:p>
+                      <a:r>
+                        <a:rPr lang="en-US" dirty="0" smtClean="0"/>
+                        <a:t>digits10</a:t>
+                      </a:r>
+                      <a:endParaRPr lang="en-US" dirty="0"/>
+                    </a:p>
+                  </a:txBody>
+                  <a:tcPr/>
+                </a:tc>
+                <a:tc>
+                  <a:txBody>
+                    <a:bodyPr/>
+                    <a:lstStyle/>
+                    <a:p>
+                      <a:r>
+                        <a:rPr lang="en-US" dirty="0" smtClean="0"/>
+                        <a:t>6</a:t>
+                      </a:r>
+                      <a:endParaRPr lang="en-US" dirty="0"/>
+                    </a:p>
+                  </a:txBody>
+                  <a:tcPr/>
+                </a:tc>
+                <a:tc>
+                  <a:txBody>
+                    <a:bodyPr/>
+                    <a:lstStyle/>
+                    <a:p>
+                      <a:r>
+                        <a:rPr lang="en-US" dirty="0" smtClean="0"/>
+                        <a:t>15</a:t>
+                      </a:r>
+                      <a:endParaRPr lang="en-US" dirty="0"/>
+                    </a:p>
+                  </a:txBody>
+                  <a:tcPr/>
+                </a:tc>
+                <a:tc>
+                  <a:txBody>
+                    <a:bodyPr/>
+                    <a:lstStyle/>
+                    <a:p>
+                      <a:r>
+                        <a:rPr lang="en-US" dirty="0" smtClean="0"/>
+                        <a:t>18</a:t>
+                      </a:r>
+                      <a:endParaRPr lang="en-US" dirty="0"/>
+                    </a:p>
+                  </a:txBody>
+                  <a:tcPr/>
+                </a:tc>
+              </a:tr>
+              <a:tr h="370840">
+                <a:tc>
+                  <a:txBody>
+                    <a:bodyPr/>
+                    <a:lstStyle/>
+                    <a:p>
+                      <a:r>
+                        <a:rPr lang="en-US" dirty="0" smtClean="0"/>
+                        <a:t>min()</a:t>
+                      </a:r>
+                      <a:endParaRPr lang="en-US" dirty="0"/>
+                    </a:p>
+                  </a:txBody>
+                  <a:tcPr/>
+                </a:tc>
+                <a:tc>
+                  <a:txBody>
+                    <a:bodyPr/>
+                    <a:lstStyle/>
+                    <a:p>
+                      <a:r>
+                        <a:rPr lang="en-US" dirty="0" smtClean="0"/>
+                        <a:t>1.176e-38</a:t>
+                      </a:r>
+                      <a:endParaRPr lang="en-US" dirty="0"/>
+                    </a:p>
+                  </a:txBody>
+                  <a:tcPr/>
+                </a:tc>
+                <a:tc>
+                  <a:txBody>
+                    <a:bodyPr/>
+                    <a:lstStyle/>
+                    <a:p>
+                      <a:pPr marL="0" marR="0" lvl="0" indent="0" algn="l" defTabSz="914400" rtl="0" eaLnBrk="1" fontAlgn="auto" latinLnBrk="0" hangingPunct="1">
+                        <a:lnSpc>
+                          <a:spcPct val="100000"/>
+                        </a:lnSpc>
+                        <a:spcBef>
+                          <a:spcPts val="0"/>
+                        </a:spcBef>
+                        <a:spcAft>
+                          <a:spcPts val="0"/>
+                        </a:spcAft>
+                        <a:buClrTx/>
+                        <a:buSzTx/>
+                        <a:buFontTx/>
+                        <a:buNone/>
+                        <a:tabLst/>
+                        <a:defRPr/>
+                      </a:pPr>
+                      <a:r>
+                        <a:rPr lang="en-US" dirty="0" smtClean="0"/>
+                        <a:t>2.225e-308</a:t>
+                      </a:r>
+                    </a:p>
+                  </a:txBody>
+                  <a:tcPr/>
+                </a:tc>
+                <a:tc>
+                  <a:txBody>
+                    <a:bodyPr/>
+                    <a:lstStyle/>
+                    <a:p>
+                      <a:r>
+                        <a:rPr lang="en-US" dirty="0" smtClean="0"/>
+                        <a:t>1.190e+4932</a:t>
+                      </a:r>
+                      <a:endParaRPr lang="en-US" dirty="0"/>
+                    </a:p>
+                  </a:txBody>
+                  <a:tcPr/>
+                </a:tc>
+              </a:tr>
+              <a:tr h="370840">
+                <a:tc>
+                  <a:txBody>
+                    <a:bodyPr/>
+                    <a:lstStyle/>
+                    <a:p>
+                      <a:r>
+                        <a:rPr lang="en-US" dirty="0" smtClean="0"/>
+                        <a:t>epsilon()</a:t>
+                      </a:r>
+                      <a:endParaRPr lang="en-US" dirty="0"/>
+                    </a:p>
+                  </a:txBody>
+                  <a:tcPr/>
+                </a:tc>
+                <a:tc>
+                  <a:txBody>
+                    <a:bodyPr/>
+                    <a:lstStyle/>
+                    <a:p>
+                      <a:r>
+                        <a:rPr lang="en-US" dirty="0" smtClean="0"/>
+                        <a:t>1.192e-07</a:t>
+                      </a:r>
+                      <a:endParaRPr lang="en-US" dirty="0"/>
+                    </a:p>
+                  </a:txBody>
+                  <a:tcPr/>
+                </a:tc>
+                <a:tc>
+                  <a:txBody>
+                    <a:bodyPr/>
+                    <a:lstStyle/>
+                    <a:p>
+                      <a:r>
+                        <a:rPr lang="en-US" dirty="0" smtClean="0"/>
+                        <a:t>2.221e-16</a:t>
+                      </a:r>
+                      <a:endParaRPr lang="en-US" dirty="0"/>
+                    </a:p>
+                  </a:txBody>
+                  <a:tcPr/>
+                </a:tc>
+                <a:tc>
+                  <a:txBody>
+                    <a:bodyPr/>
+                    <a:lstStyle/>
+                    <a:p>
+                      <a:r>
+                        <a:rPr lang="en-US" dirty="0" smtClean="0"/>
+                        <a:t>1.084e-19</a:t>
+                      </a:r>
+                      <a:endParaRPr lang="en-US" dirty="0"/>
+                    </a:p>
+                  </a:txBody>
+                  <a:tcPr/>
+                </a:tc>
+              </a:tr>
+              <a:tr h="370840">
+                <a:tc>
+                  <a:txBody>
+                    <a:bodyPr/>
+                    <a:lstStyle/>
+                    <a:p>
+                      <a:r>
+                        <a:rPr lang="en-US" dirty="0" smtClean="0"/>
+                        <a:t>max()</a:t>
+                      </a:r>
+                      <a:endParaRPr lang="en-US" dirty="0"/>
+                    </a:p>
+                  </a:txBody>
+                  <a:tcPr/>
+                </a:tc>
+                <a:tc>
+                  <a:txBody>
+                    <a:bodyPr/>
+                    <a:lstStyle/>
+                    <a:p>
+                      <a:r>
+                        <a:rPr lang="en-US" dirty="0" smtClean="0"/>
+                        <a:t>3.403e+38</a:t>
+                      </a:r>
+                      <a:endParaRPr lang="en-US" dirty="0"/>
+                    </a:p>
+                  </a:txBody>
+                  <a:tcPr/>
+                </a:tc>
+                <a:tc>
+                  <a:txBody>
+                    <a:bodyPr/>
+                    <a:lstStyle/>
+                    <a:p>
+                      <a:r>
+                        <a:rPr lang="en-US" dirty="0" smtClean="0"/>
+                        <a:t>1.798e+308</a:t>
+                      </a:r>
+                      <a:endParaRPr lang="en-US" dirty="0"/>
+                    </a:p>
+                  </a:txBody>
+                  <a:tcPr/>
+                </a:tc>
+                <a:tc>
+                  <a:txBody>
+                    <a:bodyPr/>
+                    <a:lstStyle/>
+                    <a:p>
+                      <a:r>
+                        <a:rPr lang="en-US" dirty="0" smtClean="0"/>
+                        <a:t>3.362e-4932</a:t>
+                      </a:r>
+                      <a:endParaRPr lang="en-US" dirty="0"/>
+                    </a:p>
+                  </a:txBody>
+                  <a:tcPr/>
+                </a:tc>
+              </a:tr>
+            </a:tbl>
+          </a:graphicData>
+        </a:graphic>
+      </p:graphicFrame>
+      <p:grpSp>
+        <p:nvGrpSpPr>
+          <p:cNvPr id="39" name="Group 38"/>
+          <p:cNvGrpSpPr/>
+          <p:nvPr/>
+        </p:nvGrpSpPr>
+        <p:grpSpPr>
+          <a:xfrm>
+            <a:off x="1413600" y="5505743"/>
+            <a:ext cx="4102044" cy="734676"/>
+            <a:chOff x="1413600" y="5505743"/>
+            <a:chExt cx="4102044" cy="734676"/>
+          </a:xfrm>
+        </p:grpSpPr>
+        <p:grpSp>
+          <p:nvGrpSpPr>
+            <p:cNvPr id="22" name="Group 21"/>
+            <p:cNvGrpSpPr/>
+            <p:nvPr/>
+          </p:nvGrpSpPr>
+          <p:grpSpPr>
+            <a:xfrm>
+              <a:off x="1413600" y="5505743"/>
+              <a:ext cx="965806" cy="730477"/>
+              <a:chOff x="6343663" y="-128616"/>
+              <a:chExt cx="965806" cy="730477"/>
+            </a:xfrm>
+          </p:grpSpPr>
+          <p:sp>
+            <p:nvSpPr>
+              <p:cNvPr id="23" name="TextBox 22"/>
+              <p:cNvSpPr txBox="1"/>
+              <p:nvPr/>
+            </p:nvSpPr>
+            <p:spPr>
+              <a:xfrm>
+                <a:off x="6343663" y="232529"/>
+                <a:ext cx="740908" cy="369332"/>
+              </a:xfrm>
+              <a:prstGeom prst="rect">
+                <a:avLst/>
+              </a:prstGeom>
+              <a:solidFill>
+                <a:schemeClr val="bg1"/>
+              </a:solidFill>
+              <a:ln>
+                <a:solidFill>
+                  <a:schemeClr val="tx1"/>
+                </a:solidFill>
+              </a:ln>
+            </p:spPr>
+            <p:txBody>
+              <a:bodyPr wrap="none" rtlCol="0">
+                <a:spAutoFit/>
+              </a:bodyPr>
+              <a:lstStyle/>
+              <a:p>
+                <a:r>
+                  <a:rPr lang="en-US" dirty="0" smtClean="0"/>
+                  <a:t>32-bit</a:t>
+                </a:r>
+                <a:endParaRPr lang="en-US" dirty="0">
+                  <a:latin typeface="Courier New" panose="02070309020205020404" pitchFamily="49" charset="0"/>
+                  <a:cs typeface="Courier New" panose="02070309020205020404" pitchFamily="49" charset="0"/>
+                </a:endParaRPr>
+              </a:p>
+            </p:txBody>
+          </p:sp>
+          <p:cxnSp>
+            <p:nvCxnSpPr>
+              <p:cNvPr id="24" name="Straight Arrow Connector 23"/>
+              <p:cNvCxnSpPr>
+                <a:stCxn id="23" idx="0"/>
+              </p:cNvCxnSpPr>
+              <p:nvPr/>
+            </p:nvCxnSpPr>
+            <p:spPr>
+              <a:xfrm flipV="1">
+                <a:off x="6714117" y="-128616"/>
+                <a:ext cx="595352" cy="361145"/>
+              </a:xfrm>
+              <a:prstGeom prst="straightConnector1">
+                <a:avLst/>
+              </a:prstGeom>
+              <a:ln>
+                <a:solidFill>
+                  <a:schemeClr val="tx1"/>
+                </a:solidFill>
+                <a:tailEnd type="stealth" w="lg" len="lg"/>
+              </a:ln>
+            </p:spPr>
+            <p:style>
+              <a:lnRef idx="1">
+                <a:schemeClr val="accent1"/>
+              </a:lnRef>
+              <a:fillRef idx="0">
+                <a:schemeClr val="accent1"/>
+              </a:fillRef>
+              <a:effectRef idx="0">
+                <a:schemeClr val="accent1"/>
+              </a:effectRef>
+              <a:fontRef idx="minor">
+                <a:schemeClr val="tx1"/>
+              </a:fontRef>
+            </p:style>
+          </p:cxnSp>
+        </p:grpSp>
+        <p:grpSp>
+          <p:nvGrpSpPr>
+            <p:cNvPr id="28" name="Group 27"/>
+            <p:cNvGrpSpPr/>
+            <p:nvPr/>
+          </p:nvGrpSpPr>
+          <p:grpSpPr>
+            <a:xfrm>
+              <a:off x="2961720" y="5509943"/>
+              <a:ext cx="965806" cy="730476"/>
+              <a:chOff x="6343663" y="-128615"/>
+              <a:chExt cx="965806" cy="730476"/>
+            </a:xfrm>
+          </p:grpSpPr>
+          <p:sp>
+            <p:nvSpPr>
+              <p:cNvPr id="29" name="TextBox 28"/>
+              <p:cNvSpPr txBox="1"/>
+              <p:nvPr/>
+            </p:nvSpPr>
+            <p:spPr>
+              <a:xfrm>
+                <a:off x="6343663" y="232529"/>
+                <a:ext cx="740908" cy="369332"/>
+              </a:xfrm>
+              <a:prstGeom prst="rect">
+                <a:avLst/>
+              </a:prstGeom>
+              <a:solidFill>
+                <a:schemeClr val="bg1"/>
+              </a:solidFill>
+              <a:ln>
+                <a:solidFill>
+                  <a:schemeClr val="tx1"/>
+                </a:solidFill>
+              </a:ln>
+            </p:spPr>
+            <p:txBody>
+              <a:bodyPr wrap="none" rtlCol="0">
+                <a:spAutoFit/>
+              </a:bodyPr>
+              <a:lstStyle/>
+              <a:p>
+                <a:r>
+                  <a:rPr lang="en-US" dirty="0" smtClean="0"/>
+                  <a:t>64</a:t>
+                </a:r>
+                <a:r>
+                  <a:rPr lang="en-US" dirty="0" smtClean="0"/>
+                  <a:t>-bit</a:t>
+                </a:r>
+                <a:endParaRPr lang="en-US" dirty="0">
+                  <a:latin typeface="Courier New" panose="02070309020205020404" pitchFamily="49" charset="0"/>
+                  <a:cs typeface="Courier New" panose="02070309020205020404" pitchFamily="49" charset="0"/>
+                </a:endParaRPr>
+              </a:p>
+            </p:txBody>
+          </p:sp>
+          <p:cxnSp>
+            <p:nvCxnSpPr>
+              <p:cNvPr id="30" name="Straight Arrow Connector 29"/>
+              <p:cNvCxnSpPr>
+                <a:stCxn id="29" idx="0"/>
+              </p:cNvCxnSpPr>
+              <p:nvPr/>
+            </p:nvCxnSpPr>
+            <p:spPr>
+              <a:xfrm flipV="1">
+                <a:off x="6714117" y="-128615"/>
+                <a:ext cx="595352" cy="361144"/>
+              </a:xfrm>
+              <a:prstGeom prst="straightConnector1">
+                <a:avLst/>
+              </a:prstGeom>
+              <a:ln>
+                <a:solidFill>
+                  <a:schemeClr val="tx1"/>
+                </a:solidFill>
+                <a:tailEnd type="stealth" w="lg" len="lg"/>
+              </a:ln>
+            </p:spPr>
+            <p:style>
+              <a:lnRef idx="1">
+                <a:schemeClr val="accent1"/>
+              </a:lnRef>
+              <a:fillRef idx="0">
+                <a:schemeClr val="accent1"/>
+              </a:fillRef>
+              <a:effectRef idx="0">
+                <a:schemeClr val="accent1"/>
+              </a:effectRef>
+              <a:fontRef idx="minor">
+                <a:schemeClr val="tx1"/>
+              </a:fontRef>
+            </p:style>
+          </p:cxnSp>
+        </p:grpSp>
+        <p:grpSp>
+          <p:nvGrpSpPr>
+            <p:cNvPr id="31" name="Group 30"/>
+            <p:cNvGrpSpPr/>
+            <p:nvPr/>
+          </p:nvGrpSpPr>
+          <p:grpSpPr>
+            <a:xfrm>
+              <a:off x="4549838" y="5505743"/>
+              <a:ext cx="965806" cy="730476"/>
+              <a:chOff x="6343663" y="-128615"/>
+              <a:chExt cx="965806" cy="730476"/>
+            </a:xfrm>
+          </p:grpSpPr>
+          <p:sp>
+            <p:nvSpPr>
+              <p:cNvPr id="32" name="TextBox 31"/>
+              <p:cNvSpPr txBox="1"/>
+              <p:nvPr/>
+            </p:nvSpPr>
+            <p:spPr>
+              <a:xfrm>
+                <a:off x="6343663" y="232529"/>
+                <a:ext cx="740908" cy="369332"/>
+              </a:xfrm>
+              <a:prstGeom prst="rect">
+                <a:avLst/>
+              </a:prstGeom>
+              <a:solidFill>
+                <a:schemeClr val="bg1"/>
+              </a:solidFill>
+              <a:ln>
+                <a:solidFill>
+                  <a:schemeClr val="tx1"/>
+                </a:solidFill>
+              </a:ln>
+            </p:spPr>
+            <p:txBody>
+              <a:bodyPr wrap="none" rtlCol="0">
+                <a:spAutoFit/>
+              </a:bodyPr>
+              <a:lstStyle/>
+              <a:p>
+                <a:r>
+                  <a:rPr lang="en-US" dirty="0" smtClean="0"/>
+                  <a:t>96-bit</a:t>
+                </a:r>
+                <a:endParaRPr lang="en-US" dirty="0">
+                  <a:latin typeface="Courier New" panose="02070309020205020404" pitchFamily="49" charset="0"/>
+                  <a:cs typeface="Courier New" panose="02070309020205020404" pitchFamily="49" charset="0"/>
+                </a:endParaRPr>
+              </a:p>
+            </p:txBody>
+          </p:sp>
+          <p:cxnSp>
+            <p:nvCxnSpPr>
+              <p:cNvPr id="33" name="Straight Arrow Connector 32"/>
+              <p:cNvCxnSpPr>
+                <a:stCxn id="32" idx="0"/>
+              </p:cNvCxnSpPr>
+              <p:nvPr/>
+            </p:nvCxnSpPr>
+            <p:spPr>
+              <a:xfrm flipV="1">
+                <a:off x="6714117" y="-128615"/>
+                <a:ext cx="595352" cy="361144"/>
+              </a:xfrm>
+              <a:prstGeom prst="straightConnector1">
+                <a:avLst/>
+              </a:prstGeom>
+              <a:ln>
+                <a:solidFill>
+                  <a:schemeClr val="tx1"/>
+                </a:solidFill>
+                <a:tailEnd type="stealth" w="lg" len="lg"/>
+              </a:ln>
+            </p:spPr>
+            <p:style>
+              <a:lnRef idx="1">
+                <a:schemeClr val="accent1"/>
+              </a:lnRef>
+              <a:fillRef idx="0">
+                <a:schemeClr val="accent1"/>
+              </a:fillRef>
+              <a:effectRef idx="0">
+                <a:schemeClr val="accent1"/>
+              </a:effectRef>
+              <a:fontRef idx="minor">
+                <a:schemeClr val="tx1"/>
+              </a:fontRef>
+            </p:style>
+          </p:cxnSp>
+        </p:grpSp>
+      </p:grpSp>
+      <p:grpSp>
+        <p:nvGrpSpPr>
+          <p:cNvPr id="34" name="Group 33"/>
+          <p:cNvGrpSpPr/>
+          <p:nvPr/>
+        </p:nvGrpSpPr>
+        <p:grpSpPr>
+          <a:xfrm>
+            <a:off x="6558116" y="3991894"/>
+            <a:ext cx="2106346" cy="646331"/>
+            <a:chOff x="5699501" y="143567"/>
+            <a:chExt cx="2106346" cy="646331"/>
+          </a:xfrm>
+        </p:grpSpPr>
+        <p:sp>
+          <p:nvSpPr>
+            <p:cNvPr id="35" name="TextBox 34"/>
+            <p:cNvSpPr txBox="1"/>
+            <p:nvPr/>
+          </p:nvSpPr>
+          <p:spPr>
+            <a:xfrm>
+              <a:off x="6406168" y="143567"/>
+              <a:ext cx="1399679" cy="646331"/>
+            </a:xfrm>
+            <a:prstGeom prst="rect">
+              <a:avLst/>
+            </a:prstGeom>
+            <a:solidFill>
+              <a:schemeClr val="bg1"/>
+            </a:solidFill>
+            <a:ln>
+              <a:solidFill>
+                <a:srgbClr val="C00000"/>
+              </a:solidFill>
+            </a:ln>
+          </p:spPr>
+          <p:txBody>
+            <a:bodyPr wrap="none" rtlCol="0">
+              <a:spAutoFit/>
+            </a:bodyPr>
+            <a:lstStyle/>
+            <a:p>
+              <a:r>
+                <a:rPr lang="en-US" dirty="0" smtClean="0">
+                  <a:solidFill>
+                    <a:srgbClr val="C00000"/>
+                  </a:solidFill>
+                </a:rPr>
+                <a:t>performance</a:t>
+              </a:r>
+              <a:br>
+                <a:rPr lang="en-US" dirty="0" smtClean="0">
+                  <a:solidFill>
+                    <a:srgbClr val="C00000"/>
+                  </a:solidFill>
+                </a:rPr>
+              </a:br>
+              <a:r>
+                <a:rPr lang="en-US" dirty="0" smtClean="0">
+                  <a:solidFill>
+                    <a:srgbClr val="C00000"/>
+                  </a:solidFill>
+                </a:rPr>
+                <a:t>penalty!</a:t>
+              </a:r>
+              <a:endParaRPr lang="en-US" dirty="0">
+                <a:solidFill>
+                  <a:srgbClr val="C00000"/>
+                </a:solidFill>
+                <a:latin typeface="Courier New" panose="02070309020205020404" pitchFamily="49" charset="0"/>
+                <a:cs typeface="Courier New" panose="02070309020205020404" pitchFamily="49" charset="0"/>
+              </a:endParaRPr>
+            </a:p>
+          </p:txBody>
+        </p:sp>
+        <p:cxnSp>
+          <p:nvCxnSpPr>
+            <p:cNvPr id="36" name="Straight Arrow Connector 35"/>
+            <p:cNvCxnSpPr>
+              <a:stCxn id="35" idx="1"/>
+            </p:cNvCxnSpPr>
+            <p:nvPr/>
+          </p:nvCxnSpPr>
+          <p:spPr>
+            <a:xfrm flipH="1" flipV="1">
+              <a:off x="5699501" y="143567"/>
+              <a:ext cx="706667" cy="323166"/>
+            </a:xfrm>
+            <a:prstGeom prst="straightConnector1">
+              <a:avLst/>
+            </a:prstGeom>
+            <a:ln>
+              <a:solidFill>
+                <a:srgbClr val="C00000"/>
+              </a:solidFill>
+              <a:tailEnd type="stealth" w="lg" len="lg"/>
+            </a:ln>
+          </p:spPr>
+          <p:style>
+            <a:lnRef idx="1">
+              <a:schemeClr val="accent1"/>
+            </a:lnRef>
+            <a:fillRef idx="0">
+              <a:schemeClr val="accent1"/>
+            </a:fillRef>
+            <a:effectRef idx="0">
+              <a:schemeClr val="accent1"/>
+            </a:effectRef>
+            <a:fontRef idx="minor">
+              <a:schemeClr val="tx1"/>
+            </a:fontRef>
+          </p:style>
+        </p:cxnSp>
+      </p:grpSp>
+    </p:spTree>
+    <p:extLst>
+      <p:ext uri="{BB962C8B-B14F-4D97-AF65-F5344CB8AC3E}">
+        <p14:creationId xmlns:p14="http://schemas.microsoft.com/office/powerpoint/2010/main" val="37218216"/>
+      </p:ext>
+    </p:extLst>
+  </p:cSld>
+  <p:clrMapOvr>
+    <a:masterClrMapping/>
+  </p:clrMapOvr>
+  <p:timing>
+    <p:tnLst>
+      <p:par>
+        <p:cTn id="1" dur="indefinite" restart="never" nodeType="tmRoot">
+          <p:childTnLst>
+            <p:seq concurrent="1" nextAc="seek">
+              <p:cTn id="2" dur="indefinite" nodeType="mainSeq">
+                <p:childTnLst>
+                  <p:par>
+                    <p:cTn id="3" fill="hold">
+                      <p:stCondLst>
+                        <p:cond delay="indefinite"/>
+                      </p:stCondLst>
+                      <p:childTnLst>
+                        <p:par>
+                          <p:cTn id="4" fill="hold">
+                            <p:stCondLst>
+                              <p:cond delay="0"/>
+                            </p:stCondLst>
+                            <p:childTnLst>
+                              <p:par>
+                                <p:cTn id="5" presetID="1" presetClass="entr" presetSubtype="0" fill="hold" nodeType="clickEffect">
+                                  <p:stCondLst>
+                                    <p:cond delay="0"/>
+                                  </p:stCondLst>
+                                  <p:childTnLst>
+                                    <p:set>
+                                      <p:cBhvr>
+                                        <p:cTn id="6" dur="1" fill="hold">
+                                          <p:stCondLst>
+                                            <p:cond delay="0"/>
+                                          </p:stCondLst>
+                                        </p:cTn>
+                                        <p:tgtEl>
+                                          <p:spTgt spid="40"/>
+                                        </p:tgtEl>
+                                        <p:attrNameLst>
+                                          <p:attrName>style.visibility</p:attrName>
+                                        </p:attrNameLst>
+                                      </p:cBhvr>
+                                      <p:to>
+                                        <p:strVal val="visible"/>
+                                      </p:to>
+                                    </p:set>
+                                  </p:childTnLst>
+                                </p:cTn>
+                              </p:par>
+                            </p:childTnLst>
+                          </p:cTn>
+                        </p:par>
+                      </p:childTnLst>
+                    </p:cTn>
+                  </p:par>
+                  <p:par>
+                    <p:cTn id="7" fill="hold">
+                      <p:stCondLst>
+                        <p:cond delay="indefinite"/>
+                      </p:stCondLst>
+                      <p:childTnLst>
+                        <p:par>
+                          <p:cTn id="8" fill="hold">
+                            <p:stCondLst>
+                              <p:cond delay="0"/>
+                            </p:stCondLst>
+                            <p:childTnLst>
+                              <p:par>
+                                <p:cTn id="9" presetID="1" presetClass="entr" presetSubtype="0" fill="hold" nodeType="clickEffect">
+                                  <p:stCondLst>
+                                    <p:cond delay="0"/>
+                                  </p:stCondLst>
+                                  <p:childTnLst>
+                                    <p:set>
+                                      <p:cBhvr>
+                                        <p:cTn id="10" dur="1" fill="hold">
+                                          <p:stCondLst>
+                                            <p:cond delay="0"/>
+                                          </p:stCondLst>
+                                        </p:cTn>
+                                        <p:tgtEl>
+                                          <p:spTgt spid="21"/>
+                                        </p:tgtEl>
+                                        <p:attrNameLst>
+                                          <p:attrName>style.visibility</p:attrName>
+                                        </p:attrNameLst>
+                                      </p:cBhvr>
+                                      <p:to>
+                                        <p:strVal val="visible"/>
+                                      </p:to>
+                                    </p:set>
+                                  </p:childTnLst>
+                                </p:cTn>
+                              </p:par>
+                            </p:childTnLst>
+                          </p:cTn>
+                        </p:par>
+                      </p:childTnLst>
+                    </p:cTn>
+                  </p:par>
+                  <p:par>
+                    <p:cTn id="11" fill="hold">
+                      <p:stCondLst>
+                        <p:cond delay="indefinite"/>
+                      </p:stCondLst>
+                      <p:childTnLst>
+                        <p:par>
+                          <p:cTn id="12" fill="hold">
+                            <p:stCondLst>
+                              <p:cond delay="0"/>
+                            </p:stCondLst>
+                            <p:childTnLst>
+                              <p:par>
+                                <p:cTn id="13" presetID="1" presetClass="entr" presetSubtype="0" fill="hold" nodeType="clickEffect">
+                                  <p:stCondLst>
+                                    <p:cond delay="0"/>
+                                  </p:stCondLst>
+                                  <p:childTnLst>
+                                    <p:set>
+                                      <p:cBhvr>
+                                        <p:cTn id="14" dur="1" fill="hold">
+                                          <p:stCondLst>
+                                            <p:cond delay="0"/>
+                                          </p:stCondLst>
+                                        </p:cTn>
+                                        <p:tgtEl>
+                                          <p:spTgt spid="39"/>
+                                        </p:tgtEl>
+                                        <p:attrNameLst>
+                                          <p:attrName>style.visibility</p:attrName>
+                                        </p:attrNameLst>
+                                      </p:cBhvr>
+                                      <p:to>
+                                        <p:strVal val="visible"/>
+                                      </p:to>
+                                    </p:set>
+                                  </p:childTnLst>
+                                </p:cTn>
+                              </p:par>
+                            </p:childTnLst>
+                          </p:cTn>
+                        </p:par>
+                      </p:childTnLst>
+                    </p:cTn>
+                  </p:par>
+                  <p:par>
+                    <p:cTn id="15" fill="hold">
+                      <p:stCondLst>
+                        <p:cond delay="indefinite"/>
+                      </p:stCondLst>
+                      <p:childTnLst>
+                        <p:par>
+                          <p:cTn id="16" fill="hold">
+                            <p:stCondLst>
+                              <p:cond delay="0"/>
+                            </p:stCondLst>
+                            <p:childTnLst>
+                              <p:par>
+                                <p:cTn id="17" presetID="1" presetClass="entr" presetSubtype="0" fill="hold" nodeType="clickEffect">
+                                  <p:stCondLst>
+                                    <p:cond delay="0"/>
+                                  </p:stCondLst>
+                                  <p:childTnLst>
+                                    <p:set>
+                                      <p:cBhvr>
+                                        <p:cTn id="18" dur="1" fill="hold">
+                                          <p:stCondLst>
+                                            <p:cond delay="0"/>
+                                          </p:stCondLst>
+                                        </p:cTn>
+                                        <p:tgtEl>
+                                          <p:spTgt spid="34"/>
+                                        </p:tgtEl>
+                                        <p:attrNameLst>
+                                          <p:attrName>style.visibility</p:attrName>
+                                        </p:attrNameLst>
+                                      </p:cBhvr>
+                                      <p:to>
+                                        <p:strVal val="visible"/>
+                                      </p:to>
+                                    </p:set>
+                                  </p:childTnLst>
+                                </p:cTn>
+                              </p:par>
+                            </p:childTnLst>
+                          </p:cTn>
+                        </p:par>
+                      </p:childTnLst>
+                    </p:cTn>
+                  </p:par>
+                </p:childTnLst>
+              </p:cTn>
+              <p:prevCondLst>
+                <p:cond evt="onPrev" delay="0">
+                  <p:tgtEl>
+                    <p:sldTgt/>
+                  </p:tgtEl>
+                </p:cond>
+              </p:prevCondLst>
+              <p:nextCondLst>
+                <p:cond evt="onNext" delay="0">
+                  <p:tgtEl>
+                    <p:sldTgt/>
+                  </p:tgtEl>
+                </p:cond>
+              </p:nextCondLst>
+            </p:seq>
+          </p:childTnLst>
+        </p:cTn>
       </p:par>
     </p:tnLst>
   </p:timing>
 </p:sld>
 </file>
 
-<file path=ppt/slides/slide5.xml><?xml version="1.0" encoding="utf-8"?>
+<file path=ppt/slides/slide6.xml><?xml version="1.0" encoding="utf-8"?>
+<p:sld xmlns:a="http://schemas.openxmlformats.org/drawingml/2006/main" xmlns:r="http://schemas.openxmlformats.org/officeDocument/2006/relationships" xmlns:p="http://schemas.openxmlformats.org/presentationml/2006/main">
+  <p:cSld>
+    <p:spTree>
+      <p:nvGrpSpPr>
+        <p:cNvPr id="1" name=""/>
+        <p:cNvGrpSpPr/>
+        <p:nvPr/>
+      </p:nvGrpSpPr>
+      <p:grpSpPr>
+        <a:xfrm>
+          <a:off x="0" y="0"/>
+          <a:ext cx="0" cy="0"/>
+          <a:chOff x="0" y="0"/>
+          <a:chExt cx="0" cy="0"/>
+        </a:xfrm>
+      </p:grpSpPr>
+      <p:sp>
+        <p:nvSpPr>
+          <p:cNvPr id="2" name="Title 1"/>
+          <p:cNvSpPr>
+            <a:spLocks noGrp="1"/>
+          </p:cNvSpPr>
+          <p:nvPr>
+            <p:ph type="title"/>
+          </p:nvPr>
+        </p:nvSpPr>
+        <p:spPr/>
+        <p:txBody>
+          <a:bodyPr/>
+          <a:lstStyle/>
+          <a:p>
+            <a:r>
+              <a:rPr lang="en-US" dirty="0" smtClean="0"/>
+              <a:t>More precision?</a:t>
+            </a:r>
+            <a:endParaRPr lang="en-US" dirty="0"/>
+          </a:p>
+        </p:txBody>
+      </p:sp>
+      <p:sp>
+        <p:nvSpPr>
+          <p:cNvPr id="3" name="Content Placeholder 2"/>
+          <p:cNvSpPr>
+            <a:spLocks noGrp="1"/>
+          </p:cNvSpPr>
+          <p:nvPr>
+            <p:ph idx="1"/>
+          </p:nvPr>
+        </p:nvSpPr>
+        <p:spPr/>
+        <p:txBody>
+          <a:bodyPr/>
+          <a:lstStyle/>
+          <a:p>
+            <a:r>
+              <a:rPr lang="en-US" dirty="0" smtClean="0"/>
+              <a:t>Possible, but at high cost</a:t>
+            </a:r>
+          </a:p>
+          <a:p>
+            <a:pPr lvl="1"/>
+            <a:r>
+              <a:rPr lang="en-US" dirty="0" smtClean="0"/>
+              <a:t>performance</a:t>
+            </a:r>
+          </a:p>
+          <a:p>
+            <a:pPr lvl="1"/>
+            <a:r>
+              <a:rPr lang="en-US" dirty="0" smtClean="0"/>
+              <a:t>development</a:t>
+            </a:r>
+          </a:p>
+          <a:p>
+            <a:r>
+              <a:rPr lang="en-US" dirty="0" smtClean="0"/>
+              <a:t>Consider other algorithms first</a:t>
+            </a:r>
+          </a:p>
+          <a:p>
+            <a:r>
+              <a:rPr lang="en-US" dirty="0" smtClean="0"/>
+              <a:t>Libraries for arbitrary precision arithmetic</a:t>
+            </a:r>
+          </a:p>
+          <a:p>
+            <a:pPr lvl="1"/>
+            <a:r>
+              <a:rPr lang="en-US" dirty="0" smtClean="0"/>
+              <a:t>GMP: for integers</a:t>
+            </a:r>
+          </a:p>
+          <a:p>
+            <a:pPr lvl="1"/>
+            <a:r>
+              <a:rPr lang="en-US" dirty="0" smtClean="0"/>
+              <a:t>MPFR: for floating point numbers</a:t>
+            </a:r>
+          </a:p>
+          <a:p>
+            <a:pPr lvl="1"/>
+            <a:r>
+              <a:rPr lang="en-US" dirty="0" smtClean="0"/>
+              <a:t>MPC: for complex floating point numbers</a:t>
+            </a:r>
+            <a:endParaRPr lang="en-US" dirty="0"/>
+          </a:p>
+        </p:txBody>
+      </p:sp>
+      <p:sp>
+        <p:nvSpPr>
+          <p:cNvPr id="4" name="Slide Number Placeholder 3"/>
+          <p:cNvSpPr>
+            <a:spLocks noGrp="1"/>
+          </p:cNvSpPr>
+          <p:nvPr>
+            <p:ph type="sldNum" sz="quarter" idx="12"/>
+          </p:nvPr>
+        </p:nvSpPr>
+        <p:spPr/>
+        <p:txBody>
+          <a:bodyPr/>
+          <a:lstStyle/>
+          <a:p>
+            <a:fld id="{9CEF4966-5219-4577-B301-14467D565841}" type="slidenum">
+              <a:rPr lang="en-US" smtClean="0"/>
+              <a:t>6</a:t>
+            </a:fld>
+            <a:endParaRPr lang="en-US"/>
+          </a:p>
+        </p:txBody>
+      </p:sp>
+    </p:spTree>
+    <p:extLst>
+      <p:ext uri="{BB962C8B-B14F-4D97-AF65-F5344CB8AC3E}">
+        <p14:creationId xmlns:p14="http://schemas.microsoft.com/office/powerpoint/2010/main" val="4014730973"/>
+      </p:ext>
+    </p:extLst>
+  </p:cSld>
+  <p:clrMapOvr>
+    <a:masterClrMapping/>
+  </p:clrMapOvr>
+  <p:timing>
+    <p:tnLst>
+      <p:par>
+        <p:cTn id="1" dur="indefinite" restart="never" nodeType="tmRoot">
+          <p:childTnLst>
+            <p:seq concurrent="1" nextAc="seek">
+              <p:cTn id="2" dur="indefinite" nodeType="mainSeq">
+                <p:childTnLst>
+                  <p:par>
+                    <p:cTn id="3" fill="hold">
+                      <p:stCondLst>
+                        <p:cond delay="indefinite"/>
+                        <p:cond evt="onBegin" delay="0">
+                          <p:tn val="2"/>
+                        </p:cond>
+                      </p:stCondLst>
+                      <p:childTnLst>
+                        <p:par>
+                          <p:cTn id="4" fill="hold">
+                            <p:stCondLst>
+                              <p:cond delay="0"/>
+                            </p:stCondLst>
+                            <p:childTnLst>
+                              <p:par>
+                                <p:cTn id="5" presetID="1" presetClass="entr" presetSubtype="0" fill="hold" grpId="0" nodeType="withEffect">
+                                  <p:stCondLst>
+                                    <p:cond delay="0"/>
+                                  </p:stCondLst>
+                                  <p:childTnLst>
+                                    <p:set>
+                                      <p:cBhvr>
+                                        <p:cTn id="6" dur="1" fill="hold">
+                                          <p:stCondLst>
+                                            <p:cond delay="0"/>
+                                          </p:stCondLst>
+                                        </p:cTn>
+                                        <p:tgtEl>
+                                          <p:spTgt spid="3">
+                                            <p:txEl>
+                                              <p:pRg st="0" end="0"/>
+                                            </p:txEl>
+                                          </p:spTgt>
+                                        </p:tgtEl>
+                                        <p:attrNameLst>
+                                          <p:attrName>style.visibility</p:attrName>
+                                        </p:attrNameLst>
+                                      </p:cBhvr>
+                                      <p:to>
+                                        <p:strVal val="visible"/>
+                                      </p:to>
+                                    </p:set>
+                                  </p:childTnLst>
+                                </p:cTn>
+                              </p:par>
+                            </p:childTnLst>
+                          </p:cTn>
+                        </p:par>
+                      </p:childTnLst>
+                    </p:cTn>
+                  </p:par>
+                  <p:par>
+                    <p:cTn id="7" fill="hold">
+                      <p:stCondLst>
+                        <p:cond delay="indefinite"/>
+                      </p:stCondLst>
+                      <p:childTnLst>
+                        <p:par>
+                          <p:cTn id="8" fill="hold">
+                            <p:stCondLst>
+                              <p:cond delay="0"/>
+                            </p:stCondLst>
+                            <p:childTnLst>
+                              <p:par>
+                                <p:cTn id="9" presetID="1" presetClass="entr" presetSubtype="0" fill="hold" grpId="0" nodeType="clickEffect">
+                                  <p:stCondLst>
+                                    <p:cond delay="0"/>
+                                  </p:stCondLst>
+                                  <p:childTnLst>
+                                    <p:set>
+                                      <p:cBhvr>
+                                        <p:cTn id="10" dur="1" fill="hold">
+                                          <p:stCondLst>
+                                            <p:cond delay="0"/>
+                                          </p:stCondLst>
+                                        </p:cTn>
+                                        <p:tgtEl>
+                                          <p:spTgt spid="3">
+                                            <p:txEl>
+                                              <p:pRg st="1" end="1"/>
+                                            </p:txEl>
+                                          </p:spTgt>
+                                        </p:tgtEl>
+                                        <p:attrNameLst>
+                                          <p:attrName>style.visibility</p:attrName>
+                                        </p:attrNameLst>
+                                      </p:cBhvr>
+                                      <p:to>
+                                        <p:strVal val="visible"/>
+                                      </p:to>
+                                    </p:set>
+                                  </p:childTnLst>
+                                </p:cTn>
+                              </p:par>
+                            </p:childTnLst>
+                          </p:cTn>
+                        </p:par>
+                      </p:childTnLst>
+                    </p:cTn>
+                  </p:par>
+                  <p:par>
+                    <p:cTn id="11" fill="hold">
+                      <p:stCondLst>
+                        <p:cond delay="indefinite"/>
+                      </p:stCondLst>
+                      <p:childTnLst>
+                        <p:par>
+                          <p:cTn id="12" fill="hold">
+                            <p:stCondLst>
+                              <p:cond delay="0"/>
+                            </p:stCondLst>
+                            <p:childTnLst>
+                              <p:par>
+                                <p:cTn id="13" presetID="1" presetClass="entr" presetSubtype="0" fill="hold" grpId="0" nodeType="clickEffect">
+                                  <p:stCondLst>
+                                    <p:cond delay="0"/>
+                                  </p:stCondLst>
+                                  <p:childTnLst>
+                                    <p:set>
+                                      <p:cBhvr>
+                                        <p:cTn id="14" dur="1" fill="hold">
+                                          <p:stCondLst>
+                                            <p:cond delay="0"/>
+                                          </p:stCondLst>
+                                        </p:cTn>
+                                        <p:tgtEl>
+                                          <p:spTgt spid="3">
+                                            <p:txEl>
+                                              <p:pRg st="2" end="2"/>
+                                            </p:txEl>
+                                          </p:spTgt>
+                                        </p:tgtEl>
+                                        <p:attrNameLst>
+                                          <p:attrName>style.visibility</p:attrName>
+                                        </p:attrNameLst>
+                                      </p:cBhvr>
+                                      <p:to>
+                                        <p:strVal val="visible"/>
+                                      </p:to>
+                                    </p:set>
+                                  </p:childTnLst>
+                                </p:cTn>
+                              </p:par>
+                            </p:childTnLst>
+                          </p:cTn>
+                        </p:par>
+                      </p:childTnLst>
+                    </p:cTn>
+                  </p:par>
+                  <p:par>
+                    <p:cTn id="15" fill="hold">
+                      <p:stCondLst>
+                        <p:cond delay="indefinite"/>
+                      </p:stCondLst>
+                      <p:childTnLst>
+                        <p:par>
+                          <p:cTn id="16" fill="hold">
+                            <p:stCondLst>
+                              <p:cond delay="0"/>
+                            </p:stCondLst>
+                            <p:childTnLst>
+                              <p:par>
+                                <p:cTn id="17" presetID="1" presetClass="entr" presetSubtype="0" fill="hold" grpId="0" nodeType="clickEffect">
+                                  <p:stCondLst>
+                                    <p:cond delay="0"/>
+                                  </p:stCondLst>
+                                  <p:childTnLst>
+                                    <p:set>
+                                      <p:cBhvr>
+                                        <p:cTn id="18" dur="1" fill="hold">
+                                          <p:stCondLst>
+                                            <p:cond delay="0"/>
+                                          </p:stCondLst>
+                                        </p:cTn>
+                                        <p:tgtEl>
+                                          <p:spTgt spid="3">
+                                            <p:txEl>
+                                              <p:pRg st="3" end="3"/>
+                                            </p:txEl>
+                                          </p:spTgt>
+                                        </p:tgtEl>
+                                        <p:attrNameLst>
+                                          <p:attrName>style.visibility</p:attrName>
+                                        </p:attrNameLst>
+                                      </p:cBhvr>
+                                      <p:to>
+                                        <p:strVal val="visible"/>
+                                      </p:to>
+                                    </p:set>
+                                  </p:childTnLst>
+                                </p:cTn>
+                              </p:par>
+                            </p:childTnLst>
+                          </p:cTn>
+                        </p:par>
+                      </p:childTnLst>
+                    </p:cTn>
+                  </p:par>
+                  <p:par>
+                    <p:cTn id="19" fill="hold">
+                      <p:stCondLst>
+                        <p:cond delay="indefinite"/>
+                      </p:stCondLst>
+                      <p:childTnLst>
+                        <p:par>
+                          <p:cTn id="20" fill="hold">
+                            <p:stCondLst>
+                              <p:cond delay="0"/>
+                            </p:stCondLst>
+                            <p:childTnLst>
+                              <p:par>
+                                <p:cTn id="21" presetID="1" presetClass="entr" presetSubtype="0" fill="hold" grpId="0" nodeType="clickEffect">
+                                  <p:stCondLst>
+                                    <p:cond delay="0"/>
+                                  </p:stCondLst>
+                                  <p:childTnLst>
+                                    <p:set>
+                                      <p:cBhvr>
+                                        <p:cTn id="22" dur="1" fill="hold">
+                                          <p:stCondLst>
+                                            <p:cond delay="0"/>
+                                          </p:stCondLst>
+                                        </p:cTn>
+                                        <p:tgtEl>
+                                          <p:spTgt spid="3">
+                                            <p:txEl>
+                                              <p:pRg st="4" end="4"/>
+                                            </p:txEl>
+                                          </p:spTgt>
+                                        </p:tgtEl>
+                                        <p:attrNameLst>
+                                          <p:attrName>style.visibility</p:attrName>
+                                        </p:attrNameLst>
+                                      </p:cBhvr>
+                                      <p:to>
+                                        <p:strVal val="visible"/>
+                                      </p:to>
+                                    </p:set>
+                                  </p:childTnLst>
+                                </p:cTn>
+                              </p:par>
+                            </p:childTnLst>
+                          </p:cTn>
+                        </p:par>
+                      </p:childTnLst>
+                    </p:cTn>
+                  </p:par>
+                  <p:par>
+                    <p:cTn id="23" fill="hold">
+                      <p:stCondLst>
+                        <p:cond delay="indefinite"/>
+                      </p:stCondLst>
+                      <p:childTnLst>
+                        <p:par>
+                          <p:cTn id="24" fill="hold">
+                            <p:stCondLst>
+                              <p:cond delay="0"/>
+                            </p:stCondLst>
+                            <p:childTnLst>
+                              <p:par>
+                                <p:cTn id="25" presetID="1" presetClass="entr" presetSubtype="0" fill="hold" grpId="0" nodeType="clickEffect">
+                                  <p:stCondLst>
+                                    <p:cond delay="0"/>
+                                  </p:stCondLst>
+                                  <p:childTnLst>
+                                    <p:set>
+                                      <p:cBhvr>
+                                        <p:cTn id="26" dur="1" fill="hold">
+                                          <p:stCondLst>
+                                            <p:cond delay="0"/>
+                                          </p:stCondLst>
+                                        </p:cTn>
+                                        <p:tgtEl>
+                                          <p:spTgt spid="3">
+                                            <p:txEl>
+                                              <p:pRg st="5" end="5"/>
+                                            </p:txEl>
+                                          </p:spTgt>
+                                        </p:tgtEl>
+                                        <p:attrNameLst>
+                                          <p:attrName>style.visibility</p:attrName>
+                                        </p:attrNameLst>
+                                      </p:cBhvr>
+                                      <p:to>
+                                        <p:strVal val="visible"/>
+                                      </p:to>
+                                    </p:set>
+                                  </p:childTnLst>
+                                </p:cTn>
+                              </p:par>
+                            </p:childTnLst>
+                          </p:cTn>
+                        </p:par>
+                      </p:childTnLst>
+                    </p:cTn>
+                  </p:par>
+                  <p:par>
+                    <p:cTn id="27" fill="hold">
+                      <p:stCondLst>
+                        <p:cond delay="indefinite"/>
+                      </p:stCondLst>
+                      <p:childTnLst>
+                        <p:par>
+                          <p:cTn id="28" fill="hold">
+                            <p:stCondLst>
+                              <p:cond delay="0"/>
+                            </p:stCondLst>
+                            <p:childTnLst>
+                              <p:par>
+                                <p:cTn id="29" presetID="1" presetClass="entr" presetSubtype="0" fill="hold" grpId="0" nodeType="clickEffect">
+                                  <p:stCondLst>
+                                    <p:cond delay="0"/>
+                                  </p:stCondLst>
+                                  <p:childTnLst>
+                                    <p:set>
+                                      <p:cBhvr>
+                                        <p:cTn id="30" dur="1" fill="hold">
+                                          <p:stCondLst>
+                                            <p:cond delay="0"/>
+                                          </p:stCondLst>
+                                        </p:cTn>
+                                        <p:tgtEl>
+                                          <p:spTgt spid="3">
+                                            <p:txEl>
+                                              <p:pRg st="6" end="6"/>
+                                            </p:txEl>
+                                          </p:spTgt>
+                                        </p:tgtEl>
+                                        <p:attrNameLst>
+                                          <p:attrName>style.visibility</p:attrName>
+                                        </p:attrNameLst>
+                                      </p:cBhvr>
+                                      <p:to>
+                                        <p:strVal val="visible"/>
+                                      </p:to>
+                                    </p:set>
+                                  </p:childTnLst>
+                                </p:cTn>
+                              </p:par>
+                            </p:childTnLst>
+                          </p:cTn>
+                        </p:par>
+                      </p:childTnLst>
+                    </p:cTn>
+                  </p:par>
+                  <p:par>
+                    <p:cTn id="31" fill="hold">
+                      <p:stCondLst>
+                        <p:cond delay="indefinite"/>
+                      </p:stCondLst>
+                      <p:childTnLst>
+                        <p:par>
+                          <p:cTn id="32" fill="hold">
+                            <p:stCondLst>
+                              <p:cond delay="0"/>
+                            </p:stCondLst>
+                            <p:childTnLst>
+                              <p:par>
+                                <p:cTn id="33" presetID="1" presetClass="entr" presetSubtype="0" fill="hold" grpId="0" nodeType="clickEffect">
+                                  <p:stCondLst>
+                                    <p:cond delay="0"/>
+                                  </p:stCondLst>
+                                  <p:childTnLst>
+                                    <p:set>
+                                      <p:cBhvr>
+                                        <p:cTn id="34" dur="1" fill="hold">
+                                          <p:stCondLst>
+                                            <p:cond delay="0"/>
+                                          </p:stCondLst>
+                                        </p:cTn>
+                                        <p:tgtEl>
+                                          <p:spTgt spid="3">
+                                            <p:txEl>
+                                              <p:pRg st="7" end="7"/>
+                                            </p:txEl>
+                                          </p:spTgt>
+                                        </p:tgtEl>
+                                        <p:attrNameLst>
+                                          <p:attrName>style.visibility</p:attrName>
+                                        </p:attrNameLst>
+                                      </p:cBhvr>
+                                      <p:to>
+                                        <p:strVal val="visible"/>
+                                      </p:to>
+                                    </p:set>
+                                  </p:childTnLst>
+                                </p:cTn>
+                              </p:par>
+                            </p:childTnLst>
+                          </p:cTn>
+                        </p:par>
+                      </p:childTnLst>
+                    </p:cTn>
+                  </p:par>
+                </p:childTnLst>
+              </p:cTn>
+              <p:prevCondLst>
+                <p:cond evt="onPrev" delay="0">
+                  <p:tgtEl>
+                    <p:sldTgt/>
+                  </p:tgtEl>
+                </p:cond>
+              </p:prevCondLst>
+              <p:nextCondLst>
+                <p:cond evt="onNext" delay="0">
+                  <p:tgtEl>
+                    <p:sldTgt/>
+                  </p:tgtEl>
+                </p:cond>
+              </p:nextCondLst>
+            </p:seq>
+          </p:childTnLst>
+        </p:cTn>
+      </p:par>
+    </p:tnLst>
+    <p:bldLst>
+      <p:bldP spid="3" grpId="0" uiExpand="1" build="p" bldLvl="2"/>
+    </p:bldLst>
+  </p:timing>
+</p:sld>
+</file>
+
+<file path=ppt/slides/slide7.xml><?xml version="1.0" encoding="utf-8"?>
 <p:sld xmlns:a="http://schemas.openxmlformats.org/drawingml/2006/main" xmlns:r="http://schemas.openxmlformats.org/officeDocument/2006/relationships" xmlns:p="http://schemas.openxmlformats.org/presentationml/2006/main">
   <p:cSld>
     <p:spTree>
@@ -4876,7 +8001,7 @@
           <a:p>
             <a:fld id="{9CEF4966-5219-4577-B301-14467D565841}" type="slidenum">
               <a:rPr lang="en-US" smtClean="0"/>
-              <a:t>5</a:t>
+              <a:t>7</a:t>
             </a:fld>
             <a:endParaRPr lang="en-US"/>
           </a:p>
@@ -4895,7 +8020,7 @@
 </p:sld>
 </file>
 
-<file path=ppt/slides/slide6.xml><?xml version="1.0" encoding="utf-8"?>
+<file path=ppt/slides/slide8.xml><?xml version="1.0" encoding="utf-8"?>
 <p:sld xmlns:a="http://schemas.openxmlformats.org/drawingml/2006/main" xmlns:r="http://schemas.openxmlformats.org/officeDocument/2006/relationships" xmlns:p="http://schemas.openxmlformats.org/presentationml/2006/main">
   <p:cSld>
     <p:spTree>
@@ -4975,7 +8100,7 @@
           <a:p>
             <a:fld id="{9CEF4966-5219-4577-B301-14467D565841}" type="slidenum">
               <a:rPr lang="en-US" smtClean="0"/>
-              <a:t>6</a:t>
+              <a:t>8</a:t>
             </a:fld>
             <a:endParaRPr lang="en-US"/>
           </a:p>
@@ -4994,7 +8119,7 @@
 </p:sld>
 </file>
 
-<file path=ppt/slides/slide7.xml><?xml version="1.0" encoding="utf-8"?>
+<file path=ppt/slides/slide9.xml><?xml version="1.0" encoding="utf-8"?>
 <p:sld xmlns:a="http://schemas.openxmlformats.org/drawingml/2006/main" xmlns:r="http://schemas.openxmlformats.org/officeDocument/2006/relationships" xmlns:p="http://schemas.openxmlformats.org/presentationml/2006/main">
   <p:cSld>
     <p:spTree>
@@ -5108,7 +8233,7 @@
           <a:p>
             <a:fld id="{9CEF4966-5219-4577-B301-14467D565841}" type="slidenum">
               <a:rPr lang="en-US" smtClean="0"/>
-              <a:t>7</a:t>
+              <a:t>9</a:t>
             </a:fld>
             <a:endParaRPr lang="en-US"/>
           </a:p>

</xml_diff>

<commit_message>
Added placeholder slide for random number generation
</commit_message>
<xml_diff>
--- a/CPlusPlus/12_essential_cpp_numerics.pptx
+++ b/CPlusPlus/12_essential_cpp_numerics.pptx
@@ -5,7 +5,7 @@
     <p:sldMasterId id="2147483660" r:id="rId1"/>
   </p:sldMasterIdLst>
   <p:notesMasterIdLst>
-    <p:notesMasterId r:id="rId11"/>
+    <p:notesMasterId r:id="rId12"/>
   </p:notesMasterIdLst>
   <p:sldIdLst>
     <p:sldId id="257" r:id="rId2"/>
@@ -14,9 +14,10 @@
     <p:sldId id="261" r:id="rId5"/>
     <p:sldId id="264" r:id="rId6"/>
     <p:sldId id="265" r:id="rId7"/>
-    <p:sldId id="262" r:id="rId8"/>
-    <p:sldId id="263" r:id="rId9"/>
-    <p:sldId id="260" r:id="rId10"/>
+    <p:sldId id="266" r:id="rId8"/>
+    <p:sldId id="262" r:id="rId9"/>
+    <p:sldId id="263" r:id="rId10"/>
+    <p:sldId id="260" r:id="rId11"/>
   </p:sldIdLst>
   <p:sldSz cx="9144000" cy="6858000" type="screen4x3"/>
   <p:notesSz cx="6858000" cy="9144000"/>
@@ -3491,6 +3492,366 @@
         <p:cTn id="1" dur="indefinite" restart="never" nodeType="tmRoot"/>
       </p:par>
     </p:tnLst>
+  </p:timing>
+</p:sld>
+</file>
+
+<file path=ppt/slides/slide10.xml><?xml version="1.0" encoding="utf-8"?>
+<p:sld xmlns:a="http://schemas.openxmlformats.org/drawingml/2006/main" xmlns:r="http://schemas.openxmlformats.org/officeDocument/2006/relationships" xmlns:p="http://schemas.openxmlformats.org/presentationml/2006/main">
+  <p:cSld>
+    <p:spTree>
+      <p:nvGrpSpPr>
+        <p:cNvPr id="1" name=""/>
+        <p:cNvGrpSpPr/>
+        <p:nvPr/>
+      </p:nvGrpSpPr>
+      <p:grpSpPr>
+        <a:xfrm>
+          <a:off x="0" y="0"/>
+          <a:ext cx="0" cy="0"/>
+          <a:chOff x="0" y="0"/>
+          <a:chExt cx="0" cy="0"/>
+        </a:xfrm>
+      </p:grpSpPr>
+      <p:sp>
+        <p:nvSpPr>
+          <p:cNvPr id="2" name="Title 1"/>
+          <p:cNvSpPr>
+            <a:spLocks noGrp="1"/>
+          </p:cNvSpPr>
+          <p:nvPr>
+            <p:ph type="title"/>
+          </p:nvPr>
+        </p:nvSpPr>
+        <p:spPr/>
+        <p:txBody>
+          <a:bodyPr/>
+          <a:lstStyle/>
+          <a:p>
+            <a:r>
+              <a:rPr lang="en-US" dirty="0" smtClean="0"/>
+              <a:t>What was left out/added?</a:t>
+            </a:r>
+            <a:endParaRPr lang="en-US" dirty="0"/>
+          </a:p>
+        </p:txBody>
+      </p:sp>
+      <p:sp>
+        <p:nvSpPr>
+          <p:cNvPr id="4" name="Content Placeholder 3"/>
+          <p:cNvSpPr>
+            <a:spLocks noGrp="1"/>
+          </p:cNvSpPr>
+          <p:nvPr>
+            <p:ph idx="1"/>
+          </p:nvPr>
+        </p:nvSpPr>
+        <p:spPr/>
+        <p:txBody>
+          <a:bodyPr/>
+          <a:lstStyle/>
+          <a:p>
+            <a:r>
+              <a:rPr lang="en-US" dirty="0" smtClean="0"/>
+              <a:t>Left out</a:t>
+            </a:r>
+          </a:p>
+          <a:p>
+            <a:pPr lvl="1"/>
+            <a:r>
+              <a:rPr lang="en-US" dirty="0" smtClean="0"/>
+              <a:t>Value arrays, see section on containers</a:t>
+            </a:r>
+          </a:p>
+          <a:p>
+            <a:r>
+              <a:rPr lang="en-US" dirty="0" smtClean="0"/>
+              <a:t>Added</a:t>
+            </a:r>
+          </a:p>
+          <a:p>
+            <a:pPr lvl="1"/>
+            <a:r>
+              <a:rPr lang="en-US" dirty="0" smtClean="0"/>
+              <a:t>ODEs with Boost</a:t>
+            </a:r>
+          </a:p>
+          <a:p>
+            <a:pPr lvl="1"/>
+            <a:r>
+              <a:rPr lang="en-US" dirty="0" smtClean="0"/>
+              <a:t>Linear algebra with Armadillo</a:t>
+            </a:r>
+            <a:endParaRPr lang="en-US" dirty="0"/>
+          </a:p>
+          <a:p>
+            <a:pPr lvl="1"/>
+            <a:endParaRPr lang="en-US" dirty="0" smtClean="0"/>
+          </a:p>
+          <a:p>
+            <a:endParaRPr lang="en-US" dirty="0"/>
+          </a:p>
+        </p:txBody>
+      </p:sp>
+      <p:sp>
+        <p:nvSpPr>
+          <p:cNvPr id="3" name="Slide Number Placeholder 2"/>
+          <p:cNvSpPr>
+            <a:spLocks noGrp="1"/>
+          </p:cNvSpPr>
+          <p:nvPr>
+            <p:ph type="sldNum" sz="quarter" idx="12"/>
+          </p:nvPr>
+        </p:nvSpPr>
+        <p:spPr/>
+        <p:txBody>
+          <a:bodyPr/>
+          <a:lstStyle/>
+          <a:p>
+            <a:fld id="{9CEF4966-5219-4577-B301-14467D565841}" type="slidenum">
+              <a:rPr lang="en-US" smtClean="0"/>
+              <a:t>10</a:t>
+            </a:fld>
+            <a:endParaRPr lang="en-US"/>
+          </a:p>
+        </p:txBody>
+      </p:sp>
+    </p:spTree>
+    <p:extLst>
+      <p:ext uri="{BB962C8B-B14F-4D97-AF65-F5344CB8AC3E}">
+        <p14:creationId xmlns:p14="http://schemas.microsoft.com/office/powerpoint/2010/main" val="3454245368"/>
+      </p:ext>
+    </p:extLst>
+  </p:cSld>
+  <p:clrMapOvr>
+    <a:masterClrMapping/>
+  </p:clrMapOvr>
+  <p:timing>
+    <p:tnLst>
+      <p:par>
+        <p:cTn id="1" dur="indefinite" restart="never" nodeType="tmRoot">
+          <p:childTnLst>
+            <p:seq concurrent="1" nextAc="seek">
+              <p:cTn id="2" dur="indefinite" nodeType="mainSeq">
+                <p:childTnLst>
+                  <p:par>
+                    <p:cTn id="3" fill="hold">
+                      <p:stCondLst>
+                        <p:cond delay="indefinite"/>
+                        <p:cond evt="onBegin" delay="0">
+                          <p:tn val="2"/>
+                        </p:cond>
+                      </p:stCondLst>
+                      <p:childTnLst>
+                        <p:par>
+                          <p:cTn id="4" fill="hold">
+                            <p:stCondLst>
+                              <p:cond delay="0"/>
+                            </p:stCondLst>
+                            <p:childTnLst>
+                              <p:par>
+                                <p:cTn id="5" presetID="1" presetClass="entr" presetSubtype="0" fill="hold" grpId="0" nodeType="withEffect">
+                                  <p:stCondLst>
+                                    <p:cond delay="0"/>
+                                  </p:stCondLst>
+                                  <p:childTnLst>
+                                    <p:set>
+                                      <p:cBhvr>
+                                        <p:cTn id="6" dur="1" fill="hold">
+                                          <p:stCondLst>
+                                            <p:cond delay="0"/>
+                                          </p:stCondLst>
+                                        </p:cTn>
+                                        <p:tgtEl>
+                                          <p:spTgt spid="4">
+                                            <p:txEl>
+                                              <p:pRg st="0" end="0"/>
+                                            </p:txEl>
+                                          </p:spTgt>
+                                        </p:tgtEl>
+                                        <p:attrNameLst>
+                                          <p:attrName>style.visibility</p:attrName>
+                                        </p:attrNameLst>
+                                      </p:cBhvr>
+                                      <p:to>
+                                        <p:strVal val="visible"/>
+                                      </p:to>
+                                    </p:set>
+                                  </p:childTnLst>
+                                </p:cTn>
+                              </p:par>
+                              <p:par>
+                                <p:cTn id="7" presetID="1" presetClass="entr" presetSubtype="0" fill="hold" grpId="0" nodeType="withEffect">
+                                  <p:stCondLst>
+                                    <p:cond delay="0"/>
+                                  </p:stCondLst>
+                                  <p:childTnLst>
+                                    <p:set>
+                                      <p:cBhvr>
+                                        <p:cTn id="8" dur="1" fill="hold">
+                                          <p:stCondLst>
+                                            <p:cond delay="0"/>
+                                          </p:stCondLst>
+                                        </p:cTn>
+                                        <p:tgtEl>
+                                          <p:spTgt spid="4">
+                                            <p:txEl>
+                                              <p:pRg st="1" end="1"/>
+                                            </p:txEl>
+                                          </p:spTgt>
+                                        </p:tgtEl>
+                                        <p:attrNameLst>
+                                          <p:attrName>style.visibility</p:attrName>
+                                        </p:attrNameLst>
+                                      </p:cBhvr>
+                                      <p:to>
+                                        <p:strVal val="visible"/>
+                                      </p:to>
+                                    </p:set>
+                                  </p:childTnLst>
+                                </p:cTn>
+                              </p:par>
+                            </p:childTnLst>
+                          </p:cTn>
+                        </p:par>
+                      </p:childTnLst>
+                    </p:cTn>
+                  </p:par>
+                  <p:par>
+                    <p:cTn id="9" fill="hold">
+                      <p:stCondLst>
+                        <p:cond delay="indefinite"/>
+                      </p:stCondLst>
+                      <p:childTnLst>
+                        <p:par>
+                          <p:cTn id="10" fill="hold">
+                            <p:stCondLst>
+                              <p:cond delay="0"/>
+                            </p:stCondLst>
+                            <p:childTnLst>
+                              <p:par>
+                                <p:cTn id="11" presetID="1" presetClass="entr" presetSubtype="0" fill="hold" grpId="0" nodeType="clickEffect">
+                                  <p:stCondLst>
+                                    <p:cond delay="0"/>
+                                  </p:stCondLst>
+                                  <p:childTnLst>
+                                    <p:set>
+                                      <p:cBhvr>
+                                        <p:cTn id="12" dur="1" fill="hold">
+                                          <p:stCondLst>
+                                            <p:cond delay="0"/>
+                                          </p:stCondLst>
+                                        </p:cTn>
+                                        <p:tgtEl>
+                                          <p:spTgt spid="4">
+                                            <p:txEl>
+                                              <p:pRg st="2" end="2"/>
+                                            </p:txEl>
+                                          </p:spTgt>
+                                        </p:tgtEl>
+                                        <p:attrNameLst>
+                                          <p:attrName>style.visibility</p:attrName>
+                                        </p:attrNameLst>
+                                      </p:cBhvr>
+                                      <p:to>
+                                        <p:strVal val="visible"/>
+                                      </p:to>
+                                    </p:set>
+                                  </p:childTnLst>
+                                </p:cTn>
+                              </p:par>
+                              <p:par>
+                                <p:cTn id="13" presetID="1" presetClass="entr" presetSubtype="0" fill="hold" grpId="0" nodeType="withEffect">
+                                  <p:stCondLst>
+                                    <p:cond delay="0"/>
+                                  </p:stCondLst>
+                                  <p:childTnLst>
+                                    <p:set>
+                                      <p:cBhvr>
+                                        <p:cTn id="14" dur="1" fill="hold">
+                                          <p:stCondLst>
+                                            <p:cond delay="0"/>
+                                          </p:stCondLst>
+                                        </p:cTn>
+                                        <p:tgtEl>
+                                          <p:spTgt spid="4">
+                                            <p:txEl>
+                                              <p:pRg st="3" end="3"/>
+                                            </p:txEl>
+                                          </p:spTgt>
+                                        </p:tgtEl>
+                                        <p:attrNameLst>
+                                          <p:attrName>style.visibility</p:attrName>
+                                        </p:attrNameLst>
+                                      </p:cBhvr>
+                                      <p:to>
+                                        <p:strVal val="visible"/>
+                                      </p:to>
+                                    </p:set>
+                                  </p:childTnLst>
+                                </p:cTn>
+                              </p:par>
+                              <p:par>
+                                <p:cTn id="15" presetID="1" presetClass="entr" presetSubtype="0" fill="hold" grpId="0" nodeType="withEffect">
+                                  <p:stCondLst>
+                                    <p:cond delay="0"/>
+                                  </p:stCondLst>
+                                  <p:childTnLst>
+                                    <p:set>
+                                      <p:cBhvr>
+                                        <p:cTn id="16" dur="1" fill="hold">
+                                          <p:stCondLst>
+                                            <p:cond delay="0"/>
+                                          </p:stCondLst>
+                                        </p:cTn>
+                                        <p:tgtEl>
+                                          <p:spTgt spid="4">
+                                            <p:txEl>
+                                              <p:pRg st="4" end="4"/>
+                                            </p:txEl>
+                                          </p:spTgt>
+                                        </p:tgtEl>
+                                        <p:attrNameLst>
+                                          <p:attrName>style.visibility</p:attrName>
+                                        </p:attrNameLst>
+                                      </p:cBhvr>
+                                      <p:to>
+                                        <p:strVal val="visible"/>
+                                      </p:to>
+                                    </p:set>
+                                  </p:childTnLst>
+                                </p:cTn>
+                              </p:par>
+                            </p:childTnLst>
+                          </p:cTn>
+                        </p:par>
+                      </p:childTnLst>
+                    </p:cTn>
+                  </p:par>
+                </p:childTnLst>
+              </p:cTn>
+              <p:prevCondLst>
+                <p:cond evt="onPrev" delay="0">
+                  <p:tgtEl>
+                    <p:sldTgt/>
+                  </p:tgtEl>
+                </p:cond>
+              </p:prevCondLst>
+              <p:nextCondLst>
+                <p:cond evt="onNext" delay="0">
+                  <p:tgtEl>
+                    <p:sldTgt/>
+                  </p:tgtEl>
+                </p:cond>
+              </p:nextCondLst>
+            </p:seq>
+          </p:childTnLst>
+        </p:cTn>
+      </p:par>
+    </p:tnLst>
+    <p:bldLst>
+      <p:bldP spid="4" grpId="0" uiExpand="1" build="p"/>
+    </p:bldLst>
   </p:timing>
 </p:sld>
 </file>
@@ -5552,13 +5913,13 @@
             <p:ph idx="1"/>
             <p:extLst>
               <p:ext uri="{D42A27DB-BD31-4B8C-83A1-F6EECF244321}">
-                <p14:modId xmlns:p14="http://schemas.microsoft.com/office/powerpoint/2010/main" val="962715214"/>
+                <p14:modId xmlns:p14="http://schemas.microsoft.com/office/powerpoint/2010/main" val="3167912093"/>
               </p:ext>
             </p:extLst>
           </p:nvPr>
         </p:nvGraphicFramePr>
         <p:xfrm>
-          <a:off x="628650" y="1825625"/>
+          <a:off x="628650" y="2248415"/>
           <a:ext cx="7886700" cy="1112520"/>
         </p:xfrm>
         <a:graphic>
@@ -5833,7 +6194,7 @@
         </p:nvGrpSpPr>
         <p:grpSpPr>
           <a:xfrm>
-            <a:off x="3374848" y="965343"/>
+            <a:off x="3374848" y="1388133"/>
             <a:ext cx="5072742" cy="819187"/>
             <a:chOff x="3374848" y="965343"/>
             <a:chExt cx="5072742" cy="819187"/>
@@ -6148,7 +6509,7 @@
         </p:nvSpPr>
         <p:spPr>
           <a:xfrm>
-            <a:off x="5308141" y="2888415"/>
+            <a:off x="5308141" y="3311205"/>
             <a:ext cx="623889" cy="369332"/>
           </a:xfrm>
           <a:prstGeom prst="rect">
@@ -6195,7 +6556,7 @@
         </p:nvSpPr>
         <p:spPr>
           <a:xfrm>
-            <a:off x="8210550" y="2888415"/>
+            <a:off x="8210550" y="3311205"/>
             <a:ext cx="755335" cy="369332"/>
           </a:xfrm>
           <a:prstGeom prst="rect">
@@ -6243,13 +6604,13 @@
           <p:nvPr>
             <p:extLst>
               <p:ext uri="{D42A27DB-BD31-4B8C-83A1-F6EECF244321}">
-                <p14:modId xmlns:p14="http://schemas.microsoft.com/office/powerpoint/2010/main" val="1307075112"/>
+                <p14:modId xmlns:p14="http://schemas.microsoft.com/office/powerpoint/2010/main" val="1409837202"/>
               </p:ext>
             </p:extLst>
           </p:nvPr>
         </p:nvGraphicFramePr>
         <p:xfrm>
-          <a:off x="711635" y="3639364"/>
+          <a:off x="711635" y="3953994"/>
           <a:ext cx="6096000" cy="1854200"/>
         </p:xfrm>
         <a:graphic>
@@ -6578,7 +6939,7 @@
         </p:nvGrpSpPr>
         <p:grpSpPr>
           <a:xfrm>
-            <a:off x="1413600" y="5505743"/>
+            <a:off x="1413600" y="5820373"/>
             <a:ext cx="4102044" cy="734676"/>
             <a:chOff x="1413600" y="5505743"/>
             <a:chExt cx="4102044" cy="734676"/>
@@ -6876,7 +7237,7 @@
         </p:nvGrpSpPr>
         <p:grpSpPr>
           <a:xfrm>
-            <a:off x="6558116" y="3991894"/>
+            <a:off x="6558116" y="4306524"/>
             <a:ext cx="2106346" cy="646331"/>
             <a:chOff x="5699501" y="143567"/>
             <a:chExt cx="2106346" cy="646331"/>
@@ -7797,6 +8158,108 @@
           <a:chExt cx="0" cy="0"/>
         </a:xfrm>
       </p:grpSpPr>
+      <p:sp>
+        <p:nvSpPr>
+          <p:cNvPr id="2" name="Title 1"/>
+          <p:cNvSpPr>
+            <a:spLocks noGrp="1"/>
+          </p:cNvSpPr>
+          <p:nvPr>
+            <p:ph type="title"/>
+          </p:nvPr>
+        </p:nvSpPr>
+        <p:spPr/>
+        <p:txBody>
+          <a:bodyPr/>
+          <a:lstStyle/>
+          <a:p>
+            <a:r>
+              <a:rPr lang="en-US" dirty="0" smtClean="0"/>
+              <a:t>Random numbers</a:t>
+            </a:r>
+            <a:endParaRPr lang="en-US" dirty="0"/>
+          </a:p>
+        </p:txBody>
+      </p:sp>
+      <p:sp>
+        <p:nvSpPr>
+          <p:cNvPr id="3" name="Content Placeholder 2"/>
+          <p:cNvSpPr>
+            <a:spLocks noGrp="1"/>
+          </p:cNvSpPr>
+          <p:nvPr>
+            <p:ph idx="1"/>
+          </p:nvPr>
+        </p:nvSpPr>
+        <p:spPr/>
+        <p:txBody>
+          <a:bodyPr/>
+          <a:lstStyle/>
+          <a:p>
+            <a:endParaRPr lang="en-US"/>
+          </a:p>
+        </p:txBody>
+      </p:sp>
+      <p:sp>
+        <p:nvSpPr>
+          <p:cNvPr id="4" name="Slide Number Placeholder 3"/>
+          <p:cNvSpPr>
+            <a:spLocks noGrp="1"/>
+          </p:cNvSpPr>
+          <p:nvPr>
+            <p:ph type="sldNum" sz="quarter" idx="12"/>
+          </p:nvPr>
+        </p:nvSpPr>
+        <p:spPr/>
+        <p:txBody>
+          <a:bodyPr/>
+          <a:lstStyle/>
+          <a:p>
+            <a:fld id="{9CEF4966-5219-4577-B301-14467D565841}" type="slidenum">
+              <a:rPr lang="en-US" smtClean="0"/>
+              <a:t>7</a:t>
+            </a:fld>
+            <a:endParaRPr lang="en-US"/>
+          </a:p>
+        </p:txBody>
+      </p:sp>
+    </p:spTree>
+    <p:extLst>
+      <p:ext uri="{BB962C8B-B14F-4D97-AF65-F5344CB8AC3E}">
+        <p14:creationId xmlns:p14="http://schemas.microsoft.com/office/powerpoint/2010/main" val="3389394195"/>
+      </p:ext>
+    </p:extLst>
+  </p:cSld>
+  <p:clrMapOvr>
+    <a:masterClrMapping/>
+  </p:clrMapOvr>
+  <p:timing>
+    <p:tnLst>
+      <p:par>
+        <p:cTn id="1" dur="indefinite" restart="never" nodeType="tmRoot"/>
+      </p:par>
+    </p:tnLst>
+  </p:timing>
+</p:sld>
+</file>
+
+<file path=ppt/slides/slide8.xml><?xml version="1.0" encoding="utf-8"?>
+<p:sld xmlns:a="http://schemas.openxmlformats.org/drawingml/2006/main" xmlns:r="http://schemas.openxmlformats.org/officeDocument/2006/relationships" xmlns:p="http://schemas.openxmlformats.org/presentationml/2006/main">
+  <p:cSld>
+    <p:spTree>
+      <p:nvGrpSpPr>
+        <p:cNvPr id="1" name=""/>
+        <p:cNvGrpSpPr/>
+        <p:nvPr/>
+      </p:nvGrpSpPr>
+      <p:grpSpPr>
+        <a:xfrm>
+          <a:off x="0" y="0"/>
+          <a:ext cx="0" cy="0"/>
+          <a:chOff x="0" y="0"/>
+          <a:chExt cx="0" cy="0"/>
+        </a:xfrm>
+      </p:grpSpPr>
       <p:pic>
         <p:nvPicPr>
           <p:cNvPr id="1026" name="Picture 2" descr="armadillo"/>
@@ -7878,7 +8341,7 @@
           <a:p>
             <a:r>
               <a:rPr lang="en-US" dirty="0" smtClean="0"/>
-              <a:t>Several libraries</a:t>
+              <a:t>Several libraries, don't do your own!</a:t>
             </a:r>
           </a:p>
           <a:p>
@@ -8001,9 +8464,44 @@
           <a:p>
             <a:fld id="{9CEF4966-5219-4577-B301-14467D565841}" type="slidenum">
               <a:rPr lang="en-US" smtClean="0"/>
-              <a:t>7</a:t>
+              <a:t>8</a:t>
             </a:fld>
             <a:endParaRPr lang="en-US"/>
+          </a:p>
+        </p:txBody>
+      </p:sp>
+      <p:sp>
+        <p:nvSpPr>
+          <p:cNvPr id="5" name="TextBox 4"/>
+          <p:cNvSpPr txBox="1"/>
+          <p:nvPr/>
+        </p:nvSpPr>
+        <p:spPr>
+          <a:xfrm>
+            <a:off x="3667432" y="5653743"/>
+            <a:ext cx="4022640" cy="523220"/>
+          </a:xfrm>
+          <a:prstGeom prst="rect">
+            <a:avLst/>
+          </a:prstGeom>
+          <a:noFill/>
+          <a:ln>
+            <a:solidFill>
+              <a:schemeClr val="tx1"/>
+            </a:solidFill>
+          </a:ln>
+        </p:spPr>
+        <p:txBody>
+          <a:bodyPr wrap="none" rtlCol="0">
+            <a:spAutoFit/>
+          </a:bodyPr>
+          <a:lstStyle/>
+          <a:p>
+            <a:r>
+              <a:rPr lang="en-US" sz="2800" dirty="0" smtClean="0"/>
+              <a:t>Here: a flavor of Armadillo</a:t>
+            </a:r>
+            <a:endParaRPr lang="en-US" sz="2800" dirty="0"/>
           </a:p>
         </p:txBody>
       </p:sp>
@@ -8011,238 +8509,6 @@
     <p:extLst>
       <p:ext uri="{BB962C8B-B14F-4D97-AF65-F5344CB8AC3E}">
         <p14:creationId xmlns:p14="http://schemas.microsoft.com/office/powerpoint/2010/main" val="968117353"/>
-      </p:ext>
-    </p:extLst>
-  </p:cSld>
-  <p:clrMapOvr>
-    <a:masterClrMapping/>
-  </p:clrMapOvr>
-</p:sld>
-</file>
-
-<file path=ppt/slides/slide8.xml><?xml version="1.0" encoding="utf-8"?>
-<p:sld xmlns:a="http://schemas.openxmlformats.org/drawingml/2006/main" xmlns:r="http://schemas.openxmlformats.org/officeDocument/2006/relationships" xmlns:p="http://schemas.openxmlformats.org/presentationml/2006/main">
-  <p:cSld>
-    <p:spTree>
-      <p:nvGrpSpPr>
-        <p:cNvPr id="1" name=""/>
-        <p:cNvGrpSpPr/>
-        <p:nvPr/>
-      </p:nvGrpSpPr>
-      <p:grpSpPr>
-        <a:xfrm>
-          <a:off x="0" y="0"/>
-          <a:ext cx="0" cy="0"/>
-          <a:chOff x="0" y="0"/>
-          <a:chExt cx="0" cy="0"/>
-        </a:xfrm>
-      </p:grpSpPr>
-      <p:sp>
-        <p:nvSpPr>
-          <p:cNvPr id="2" name="Title 1"/>
-          <p:cNvSpPr>
-            <a:spLocks noGrp="1"/>
-          </p:cNvSpPr>
-          <p:nvPr>
-            <p:ph type="title"/>
-          </p:nvPr>
-        </p:nvSpPr>
-        <p:spPr/>
-        <p:txBody>
-          <a:bodyPr/>
-          <a:lstStyle/>
-          <a:p>
-            <a:r>
-              <a:rPr lang="en-US" dirty="0" smtClean="0"/>
-              <a:t>Ordinary differential equations</a:t>
-            </a:r>
-            <a:endParaRPr lang="en-US" dirty="0"/>
-          </a:p>
-        </p:txBody>
-      </p:sp>
-      <p:sp>
-        <p:nvSpPr>
-          <p:cNvPr id="3" name="Content Placeholder 2"/>
-          <p:cNvSpPr>
-            <a:spLocks noGrp="1"/>
-          </p:cNvSpPr>
-          <p:nvPr>
-            <p:ph idx="1"/>
-          </p:nvPr>
-        </p:nvSpPr>
-        <p:spPr/>
-        <p:txBody>
-          <a:bodyPr/>
-          <a:lstStyle/>
-          <a:p>
-            <a:r>
-              <a:rPr lang="en-US" dirty="0" smtClean="0"/>
-              <a:t>Straightforward: Boost</a:t>
-            </a:r>
-            <a:endParaRPr lang="en-US" dirty="0"/>
-          </a:p>
-        </p:txBody>
-      </p:sp>
-      <p:sp>
-        <p:nvSpPr>
-          <p:cNvPr id="4" name="Slide Number Placeholder 3"/>
-          <p:cNvSpPr>
-            <a:spLocks noGrp="1"/>
-          </p:cNvSpPr>
-          <p:nvPr>
-            <p:ph type="sldNum" sz="quarter" idx="12"/>
-          </p:nvPr>
-        </p:nvSpPr>
-        <p:spPr/>
-        <p:txBody>
-          <a:bodyPr/>
-          <a:lstStyle/>
-          <a:p>
-            <a:fld id="{9CEF4966-5219-4577-B301-14467D565841}" type="slidenum">
-              <a:rPr lang="en-US" smtClean="0"/>
-              <a:t>8</a:t>
-            </a:fld>
-            <a:endParaRPr lang="en-US"/>
-          </a:p>
-        </p:txBody>
-      </p:sp>
-    </p:spTree>
-    <p:extLst>
-      <p:ext uri="{BB962C8B-B14F-4D97-AF65-F5344CB8AC3E}">
-        <p14:creationId xmlns:p14="http://schemas.microsoft.com/office/powerpoint/2010/main" val="3264396598"/>
-      </p:ext>
-    </p:extLst>
-  </p:cSld>
-  <p:clrMapOvr>
-    <a:masterClrMapping/>
-  </p:clrMapOvr>
-</p:sld>
-</file>
-
-<file path=ppt/slides/slide9.xml><?xml version="1.0" encoding="utf-8"?>
-<p:sld xmlns:a="http://schemas.openxmlformats.org/drawingml/2006/main" xmlns:r="http://schemas.openxmlformats.org/officeDocument/2006/relationships" xmlns:p="http://schemas.openxmlformats.org/presentationml/2006/main">
-  <p:cSld>
-    <p:spTree>
-      <p:nvGrpSpPr>
-        <p:cNvPr id="1" name=""/>
-        <p:cNvGrpSpPr/>
-        <p:nvPr/>
-      </p:nvGrpSpPr>
-      <p:grpSpPr>
-        <a:xfrm>
-          <a:off x="0" y="0"/>
-          <a:ext cx="0" cy="0"/>
-          <a:chOff x="0" y="0"/>
-          <a:chExt cx="0" cy="0"/>
-        </a:xfrm>
-      </p:grpSpPr>
-      <p:sp>
-        <p:nvSpPr>
-          <p:cNvPr id="2" name="Title 1"/>
-          <p:cNvSpPr>
-            <a:spLocks noGrp="1"/>
-          </p:cNvSpPr>
-          <p:nvPr>
-            <p:ph type="title"/>
-          </p:nvPr>
-        </p:nvSpPr>
-        <p:spPr/>
-        <p:txBody>
-          <a:bodyPr/>
-          <a:lstStyle/>
-          <a:p>
-            <a:r>
-              <a:rPr lang="en-US" dirty="0" smtClean="0"/>
-              <a:t>What was left out/added?</a:t>
-            </a:r>
-            <a:endParaRPr lang="en-US" dirty="0"/>
-          </a:p>
-        </p:txBody>
-      </p:sp>
-      <p:sp>
-        <p:nvSpPr>
-          <p:cNvPr id="4" name="Content Placeholder 3"/>
-          <p:cNvSpPr>
-            <a:spLocks noGrp="1"/>
-          </p:cNvSpPr>
-          <p:nvPr>
-            <p:ph idx="1"/>
-          </p:nvPr>
-        </p:nvSpPr>
-        <p:spPr/>
-        <p:txBody>
-          <a:bodyPr/>
-          <a:lstStyle/>
-          <a:p>
-            <a:r>
-              <a:rPr lang="en-US" dirty="0" smtClean="0"/>
-              <a:t>Left out</a:t>
-            </a:r>
-          </a:p>
-          <a:p>
-            <a:pPr lvl="1"/>
-            <a:r>
-              <a:rPr lang="en-US" dirty="0" smtClean="0"/>
-              <a:t>Value arrays, see section on containers</a:t>
-            </a:r>
-          </a:p>
-          <a:p>
-            <a:r>
-              <a:rPr lang="en-US" dirty="0" smtClean="0"/>
-              <a:t>Added</a:t>
-            </a:r>
-          </a:p>
-          <a:p>
-            <a:pPr lvl="1"/>
-            <a:r>
-              <a:rPr lang="en-US" dirty="0" smtClean="0"/>
-              <a:t>ODEs with Boost</a:t>
-            </a:r>
-          </a:p>
-          <a:p>
-            <a:pPr lvl="1"/>
-            <a:r>
-              <a:rPr lang="en-US" dirty="0" smtClean="0"/>
-              <a:t>Linear algebra with Armadillo</a:t>
-            </a:r>
-            <a:endParaRPr lang="en-US" dirty="0"/>
-          </a:p>
-          <a:p>
-            <a:pPr lvl="1"/>
-            <a:endParaRPr lang="en-US" dirty="0" smtClean="0"/>
-          </a:p>
-          <a:p>
-            <a:endParaRPr lang="en-US" dirty="0"/>
-          </a:p>
-        </p:txBody>
-      </p:sp>
-      <p:sp>
-        <p:nvSpPr>
-          <p:cNvPr id="3" name="Slide Number Placeholder 2"/>
-          <p:cNvSpPr>
-            <a:spLocks noGrp="1"/>
-          </p:cNvSpPr>
-          <p:nvPr>
-            <p:ph type="sldNum" sz="quarter" idx="12"/>
-          </p:nvPr>
-        </p:nvSpPr>
-        <p:spPr/>
-        <p:txBody>
-          <a:bodyPr/>
-          <a:lstStyle/>
-          <a:p>
-            <a:fld id="{9CEF4966-5219-4577-B301-14467D565841}" type="slidenum">
-              <a:rPr lang="en-US" smtClean="0"/>
-              <a:t>9</a:t>
-            </a:fld>
-            <a:endParaRPr lang="en-US"/>
-          </a:p>
-        </p:txBody>
-      </p:sp>
-    </p:spTree>
-    <p:extLst>
-      <p:ext uri="{BB962C8B-B14F-4D97-AF65-F5344CB8AC3E}">
-        <p14:creationId xmlns:p14="http://schemas.microsoft.com/office/powerpoint/2010/main" val="3454245368"/>
       </p:ext>
     </p:extLst>
   </p:cSld>
@@ -8303,15 +8569,33 @@
                                   </p:childTnLst>
                                 </p:cTn>
                               </p:par>
+                            </p:childTnLst>
+                          </p:cTn>
+                        </p:par>
+                      </p:childTnLst>
+                    </p:cTn>
+                  </p:par>
+                  <p:par>
+                    <p:cTn id="7" fill="hold">
+                      <p:stCondLst>
+                        <p:cond delay="indefinite"/>
+                      </p:stCondLst>
+                      <p:childTnLst>
+                        <p:par>
+                          <p:cTn id="8" fill="hold">
+                            <p:stCondLst>
+                              <p:cond delay="0"/>
+                            </p:stCondLst>
+                            <p:childTnLst>
                               <p:par>
-                                <p:cTn id="7" presetID="1" presetClass="entr" presetSubtype="0" fill="hold" grpId="0" nodeType="withEffect">
+                                <p:cTn id="9" presetID="1" presetClass="entr" presetSubtype="0" fill="hold" grpId="0" nodeType="clickEffect">
                                   <p:stCondLst>
                                     <p:cond delay="0"/>
                                   </p:stCondLst>
                                   <p:childTnLst>
                                     <p:set>
                                       <p:cBhvr>
-                                        <p:cTn id="8" dur="1" fill="hold">
+                                        <p:cTn id="10" dur="1" fill="hold">
                                           <p:stCondLst>
                                             <p:cond delay="0"/>
                                           </p:stCondLst>
@@ -8334,26 +8618,8 @@
                                   </p:childTnLst>
                                 </p:cTn>
                               </p:par>
-                            </p:childTnLst>
-                          </p:cTn>
-                        </p:par>
-                      </p:childTnLst>
-                    </p:cTn>
-                  </p:par>
-                  <p:par>
-                    <p:cTn id="9" fill="hold">
-                      <p:stCondLst>
-                        <p:cond delay="indefinite"/>
-                      </p:stCondLst>
-                      <p:childTnLst>
-                        <p:par>
-                          <p:cTn id="10" fill="hold">
-                            <p:stCondLst>
-                              <p:cond delay="0"/>
-                            </p:stCondLst>
-                            <p:childTnLst>
                               <p:par>
-                                <p:cTn id="11" presetID="1" presetClass="entr" presetSubtype="0" fill="hold" grpId="0" nodeType="clickEffect">
+                                <p:cTn id="11" presetID="1" presetClass="entr" presetSubtype="0" fill="hold" grpId="0" nodeType="withEffect">
                                   <p:stCondLst>
                                     <p:cond delay="0"/>
                                   </p:stCondLst>
@@ -8414,15 +8680,33 @@
                                   </p:childTnLst>
                                 </p:cTn>
                               </p:par>
+                            </p:childTnLst>
+                          </p:cTn>
+                        </p:par>
+                      </p:childTnLst>
+                    </p:cTn>
+                  </p:par>
+                  <p:par>
+                    <p:cTn id="15" fill="hold">
+                      <p:stCondLst>
+                        <p:cond delay="indefinite"/>
+                      </p:stCondLst>
+                      <p:childTnLst>
+                        <p:par>
+                          <p:cTn id="16" fill="hold">
+                            <p:stCondLst>
+                              <p:cond delay="0"/>
+                            </p:stCondLst>
+                            <p:childTnLst>
                               <p:par>
-                                <p:cTn id="15" presetID="1" presetClass="entr" presetSubtype="0" fill="hold" grpId="0" nodeType="withEffect">
+                                <p:cTn id="17" presetID="1" presetClass="entr" presetSubtype="0" fill="hold" grpId="0" nodeType="clickEffect">
                                   <p:stCondLst>
                                     <p:cond delay="0"/>
                                   </p:stCondLst>
                                   <p:childTnLst>
                                     <p:set>
                                       <p:cBhvr>
-                                        <p:cTn id="16" dur="1" fill="hold">
+                                        <p:cTn id="18" dur="1" fill="hold">
                                           <p:stCondLst>
                                             <p:cond delay="0"/>
                                           </p:stCondLst>
@@ -8433,6 +8717,251 @@
                                               <p:pRg st="4" end="4"/>
                                             </p:txEl>
                                           </p:spTgt>
+                                        </p:tgtEl>
+                                        <p:attrNameLst>
+                                          <p:attrName>style.visibility</p:attrName>
+                                        </p:attrNameLst>
+                                      </p:cBhvr>
+                                      <p:to>
+                                        <p:strVal val="visible"/>
+                                      </p:to>
+                                    </p:set>
+                                  </p:childTnLst>
+                                </p:cTn>
+                              </p:par>
+                              <p:par>
+                                <p:cTn id="19" presetID="1" presetClass="entr" presetSubtype="0" fill="hold" grpId="0" nodeType="withEffect">
+                                  <p:stCondLst>
+                                    <p:cond delay="0"/>
+                                  </p:stCondLst>
+                                  <p:childTnLst>
+                                    <p:set>
+                                      <p:cBhvr>
+                                        <p:cTn id="20" dur="1" fill="hold">
+                                          <p:stCondLst>
+                                            <p:cond delay="0"/>
+                                          </p:stCondLst>
+                                        </p:cTn>
+                                        <p:tgtEl>
+                                          <p:spTgt spid="4">
+                                            <p:txEl>
+                                              <p:pRg st="5" end="5"/>
+                                            </p:txEl>
+                                          </p:spTgt>
+                                        </p:tgtEl>
+                                        <p:attrNameLst>
+                                          <p:attrName>style.visibility</p:attrName>
+                                        </p:attrNameLst>
+                                      </p:cBhvr>
+                                      <p:to>
+                                        <p:strVal val="visible"/>
+                                      </p:to>
+                                    </p:set>
+                                  </p:childTnLst>
+                                </p:cTn>
+                              </p:par>
+                              <p:par>
+                                <p:cTn id="21" presetID="1" presetClass="entr" presetSubtype="0" fill="hold" grpId="0" nodeType="withEffect">
+                                  <p:stCondLst>
+                                    <p:cond delay="0"/>
+                                  </p:stCondLst>
+                                  <p:childTnLst>
+                                    <p:set>
+                                      <p:cBhvr>
+                                        <p:cTn id="22" dur="1" fill="hold">
+                                          <p:stCondLst>
+                                            <p:cond delay="0"/>
+                                          </p:stCondLst>
+                                        </p:cTn>
+                                        <p:tgtEl>
+                                          <p:spTgt spid="4">
+                                            <p:txEl>
+                                              <p:pRg st="6" end="6"/>
+                                            </p:txEl>
+                                          </p:spTgt>
+                                        </p:tgtEl>
+                                        <p:attrNameLst>
+                                          <p:attrName>style.visibility</p:attrName>
+                                        </p:attrNameLst>
+                                      </p:cBhvr>
+                                      <p:to>
+                                        <p:strVal val="visible"/>
+                                      </p:to>
+                                    </p:set>
+                                  </p:childTnLst>
+                                </p:cTn>
+                              </p:par>
+                              <p:par>
+                                <p:cTn id="23" presetID="1" presetClass="entr" presetSubtype="0" fill="hold" grpId="0" nodeType="withEffect">
+                                  <p:stCondLst>
+                                    <p:cond delay="0"/>
+                                  </p:stCondLst>
+                                  <p:childTnLst>
+                                    <p:set>
+                                      <p:cBhvr>
+                                        <p:cTn id="24" dur="1" fill="hold">
+                                          <p:stCondLst>
+                                            <p:cond delay="0"/>
+                                          </p:stCondLst>
+                                        </p:cTn>
+                                        <p:tgtEl>
+                                          <p:spTgt spid="4">
+                                            <p:txEl>
+                                              <p:pRg st="7" end="7"/>
+                                            </p:txEl>
+                                          </p:spTgt>
+                                        </p:tgtEl>
+                                        <p:attrNameLst>
+                                          <p:attrName>style.visibility</p:attrName>
+                                        </p:attrNameLst>
+                                      </p:cBhvr>
+                                      <p:to>
+                                        <p:strVal val="visible"/>
+                                      </p:to>
+                                    </p:set>
+                                  </p:childTnLst>
+                                </p:cTn>
+                              </p:par>
+                              <p:par>
+                                <p:cTn id="25" presetID="1" presetClass="entr" presetSubtype="0" fill="hold" grpId="0" nodeType="withEffect">
+                                  <p:stCondLst>
+                                    <p:cond delay="0"/>
+                                  </p:stCondLst>
+                                  <p:childTnLst>
+                                    <p:set>
+                                      <p:cBhvr>
+                                        <p:cTn id="26" dur="1" fill="hold">
+                                          <p:stCondLst>
+                                            <p:cond delay="0"/>
+                                          </p:stCondLst>
+                                        </p:cTn>
+                                        <p:tgtEl>
+                                          <p:spTgt spid="4">
+                                            <p:txEl>
+                                              <p:pRg st="8" end="8"/>
+                                            </p:txEl>
+                                          </p:spTgt>
+                                        </p:tgtEl>
+                                        <p:attrNameLst>
+                                          <p:attrName>style.visibility</p:attrName>
+                                        </p:attrNameLst>
+                                      </p:cBhvr>
+                                      <p:to>
+                                        <p:strVal val="visible"/>
+                                      </p:to>
+                                    </p:set>
+                                  </p:childTnLst>
+                                </p:cTn>
+                              </p:par>
+                            </p:childTnLst>
+                          </p:cTn>
+                        </p:par>
+                      </p:childTnLst>
+                    </p:cTn>
+                  </p:par>
+                  <p:par>
+                    <p:cTn id="27" fill="hold">
+                      <p:stCondLst>
+                        <p:cond delay="indefinite"/>
+                      </p:stCondLst>
+                      <p:childTnLst>
+                        <p:par>
+                          <p:cTn id="28" fill="hold">
+                            <p:stCondLst>
+                              <p:cond delay="0"/>
+                            </p:stCondLst>
+                            <p:childTnLst>
+                              <p:par>
+                                <p:cTn id="29" presetID="1" presetClass="entr" presetSubtype="0" fill="hold" grpId="0" nodeType="clickEffect">
+                                  <p:stCondLst>
+                                    <p:cond delay="0"/>
+                                  </p:stCondLst>
+                                  <p:childTnLst>
+                                    <p:set>
+                                      <p:cBhvr>
+                                        <p:cTn id="30" dur="1" fill="hold">
+                                          <p:stCondLst>
+                                            <p:cond delay="0"/>
+                                          </p:stCondLst>
+                                        </p:cTn>
+                                        <p:tgtEl>
+                                          <p:spTgt spid="4">
+                                            <p:txEl>
+                                              <p:pRg st="9" end="9"/>
+                                            </p:txEl>
+                                          </p:spTgt>
+                                        </p:tgtEl>
+                                        <p:attrNameLst>
+                                          <p:attrName>style.visibility</p:attrName>
+                                        </p:attrNameLst>
+                                      </p:cBhvr>
+                                      <p:to>
+                                        <p:strVal val="visible"/>
+                                      </p:to>
+                                    </p:set>
+                                  </p:childTnLst>
+                                </p:cTn>
+                              </p:par>
+                            </p:childTnLst>
+                          </p:cTn>
+                        </p:par>
+                      </p:childTnLst>
+                    </p:cTn>
+                  </p:par>
+                  <p:par>
+                    <p:cTn id="31" fill="hold">
+                      <p:stCondLst>
+                        <p:cond delay="indefinite"/>
+                      </p:stCondLst>
+                      <p:childTnLst>
+                        <p:par>
+                          <p:cTn id="32" fill="hold">
+                            <p:stCondLst>
+                              <p:cond delay="0"/>
+                            </p:stCondLst>
+                            <p:childTnLst>
+                              <p:par>
+                                <p:cTn id="33" presetID="1" presetClass="entr" presetSubtype="0" fill="hold" nodeType="clickEffect">
+                                  <p:stCondLst>
+                                    <p:cond delay="0"/>
+                                  </p:stCondLst>
+                                  <p:childTnLst>
+                                    <p:set>
+                                      <p:cBhvr>
+                                        <p:cTn id="34" dur="1" fill="hold">
+                                          <p:stCondLst>
+                                            <p:cond delay="0"/>
+                                          </p:stCondLst>
+                                        </p:cTn>
+                                        <p:tgtEl>
+                                          <p:spTgt spid="1026"/>
+                                        </p:tgtEl>
+                                        <p:attrNameLst>
+                                          <p:attrName>style.visibility</p:attrName>
+                                        </p:attrNameLst>
+                                      </p:cBhvr>
+                                      <p:to>
+                                        <p:strVal val="visible"/>
+                                      </p:to>
+                                    </p:set>
+                                  </p:childTnLst>
+                                </p:cTn>
+                              </p:par>
+                              <p:par>
+                                <p:cTn id="35" presetID="1" presetClass="entr" presetSubtype="0" fill="hold" grpId="0" nodeType="withEffect">
+                                  <p:stCondLst>
+                                    <p:cond delay="0"/>
+                                  </p:stCondLst>
+                                  <p:childTnLst>
+                                    <p:set>
+                                      <p:cBhvr>
+                                        <p:cTn id="36" dur="1" fill="hold">
+                                          <p:stCondLst>
+                                            <p:cond delay="0"/>
+                                          </p:stCondLst>
+                                        </p:cTn>
+                                        <p:tgtEl>
+                                          <p:spTgt spid="5"/>
                                         </p:tgtEl>
                                         <p:attrNameLst>
                                           <p:attrName>style.visibility</p:attrName>
@@ -8473,8 +9002,119 @@
       </p:par>
     </p:tnLst>
     <p:bldLst>
-      <p:bldP spid="4" grpId="0" uiExpand="1" build="p"/>
+      <p:bldP spid="4" grpId="0" uiExpand="1" build="p" bldLvl="2"/>
+      <p:bldP spid="5" grpId="0" animBg="1"/>
     </p:bldLst>
+  </p:timing>
+</p:sld>
+</file>
+
+<file path=ppt/slides/slide9.xml><?xml version="1.0" encoding="utf-8"?>
+<p:sld xmlns:a="http://schemas.openxmlformats.org/drawingml/2006/main" xmlns:r="http://schemas.openxmlformats.org/officeDocument/2006/relationships" xmlns:p="http://schemas.openxmlformats.org/presentationml/2006/main">
+  <p:cSld>
+    <p:spTree>
+      <p:nvGrpSpPr>
+        <p:cNvPr id="1" name=""/>
+        <p:cNvGrpSpPr/>
+        <p:nvPr/>
+      </p:nvGrpSpPr>
+      <p:grpSpPr>
+        <a:xfrm>
+          <a:off x="0" y="0"/>
+          <a:ext cx="0" cy="0"/>
+          <a:chOff x="0" y="0"/>
+          <a:chExt cx="0" cy="0"/>
+        </a:xfrm>
+      </p:grpSpPr>
+      <p:sp>
+        <p:nvSpPr>
+          <p:cNvPr id="2" name="Title 1"/>
+          <p:cNvSpPr>
+            <a:spLocks noGrp="1"/>
+          </p:cNvSpPr>
+          <p:nvPr>
+            <p:ph type="title"/>
+          </p:nvPr>
+        </p:nvSpPr>
+        <p:spPr/>
+        <p:txBody>
+          <a:bodyPr/>
+          <a:lstStyle/>
+          <a:p>
+            <a:r>
+              <a:rPr lang="en-US" dirty="0" smtClean="0"/>
+              <a:t>Ordinary differential equations</a:t>
+            </a:r>
+            <a:endParaRPr lang="en-US" dirty="0"/>
+          </a:p>
+        </p:txBody>
+      </p:sp>
+      <p:sp>
+        <p:nvSpPr>
+          <p:cNvPr id="3" name="Content Placeholder 2"/>
+          <p:cNvSpPr>
+            <a:spLocks noGrp="1"/>
+          </p:cNvSpPr>
+          <p:nvPr>
+            <p:ph idx="1"/>
+          </p:nvPr>
+        </p:nvSpPr>
+        <p:spPr/>
+        <p:txBody>
+          <a:bodyPr/>
+          <a:lstStyle/>
+          <a:p>
+            <a:r>
+              <a:rPr lang="en-US" dirty="0" smtClean="0"/>
+              <a:t>Straightforward: Boost::</a:t>
+            </a:r>
+            <a:r>
+              <a:rPr lang="en-US" dirty="0" err="1" smtClean="0"/>
+              <a:t>odeint</a:t>
+            </a:r>
+            <a:endParaRPr lang="en-US" dirty="0"/>
+          </a:p>
+        </p:txBody>
+      </p:sp>
+      <p:sp>
+        <p:nvSpPr>
+          <p:cNvPr id="4" name="Slide Number Placeholder 3"/>
+          <p:cNvSpPr>
+            <a:spLocks noGrp="1"/>
+          </p:cNvSpPr>
+          <p:nvPr>
+            <p:ph type="sldNum" sz="quarter" idx="12"/>
+          </p:nvPr>
+        </p:nvSpPr>
+        <p:spPr/>
+        <p:txBody>
+          <a:bodyPr/>
+          <a:lstStyle/>
+          <a:p>
+            <a:fld id="{9CEF4966-5219-4577-B301-14467D565841}" type="slidenum">
+              <a:rPr lang="en-US" smtClean="0"/>
+              <a:t>9</a:t>
+            </a:fld>
+            <a:endParaRPr lang="en-US"/>
+          </a:p>
+        </p:txBody>
+      </p:sp>
+    </p:spTree>
+    <p:extLst>
+      <p:ext uri="{BB962C8B-B14F-4D97-AF65-F5344CB8AC3E}">
+        <p14:creationId xmlns:p14="http://schemas.microsoft.com/office/powerpoint/2010/main" val="3264396598"/>
+      </p:ext>
+    </p:extLst>
+  </p:cSld>
+  <p:clrMapOvr>
+    <a:masterClrMapping/>
+  </p:clrMapOvr>
+  <p:timing>
+    <p:tnLst>
+      <p:par>
+        <p:cTn id="1" dur="indefinite" restart="never" nodeType="tmRoot"/>
+      </p:par>
+    </p:tnLst>
   </p:timing>
 </p:sld>
 </file>

</xml_diff>

<commit_message>
Added slides on random number generation
</commit_message>
<xml_diff>
--- a/CPlusPlus/12_essential_cpp_numerics.pptx
+++ b/CPlusPlus/12_essential_cpp_numerics.pptx
@@ -5,7 +5,7 @@
     <p:sldMasterId id="2147483660" r:id="rId1"/>
   </p:sldMasterIdLst>
   <p:notesMasterIdLst>
-    <p:notesMasterId r:id="rId12"/>
+    <p:notesMasterId r:id="rId15"/>
   </p:notesMasterIdLst>
   <p:sldIdLst>
     <p:sldId id="257" r:id="rId2"/>
@@ -15,9 +15,12 @@
     <p:sldId id="264" r:id="rId6"/>
     <p:sldId id="265" r:id="rId7"/>
     <p:sldId id="266" r:id="rId8"/>
-    <p:sldId id="262" r:id="rId9"/>
-    <p:sldId id="263" r:id="rId10"/>
-    <p:sldId id="260" r:id="rId11"/>
+    <p:sldId id="267" r:id="rId9"/>
+    <p:sldId id="268" r:id="rId10"/>
+    <p:sldId id="269" r:id="rId11"/>
+    <p:sldId id="262" r:id="rId12"/>
+    <p:sldId id="263" r:id="rId13"/>
+    <p:sldId id="260" r:id="rId14"/>
   </p:sldIdLst>
   <p:sldSz cx="9144000" cy="6858000" type="screen4x3"/>
   <p:notesSz cx="6858000" cy="9144000"/>
@@ -3530,7 +3533,7 @@
           <a:p>
             <a:r>
               <a:rPr lang="en-US" dirty="0" smtClean="0"/>
-              <a:t>What was left out/added?</a:t>
+              <a:t>Multiple distributions</a:t>
             </a:r>
             <a:endParaRPr lang="en-US" dirty="0"/>
           </a:p>
@@ -3552,43 +3555,16 @@
           <a:lstStyle/>
           <a:p>
             <a:r>
+              <a:rPr lang="en-US" dirty="0" smtClean="0">
+                <a:latin typeface="Courier New" panose="02070309020205020404" pitchFamily="49" charset="0"/>
+                <a:cs typeface="Courier New" panose="02070309020205020404" pitchFamily="49" charset="0"/>
+              </a:rPr>
+              <a:t>bind</a:t>
+            </a:r>
+            <a:r>
               <a:rPr lang="en-US" dirty="0" smtClean="0"/>
-              <a:t>Left out</a:t>
-            </a:r>
-          </a:p>
-          <a:p>
-            <a:pPr lvl="1"/>
-            <a:r>
-              <a:rPr lang="en-US" dirty="0" smtClean="0"/>
-              <a:t>Value arrays, see section on containers</a:t>
-            </a:r>
-          </a:p>
-          <a:p>
-            <a:r>
-              <a:rPr lang="en-US" dirty="0" smtClean="0"/>
-              <a:t>Added</a:t>
-            </a:r>
-          </a:p>
-          <a:p>
-            <a:pPr lvl="1"/>
-            <a:r>
-              <a:rPr lang="en-US" dirty="0" smtClean="0"/>
-              <a:t>ODEs with Boost</a:t>
-            </a:r>
-          </a:p>
-          <a:p>
-            <a:pPr lvl="1"/>
-            <a:r>
-              <a:rPr lang="en-US" dirty="0" smtClean="0"/>
-              <a:t>Linear algebra with Armadillo</a:t>
-            </a:r>
-            <a:endParaRPr lang="en-US" dirty="0"/>
-          </a:p>
-          <a:p>
-            <a:pPr lvl="1"/>
-            <a:endParaRPr lang="en-US" dirty="0" smtClean="0"/>
-          </a:p>
-          <a:p>
+              <a:t> binds by value, i.e., copies, unless wrapped</a:t>
+            </a:r>
             <a:endParaRPr lang="en-US" dirty="0"/>
           </a:p>
         </p:txBody>
@@ -3611,6 +3587,1515 @@
             <a:fld id="{9CEF4966-5219-4577-B301-14467D565841}" type="slidenum">
               <a:rPr lang="en-US" smtClean="0"/>
               <a:t>10</a:t>
+            </a:fld>
+            <a:endParaRPr lang="en-US"/>
+          </a:p>
+        </p:txBody>
+      </p:sp>
+      <p:sp>
+        <p:nvSpPr>
+          <p:cNvPr id="6" name="TextBox 5"/>
+          <p:cNvSpPr txBox="1"/>
+          <p:nvPr/>
+        </p:nvSpPr>
+        <p:spPr>
+          <a:xfrm>
+            <a:off x="714683" y="2430074"/>
+            <a:ext cx="7367435" cy="2554545"/>
+          </a:xfrm>
+          <a:prstGeom prst="rect">
+            <a:avLst/>
+          </a:prstGeom>
+          <a:solidFill>
+            <a:schemeClr val="bg1">
+              <a:lumMod val="75000"/>
+            </a:schemeClr>
+          </a:solidFill>
+          <a:ln>
+            <a:noFill/>
+          </a:ln>
+        </p:spPr>
+        <p:txBody>
+          <a:bodyPr wrap="square" rtlCol="0">
+            <a:spAutoFit/>
+          </a:bodyPr>
+          <a:lstStyle/>
+          <a:p>
+            <a:r>
+              <a:rPr lang="en-US" sz="1600" dirty="0">
+                <a:latin typeface="Courier New" pitchFamily="49" charset="0"/>
+                <a:cs typeface="Courier New" pitchFamily="49" charset="0"/>
+              </a:rPr>
+              <a:t>#include &lt;functional&gt;</a:t>
+            </a:r>
+          </a:p>
+          <a:p>
+            <a:r>
+              <a:rPr lang="en-US" sz="1600" dirty="0" smtClean="0">
+                <a:latin typeface="Courier New" pitchFamily="49" charset="0"/>
+                <a:cs typeface="Courier New" pitchFamily="49" charset="0"/>
+              </a:rPr>
+              <a:t>#</a:t>
+            </a:r>
+            <a:r>
+              <a:rPr lang="en-US" sz="1600" dirty="0">
+                <a:latin typeface="Courier New" pitchFamily="49" charset="0"/>
+                <a:cs typeface="Courier New" pitchFamily="49" charset="0"/>
+              </a:rPr>
+              <a:t>include &lt;random&gt;</a:t>
+            </a:r>
+          </a:p>
+          <a:p>
+            <a:r>
+              <a:rPr lang="en-US" sz="1600" dirty="0" smtClean="0">
+                <a:latin typeface="Courier New" pitchFamily="49" charset="0"/>
+                <a:cs typeface="Courier New" pitchFamily="49" charset="0"/>
+              </a:rPr>
+              <a:t>…</a:t>
+            </a:r>
+            <a:endParaRPr lang="en-US" sz="1600" dirty="0">
+              <a:latin typeface="Courier New" pitchFamily="49" charset="0"/>
+              <a:cs typeface="Courier New" pitchFamily="49" charset="0"/>
+            </a:endParaRPr>
+          </a:p>
+          <a:p>
+            <a:r>
+              <a:rPr lang="en-US" sz="1600" dirty="0" smtClean="0">
+                <a:latin typeface="Courier New" pitchFamily="49" charset="0"/>
+                <a:cs typeface="Courier New" pitchFamily="49" charset="0"/>
+              </a:rPr>
+              <a:t>using </a:t>
+            </a:r>
+            <a:r>
+              <a:rPr lang="en-US" sz="1600" dirty="0" err="1">
+                <a:latin typeface="Courier New" pitchFamily="49" charset="0"/>
+                <a:cs typeface="Courier New" pitchFamily="49" charset="0"/>
+              </a:rPr>
+              <a:t>seed_dist_t</a:t>
+            </a:r>
+            <a:r>
+              <a:rPr lang="en-US" sz="1600" dirty="0">
+                <a:latin typeface="Courier New" pitchFamily="49" charset="0"/>
+                <a:cs typeface="Courier New" pitchFamily="49" charset="0"/>
+              </a:rPr>
+              <a:t> = </a:t>
+            </a:r>
+            <a:r>
+              <a:rPr lang="en-US" sz="1600" dirty="0" err="1">
+                <a:latin typeface="Courier New" pitchFamily="49" charset="0"/>
+                <a:cs typeface="Courier New" pitchFamily="49" charset="0"/>
+              </a:rPr>
+              <a:t>uniform_int_distribution</a:t>
+            </a:r>
+            <a:r>
+              <a:rPr lang="en-US" sz="1600" dirty="0">
+                <a:latin typeface="Courier New" pitchFamily="49" charset="0"/>
+                <a:cs typeface="Courier New" pitchFamily="49" charset="0"/>
+              </a:rPr>
+              <a:t>&lt;</a:t>
+            </a:r>
+            <a:r>
+              <a:rPr lang="en-US" sz="1600" dirty="0" err="1">
+                <a:latin typeface="Courier New" pitchFamily="49" charset="0"/>
+                <a:cs typeface="Courier New" pitchFamily="49" charset="0"/>
+              </a:rPr>
+              <a:t>size_t</a:t>
+            </a:r>
+            <a:r>
+              <a:rPr lang="en-US" sz="1600" dirty="0">
+                <a:latin typeface="Courier New" pitchFamily="49" charset="0"/>
+                <a:cs typeface="Courier New" pitchFamily="49" charset="0"/>
+              </a:rPr>
+              <a:t>&gt;;</a:t>
+            </a:r>
+          </a:p>
+          <a:p>
+            <a:r>
+              <a:rPr lang="en-US" sz="1600" dirty="0" smtClean="0">
+                <a:latin typeface="Courier New" pitchFamily="49" charset="0"/>
+                <a:cs typeface="Courier New" pitchFamily="49" charset="0"/>
+              </a:rPr>
+              <a:t>…</a:t>
+            </a:r>
+            <a:endParaRPr lang="en-US" sz="1600" dirty="0">
+              <a:latin typeface="Courier New" pitchFamily="49" charset="0"/>
+              <a:cs typeface="Courier New" pitchFamily="49" charset="0"/>
+            </a:endParaRPr>
+          </a:p>
+          <a:p>
+            <a:r>
+              <a:rPr lang="en-US" sz="1600" dirty="0" smtClean="0">
+                <a:latin typeface="Courier New" pitchFamily="49" charset="0"/>
+                <a:cs typeface="Courier New" pitchFamily="49" charset="0"/>
+              </a:rPr>
+              <a:t>mt19937_64 </a:t>
+            </a:r>
+            <a:r>
+              <a:rPr lang="en-US" sz="1600" dirty="0">
+                <a:latin typeface="Courier New" pitchFamily="49" charset="0"/>
+                <a:cs typeface="Courier New" pitchFamily="49" charset="0"/>
+              </a:rPr>
+              <a:t>engine(seed);</a:t>
+            </a:r>
+          </a:p>
+          <a:p>
+            <a:r>
+              <a:rPr lang="en-US" sz="1600" dirty="0" smtClean="0">
+                <a:latin typeface="Courier New" pitchFamily="49" charset="0"/>
+                <a:cs typeface="Courier New" pitchFamily="49" charset="0"/>
+              </a:rPr>
+              <a:t>auto </a:t>
+            </a:r>
+            <a:r>
+              <a:rPr lang="en-US" sz="1600" dirty="0" err="1" smtClean="0">
+                <a:latin typeface="Courier New" pitchFamily="49" charset="0"/>
+                <a:cs typeface="Courier New" pitchFamily="49" charset="0"/>
+              </a:rPr>
+              <a:t>x_distr</a:t>
+            </a:r>
+            <a:r>
+              <a:rPr lang="en-US" sz="1600" dirty="0" smtClean="0">
+                <a:latin typeface="Courier New" pitchFamily="49" charset="0"/>
+                <a:cs typeface="Courier New" pitchFamily="49" charset="0"/>
+              </a:rPr>
+              <a:t> </a:t>
+            </a:r>
+            <a:r>
+              <a:rPr lang="en-US" sz="1600" dirty="0">
+                <a:latin typeface="Courier New" pitchFamily="49" charset="0"/>
+                <a:cs typeface="Courier New" pitchFamily="49" charset="0"/>
+              </a:rPr>
+              <a:t>= </a:t>
+            </a:r>
+            <a:r>
+              <a:rPr lang="en-US" sz="1600" dirty="0" smtClean="0">
+                <a:latin typeface="Courier New" pitchFamily="49" charset="0"/>
+                <a:cs typeface="Courier New" pitchFamily="49" charset="0"/>
+              </a:rPr>
+              <a:t>bind(</a:t>
+            </a:r>
+            <a:r>
+              <a:rPr lang="en-US" sz="1600" dirty="0" err="1" smtClean="0">
+                <a:latin typeface="Courier New" pitchFamily="49" charset="0"/>
+                <a:cs typeface="Courier New" pitchFamily="49" charset="0"/>
+              </a:rPr>
+              <a:t>normal_distribution</a:t>
+            </a:r>
+            <a:r>
+              <a:rPr lang="en-US" sz="1600" dirty="0" smtClean="0">
+                <a:latin typeface="Courier New" pitchFamily="49" charset="0"/>
+                <a:cs typeface="Courier New" pitchFamily="49" charset="0"/>
+              </a:rPr>
+              <a:t>&lt;</a:t>
+            </a:r>
+            <a:r>
+              <a:rPr lang="en-US" sz="1600" dirty="0" err="1" smtClean="0">
+                <a:latin typeface="Courier New" pitchFamily="49" charset="0"/>
+                <a:cs typeface="Courier New" pitchFamily="49" charset="0"/>
+              </a:rPr>
+              <a:t>int</a:t>
+            </a:r>
+            <a:r>
+              <a:rPr lang="en-US" sz="1600" dirty="0" smtClean="0">
+                <a:latin typeface="Courier New" pitchFamily="49" charset="0"/>
+                <a:cs typeface="Courier New" pitchFamily="49" charset="0"/>
+              </a:rPr>
+              <a:t>&gt;(0.0, 1.0),                  </a:t>
+            </a:r>
+            <a:br>
+              <a:rPr lang="en-US" sz="1600" dirty="0" smtClean="0">
+                <a:latin typeface="Courier New" pitchFamily="49" charset="0"/>
+                <a:cs typeface="Courier New" pitchFamily="49" charset="0"/>
+              </a:rPr>
+            </a:br>
+            <a:r>
+              <a:rPr lang="en-US" sz="1600" dirty="0" smtClean="0">
+                <a:latin typeface="Courier New" pitchFamily="49" charset="0"/>
+                <a:cs typeface="Courier New" pitchFamily="49" charset="0"/>
+              </a:rPr>
+              <a:t>                    </a:t>
+            </a:r>
+            <a:r>
+              <a:rPr lang="en-US" sz="1600" b="1" dirty="0" smtClean="0">
+                <a:solidFill>
+                  <a:srgbClr val="C00000"/>
+                </a:solidFill>
+                <a:latin typeface="Courier New" pitchFamily="49" charset="0"/>
+                <a:cs typeface="Courier New" pitchFamily="49" charset="0"/>
+              </a:rPr>
+              <a:t>ref</a:t>
+            </a:r>
+            <a:r>
+              <a:rPr lang="en-US" sz="1600" dirty="0" smtClean="0">
+                <a:latin typeface="Courier New" pitchFamily="49" charset="0"/>
+                <a:cs typeface="Courier New" pitchFamily="49" charset="0"/>
+              </a:rPr>
+              <a:t>(engine));</a:t>
+            </a:r>
+            <a:endParaRPr lang="en-US" sz="1600" dirty="0">
+              <a:latin typeface="Courier New" pitchFamily="49" charset="0"/>
+              <a:cs typeface="Courier New" pitchFamily="49" charset="0"/>
+            </a:endParaRPr>
+          </a:p>
+          <a:p>
+            <a:r>
+              <a:rPr lang="en-US" sz="1600" dirty="0">
+                <a:latin typeface="Courier New" pitchFamily="49" charset="0"/>
+                <a:cs typeface="Courier New" pitchFamily="49" charset="0"/>
+              </a:rPr>
+              <a:t>auto </a:t>
+            </a:r>
+            <a:r>
+              <a:rPr lang="en-US" sz="1600" dirty="0" err="1">
+                <a:latin typeface="Courier New" pitchFamily="49" charset="0"/>
+                <a:cs typeface="Courier New" pitchFamily="49" charset="0"/>
+              </a:rPr>
+              <a:t>y</a:t>
+            </a:r>
+            <a:r>
+              <a:rPr lang="en-US" sz="1600" dirty="0" err="1" smtClean="0">
+                <a:latin typeface="Courier New" pitchFamily="49" charset="0"/>
+                <a:cs typeface="Courier New" pitchFamily="49" charset="0"/>
+              </a:rPr>
+              <a:t>_distr</a:t>
+            </a:r>
+            <a:r>
+              <a:rPr lang="en-US" sz="1600" dirty="0" smtClean="0">
+                <a:latin typeface="Courier New" pitchFamily="49" charset="0"/>
+                <a:cs typeface="Courier New" pitchFamily="49" charset="0"/>
+              </a:rPr>
+              <a:t> </a:t>
+            </a:r>
+            <a:r>
+              <a:rPr lang="en-US" sz="1600" dirty="0">
+                <a:latin typeface="Courier New" pitchFamily="49" charset="0"/>
+                <a:cs typeface="Courier New" pitchFamily="49" charset="0"/>
+              </a:rPr>
+              <a:t>= bind(</a:t>
+            </a:r>
+            <a:r>
+              <a:rPr lang="en-US" sz="1600" dirty="0" err="1">
+                <a:latin typeface="Courier New" pitchFamily="49" charset="0"/>
+                <a:cs typeface="Courier New" pitchFamily="49" charset="0"/>
+              </a:rPr>
+              <a:t>normal_distribution</a:t>
+            </a:r>
+            <a:r>
+              <a:rPr lang="en-US" sz="1600" dirty="0">
+                <a:latin typeface="Courier New" pitchFamily="49" charset="0"/>
+                <a:cs typeface="Courier New" pitchFamily="49" charset="0"/>
+              </a:rPr>
+              <a:t>&lt;</a:t>
+            </a:r>
+            <a:r>
+              <a:rPr lang="en-US" sz="1600" dirty="0" err="1">
+                <a:latin typeface="Courier New" pitchFamily="49" charset="0"/>
+                <a:cs typeface="Courier New" pitchFamily="49" charset="0"/>
+              </a:rPr>
+              <a:t>int</a:t>
+            </a:r>
+            <a:r>
+              <a:rPr lang="en-US" sz="1600" dirty="0" smtClean="0">
+                <a:latin typeface="Courier New" pitchFamily="49" charset="0"/>
+                <a:cs typeface="Courier New" pitchFamily="49" charset="0"/>
+              </a:rPr>
+              <a:t>&gt;(0.0</a:t>
+            </a:r>
+            <a:r>
+              <a:rPr lang="en-US" sz="1600" dirty="0">
+                <a:latin typeface="Courier New" pitchFamily="49" charset="0"/>
+                <a:cs typeface="Courier New" pitchFamily="49" charset="0"/>
+              </a:rPr>
+              <a:t>, 1.0),                  </a:t>
+            </a:r>
+            <a:br>
+              <a:rPr lang="en-US" sz="1600" dirty="0">
+                <a:latin typeface="Courier New" pitchFamily="49" charset="0"/>
+                <a:cs typeface="Courier New" pitchFamily="49" charset="0"/>
+              </a:rPr>
+            </a:br>
+            <a:r>
+              <a:rPr lang="en-US" sz="1600" dirty="0">
+                <a:latin typeface="Courier New" pitchFamily="49" charset="0"/>
+                <a:cs typeface="Courier New" pitchFamily="49" charset="0"/>
+              </a:rPr>
+              <a:t>                    </a:t>
+            </a:r>
+            <a:r>
+              <a:rPr lang="en-US" sz="1600" b="1" dirty="0">
+                <a:solidFill>
+                  <a:srgbClr val="C00000"/>
+                </a:solidFill>
+                <a:latin typeface="Courier New" pitchFamily="49" charset="0"/>
+                <a:cs typeface="Courier New" pitchFamily="49" charset="0"/>
+              </a:rPr>
+              <a:t>ref</a:t>
+            </a:r>
+            <a:r>
+              <a:rPr lang="en-US" sz="1600" dirty="0">
+                <a:latin typeface="Courier New" pitchFamily="49" charset="0"/>
+                <a:cs typeface="Courier New" pitchFamily="49" charset="0"/>
+              </a:rPr>
+              <a:t>(engine));</a:t>
+            </a:r>
+            <a:endParaRPr lang="en-US" sz="1600" dirty="0">
+              <a:latin typeface="Courier New" pitchFamily="49" charset="0"/>
+              <a:cs typeface="Courier New" pitchFamily="49" charset="0"/>
+            </a:endParaRPr>
+          </a:p>
+        </p:txBody>
+      </p:sp>
+      <p:sp>
+        <p:nvSpPr>
+          <p:cNvPr id="7" name="TextBox 6"/>
+          <p:cNvSpPr txBox="1"/>
+          <p:nvPr/>
+        </p:nvSpPr>
+        <p:spPr>
+          <a:xfrm>
+            <a:off x="981754" y="5404402"/>
+            <a:ext cx="7180492" cy="369332"/>
+          </a:xfrm>
+          <a:prstGeom prst="rect">
+            <a:avLst/>
+          </a:prstGeom>
+          <a:noFill/>
+          <a:ln>
+            <a:solidFill>
+              <a:schemeClr val="tx1"/>
+            </a:solidFill>
+          </a:ln>
+        </p:spPr>
+        <p:txBody>
+          <a:bodyPr wrap="none" rtlCol="0">
+            <a:spAutoFit/>
+          </a:bodyPr>
+          <a:lstStyle/>
+          <a:p>
+            <a:r>
+              <a:rPr lang="en-US" dirty="0" smtClean="0"/>
+              <a:t>Without </a:t>
+            </a:r>
+            <a:r>
+              <a:rPr lang="en-US" dirty="0" smtClean="0">
+                <a:latin typeface="Courier New" panose="02070309020205020404" pitchFamily="49" charset="0"/>
+                <a:cs typeface="Courier New" panose="02070309020205020404" pitchFamily="49" charset="0"/>
+              </a:rPr>
+              <a:t>ref(…)</a:t>
+            </a:r>
+            <a:r>
+              <a:rPr lang="en-US" dirty="0" smtClean="0"/>
+              <a:t>, both </a:t>
+            </a:r>
+            <a:r>
+              <a:rPr lang="en-US" dirty="0" err="1" smtClean="0">
+                <a:latin typeface="Courier New" panose="02070309020205020404" pitchFamily="49" charset="0"/>
+                <a:cs typeface="Courier New" panose="02070309020205020404" pitchFamily="49" charset="0"/>
+              </a:rPr>
+              <a:t>x_distr</a:t>
+            </a:r>
+            <a:r>
+              <a:rPr lang="en-US" dirty="0" smtClean="0"/>
+              <a:t> and </a:t>
+            </a:r>
+            <a:r>
+              <a:rPr lang="en-US" dirty="0" err="1" smtClean="0">
+                <a:latin typeface="Courier New" panose="02070309020205020404" pitchFamily="49" charset="0"/>
+                <a:cs typeface="Courier New" panose="02070309020205020404" pitchFamily="49" charset="0"/>
+              </a:rPr>
+              <a:t>y_distr</a:t>
+            </a:r>
+            <a:r>
+              <a:rPr lang="en-US" dirty="0" smtClean="0"/>
+              <a:t> produce same numbers!</a:t>
+            </a:r>
+            <a:endParaRPr lang="en-US" dirty="0"/>
+          </a:p>
+        </p:txBody>
+      </p:sp>
+    </p:spTree>
+    <p:extLst>
+      <p:ext uri="{BB962C8B-B14F-4D97-AF65-F5344CB8AC3E}">
+        <p14:creationId xmlns:p14="http://schemas.microsoft.com/office/powerpoint/2010/main" val="3496673181"/>
+      </p:ext>
+    </p:extLst>
+  </p:cSld>
+  <p:clrMapOvr>
+    <a:masterClrMapping/>
+  </p:clrMapOvr>
+  <p:timing>
+    <p:tnLst>
+      <p:par>
+        <p:cTn id="1" dur="indefinite" restart="never" nodeType="tmRoot">
+          <p:childTnLst>
+            <p:seq concurrent="1" nextAc="seek">
+              <p:cTn id="2" dur="indefinite" nodeType="mainSeq">
+                <p:childTnLst>
+                  <p:par>
+                    <p:cTn id="3" fill="hold">
+                      <p:stCondLst>
+                        <p:cond delay="indefinite"/>
+                      </p:stCondLst>
+                      <p:childTnLst>
+                        <p:par>
+                          <p:cTn id="4" fill="hold">
+                            <p:stCondLst>
+                              <p:cond delay="0"/>
+                            </p:stCondLst>
+                            <p:childTnLst>
+                              <p:par>
+                                <p:cTn id="5" presetID="1" presetClass="entr" presetSubtype="0" fill="hold" grpId="0" nodeType="clickEffect">
+                                  <p:stCondLst>
+                                    <p:cond delay="0"/>
+                                  </p:stCondLst>
+                                  <p:childTnLst>
+                                    <p:set>
+                                      <p:cBhvr>
+                                        <p:cTn id="6" dur="1" fill="hold">
+                                          <p:stCondLst>
+                                            <p:cond delay="0"/>
+                                          </p:stCondLst>
+                                        </p:cTn>
+                                        <p:tgtEl>
+                                          <p:spTgt spid="7"/>
+                                        </p:tgtEl>
+                                        <p:attrNameLst>
+                                          <p:attrName>style.visibility</p:attrName>
+                                        </p:attrNameLst>
+                                      </p:cBhvr>
+                                      <p:to>
+                                        <p:strVal val="visible"/>
+                                      </p:to>
+                                    </p:set>
+                                  </p:childTnLst>
+                                </p:cTn>
+                              </p:par>
+                            </p:childTnLst>
+                          </p:cTn>
+                        </p:par>
+                      </p:childTnLst>
+                    </p:cTn>
+                  </p:par>
+                </p:childTnLst>
+              </p:cTn>
+              <p:prevCondLst>
+                <p:cond evt="onPrev" delay="0">
+                  <p:tgtEl>
+                    <p:sldTgt/>
+                  </p:tgtEl>
+                </p:cond>
+              </p:prevCondLst>
+              <p:nextCondLst>
+                <p:cond evt="onNext" delay="0">
+                  <p:tgtEl>
+                    <p:sldTgt/>
+                  </p:tgtEl>
+                </p:cond>
+              </p:nextCondLst>
+            </p:seq>
+          </p:childTnLst>
+        </p:cTn>
+      </p:par>
+    </p:tnLst>
+    <p:bldLst>
+      <p:bldP spid="7" grpId="0" animBg="1"/>
+    </p:bldLst>
+  </p:timing>
+</p:sld>
+</file>
+
+<file path=ppt/slides/slide11.xml><?xml version="1.0" encoding="utf-8"?>
+<p:sld xmlns:a="http://schemas.openxmlformats.org/drawingml/2006/main" xmlns:r="http://schemas.openxmlformats.org/officeDocument/2006/relationships" xmlns:p="http://schemas.openxmlformats.org/presentationml/2006/main">
+  <p:cSld>
+    <p:spTree>
+      <p:nvGrpSpPr>
+        <p:cNvPr id="1" name=""/>
+        <p:cNvGrpSpPr/>
+        <p:nvPr/>
+      </p:nvGrpSpPr>
+      <p:grpSpPr>
+        <a:xfrm>
+          <a:off x="0" y="0"/>
+          <a:ext cx="0" cy="0"/>
+          <a:chOff x="0" y="0"/>
+          <a:chExt cx="0" cy="0"/>
+        </a:xfrm>
+      </p:grpSpPr>
+      <p:pic>
+        <p:nvPicPr>
+          <p:cNvPr id="1026" name="Picture 2" descr="armadillo"/>
+          <p:cNvPicPr>
+            <a:picLocks noChangeAspect="1" noChangeArrowheads="1"/>
+          </p:cNvPicPr>
+          <p:nvPr/>
+        </p:nvPicPr>
+        <p:blipFill>
+          <a:blip r:embed="rId2">
+            <a:extLst>
+              <a:ext uri="{28A0092B-C50C-407E-A947-70E740481C1C}">
+                <a14:useLocalDpi xmlns:a14="http://schemas.microsoft.com/office/drawing/2010/main" val="0"/>
+              </a:ext>
+            </a:extLst>
+          </a:blip>
+          <a:srcRect/>
+          <a:stretch>
+            <a:fillRect/>
+          </a:stretch>
+        </p:blipFill>
+        <p:spPr bwMode="auto">
+          <a:xfrm>
+            <a:off x="5012711" y="4001294"/>
+            <a:ext cx="2362200" cy="819151"/>
+          </a:xfrm>
+          <a:prstGeom prst="rect">
+            <a:avLst/>
+          </a:prstGeom>
+          <a:noFill/>
+          <a:extLst>
+            <a:ext uri="{909E8E84-426E-40DD-AFC4-6F175D3DCCD1}">
+              <a14:hiddenFill xmlns:a14="http://schemas.microsoft.com/office/drawing/2010/main">
+                <a:solidFill>
+                  <a:srgbClr val="FFFFFF"/>
+                </a:solidFill>
+              </a14:hiddenFill>
+            </a:ext>
+          </a:extLst>
+        </p:spPr>
+      </p:pic>
+      <p:sp>
+        <p:nvSpPr>
+          <p:cNvPr id="2" name="Title 1"/>
+          <p:cNvSpPr>
+            <a:spLocks noGrp="1"/>
+          </p:cNvSpPr>
+          <p:nvPr>
+            <p:ph type="title"/>
+          </p:nvPr>
+        </p:nvSpPr>
+        <p:spPr/>
+        <p:txBody>
+          <a:bodyPr/>
+          <a:lstStyle/>
+          <a:p>
+            <a:r>
+              <a:rPr lang="en-US" dirty="0" smtClean="0"/>
+              <a:t>Linear algebra</a:t>
+            </a:r>
+            <a:endParaRPr lang="en-US" dirty="0"/>
+          </a:p>
+        </p:txBody>
+      </p:sp>
+      <p:sp>
+        <p:nvSpPr>
+          <p:cNvPr id="4" name="Content Placeholder 3"/>
+          <p:cNvSpPr>
+            <a:spLocks noGrp="1"/>
+          </p:cNvSpPr>
+          <p:nvPr>
+            <p:ph idx="1"/>
+          </p:nvPr>
+        </p:nvSpPr>
+        <p:spPr/>
+        <p:txBody>
+          <a:bodyPr/>
+          <a:lstStyle/>
+          <a:p>
+            <a:r>
+              <a:rPr lang="en-US" dirty="0" smtClean="0"/>
+              <a:t>Several libraries, don't do your own!</a:t>
+            </a:r>
+          </a:p>
+          <a:p>
+            <a:pPr lvl="1"/>
+            <a:r>
+              <a:rPr lang="en-US" dirty="0"/>
+              <a:t>Eigen (</a:t>
+            </a:r>
+            <a:r>
+              <a:rPr lang="en-US" dirty="0">
+                <a:hlinkClick r:id="rId3"/>
+              </a:rPr>
+              <a:t>http://eigen.tuxfamily.org</a:t>
+            </a:r>
+            <a:r>
+              <a:rPr lang="en-US" dirty="0" smtClean="0">
+                <a:hlinkClick r:id="rId3"/>
+              </a:rPr>
+              <a:t>/</a:t>
+            </a:r>
+            <a:r>
+              <a:rPr lang="en-US" dirty="0" smtClean="0"/>
+              <a:t>)</a:t>
+            </a:r>
+          </a:p>
+          <a:p>
+            <a:pPr lvl="2"/>
+            <a:r>
+              <a:rPr lang="en-US" dirty="0" smtClean="0"/>
+              <a:t>purely header files</a:t>
+            </a:r>
+          </a:p>
+          <a:p>
+            <a:pPr lvl="2"/>
+            <a:r>
+              <a:rPr lang="en-US" dirty="0" smtClean="0"/>
+              <a:t>trivial to install</a:t>
+            </a:r>
+          </a:p>
+          <a:p>
+            <a:pPr lvl="1"/>
+            <a:r>
+              <a:rPr lang="en-US" dirty="0"/>
+              <a:t>Armadillo (</a:t>
+            </a:r>
+            <a:r>
+              <a:rPr lang="en-US" dirty="0">
+                <a:hlinkClick r:id="rId4"/>
+              </a:rPr>
+              <a:t>http://arma.sourceforge.net</a:t>
+            </a:r>
+            <a:r>
+              <a:rPr lang="en-US" dirty="0" smtClean="0">
+                <a:hlinkClick r:id="rId4"/>
+              </a:rPr>
+              <a:t>/</a:t>
+            </a:r>
+            <a:r>
+              <a:rPr lang="en-US" dirty="0" smtClean="0"/>
+              <a:t>)</a:t>
+            </a:r>
+          </a:p>
+          <a:p>
+            <a:pPr lvl="2"/>
+            <a:r>
+              <a:rPr lang="en-US" dirty="0" smtClean="0"/>
+              <a:t>uses BLAS/</a:t>
+            </a:r>
+            <a:r>
+              <a:rPr lang="en-US" dirty="0" err="1" smtClean="0"/>
+              <a:t>Lapack</a:t>
+            </a:r>
+            <a:endParaRPr lang="en-US" dirty="0" smtClean="0"/>
+          </a:p>
+          <a:p>
+            <a:pPr lvl="2"/>
+            <a:r>
+              <a:rPr lang="en-US" dirty="0" smtClean="0"/>
+              <a:t>quite convenient</a:t>
+            </a:r>
+          </a:p>
+          <a:p>
+            <a:pPr lvl="2"/>
+            <a:r>
+              <a:rPr lang="en-US" dirty="0" smtClean="0"/>
+              <a:t>good performance</a:t>
+            </a:r>
+          </a:p>
+          <a:p>
+            <a:pPr lvl="2"/>
+            <a:r>
+              <a:rPr lang="en-US" dirty="0" smtClean="0"/>
+              <a:t>no distributed algorithms</a:t>
+            </a:r>
+          </a:p>
+          <a:p>
+            <a:pPr lvl="1"/>
+            <a:r>
+              <a:rPr lang="en-US" dirty="0" smtClean="0"/>
+              <a:t>…</a:t>
+            </a:r>
+            <a:endParaRPr lang="en-US" dirty="0"/>
+          </a:p>
+        </p:txBody>
+      </p:sp>
+      <p:sp>
+        <p:nvSpPr>
+          <p:cNvPr id="3" name="Slide Number Placeholder 2"/>
+          <p:cNvSpPr>
+            <a:spLocks noGrp="1"/>
+          </p:cNvSpPr>
+          <p:nvPr>
+            <p:ph type="sldNum" sz="quarter" idx="12"/>
+          </p:nvPr>
+        </p:nvSpPr>
+        <p:spPr/>
+        <p:txBody>
+          <a:bodyPr/>
+          <a:lstStyle/>
+          <a:p>
+            <a:fld id="{9CEF4966-5219-4577-B301-14467D565841}" type="slidenum">
+              <a:rPr lang="en-US" smtClean="0"/>
+              <a:t>11</a:t>
+            </a:fld>
+            <a:endParaRPr lang="en-US"/>
+          </a:p>
+        </p:txBody>
+      </p:sp>
+      <p:sp>
+        <p:nvSpPr>
+          <p:cNvPr id="5" name="TextBox 4"/>
+          <p:cNvSpPr txBox="1"/>
+          <p:nvPr/>
+        </p:nvSpPr>
+        <p:spPr>
+          <a:xfrm>
+            <a:off x="3667432" y="5653743"/>
+            <a:ext cx="4022640" cy="523220"/>
+          </a:xfrm>
+          <a:prstGeom prst="rect">
+            <a:avLst/>
+          </a:prstGeom>
+          <a:noFill/>
+          <a:ln>
+            <a:solidFill>
+              <a:schemeClr val="tx1"/>
+            </a:solidFill>
+          </a:ln>
+        </p:spPr>
+        <p:txBody>
+          <a:bodyPr wrap="none" rtlCol="0">
+            <a:spAutoFit/>
+          </a:bodyPr>
+          <a:lstStyle/>
+          <a:p>
+            <a:r>
+              <a:rPr lang="en-US" sz="2800" dirty="0" smtClean="0"/>
+              <a:t>Here: a flavor of Armadillo</a:t>
+            </a:r>
+            <a:endParaRPr lang="en-US" sz="2800" dirty="0"/>
+          </a:p>
+        </p:txBody>
+      </p:sp>
+    </p:spTree>
+    <p:extLst>
+      <p:ext uri="{BB962C8B-B14F-4D97-AF65-F5344CB8AC3E}">
+        <p14:creationId xmlns:p14="http://schemas.microsoft.com/office/powerpoint/2010/main" val="968117353"/>
+      </p:ext>
+    </p:extLst>
+  </p:cSld>
+  <p:clrMapOvr>
+    <a:masterClrMapping/>
+  </p:clrMapOvr>
+  <p:timing>
+    <p:tnLst>
+      <p:par>
+        <p:cTn id="1" dur="indefinite" restart="never" nodeType="tmRoot">
+          <p:childTnLst>
+            <p:seq concurrent="1" nextAc="seek">
+              <p:cTn id="2" dur="indefinite" nodeType="mainSeq">
+                <p:childTnLst>
+                  <p:par>
+                    <p:cTn id="3" fill="hold">
+                      <p:stCondLst>
+                        <p:cond delay="indefinite"/>
+                        <p:cond evt="onBegin" delay="0">
+                          <p:tn val="2"/>
+                        </p:cond>
+                      </p:stCondLst>
+                      <p:childTnLst>
+                        <p:par>
+                          <p:cTn id="4" fill="hold">
+                            <p:stCondLst>
+                              <p:cond delay="0"/>
+                            </p:stCondLst>
+                            <p:childTnLst>
+                              <p:par>
+                                <p:cTn id="5" presetID="1" presetClass="entr" presetSubtype="0" fill="hold" grpId="0" nodeType="withEffect">
+                                  <p:stCondLst>
+                                    <p:cond delay="0"/>
+                                  </p:stCondLst>
+                                  <p:childTnLst>
+                                    <p:set>
+                                      <p:cBhvr>
+                                        <p:cTn id="6" dur="1" fill="hold">
+                                          <p:stCondLst>
+                                            <p:cond delay="0"/>
+                                          </p:stCondLst>
+                                        </p:cTn>
+                                        <p:tgtEl>
+                                          <p:spTgt spid="4">
+                                            <p:txEl>
+                                              <p:pRg st="0" end="0"/>
+                                            </p:txEl>
+                                          </p:spTgt>
+                                        </p:tgtEl>
+                                        <p:attrNameLst>
+                                          <p:attrName>style.visibility</p:attrName>
+                                        </p:attrNameLst>
+                                      </p:cBhvr>
+                                      <p:to>
+                                        <p:strVal val="visible"/>
+                                      </p:to>
+                                    </p:set>
+                                  </p:childTnLst>
+                                </p:cTn>
+                              </p:par>
+                            </p:childTnLst>
+                          </p:cTn>
+                        </p:par>
+                      </p:childTnLst>
+                    </p:cTn>
+                  </p:par>
+                  <p:par>
+                    <p:cTn id="7" fill="hold">
+                      <p:stCondLst>
+                        <p:cond delay="indefinite"/>
+                      </p:stCondLst>
+                      <p:childTnLst>
+                        <p:par>
+                          <p:cTn id="8" fill="hold">
+                            <p:stCondLst>
+                              <p:cond delay="0"/>
+                            </p:stCondLst>
+                            <p:childTnLst>
+                              <p:par>
+                                <p:cTn id="9" presetID="1" presetClass="entr" presetSubtype="0" fill="hold" grpId="0" nodeType="clickEffect">
+                                  <p:stCondLst>
+                                    <p:cond delay="0"/>
+                                  </p:stCondLst>
+                                  <p:childTnLst>
+                                    <p:set>
+                                      <p:cBhvr>
+                                        <p:cTn id="10" dur="1" fill="hold">
+                                          <p:stCondLst>
+                                            <p:cond delay="0"/>
+                                          </p:stCondLst>
+                                        </p:cTn>
+                                        <p:tgtEl>
+                                          <p:spTgt spid="4">
+                                            <p:txEl>
+                                              <p:pRg st="1" end="1"/>
+                                            </p:txEl>
+                                          </p:spTgt>
+                                        </p:tgtEl>
+                                        <p:attrNameLst>
+                                          <p:attrName>style.visibility</p:attrName>
+                                        </p:attrNameLst>
+                                      </p:cBhvr>
+                                      <p:to>
+                                        <p:strVal val="visible"/>
+                                      </p:to>
+                                    </p:set>
+                                  </p:childTnLst>
+                                </p:cTn>
+                              </p:par>
+                              <p:par>
+                                <p:cTn id="11" presetID="1" presetClass="entr" presetSubtype="0" fill="hold" grpId="0" nodeType="withEffect">
+                                  <p:stCondLst>
+                                    <p:cond delay="0"/>
+                                  </p:stCondLst>
+                                  <p:childTnLst>
+                                    <p:set>
+                                      <p:cBhvr>
+                                        <p:cTn id="12" dur="1" fill="hold">
+                                          <p:stCondLst>
+                                            <p:cond delay="0"/>
+                                          </p:stCondLst>
+                                        </p:cTn>
+                                        <p:tgtEl>
+                                          <p:spTgt spid="4">
+                                            <p:txEl>
+                                              <p:pRg st="2" end="2"/>
+                                            </p:txEl>
+                                          </p:spTgt>
+                                        </p:tgtEl>
+                                        <p:attrNameLst>
+                                          <p:attrName>style.visibility</p:attrName>
+                                        </p:attrNameLst>
+                                      </p:cBhvr>
+                                      <p:to>
+                                        <p:strVal val="visible"/>
+                                      </p:to>
+                                    </p:set>
+                                  </p:childTnLst>
+                                </p:cTn>
+                              </p:par>
+                              <p:par>
+                                <p:cTn id="13" presetID="1" presetClass="entr" presetSubtype="0" fill="hold" grpId="0" nodeType="withEffect">
+                                  <p:stCondLst>
+                                    <p:cond delay="0"/>
+                                  </p:stCondLst>
+                                  <p:childTnLst>
+                                    <p:set>
+                                      <p:cBhvr>
+                                        <p:cTn id="14" dur="1" fill="hold">
+                                          <p:stCondLst>
+                                            <p:cond delay="0"/>
+                                          </p:stCondLst>
+                                        </p:cTn>
+                                        <p:tgtEl>
+                                          <p:spTgt spid="4">
+                                            <p:txEl>
+                                              <p:pRg st="3" end="3"/>
+                                            </p:txEl>
+                                          </p:spTgt>
+                                        </p:tgtEl>
+                                        <p:attrNameLst>
+                                          <p:attrName>style.visibility</p:attrName>
+                                        </p:attrNameLst>
+                                      </p:cBhvr>
+                                      <p:to>
+                                        <p:strVal val="visible"/>
+                                      </p:to>
+                                    </p:set>
+                                  </p:childTnLst>
+                                </p:cTn>
+                              </p:par>
+                            </p:childTnLst>
+                          </p:cTn>
+                        </p:par>
+                      </p:childTnLst>
+                    </p:cTn>
+                  </p:par>
+                  <p:par>
+                    <p:cTn id="15" fill="hold">
+                      <p:stCondLst>
+                        <p:cond delay="indefinite"/>
+                      </p:stCondLst>
+                      <p:childTnLst>
+                        <p:par>
+                          <p:cTn id="16" fill="hold">
+                            <p:stCondLst>
+                              <p:cond delay="0"/>
+                            </p:stCondLst>
+                            <p:childTnLst>
+                              <p:par>
+                                <p:cTn id="17" presetID="1" presetClass="entr" presetSubtype="0" fill="hold" grpId="0" nodeType="clickEffect">
+                                  <p:stCondLst>
+                                    <p:cond delay="0"/>
+                                  </p:stCondLst>
+                                  <p:childTnLst>
+                                    <p:set>
+                                      <p:cBhvr>
+                                        <p:cTn id="18" dur="1" fill="hold">
+                                          <p:stCondLst>
+                                            <p:cond delay="0"/>
+                                          </p:stCondLst>
+                                        </p:cTn>
+                                        <p:tgtEl>
+                                          <p:spTgt spid="4">
+                                            <p:txEl>
+                                              <p:pRg st="4" end="4"/>
+                                            </p:txEl>
+                                          </p:spTgt>
+                                        </p:tgtEl>
+                                        <p:attrNameLst>
+                                          <p:attrName>style.visibility</p:attrName>
+                                        </p:attrNameLst>
+                                      </p:cBhvr>
+                                      <p:to>
+                                        <p:strVal val="visible"/>
+                                      </p:to>
+                                    </p:set>
+                                  </p:childTnLst>
+                                </p:cTn>
+                              </p:par>
+                              <p:par>
+                                <p:cTn id="19" presetID="1" presetClass="entr" presetSubtype="0" fill="hold" grpId="0" nodeType="withEffect">
+                                  <p:stCondLst>
+                                    <p:cond delay="0"/>
+                                  </p:stCondLst>
+                                  <p:childTnLst>
+                                    <p:set>
+                                      <p:cBhvr>
+                                        <p:cTn id="20" dur="1" fill="hold">
+                                          <p:stCondLst>
+                                            <p:cond delay="0"/>
+                                          </p:stCondLst>
+                                        </p:cTn>
+                                        <p:tgtEl>
+                                          <p:spTgt spid="4">
+                                            <p:txEl>
+                                              <p:pRg st="5" end="5"/>
+                                            </p:txEl>
+                                          </p:spTgt>
+                                        </p:tgtEl>
+                                        <p:attrNameLst>
+                                          <p:attrName>style.visibility</p:attrName>
+                                        </p:attrNameLst>
+                                      </p:cBhvr>
+                                      <p:to>
+                                        <p:strVal val="visible"/>
+                                      </p:to>
+                                    </p:set>
+                                  </p:childTnLst>
+                                </p:cTn>
+                              </p:par>
+                              <p:par>
+                                <p:cTn id="21" presetID="1" presetClass="entr" presetSubtype="0" fill="hold" grpId="0" nodeType="withEffect">
+                                  <p:stCondLst>
+                                    <p:cond delay="0"/>
+                                  </p:stCondLst>
+                                  <p:childTnLst>
+                                    <p:set>
+                                      <p:cBhvr>
+                                        <p:cTn id="22" dur="1" fill="hold">
+                                          <p:stCondLst>
+                                            <p:cond delay="0"/>
+                                          </p:stCondLst>
+                                        </p:cTn>
+                                        <p:tgtEl>
+                                          <p:spTgt spid="4">
+                                            <p:txEl>
+                                              <p:pRg st="6" end="6"/>
+                                            </p:txEl>
+                                          </p:spTgt>
+                                        </p:tgtEl>
+                                        <p:attrNameLst>
+                                          <p:attrName>style.visibility</p:attrName>
+                                        </p:attrNameLst>
+                                      </p:cBhvr>
+                                      <p:to>
+                                        <p:strVal val="visible"/>
+                                      </p:to>
+                                    </p:set>
+                                  </p:childTnLst>
+                                </p:cTn>
+                              </p:par>
+                              <p:par>
+                                <p:cTn id="23" presetID="1" presetClass="entr" presetSubtype="0" fill="hold" grpId="0" nodeType="withEffect">
+                                  <p:stCondLst>
+                                    <p:cond delay="0"/>
+                                  </p:stCondLst>
+                                  <p:childTnLst>
+                                    <p:set>
+                                      <p:cBhvr>
+                                        <p:cTn id="24" dur="1" fill="hold">
+                                          <p:stCondLst>
+                                            <p:cond delay="0"/>
+                                          </p:stCondLst>
+                                        </p:cTn>
+                                        <p:tgtEl>
+                                          <p:spTgt spid="4">
+                                            <p:txEl>
+                                              <p:pRg st="7" end="7"/>
+                                            </p:txEl>
+                                          </p:spTgt>
+                                        </p:tgtEl>
+                                        <p:attrNameLst>
+                                          <p:attrName>style.visibility</p:attrName>
+                                        </p:attrNameLst>
+                                      </p:cBhvr>
+                                      <p:to>
+                                        <p:strVal val="visible"/>
+                                      </p:to>
+                                    </p:set>
+                                  </p:childTnLst>
+                                </p:cTn>
+                              </p:par>
+                              <p:par>
+                                <p:cTn id="25" presetID="1" presetClass="entr" presetSubtype="0" fill="hold" grpId="0" nodeType="withEffect">
+                                  <p:stCondLst>
+                                    <p:cond delay="0"/>
+                                  </p:stCondLst>
+                                  <p:childTnLst>
+                                    <p:set>
+                                      <p:cBhvr>
+                                        <p:cTn id="26" dur="1" fill="hold">
+                                          <p:stCondLst>
+                                            <p:cond delay="0"/>
+                                          </p:stCondLst>
+                                        </p:cTn>
+                                        <p:tgtEl>
+                                          <p:spTgt spid="4">
+                                            <p:txEl>
+                                              <p:pRg st="8" end="8"/>
+                                            </p:txEl>
+                                          </p:spTgt>
+                                        </p:tgtEl>
+                                        <p:attrNameLst>
+                                          <p:attrName>style.visibility</p:attrName>
+                                        </p:attrNameLst>
+                                      </p:cBhvr>
+                                      <p:to>
+                                        <p:strVal val="visible"/>
+                                      </p:to>
+                                    </p:set>
+                                  </p:childTnLst>
+                                </p:cTn>
+                              </p:par>
+                            </p:childTnLst>
+                          </p:cTn>
+                        </p:par>
+                      </p:childTnLst>
+                    </p:cTn>
+                  </p:par>
+                  <p:par>
+                    <p:cTn id="27" fill="hold">
+                      <p:stCondLst>
+                        <p:cond delay="indefinite"/>
+                      </p:stCondLst>
+                      <p:childTnLst>
+                        <p:par>
+                          <p:cTn id="28" fill="hold">
+                            <p:stCondLst>
+                              <p:cond delay="0"/>
+                            </p:stCondLst>
+                            <p:childTnLst>
+                              <p:par>
+                                <p:cTn id="29" presetID="1" presetClass="entr" presetSubtype="0" fill="hold" grpId="0" nodeType="clickEffect">
+                                  <p:stCondLst>
+                                    <p:cond delay="0"/>
+                                  </p:stCondLst>
+                                  <p:childTnLst>
+                                    <p:set>
+                                      <p:cBhvr>
+                                        <p:cTn id="30" dur="1" fill="hold">
+                                          <p:stCondLst>
+                                            <p:cond delay="0"/>
+                                          </p:stCondLst>
+                                        </p:cTn>
+                                        <p:tgtEl>
+                                          <p:spTgt spid="4">
+                                            <p:txEl>
+                                              <p:pRg st="9" end="9"/>
+                                            </p:txEl>
+                                          </p:spTgt>
+                                        </p:tgtEl>
+                                        <p:attrNameLst>
+                                          <p:attrName>style.visibility</p:attrName>
+                                        </p:attrNameLst>
+                                      </p:cBhvr>
+                                      <p:to>
+                                        <p:strVal val="visible"/>
+                                      </p:to>
+                                    </p:set>
+                                  </p:childTnLst>
+                                </p:cTn>
+                              </p:par>
+                            </p:childTnLst>
+                          </p:cTn>
+                        </p:par>
+                      </p:childTnLst>
+                    </p:cTn>
+                  </p:par>
+                  <p:par>
+                    <p:cTn id="31" fill="hold">
+                      <p:stCondLst>
+                        <p:cond delay="indefinite"/>
+                      </p:stCondLst>
+                      <p:childTnLst>
+                        <p:par>
+                          <p:cTn id="32" fill="hold">
+                            <p:stCondLst>
+                              <p:cond delay="0"/>
+                            </p:stCondLst>
+                            <p:childTnLst>
+                              <p:par>
+                                <p:cTn id="33" presetID="1" presetClass="entr" presetSubtype="0" fill="hold" nodeType="clickEffect">
+                                  <p:stCondLst>
+                                    <p:cond delay="0"/>
+                                  </p:stCondLst>
+                                  <p:childTnLst>
+                                    <p:set>
+                                      <p:cBhvr>
+                                        <p:cTn id="34" dur="1" fill="hold">
+                                          <p:stCondLst>
+                                            <p:cond delay="0"/>
+                                          </p:stCondLst>
+                                        </p:cTn>
+                                        <p:tgtEl>
+                                          <p:spTgt spid="1026"/>
+                                        </p:tgtEl>
+                                        <p:attrNameLst>
+                                          <p:attrName>style.visibility</p:attrName>
+                                        </p:attrNameLst>
+                                      </p:cBhvr>
+                                      <p:to>
+                                        <p:strVal val="visible"/>
+                                      </p:to>
+                                    </p:set>
+                                  </p:childTnLst>
+                                </p:cTn>
+                              </p:par>
+                              <p:par>
+                                <p:cTn id="35" presetID="1" presetClass="entr" presetSubtype="0" fill="hold" grpId="0" nodeType="withEffect">
+                                  <p:stCondLst>
+                                    <p:cond delay="0"/>
+                                  </p:stCondLst>
+                                  <p:childTnLst>
+                                    <p:set>
+                                      <p:cBhvr>
+                                        <p:cTn id="36" dur="1" fill="hold">
+                                          <p:stCondLst>
+                                            <p:cond delay="0"/>
+                                          </p:stCondLst>
+                                        </p:cTn>
+                                        <p:tgtEl>
+                                          <p:spTgt spid="5"/>
+                                        </p:tgtEl>
+                                        <p:attrNameLst>
+                                          <p:attrName>style.visibility</p:attrName>
+                                        </p:attrNameLst>
+                                      </p:cBhvr>
+                                      <p:to>
+                                        <p:strVal val="visible"/>
+                                      </p:to>
+                                    </p:set>
+                                  </p:childTnLst>
+                                </p:cTn>
+                              </p:par>
+                            </p:childTnLst>
+                          </p:cTn>
+                        </p:par>
+                      </p:childTnLst>
+                    </p:cTn>
+                  </p:par>
+                </p:childTnLst>
+              </p:cTn>
+              <p:prevCondLst>
+                <p:cond evt="onPrev" delay="0">
+                  <p:tgtEl>
+                    <p:sldTgt/>
+                  </p:tgtEl>
+                </p:cond>
+              </p:prevCondLst>
+              <p:nextCondLst>
+                <p:cond evt="onNext" delay="0">
+                  <p:tgtEl>
+                    <p:sldTgt/>
+                  </p:tgtEl>
+                </p:cond>
+              </p:nextCondLst>
+            </p:seq>
+          </p:childTnLst>
+        </p:cTn>
+      </p:par>
+    </p:tnLst>
+    <p:bldLst>
+      <p:bldP spid="4" grpId="0" uiExpand="1" build="p" bldLvl="2"/>
+      <p:bldP spid="5" grpId="0" animBg="1"/>
+    </p:bldLst>
+  </p:timing>
+</p:sld>
+</file>
+
+<file path=ppt/slides/slide12.xml><?xml version="1.0" encoding="utf-8"?>
+<p:sld xmlns:a="http://schemas.openxmlformats.org/drawingml/2006/main" xmlns:r="http://schemas.openxmlformats.org/officeDocument/2006/relationships" xmlns:p="http://schemas.openxmlformats.org/presentationml/2006/main">
+  <p:cSld>
+    <p:spTree>
+      <p:nvGrpSpPr>
+        <p:cNvPr id="1" name=""/>
+        <p:cNvGrpSpPr/>
+        <p:nvPr/>
+      </p:nvGrpSpPr>
+      <p:grpSpPr>
+        <a:xfrm>
+          <a:off x="0" y="0"/>
+          <a:ext cx="0" cy="0"/>
+          <a:chOff x="0" y="0"/>
+          <a:chExt cx="0" cy="0"/>
+        </a:xfrm>
+      </p:grpSpPr>
+      <p:sp>
+        <p:nvSpPr>
+          <p:cNvPr id="2" name="Title 1"/>
+          <p:cNvSpPr>
+            <a:spLocks noGrp="1"/>
+          </p:cNvSpPr>
+          <p:nvPr>
+            <p:ph type="title"/>
+          </p:nvPr>
+        </p:nvSpPr>
+        <p:spPr/>
+        <p:txBody>
+          <a:bodyPr/>
+          <a:lstStyle/>
+          <a:p>
+            <a:r>
+              <a:rPr lang="en-US" dirty="0" smtClean="0"/>
+              <a:t>Ordinary differential equations</a:t>
+            </a:r>
+            <a:endParaRPr lang="en-US" dirty="0"/>
+          </a:p>
+        </p:txBody>
+      </p:sp>
+      <p:sp>
+        <p:nvSpPr>
+          <p:cNvPr id="3" name="Content Placeholder 2"/>
+          <p:cNvSpPr>
+            <a:spLocks noGrp="1"/>
+          </p:cNvSpPr>
+          <p:nvPr>
+            <p:ph idx="1"/>
+          </p:nvPr>
+        </p:nvSpPr>
+        <p:spPr/>
+        <p:txBody>
+          <a:bodyPr/>
+          <a:lstStyle/>
+          <a:p>
+            <a:r>
+              <a:rPr lang="en-US" dirty="0" smtClean="0"/>
+              <a:t>Straightforward: Boost::</a:t>
+            </a:r>
+            <a:r>
+              <a:rPr lang="en-US" dirty="0" err="1" smtClean="0"/>
+              <a:t>odeint</a:t>
+            </a:r>
+            <a:endParaRPr lang="en-US" dirty="0"/>
+          </a:p>
+        </p:txBody>
+      </p:sp>
+      <p:sp>
+        <p:nvSpPr>
+          <p:cNvPr id="4" name="Slide Number Placeholder 3"/>
+          <p:cNvSpPr>
+            <a:spLocks noGrp="1"/>
+          </p:cNvSpPr>
+          <p:nvPr>
+            <p:ph type="sldNum" sz="quarter" idx="12"/>
+          </p:nvPr>
+        </p:nvSpPr>
+        <p:spPr/>
+        <p:txBody>
+          <a:bodyPr/>
+          <a:lstStyle/>
+          <a:p>
+            <a:fld id="{9CEF4966-5219-4577-B301-14467D565841}" type="slidenum">
+              <a:rPr lang="en-US" smtClean="0"/>
+              <a:t>12</a:t>
+            </a:fld>
+            <a:endParaRPr lang="en-US"/>
+          </a:p>
+        </p:txBody>
+      </p:sp>
+    </p:spTree>
+    <p:extLst>
+      <p:ext uri="{BB962C8B-B14F-4D97-AF65-F5344CB8AC3E}">
+        <p14:creationId xmlns:p14="http://schemas.microsoft.com/office/powerpoint/2010/main" val="3264396598"/>
+      </p:ext>
+    </p:extLst>
+  </p:cSld>
+  <p:clrMapOvr>
+    <a:masterClrMapping/>
+  </p:clrMapOvr>
+  <p:timing>
+    <p:tnLst>
+      <p:par>
+        <p:cTn id="1" dur="indefinite" restart="never" nodeType="tmRoot"/>
+      </p:par>
+    </p:tnLst>
+  </p:timing>
+</p:sld>
+</file>
+
+<file path=ppt/slides/slide13.xml><?xml version="1.0" encoding="utf-8"?>
+<p:sld xmlns:a="http://schemas.openxmlformats.org/drawingml/2006/main" xmlns:r="http://schemas.openxmlformats.org/officeDocument/2006/relationships" xmlns:p="http://schemas.openxmlformats.org/presentationml/2006/main">
+  <p:cSld>
+    <p:spTree>
+      <p:nvGrpSpPr>
+        <p:cNvPr id="1" name=""/>
+        <p:cNvGrpSpPr/>
+        <p:nvPr/>
+      </p:nvGrpSpPr>
+      <p:grpSpPr>
+        <a:xfrm>
+          <a:off x="0" y="0"/>
+          <a:ext cx="0" cy="0"/>
+          <a:chOff x="0" y="0"/>
+          <a:chExt cx="0" cy="0"/>
+        </a:xfrm>
+      </p:grpSpPr>
+      <p:sp>
+        <p:nvSpPr>
+          <p:cNvPr id="2" name="Title 1"/>
+          <p:cNvSpPr>
+            <a:spLocks noGrp="1"/>
+          </p:cNvSpPr>
+          <p:nvPr>
+            <p:ph type="title"/>
+          </p:nvPr>
+        </p:nvSpPr>
+        <p:spPr/>
+        <p:txBody>
+          <a:bodyPr/>
+          <a:lstStyle/>
+          <a:p>
+            <a:r>
+              <a:rPr lang="en-US" dirty="0" smtClean="0"/>
+              <a:t>What was left out/added?</a:t>
+            </a:r>
+            <a:endParaRPr lang="en-US" dirty="0"/>
+          </a:p>
+        </p:txBody>
+      </p:sp>
+      <p:sp>
+        <p:nvSpPr>
+          <p:cNvPr id="4" name="Content Placeholder 3"/>
+          <p:cNvSpPr>
+            <a:spLocks noGrp="1"/>
+          </p:cNvSpPr>
+          <p:nvPr>
+            <p:ph idx="1"/>
+          </p:nvPr>
+        </p:nvSpPr>
+        <p:spPr/>
+        <p:txBody>
+          <a:bodyPr/>
+          <a:lstStyle/>
+          <a:p>
+            <a:r>
+              <a:rPr lang="en-US" dirty="0" smtClean="0"/>
+              <a:t>Left out</a:t>
+            </a:r>
+          </a:p>
+          <a:p>
+            <a:pPr lvl="1"/>
+            <a:r>
+              <a:rPr lang="en-US" dirty="0" smtClean="0"/>
+              <a:t>Value arrays, see section on containers</a:t>
+            </a:r>
+          </a:p>
+          <a:p>
+            <a:r>
+              <a:rPr lang="en-US" dirty="0" smtClean="0"/>
+              <a:t>Added</a:t>
+            </a:r>
+          </a:p>
+          <a:p>
+            <a:pPr lvl="1"/>
+            <a:r>
+              <a:rPr lang="en-US" dirty="0" smtClean="0"/>
+              <a:t>Linear </a:t>
+            </a:r>
+            <a:r>
+              <a:rPr lang="en-US" dirty="0" smtClean="0"/>
+              <a:t>algebra with Armadillo</a:t>
+            </a:r>
+            <a:endParaRPr lang="en-US" dirty="0"/>
+          </a:p>
+          <a:p>
+            <a:pPr lvl="1"/>
+            <a:r>
+              <a:rPr lang="en-US" dirty="0"/>
+              <a:t>ODEs with Boost</a:t>
+            </a:r>
+            <a:endParaRPr lang="en-US" dirty="0" smtClean="0"/>
+          </a:p>
+          <a:p>
+            <a:endParaRPr lang="en-US" dirty="0"/>
+          </a:p>
+        </p:txBody>
+      </p:sp>
+      <p:sp>
+        <p:nvSpPr>
+          <p:cNvPr id="3" name="Slide Number Placeholder 2"/>
+          <p:cNvSpPr>
+            <a:spLocks noGrp="1"/>
+          </p:cNvSpPr>
+          <p:nvPr>
+            <p:ph type="sldNum" sz="quarter" idx="12"/>
+          </p:nvPr>
+        </p:nvSpPr>
+        <p:spPr/>
+        <p:txBody>
+          <a:bodyPr/>
+          <a:lstStyle/>
+          <a:p>
+            <a:fld id="{9CEF4966-5219-4577-B301-14467D565841}" type="slidenum">
+              <a:rPr lang="en-US" smtClean="0"/>
+              <a:t>13</a:t>
             </a:fld>
             <a:endParaRPr lang="en-US"/>
           </a:p>
@@ -8175,7 +9660,7 @@
           <a:p>
             <a:r>
               <a:rPr lang="en-US" dirty="0" smtClean="0"/>
-              <a:t>Random numbers</a:t>
+              <a:t>Random number generation</a:t>
             </a:r>
             <a:endParaRPr lang="en-US" dirty="0"/>
           </a:p>
@@ -8196,7 +9681,163 @@
           <a:bodyPr/>
           <a:lstStyle/>
           <a:p>
-            <a:endParaRPr lang="en-US"/>
+            <a:r>
+              <a:rPr lang="en-US" dirty="0" smtClean="0"/>
+              <a:t>Engine: generates random number sequence</a:t>
+            </a:r>
+          </a:p>
+          <a:p>
+            <a:pPr lvl="1"/>
+            <a:r>
+              <a:rPr lang="en-US" dirty="0" err="1" smtClean="0">
+                <a:latin typeface="Courier New" panose="02070309020205020404" pitchFamily="49" charset="0"/>
+                <a:cs typeface="Courier New" panose="02070309020205020404" pitchFamily="49" charset="0"/>
+              </a:rPr>
+              <a:t>std</a:t>
+            </a:r>
+            <a:r>
+              <a:rPr lang="en-US" dirty="0" smtClean="0">
+                <a:latin typeface="Courier New" panose="02070309020205020404" pitchFamily="49" charset="0"/>
+                <a:cs typeface="Courier New" panose="02070309020205020404" pitchFamily="49" charset="0"/>
+              </a:rPr>
+              <a:t>::</a:t>
+            </a:r>
+            <a:r>
+              <a:rPr lang="en-US" dirty="0" err="1" smtClean="0">
+                <a:latin typeface="Courier New" panose="02070309020205020404" pitchFamily="49" charset="0"/>
+                <a:cs typeface="Courier New" panose="02070309020205020404" pitchFamily="49" charset="0"/>
+              </a:rPr>
+              <a:t>random_device</a:t>
+            </a:r>
+            <a:r>
+              <a:rPr lang="en-US" dirty="0" smtClean="0"/>
+              <a:t>: non-deterministic</a:t>
+            </a:r>
+          </a:p>
+          <a:p>
+            <a:pPr lvl="1"/>
+            <a:r>
+              <a:rPr lang="en-US" dirty="0" err="1" smtClean="0">
+                <a:latin typeface="Courier New" panose="02070309020205020404" pitchFamily="49" charset="0"/>
+                <a:cs typeface="Courier New" panose="02070309020205020404" pitchFamily="49" charset="0"/>
+              </a:rPr>
+              <a:t>std</a:t>
+            </a:r>
+            <a:r>
+              <a:rPr lang="en-US" dirty="0" smtClean="0">
+                <a:latin typeface="Courier New" panose="02070309020205020404" pitchFamily="49" charset="0"/>
+                <a:cs typeface="Courier New" panose="02070309020205020404" pitchFamily="49" charset="0"/>
+              </a:rPr>
+              <a:t>::ranlux48</a:t>
+            </a:r>
+          </a:p>
+          <a:p>
+            <a:pPr lvl="1"/>
+            <a:r>
+              <a:rPr lang="en-US" dirty="0" err="1" smtClean="0">
+                <a:latin typeface="Courier New" panose="02070309020205020404" pitchFamily="49" charset="0"/>
+                <a:cs typeface="Courier New" panose="02070309020205020404" pitchFamily="49" charset="0"/>
+              </a:rPr>
+              <a:t>std</a:t>
+            </a:r>
+            <a:r>
+              <a:rPr lang="en-US" dirty="0" smtClean="0">
+                <a:latin typeface="Courier New" panose="02070309020205020404" pitchFamily="49" charset="0"/>
+                <a:cs typeface="Courier New" panose="02070309020205020404" pitchFamily="49" charset="0"/>
+              </a:rPr>
+              <a:t>::mt19937_64</a:t>
+            </a:r>
+            <a:r>
+              <a:rPr lang="en-US" dirty="0" smtClean="0"/>
+              <a:t>: </a:t>
+            </a:r>
+            <a:r>
+              <a:rPr lang="en-US" dirty="0" err="1"/>
+              <a:t>M</a:t>
+            </a:r>
+            <a:r>
+              <a:rPr lang="en-US" dirty="0" err="1" smtClean="0"/>
+              <a:t>ersenne</a:t>
+            </a:r>
+            <a:r>
+              <a:rPr lang="en-US" dirty="0" smtClean="0"/>
+              <a:t> twister</a:t>
+            </a:r>
+          </a:p>
+          <a:p>
+            <a:pPr lvl="1"/>
+            <a:r>
+              <a:rPr lang="en-US" dirty="0" smtClean="0"/>
+              <a:t>…</a:t>
+            </a:r>
+          </a:p>
+          <a:p>
+            <a:r>
+              <a:rPr lang="en-US" dirty="0" smtClean="0"/>
+              <a:t>Distributions</a:t>
+            </a:r>
+          </a:p>
+          <a:p>
+            <a:pPr lvl="1"/>
+            <a:r>
+              <a:rPr lang="en-US" dirty="0" err="1" smtClean="0">
+                <a:latin typeface="Courier New" panose="02070309020205020404" pitchFamily="49" charset="0"/>
+                <a:cs typeface="Courier New" panose="02070309020205020404" pitchFamily="49" charset="0"/>
+              </a:rPr>
+              <a:t>uniform_int_distribution</a:t>
+            </a:r>
+            <a:r>
+              <a:rPr lang="en-US" dirty="0" smtClean="0">
+                <a:latin typeface="Courier New" panose="02070309020205020404" pitchFamily="49" charset="0"/>
+                <a:cs typeface="Courier New" panose="02070309020205020404" pitchFamily="49" charset="0"/>
+              </a:rPr>
+              <a:t>&lt;type&gt;(a, b)</a:t>
+            </a:r>
+          </a:p>
+          <a:p>
+            <a:pPr lvl="1"/>
+            <a:r>
+              <a:rPr lang="en-US" dirty="0" err="1" smtClean="0">
+                <a:latin typeface="Courier New" panose="02070309020205020404" pitchFamily="49" charset="0"/>
+                <a:cs typeface="Courier New" panose="02070309020205020404" pitchFamily="49" charset="0"/>
+              </a:rPr>
+              <a:t>uniform_real_distribution</a:t>
+            </a:r>
+            <a:r>
+              <a:rPr lang="en-US" dirty="0" smtClean="0">
+                <a:latin typeface="Courier New" panose="02070309020205020404" pitchFamily="49" charset="0"/>
+                <a:cs typeface="Courier New" panose="02070309020205020404" pitchFamily="49" charset="0"/>
+              </a:rPr>
+              <a:t>&lt;type&gt;(a, b)</a:t>
+            </a:r>
+          </a:p>
+          <a:p>
+            <a:pPr lvl="1"/>
+            <a:r>
+              <a:rPr lang="en-US" dirty="0" err="1" smtClean="0">
+                <a:latin typeface="Courier New" panose="02070309020205020404" pitchFamily="49" charset="0"/>
+                <a:cs typeface="Courier New" panose="02070309020205020404" pitchFamily="49" charset="0"/>
+              </a:rPr>
+              <a:t>normal_distribution</a:t>
+            </a:r>
+            <a:r>
+              <a:rPr lang="en-US" dirty="0" smtClean="0">
+                <a:latin typeface="Courier New" panose="02070309020205020404" pitchFamily="49" charset="0"/>
+                <a:cs typeface="Courier New" panose="02070309020205020404" pitchFamily="49" charset="0"/>
+              </a:rPr>
+              <a:t>&lt;type&gt;(mu, sigma)</a:t>
+            </a:r>
+          </a:p>
+          <a:p>
+            <a:pPr lvl="1"/>
+            <a:r>
+              <a:rPr lang="en-US" dirty="0" smtClean="0"/>
+              <a:t>…</a:t>
+            </a:r>
+          </a:p>
+          <a:p>
+            <a:pPr lvl="1"/>
+            <a:endParaRPr lang="en-US" dirty="0"/>
           </a:p>
         </p:txBody>
       </p:sp>
@@ -8260,47 +9901,6 @@
           <a:chExt cx="0" cy="0"/>
         </a:xfrm>
       </p:grpSpPr>
-      <p:pic>
-        <p:nvPicPr>
-          <p:cNvPr id="1026" name="Picture 2" descr="armadillo"/>
-          <p:cNvPicPr>
-            <a:picLocks noChangeAspect="1" noChangeArrowheads="1"/>
-          </p:cNvPicPr>
-          <p:nvPr/>
-        </p:nvPicPr>
-        <p:blipFill>
-          <a:blip r:embed="rId2">
-            <a:extLst>
-              <a:ext uri="{28A0092B-C50C-407E-A947-70E740481C1C}">
-                <a14:useLocalDpi xmlns:a14="http://schemas.microsoft.com/office/drawing/2010/main" val="0"/>
-              </a:ext>
-            </a:extLst>
-          </a:blip>
-          <a:srcRect/>
-          <a:stretch>
-            <a:fillRect/>
-          </a:stretch>
-        </p:blipFill>
-        <p:spPr bwMode="auto">
-          <a:xfrm>
-            <a:off x="5012711" y="4001294"/>
-            <a:ext cx="2362200" cy="819151"/>
-          </a:xfrm>
-          <a:prstGeom prst="rect">
-            <a:avLst/>
-          </a:prstGeom>
-          <a:noFill/>
-          <a:extLst>
-            <a:ext uri="{909E8E84-426E-40DD-AFC4-6F175D3DCCD1}">
-              <a14:hiddenFill xmlns:a14="http://schemas.microsoft.com/office/drawing/2010/main">
-                <a:solidFill>
-                  <a:srgbClr val="FFFFFF"/>
-                </a:solidFill>
-              </a14:hiddenFill>
-            </a:ext>
-          </a:extLst>
-        </p:spPr>
-      </p:pic>
       <p:sp>
         <p:nvSpPr>
           <p:cNvPr id="2" name="Title 1"/>
@@ -8318,7 +9918,7 @@
           <a:p>
             <a:r>
               <a:rPr lang="en-US" dirty="0" smtClean="0"/>
-              <a:t>Linear algebra</a:t>
+              <a:t>Typical workflow</a:t>
             </a:r>
             <a:endParaRPr lang="en-US" dirty="0"/>
           </a:p>
@@ -8326,7 +9926,7 @@
       </p:sp>
       <p:sp>
         <p:nvSpPr>
-          <p:cNvPr id="4" name="Content Placeholder 3"/>
+          <p:cNvPr id="3" name="Content Placeholder 2"/>
           <p:cNvSpPr>
             <a:spLocks noGrp="1"/>
           </p:cNvSpPr>
@@ -8339,109 +9939,63 @@
           <a:bodyPr/>
           <a:lstStyle/>
           <a:p>
+            <a:pPr marL="514350" indent="-514350">
+              <a:buFont typeface="+mj-lt"/>
+              <a:buAutoNum type="arabicPeriod"/>
+            </a:pPr>
             <a:r>
               <a:rPr lang="en-US" dirty="0" smtClean="0"/>
-              <a:t>Several libraries, don't do your own!</a:t>
-            </a:r>
-          </a:p>
-          <a:p>
-            <a:pPr lvl="1"/>
-            <a:r>
-              <a:rPr lang="en-US" dirty="0"/>
-              <a:t>Eigen (</a:t>
-            </a:r>
-            <a:r>
-              <a:rPr lang="en-US" dirty="0">
-                <a:hlinkClick r:id="rId3"/>
-              </a:rPr>
-              <a:t>http://eigen.tuxfamily.org</a:t>
-            </a:r>
-            <a:r>
-              <a:rPr lang="en-US" dirty="0" smtClean="0">
-                <a:hlinkClick r:id="rId3"/>
-              </a:rPr>
-              <a:t>/</a:t>
-            </a:r>
+              <a:t>Create random device</a:t>
+            </a:r>
+          </a:p>
+          <a:p>
+            <a:pPr marL="514350" indent="-514350">
+              <a:buFont typeface="+mj-lt"/>
+              <a:buAutoNum type="arabicPeriod"/>
+            </a:pPr>
             <a:r>
               <a:rPr lang="en-US" dirty="0" smtClean="0"/>
-              <a:t>)</a:t>
-            </a:r>
-          </a:p>
-          <a:p>
-            <a:pPr lvl="2"/>
+              <a:t>Create seed distribution</a:t>
+            </a:r>
+          </a:p>
+          <a:p>
+            <a:pPr marL="514350" indent="-514350">
+              <a:buFont typeface="+mj-lt"/>
+              <a:buAutoNum type="arabicPeriod"/>
+            </a:pPr>
             <a:r>
               <a:rPr lang="en-US" dirty="0" smtClean="0"/>
-              <a:t>purely header files</a:t>
-            </a:r>
-          </a:p>
-          <a:p>
-            <a:pPr lvl="2"/>
+              <a:t>Draw seed from seed distribution using random device</a:t>
+            </a:r>
+          </a:p>
+          <a:p>
+            <a:pPr marL="514350" indent="-514350">
+              <a:buFont typeface="+mj-lt"/>
+              <a:buAutoNum type="arabicPeriod"/>
+            </a:pPr>
             <a:r>
               <a:rPr lang="en-US" dirty="0" smtClean="0"/>
-              <a:t>trivial to install</a:t>
-            </a:r>
-          </a:p>
-          <a:p>
-            <a:pPr lvl="1"/>
-            <a:r>
-              <a:rPr lang="en-US" dirty="0"/>
-              <a:t>Armadillo (</a:t>
-            </a:r>
-            <a:r>
-              <a:rPr lang="en-US" dirty="0">
-                <a:hlinkClick r:id="rId4"/>
-              </a:rPr>
-              <a:t>http://arma.sourceforge.net</a:t>
-            </a:r>
-            <a:r>
-              <a:rPr lang="en-US" dirty="0" smtClean="0">
-                <a:hlinkClick r:id="rId4"/>
-              </a:rPr>
-              <a:t>/</a:t>
-            </a:r>
+              <a:t>Create engine, seed</a:t>
+            </a:r>
+          </a:p>
+          <a:p>
+            <a:pPr marL="514350" indent="-514350">
+              <a:buFont typeface="+mj-lt"/>
+              <a:buAutoNum type="arabicPeriod"/>
+            </a:pPr>
             <a:r>
               <a:rPr lang="en-US" dirty="0" smtClean="0"/>
-              <a:t>)</a:t>
-            </a:r>
-          </a:p>
-          <a:p>
-            <a:pPr lvl="2"/>
+              <a:t>Create actual distribution</a:t>
+            </a:r>
+          </a:p>
+          <a:p>
+            <a:pPr marL="514350" indent="-514350">
+              <a:buFont typeface="+mj-lt"/>
+              <a:buAutoNum type="arabicPeriod"/>
+            </a:pPr>
             <a:r>
               <a:rPr lang="en-US" dirty="0" smtClean="0"/>
-              <a:t>uses BLAS/</a:t>
-            </a:r>
-            <a:r>
-              <a:rPr lang="en-US" dirty="0" err="1" smtClean="0"/>
-              <a:t>Lapack</a:t>
-            </a:r>
-            <a:endParaRPr lang="en-US" dirty="0" smtClean="0"/>
-          </a:p>
-          <a:p>
-            <a:pPr lvl="2"/>
-            <a:r>
-              <a:rPr lang="en-US" dirty="0" smtClean="0"/>
-              <a:t>quite convenient</a:t>
-            </a:r>
-          </a:p>
-          <a:p>
-            <a:pPr lvl="2"/>
-            <a:r>
-              <a:rPr lang="en-US" dirty="0" smtClean="0"/>
-              <a:t>good performance</a:t>
-            </a:r>
-          </a:p>
-          <a:p>
-            <a:pPr lvl="2"/>
-            <a:r>
-              <a:rPr lang="en-US" dirty="0" smtClean="0"/>
-              <a:t>no distributed algorithms</a:t>
-            </a:r>
-          </a:p>
-          <a:p>
-            <a:pPr lvl="1"/>
-            <a:r>
-              <a:rPr lang="en-US" dirty="0" smtClean="0"/>
-              <a:t>…</a:t>
+              <a:t>Draw random number from actual distribution using engine</a:t>
             </a:r>
             <a:endParaRPr lang="en-US" dirty="0"/>
           </a:p>
@@ -8449,7 +10003,7 @@
       </p:sp>
       <p:sp>
         <p:nvSpPr>
-          <p:cNvPr id="3" name="Slide Number Placeholder 2"/>
+          <p:cNvPr id="4" name="Slide Number Placeholder 3"/>
           <p:cNvSpPr>
             <a:spLocks noGrp="1"/>
           </p:cNvSpPr>
@@ -8470,6 +10024,89 @@
           </a:p>
         </p:txBody>
       </p:sp>
+    </p:spTree>
+    <p:extLst>
+      <p:ext uri="{BB962C8B-B14F-4D97-AF65-F5344CB8AC3E}">
+        <p14:creationId xmlns:p14="http://schemas.microsoft.com/office/powerpoint/2010/main" val="4196644572"/>
+      </p:ext>
+    </p:extLst>
+  </p:cSld>
+  <p:clrMapOvr>
+    <a:masterClrMapping/>
+  </p:clrMapOvr>
+  <p:timing>
+    <p:tnLst>
+      <p:par>
+        <p:cTn id="1" dur="indefinite" restart="never" nodeType="tmRoot"/>
+      </p:par>
+    </p:tnLst>
+  </p:timing>
+</p:sld>
+</file>
+
+<file path=ppt/slides/slide9.xml><?xml version="1.0" encoding="utf-8"?>
+<p:sld xmlns:a="http://schemas.openxmlformats.org/drawingml/2006/main" xmlns:r="http://schemas.openxmlformats.org/officeDocument/2006/relationships" xmlns:p="http://schemas.openxmlformats.org/presentationml/2006/main">
+  <p:cSld>
+    <p:spTree>
+      <p:nvGrpSpPr>
+        <p:cNvPr id="1" name=""/>
+        <p:cNvGrpSpPr/>
+        <p:nvPr/>
+      </p:nvGrpSpPr>
+      <p:grpSpPr>
+        <a:xfrm>
+          <a:off x="0" y="0"/>
+          <a:ext cx="0" cy="0"/>
+          <a:chOff x="0" y="0"/>
+          <a:chExt cx="0" cy="0"/>
+        </a:xfrm>
+      </p:grpSpPr>
+      <p:sp>
+        <p:nvSpPr>
+          <p:cNvPr id="2" name="Title 1"/>
+          <p:cNvSpPr>
+            <a:spLocks noGrp="1"/>
+          </p:cNvSpPr>
+          <p:nvPr>
+            <p:ph type="title"/>
+          </p:nvPr>
+        </p:nvSpPr>
+        <p:spPr/>
+        <p:txBody>
+          <a:bodyPr/>
+          <a:lstStyle/>
+          <a:p>
+            <a:r>
+              <a:rPr lang="en-US" dirty="0" smtClean="0"/>
+              <a:t>Example: normal distribution</a:t>
+            </a:r>
+            <a:endParaRPr lang="en-US" dirty="0"/>
+          </a:p>
+        </p:txBody>
+      </p:sp>
+      <p:sp>
+        <p:nvSpPr>
+          <p:cNvPr id="4" name="Slide Number Placeholder 3"/>
+          <p:cNvSpPr>
+            <a:spLocks noGrp="1"/>
+          </p:cNvSpPr>
+          <p:nvPr>
+            <p:ph type="sldNum" sz="quarter" idx="12"/>
+          </p:nvPr>
+        </p:nvSpPr>
+        <p:spPr/>
+        <p:txBody>
+          <a:bodyPr/>
+          <a:lstStyle/>
+          <a:p>
+            <a:fld id="{9CEF4966-5219-4577-B301-14467D565841}" type="slidenum">
+              <a:rPr lang="en-US" smtClean="0"/>
+              <a:t>9</a:t>
+            </a:fld>
+            <a:endParaRPr lang="en-US"/>
+          </a:p>
+        </p:txBody>
+      </p:sp>
       <p:sp>
         <p:nvSpPr>
           <p:cNvPr id="5" name="TextBox 4"/>
@@ -8478,28 +10115,710 @@
         </p:nvSpPr>
         <p:spPr>
           <a:xfrm>
-            <a:off x="3667432" y="5653743"/>
-            <a:ext cx="4022640" cy="523220"/>
+            <a:off x="714683" y="1889296"/>
+            <a:ext cx="7367435" cy="3539430"/>
+          </a:xfrm>
+          <a:prstGeom prst="rect">
+            <a:avLst/>
+          </a:prstGeom>
+          <a:solidFill>
+            <a:schemeClr val="bg1">
+              <a:lumMod val="75000"/>
+            </a:schemeClr>
+          </a:solidFill>
+          <a:ln>
+            <a:noFill/>
+          </a:ln>
+        </p:spPr>
+        <p:txBody>
+          <a:bodyPr wrap="square" rtlCol="0">
+            <a:spAutoFit/>
+          </a:bodyPr>
+          <a:lstStyle/>
+          <a:p>
+            <a:r>
+              <a:rPr lang="en-US" sz="1600" dirty="0">
+                <a:latin typeface="Courier New" pitchFamily="49" charset="0"/>
+                <a:cs typeface="Courier New" pitchFamily="49" charset="0"/>
+              </a:rPr>
+              <a:t>#include &lt;functional&gt;</a:t>
+            </a:r>
+          </a:p>
+          <a:p>
+            <a:r>
+              <a:rPr lang="en-US" sz="1600" dirty="0" smtClean="0">
+                <a:latin typeface="Courier New" pitchFamily="49" charset="0"/>
+                <a:cs typeface="Courier New" pitchFamily="49" charset="0"/>
+              </a:rPr>
+              <a:t>#</a:t>
+            </a:r>
+            <a:r>
+              <a:rPr lang="en-US" sz="1600" dirty="0">
+                <a:latin typeface="Courier New" pitchFamily="49" charset="0"/>
+                <a:cs typeface="Courier New" pitchFamily="49" charset="0"/>
+              </a:rPr>
+              <a:t>include &lt;random&gt;</a:t>
+            </a:r>
+          </a:p>
+          <a:p>
+            <a:r>
+              <a:rPr lang="en-US" sz="1600" dirty="0" smtClean="0">
+                <a:latin typeface="Courier New" pitchFamily="49" charset="0"/>
+                <a:cs typeface="Courier New" pitchFamily="49" charset="0"/>
+              </a:rPr>
+              <a:t>…</a:t>
+            </a:r>
+            <a:endParaRPr lang="en-US" sz="1600" dirty="0">
+              <a:latin typeface="Courier New" pitchFamily="49" charset="0"/>
+              <a:cs typeface="Courier New" pitchFamily="49" charset="0"/>
+            </a:endParaRPr>
+          </a:p>
+          <a:p>
+            <a:r>
+              <a:rPr lang="en-US" sz="1600" dirty="0" smtClean="0">
+                <a:latin typeface="Courier New" pitchFamily="49" charset="0"/>
+                <a:cs typeface="Courier New" pitchFamily="49" charset="0"/>
+              </a:rPr>
+              <a:t>using </a:t>
+            </a:r>
+            <a:r>
+              <a:rPr lang="en-US" sz="1600" dirty="0" err="1">
+                <a:latin typeface="Courier New" pitchFamily="49" charset="0"/>
+                <a:cs typeface="Courier New" pitchFamily="49" charset="0"/>
+              </a:rPr>
+              <a:t>seed_dist_t</a:t>
+            </a:r>
+            <a:r>
+              <a:rPr lang="en-US" sz="1600" dirty="0">
+                <a:latin typeface="Courier New" pitchFamily="49" charset="0"/>
+                <a:cs typeface="Courier New" pitchFamily="49" charset="0"/>
+              </a:rPr>
+              <a:t> = </a:t>
+            </a:r>
+            <a:r>
+              <a:rPr lang="en-US" sz="1600" dirty="0" err="1">
+                <a:latin typeface="Courier New" pitchFamily="49" charset="0"/>
+                <a:cs typeface="Courier New" pitchFamily="49" charset="0"/>
+              </a:rPr>
+              <a:t>uniform_int_distribution</a:t>
+            </a:r>
+            <a:r>
+              <a:rPr lang="en-US" sz="1600" dirty="0">
+                <a:latin typeface="Courier New" pitchFamily="49" charset="0"/>
+                <a:cs typeface="Courier New" pitchFamily="49" charset="0"/>
+              </a:rPr>
+              <a:t>&lt;</a:t>
+            </a:r>
+            <a:r>
+              <a:rPr lang="en-US" sz="1600" dirty="0" err="1">
+                <a:latin typeface="Courier New" pitchFamily="49" charset="0"/>
+                <a:cs typeface="Courier New" pitchFamily="49" charset="0"/>
+              </a:rPr>
+              <a:t>size_t</a:t>
+            </a:r>
+            <a:r>
+              <a:rPr lang="en-US" sz="1600" dirty="0">
+                <a:latin typeface="Courier New" pitchFamily="49" charset="0"/>
+                <a:cs typeface="Courier New" pitchFamily="49" charset="0"/>
+              </a:rPr>
+              <a:t>&gt;;</a:t>
+            </a:r>
+          </a:p>
+          <a:p>
+            <a:r>
+              <a:rPr lang="en-US" sz="1600" dirty="0" smtClean="0">
+                <a:latin typeface="Courier New" pitchFamily="49" charset="0"/>
+                <a:cs typeface="Courier New" pitchFamily="49" charset="0"/>
+              </a:rPr>
+              <a:t>…</a:t>
+            </a:r>
+            <a:endParaRPr lang="en-US" sz="1600" dirty="0">
+              <a:latin typeface="Courier New" pitchFamily="49" charset="0"/>
+              <a:cs typeface="Courier New" pitchFamily="49" charset="0"/>
+            </a:endParaRPr>
+          </a:p>
+          <a:p>
+            <a:r>
+              <a:rPr lang="en-US" sz="1600" dirty="0" err="1" smtClean="0">
+                <a:latin typeface="Courier New" pitchFamily="49" charset="0"/>
+                <a:cs typeface="Courier New" pitchFamily="49" charset="0"/>
+              </a:rPr>
+              <a:t>random_device</a:t>
+            </a:r>
+            <a:r>
+              <a:rPr lang="en-US" sz="1600" dirty="0" smtClean="0">
+                <a:latin typeface="Courier New" pitchFamily="49" charset="0"/>
+                <a:cs typeface="Courier New" pitchFamily="49" charset="0"/>
+              </a:rPr>
+              <a:t> </a:t>
+            </a:r>
+            <a:r>
+              <a:rPr lang="en-US" sz="1600" dirty="0">
+                <a:latin typeface="Courier New" pitchFamily="49" charset="0"/>
+                <a:cs typeface="Courier New" pitchFamily="49" charset="0"/>
+              </a:rPr>
+              <a:t>dev;</a:t>
+            </a:r>
+          </a:p>
+          <a:p>
+            <a:r>
+              <a:rPr lang="en-US" sz="1600" dirty="0" err="1" smtClean="0">
+                <a:latin typeface="Courier New" pitchFamily="49" charset="0"/>
+                <a:cs typeface="Courier New" pitchFamily="49" charset="0"/>
+              </a:rPr>
+              <a:t>seed_dist_t</a:t>
+            </a:r>
+            <a:r>
+              <a:rPr lang="en-US" sz="1600" dirty="0" smtClean="0">
+                <a:latin typeface="Courier New" pitchFamily="49" charset="0"/>
+                <a:cs typeface="Courier New" pitchFamily="49" charset="0"/>
+              </a:rPr>
+              <a:t> </a:t>
+            </a:r>
+            <a:r>
+              <a:rPr lang="en-US" sz="1600" dirty="0" err="1">
+                <a:latin typeface="Courier New" pitchFamily="49" charset="0"/>
+                <a:cs typeface="Courier New" pitchFamily="49" charset="0"/>
+              </a:rPr>
+              <a:t>seed_distr</a:t>
+            </a:r>
+            <a:r>
+              <a:rPr lang="en-US" sz="1600" dirty="0">
+                <a:latin typeface="Courier New" pitchFamily="49" charset="0"/>
+                <a:cs typeface="Courier New" pitchFamily="49" charset="0"/>
+              </a:rPr>
+              <a:t>(0, </a:t>
+            </a:r>
+            <a:r>
+              <a:rPr lang="en-US" sz="1600" dirty="0" err="1">
+                <a:latin typeface="Courier New" pitchFamily="49" charset="0"/>
+                <a:cs typeface="Courier New" pitchFamily="49" charset="0"/>
+              </a:rPr>
+              <a:t>numeric_limits</a:t>
+            </a:r>
+            <a:r>
+              <a:rPr lang="en-US" sz="1600" dirty="0">
+                <a:latin typeface="Courier New" pitchFamily="49" charset="0"/>
+                <a:cs typeface="Courier New" pitchFamily="49" charset="0"/>
+              </a:rPr>
+              <a:t>&lt;</a:t>
+            </a:r>
+            <a:r>
+              <a:rPr lang="en-US" sz="1600" dirty="0" err="1">
+                <a:latin typeface="Courier New" pitchFamily="49" charset="0"/>
+                <a:cs typeface="Courier New" pitchFamily="49" charset="0"/>
+              </a:rPr>
+              <a:t>size_t</a:t>
+            </a:r>
+            <a:r>
+              <a:rPr lang="en-US" sz="1600" dirty="0">
+                <a:latin typeface="Courier New" pitchFamily="49" charset="0"/>
+                <a:cs typeface="Courier New" pitchFamily="49" charset="0"/>
+              </a:rPr>
+              <a:t>&gt;::max());</a:t>
+            </a:r>
+          </a:p>
+          <a:p>
+            <a:r>
+              <a:rPr lang="en-US" sz="1600" dirty="0" smtClean="0">
+                <a:latin typeface="Courier New" pitchFamily="49" charset="0"/>
+                <a:cs typeface="Courier New" pitchFamily="49" charset="0"/>
+              </a:rPr>
+              <a:t>auto </a:t>
+            </a:r>
+            <a:r>
+              <a:rPr lang="en-US" sz="1600" dirty="0">
+                <a:latin typeface="Courier New" pitchFamily="49" charset="0"/>
+                <a:cs typeface="Courier New" pitchFamily="49" charset="0"/>
+              </a:rPr>
+              <a:t>seed = </a:t>
+            </a:r>
+            <a:r>
+              <a:rPr lang="en-US" sz="1600" dirty="0" err="1">
+                <a:latin typeface="Courier New" pitchFamily="49" charset="0"/>
+                <a:cs typeface="Courier New" pitchFamily="49" charset="0"/>
+              </a:rPr>
+              <a:t>seed_distr</a:t>
+            </a:r>
+            <a:r>
+              <a:rPr lang="en-US" sz="1600" dirty="0">
+                <a:latin typeface="Courier New" pitchFamily="49" charset="0"/>
+                <a:cs typeface="Courier New" pitchFamily="49" charset="0"/>
+              </a:rPr>
+              <a:t>(dev);</a:t>
+            </a:r>
+          </a:p>
+          <a:p>
+            <a:r>
+              <a:rPr lang="en-US" sz="1600" dirty="0" err="1" smtClean="0">
+                <a:latin typeface="Courier New" pitchFamily="49" charset="0"/>
+                <a:cs typeface="Courier New" pitchFamily="49" charset="0"/>
+              </a:rPr>
+              <a:t>cout</a:t>
+            </a:r>
+            <a:r>
+              <a:rPr lang="en-US" sz="1600" dirty="0" smtClean="0">
+                <a:latin typeface="Courier New" pitchFamily="49" charset="0"/>
+                <a:cs typeface="Courier New" pitchFamily="49" charset="0"/>
+              </a:rPr>
+              <a:t> </a:t>
+            </a:r>
+            <a:r>
+              <a:rPr lang="en-US" sz="1600" dirty="0">
+                <a:latin typeface="Courier New" pitchFamily="49" charset="0"/>
+                <a:cs typeface="Courier New" pitchFamily="49" charset="0"/>
+              </a:rPr>
+              <a:t>&lt;&lt; seed &lt;&lt; </a:t>
+            </a:r>
+            <a:r>
+              <a:rPr lang="en-US" sz="1600" dirty="0" err="1">
+                <a:latin typeface="Courier New" pitchFamily="49" charset="0"/>
+                <a:cs typeface="Courier New" pitchFamily="49" charset="0"/>
+              </a:rPr>
+              <a:t>endl</a:t>
+            </a:r>
+            <a:r>
+              <a:rPr lang="en-US" sz="1600" dirty="0">
+                <a:latin typeface="Courier New" pitchFamily="49" charset="0"/>
+                <a:cs typeface="Courier New" pitchFamily="49" charset="0"/>
+              </a:rPr>
+              <a:t>;</a:t>
+            </a:r>
+          </a:p>
+          <a:p>
+            <a:r>
+              <a:rPr lang="en-US" sz="1600" dirty="0" smtClean="0">
+                <a:latin typeface="Courier New" pitchFamily="49" charset="0"/>
+                <a:cs typeface="Courier New" pitchFamily="49" charset="0"/>
+              </a:rPr>
+              <a:t>mt19937_64 </a:t>
+            </a:r>
+            <a:r>
+              <a:rPr lang="en-US" sz="1600" dirty="0">
+                <a:latin typeface="Courier New" pitchFamily="49" charset="0"/>
+                <a:cs typeface="Courier New" pitchFamily="49" charset="0"/>
+              </a:rPr>
+              <a:t>engine(seed);</a:t>
+            </a:r>
+          </a:p>
+          <a:p>
+            <a:r>
+              <a:rPr lang="en-US" sz="1600" dirty="0" smtClean="0">
+                <a:latin typeface="Courier New" pitchFamily="49" charset="0"/>
+                <a:cs typeface="Courier New" pitchFamily="49" charset="0"/>
+              </a:rPr>
+              <a:t>auto </a:t>
+            </a:r>
+            <a:r>
+              <a:rPr lang="en-US" sz="1600" dirty="0" err="1" smtClean="0">
+                <a:latin typeface="Courier New" pitchFamily="49" charset="0"/>
+                <a:cs typeface="Courier New" pitchFamily="49" charset="0"/>
+              </a:rPr>
+              <a:t>distr</a:t>
+            </a:r>
+            <a:r>
+              <a:rPr lang="en-US" sz="1600" dirty="0" smtClean="0">
+                <a:latin typeface="Courier New" pitchFamily="49" charset="0"/>
+                <a:cs typeface="Courier New" pitchFamily="49" charset="0"/>
+              </a:rPr>
+              <a:t> </a:t>
+            </a:r>
+            <a:r>
+              <a:rPr lang="en-US" sz="1600" dirty="0">
+                <a:latin typeface="Courier New" pitchFamily="49" charset="0"/>
+                <a:cs typeface="Courier New" pitchFamily="49" charset="0"/>
+              </a:rPr>
+              <a:t>= </a:t>
+            </a:r>
+            <a:r>
+              <a:rPr lang="en-US" sz="1600" dirty="0" smtClean="0">
+                <a:latin typeface="Courier New" pitchFamily="49" charset="0"/>
+                <a:cs typeface="Courier New" pitchFamily="49" charset="0"/>
+              </a:rPr>
+              <a:t>bind(</a:t>
+            </a:r>
+            <a:r>
+              <a:rPr lang="en-US" sz="1600" dirty="0" err="1" smtClean="0">
+                <a:latin typeface="Courier New" pitchFamily="49" charset="0"/>
+                <a:cs typeface="Courier New" pitchFamily="49" charset="0"/>
+              </a:rPr>
+              <a:t>normal_distribution</a:t>
+            </a:r>
+            <a:r>
+              <a:rPr lang="en-US" sz="1600" dirty="0" smtClean="0">
+                <a:latin typeface="Courier New" pitchFamily="49" charset="0"/>
+                <a:cs typeface="Courier New" pitchFamily="49" charset="0"/>
+              </a:rPr>
+              <a:t>&lt;</a:t>
+            </a:r>
+            <a:r>
+              <a:rPr lang="en-US" sz="1600" dirty="0" err="1" smtClean="0">
+                <a:latin typeface="Courier New" pitchFamily="49" charset="0"/>
+                <a:cs typeface="Courier New" pitchFamily="49" charset="0"/>
+              </a:rPr>
+              <a:t>int</a:t>
+            </a:r>
+            <a:r>
+              <a:rPr lang="en-US" sz="1600" dirty="0" smtClean="0">
+                <a:latin typeface="Courier New" pitchFamily="49" charset="0"/>
+                <a:cs typeface="Courier New" pitchFamily="49" charset="0"/>
+              </a:rPr>
+              <a:t>&gt;(0.0, 1.0),                  </a:t>
+            </a:r>
+            <a:br>
+              <a:rPr lang="en-US" sz="1600" dirty="0" smtClean="0">
+                <a:latin typeface="Courier New" pitchFamily="49" charset="0"/>
+                <a:cs typeface="Courier New" pitchFamily="49" charset="0"/>
+              </a:rPr>
+            </a:br>
+            <a:r>
+              <a:rPr lang="en-US" sz="1600" dirty="0" smtClean="0">
+                <a:latin typeface="Courier New" pitchFamily="49" charset="0"/>
+                <a:cs typeface="Courier New" pitchFamily="49" charset="0"/>
+              </a:rPr>
+              <a:t>                  engine</a:t>
+            </a:r>
+            <a:r>
+              <a:rPr lang="en-US" sz="1600" dirty="0">
+                <a:latin typeface="Courier New" pitchFamily="49" charset="0"/>
+                <a:cs typeface="Courier New" pitchFamily="49" charset="0"/>
+              </a:rPr>
+              <a:t>);</a:t>
+            </a:r>
+          </a:p>
+          <a:p>
+            <a:r>
+              <a:rPr lang="en-US" sz="1600" dirty="0" smtClean="0">
+                <a:latin typeface="Courier New" pitchFamily="49" charset="0"/>
+                <a:cs typeface="Courier New" pitchFamily="49" charset="0"/>
+              </a:rPr>
+              <a:t>for </a:t>
+            </a:r>
+            <a:r>
+              <a:rPr lang="en-US" sz="1600" dirty="0">
+                <a:latin typeface="Courier New" pitchFamily="49" charset="0"/>
+                <a:cs typeface="Courier New" pitchFamily="49" charset="0"/>
+              </a:rPr>
+              <a:t>(</a:t>
+            </a:r>
+            <a:r>
+              <a:rPr lang="en-US" sz="1600" dirty="0" err="1">
+                <a:latin typeface="Courier New" pitchFamily="49" charset="0"/>
+                <a:cs typeface="Courier New" pitchFamily="49" charset="0"/>
+              </a:rPr>
+              <a:t>int</a:t>
+            </a:r>
+            <a:r>
+              <a:rPr lang="en-US" sz="1600" dirty="0">
+                <a:latin typeface="Courier New" pitchFamily="49" charset="0"/>
+                <a:cs typeface="Courier New" pitchFamily="49" charset="0"/>
+              </a:rPr>
+              <a:t> </a:t>
+            </a:r>
+            <a:r>
+              <a:rPr lang="en-US" sz="1600" dirty="0" err="1">
+                <a:latin typeface="Courier New" pitchFamily="49" charset="0"/>
+                <a:cs typeface="Courier New" pitchFamily="49" charset="0"/>
+              </a:rPr>
+              <a:t>i</a:t>
+            </a:r>
+            <a:r>
+              <a:rPr lang="en-US" sz="1600" dirty="0">
+                <a:latin typeface="Courier New" pitchFamily="49" charset="0"/>
+                <a:cs typeface="Courier New" pitchFamily="49" charset="0"/>
+              </a:rPr>
+              <a:t> = 0; </a:t>
+            </a:r>
+            <a:r>
+              <a:rPr lang="en-US" sz="1600" dirty="0" err="1">
+                <a:latin typeface="Courier New" pitchFamily="49" charset="0"/>
+                <a:cs typeface="Courier New" pitchFamily="49" charset="0"/>
+              </a:rPr>
+              <a:t>i</a:t>
+            </a:r>
+            <a:r>
+              <a:rPr lang="en-US" sz="1600" dirty="0">
+                <a:latin typeface="Courier New" pitchFamily="49" charset="0"/>
+                <a:cs typeface="Courier New" pitchFamily="49" charset="0"/>
+              </a:rPr>
+              <a:t> &lt; 5; </a:t>
+            </a:r>
+            <a:r>
+              <a:rPr lang="en-US" sz="1600" dirty="0" err="1">
+                <a:latin typeface="Courier New" pitchFamily="49" charset="0"/>
+                <a:cs typeface="Courier New" pitchFamily="49" charset="0"/>
+              </a:rPr>
+              <a:t>i</a:t>
+            </a:r>
+            <a:r>
+              <a:rPr lang="en-US" sz="1600" dirty="0">
+                <a:latin typeface="Courier New" pitchFamily="49" charset="0"/>
+                <a:cs typeface="Courier New" pitchFamily="49" charset="0"/>
+              </a:rPr>
+              <a:t>++)</a:t>
+            </a:r>
+          </a:p>
+          <a:p>
+            <a:r>
+              <a:rPr lang="en-US" sz="1600" dirty="0" smtClean="0">
+                <a:latin typeface="Courier New" pitchFamily="49" charset="0"/>
+                <a:cs typeface="Courier New" pitchFamily="49" charset="0"/>
+              </a:rPr>
+              <a:t>    </a:t>
+            </a:r>
+            <a:r>
+              <a:rPr lang="en-US" sz="1600" dirty="0" err="1">
+                <a:latin typeface="Courier New" pitchFamily="49" charset="0"/>
+                <a:cs typeface="Courier New" pitchFamily="49" charset="0"/>
+              </a:rPr>
+              <a:t>cout</a:t>
+            </a:r>
+            <a:r>
+              <a:rPr lang="en-US" sz="1600" dirty="0">
+                <a:latin typeface="Courier New" pitchFamily="49" charset="0"/>
+                <a:cs typeface="Courier New" pitchFamily="49" charset="0"/>
+              </a:rPr>
+              <a:t> &lt;&lt; </a:t>
+            </a:r>
+            <a:r>
+              <a:rPr lang="en-US" sz="1600" dirty="0" err="1" smtClean="0">
+                <a:latin typeface="Courier New" pitchFamily="49" charset="0"/>
+                <a:cs typeface="Courier New" pitchFamily="49" charset="0"/>
+              </a:rPr>
+              <a:t>distr</a:t>
+            </a:r>
+            <a:r>
+              <a:rPr lang="en-US" sz="1600" dirty="0">
+                <a:latin typeface="Courier New" pitchFamily="49" charset="0"/>
+                <a:cs typeface="Courier New" pitchFamily="49" charset="0"/>
+              </a:rPr>
+              <a:t>() &lt;&lt; </a:t>
+            </a:r>
+            <a:r>
+              <a:rPr lang="en-US" sz="1600" dirty="0" err="1">
+                <a:latin typeface="Courier New" pitchFamily="49" charset="0"/>
+                <a:cs typeface="Courier New" pitchFamily="49" charset="0"/>
+              </a:rPr>
+              <a:t>endl</a:t>
+            </a:r>
+            <a:r>
+              <a:rPr lang="en-US" sz="1600" dirty="0" smtClean="0">
+                <a:latin typeface="Courier New" pitchFamily="49" charset="0"/>
+                <a:cs typeface="Courier New" pitchFamily="49" charset="0"/>
+              </a:rPr>
+              <a:t>;</a:t>
+            </a:r>
+            <a:endParaRPr lang="en-US" sz="1600" dirty="0">
+              <a:latin typeface="Courier New" pitchFamily="49" charset="0"/>
+              <a:cs typeface="Courier New" pitchFamily="49" charset="0"/>
+            </a:endParaRPr>
+          </a:p>
+        </p:txBody>
+      </p:sp>
+      <p:sp>
+        <p:nvSpPr>
+          <p:cNvPr id="11" name="TextBox 10"/>
+          <p:cNvSpPr txBox="1"/>
+          <p:nvPr/>
+        </p:nvSpPr>
+        <p:spPr>
+          <a:xfrm>
+            <a:off x="176365" y="3050803"/>
+            <a:ext cx="914400" cy="523220"/>
           </a:xfrm>
           <a:prstGeom prst="rect">
             <a:avLst/>
           </a:prstGeom>
           <a:noFill/>
-          <a:ln>
-            <a:solidFill>
-              <a:schemeClr val="tx1"/>
-            </a:solidFill>
-          </a:ln>
         </p:spPr>
         <p:txBody>
-          <a:bodyPr wrap="none" rtlCol="0">
+          <a:bodyPr wrap="square" rtlCol="0">
             <a:spAutoFit/>
           </a:bodyPr>
           <a:lstStyle/>
           <a:p>
             <a:r>
-              <a:rPr lang="en-US" sz="2800" dirty="0" smtClean="0"/>
-              <a:t>Here: a flavor of Armadillo</a:t>
+              <a:rPr lang="en-US" sz="2800" dirty="0">
+                <a:solidFill>
+                  <a:srgbClr val="C00000"/>
+                </a:solidFill>
+                <a:sym typeface="Wingdings" panose="05000000000000000000" pitchFamily="2" charset="2"/>
+              </a:rPr>
+              <a:t></a:t>
+            </a:r>
+            <a:endParaRPr lang="en-US" sz="2800" dirty="0">
+              <a:solidFill>
+                <a:srgbClr val="C00000"/>
+              </a:solidFill>
+            </a:endParaRPr>
+          </a:p>
+        </p:txBody>
+      </p:sp>
+      <p:sp>
+        <p:nvSpPr>
+          <p:cNvPr id="12" name="Rectangle 11"/>
+          <p:cNvSpPr/>
+          <p:nvPr/>
+        </p:nvSpPr>
+        <p:spPr>
+          <a:xfrm>
+            <a:off x="176366" y="3312413"/>
+            <a:ext cx="505267" cy="523220"/>
+          </a:xfrm>
+          <a:prstGeom prst="rect">
+            <a:avLst/>
+          </a:prstGeom>
+        </p:spPr>
+        <p:txBody>
+          <a:bodyPr wrap="none">
+            <a:spAutoFit/>
+          </a:bodyPr>
+          <a:lstStyle/>
+          <a:p>
+            <a:r>
+              <a:rPr lang="en-US" sz="2800" dirty="0">
+                <a:solidFill>
+                  <a:srgbClr val="C00000"/>
+                </a:solidFill>
+                <a:sym typeface="Wingdings" panose="05000000000000000000" pitchFamily="2" charset="2"/>
+              </a:rPr>
+              <a:t></a:t>
+            </a:r>
+            <a:endParaRPr lang="en-US" sz="2800" dirty="0"/>
+          </a:p>
+        </p:txBody>
+      </p:sp>
+      <p:sp>
+        <p:nvSpPr>
+          <p:cNvPr id="13" name="Rectangle 12"/>
+          <p:cNvSpPr/>
+          <p:nvPr/>
+        </p:nvSpPr>
+        <p:spPr>
+          <a:xfrm>
+            <a:off x="176365" y="3574023"/>
+            <a:ext cx="505267" cy="523220"/>
+          </a:xfrm>
+          <a:prstGeom prst="rect">
+            <a:avLst/>
+          </a:prstGeom>
+        </p:spPr>
+        <p:txBody>
+          <a:bodyPr wrap="none">
+            <a:spAutoFit/>
+          </a:bodyPr>
+          <a:lstStyle/>
+          <a:p>
+            <a:r>
+              <a:rPr lang="en-US" sz="2800" dirty="0">
+                <a:solidFill>
+                  <a:srgbClr val="C00000"/>
+                </a:solidFill>
+                <a:sym typeface="Wingdings" panose="05000000000000000000" pitchFamily="2" charset="2"/>
+              </a:rPr>
+              <a:t></a:t>
+            </a:r>
+            <a:endParaRPr lang="en-US" sz="2800" dirty="0"/>
+          </a:p>
+        </p:txBody>
+      </p:sp>
+      <p:sp>
+        <p:nvSpPr>
+          <p:cNvPr id="14" name="Rectangle 13"/>
+          <p:cNvSpPr/>
+          <p:nvPr/>
+        </p:nvSpPr>
+        <p:spPr>
+          <a:xfrm>
+            <a:off x="176365" y="4033352"/>
+            <a:ext cx="505267" cy="523220"/>
+          </a:xfrm>
+          <a:prstGeom prst="rect">
+            <a:avLst/>
+          </a:prstGeom>
+        </p:spPr>
+        <p:txBody>
+          <a:bodyPr wrap="none">
+            <a:spAutoFit/>
+          </a:bodyPr>
+          <a:lstStyle/>
+          <a:p>
+            <a:r>
+              <a:rPr lang="en-US" sz="2800" dirty="0">
+                <a:solidFill>
+                  <a:srgbClr val="C00000"/>
+                </a:solidFill>
+                <a:sym typeface="Wingdings" panose="05000000000000000000" pitchFamily="2" charset="2"/>
+              </a:rPr>
+              <a:t></a:t>
+            </a:r>
+            <a:endParaRPr lang="en-US" sz="2800" dirty="0"/>
+          </a:p>
+        </p:txBody>
+      </p:sp>
+      <p:sp>
+        <p:nvSpPr>
+          <p:cNvPr id="15" name="Rectangle 14"/>
+          <p:cNvSpPr/>
+          <p:nvPr/>
+        </p:nvSpPr>
+        <p:spPr>
+          <a:xfrm>
+            <a:off x="176364" y="4476723"/>
+            <a:ext cx="505267" cy="523220"/>
+          </a:xfrm>
+          <a:prstGeom prst="rect">
+            <a:avLst/>
+          </a:prstGeom>
+        </p:spPr>
+        <p:txBody>
+          <a:bodyPr wrap="none">
+            <a:spAutoFit/>
+          </a:bodyPr>
+          <a:lstStyle/>
+          <a:p>
+            <a:r>
+              <a:rPr lang="en-US" sz="2800" dirty="0">
+                <a:solidFill>
+                  <a:srgbClr val="C00000"/>
+                </a:solidFill>
+                <a:sym typeface="Wingdings" panose="05000000000000000000" pitchFamily="2" charset="2"/>
+              </a:rPr>
+              <a:t></a:t>
+            </a:r>
+            <a:endParaRPr lang="en-US" sz="2800" dirty="0"/>
+          </a:p>
+        </p:txBody>
+      </p:sp>
+      <p:sp>
+        <p:nvSpPr>
+          <p:cNvPr id="16" name="Rectangle 15"/>
+          <p:cNvSpPr/>
+          <p:nvPr/>
+        </p:nvSpPr>
+        <p:spPr>
+          <a:xfrm>
+            <a:off x="176364" y="5015901"/>
+            <a:ext cx="505267" cy="523220"/>
+          </a:xfrm>
+          <a:prstGeom prst="rect">
+            <a:avLst/>
+          </a:prstGeom>
+        </p:spPr>
+        <p:txBody>
+          <a:bodyPr wrap="none">
+            <a:spAutoFit/>
+          </a:bodyPr>
+          <a:lstStyle/>
+          <a:p>
+            <a:r>
+              <a:rPr lang="en-US" sz="2800" dirty="0">
+                <a:solidFill>
+                  <a:srgbClr val="C00000"/>
+                </a:solidFill>
+                <a:sym typeface="Wingdings" panose="05000000000000000000" pitchFamily="2" charset="2"/>
+              </a:rPr>
+              <a:t></a:t>
             </a:r>
             <a:endParaRPr lang="en-US" sz="2800" dirty="0"/>
           </a:p>
@@ -8508,7 +10827,7 @@
     </p:spTree>
     <p:extLst>
       <p:ext uri="{BB962C8B-B14F-4D97-AF65-F5344CB8AC3E}">
-        <p14:creationId xmlns:p14="http://schemas.microsoft.com/office/powerpoint/2010/main" val="968117353"/>
+        <p14:creationId xmlns:p14="http://schemas.microsoft.com/office/powerpoint/2010/main" val="1724380692"/>
       </p:ext>
     </p:extLst>
   </p:cSld>
@@ -8527,9 +10846,6 @@
                     <p:cTn id="3" fill="hold">
                       <p:stCondLst>
                         <p:cond delay="indefinite"/>
-                        <p:cond evt="onBegin" delay="0">
-                          <p:tn val="2"/>
-                        </p:cond>
                       </p:stCondLst>
                       <p:childTnLst>
                         <p:par>
@@ -8539,7 +10855,7 @@
                             </p:stCondLst>
                             <p:childTnLst>
                               <p:par>
-                                <p:cTn id="5" presetID="1" presetClass="entr" presetSubtype="0" fill="hold" grpId="0" nodeType="withEffect">
+                                <p:cTn id="5" presetID="1" presetClass="entr" presetSubtype="0" fill="hold" grpId="0" nodeType="clickEffect">
                                   <p:stCondLst>
                                     <p:cond delay="0"/>
                                   </p:stCondLst>
@@ -8552,11 +10868,7 @@
                                           </p:stCondLst>
                                         </p:cTn>
                                         <p:tgtEl>
-                                          <p:spTgt spid="4">
-                                            <p:txEl>
-                                              <p:pRg st="0" end="0"/>
-                                            </p:txEl>
-                                          </p:spTgt>
+                                          <p:spTgt spid="11"/>
                                         </p:tgtEl>
                                         <p:attrNameLst>
                                           <p:attrName>style.visibility</p:attrName>
@@ -8601,11 +10913,7 @@
                                           </p:stCondLst>
                                         </p:cTn>
                                         <p:tgtEl>
-                                          <p:spTgt spid="4">
-                                            <p:txEl>
-                                              <p:pRg st="1" end="1"/>
-                                            </p:txEl>
-                                          </p:spTgt>
+                                          <p:spTgt spid="12"/>
                                         </p:tgtEl>
                                         <p:attrNameLst>
                                           <p:attrName>style.visibility</p:attrName>
@@ -8618,39 +10926,26 @@
                                   </p:childTnLst>
                                 </p:cTn>
                               </p:par>
+                            </p:childTnLst>
+                          </p:cTn>
+                        </p:par>
+                      </p:childTnLst>
+                    </p:cTn>
+                  </p:par>
+                  <p:par>
+                    <p:cTn id="11" fill="hold">
+                      <p:stCondLst>
+                        <p:cond delay="indefinite"/>
+                      </p:stCondLst>
+                      <p:childTnLst>
+                        <p:par>
+                          <p:cTn id="12" fill="hold">
+                            <p:stCondLst>
+                              <p:cond delay="0"/>
+                            </p:stCondLst>
+                            <p:childTnLst>
                               <p:par>
-                                <p:cTn id="11" presetID="1" presetClass="entr" presetSubtype="0" fill="hold" grpId="0" nodeType="withEffect">
-                                  <p:stCondLst>
-                                    <p:cond delay="0"/>
-                                  </p:stCondLst>
-                                  <p:childTnLst>
-                                    <p:set>
-                                      <p:cBhvr>
-                                        <p:cTn id="12" dur="1" fill="hold">
-                                          <p:stCondLst>
-                                            <p:cond delay="0"/>
-                                          </p:stCondLst>
-                                        </p:cTn>
-                                        <p:tgtEl>
-                                          <p:spTgt spid="4">
-                                            <p:txEl>
-                                              <p:pRg st="2" end="2"/>
-                                            </p:txEl>
-                                          </p:spTgt>
-                                        </p:tgtEl>
-                                        <p:attrNameLst>
-                                          <p:attrName>style.visibility</p:attrName>
-                                        </p:attrNameLst>
-                                      </p:cBhvr>
-                                      <p:to>
-                                        <p:strVal val="visible"/>
-                                      </p:to>
-                                    </p:set>
-                                  </p:childTnLst>
-                                </p:cTn>
-                              </p:par>
-                              <p:par>
-                                <p:cTn id="13" presetID="1" presetClass="entr" presetSubtype="0" fill="hold" grpId="0" nodeType="withEffect">
+                                <p:cTn id="13" presetID="1" presetClass="entr" presetSubtype="0" fill="hold" grpId="0" nodeType="clickEffect">
                                   <p:stCondLst>
                                     <p:cond delay="0"/>
                                   </p:stCondLst>
@@ -8663,11 +10958,7 @@
                                           </p:stCondLst>
                                         </p:cTn>
                                         <p:tgtEl>
-                                          <p:spTgt spid="4">
-                                            <p:txEl>
-                                              <p:pRg st="3" end="3"/>
-                                            </p:txEl>
-                                          </p:spTgt>
+                                          <p:spTgt spid="13"/>
                                         </p:tgtEl>
                                         <p:attrNameLst>
                                           <p:attrName>style.visibility</p:attrName>
@@ -8712,135 +11003,7 @@
                                           </p:stCondLst>
                                         </p:cTn>
                                         <p:tgtEl>
-                                          <p:spTgt spid="4">
-                                            <p:txEl>
-                                              <p:pRg st="4" end="4"/>
-                                            </p:txEl>
-                                          </p:spTgt>
-                                        </p:tgtEl>
-                                        <p:attrNameLst>
-                                          <p:attrName>style.visibility</p:attrName>
-                                        </p:attrNameLst>
-                                      </p:cBhvr>
-                                      <p:to>
-                                        <p:strVal val="visible"/>
-                                      </p:to>
-                                    </p:set>
-                                  </p:childTnLst>
-                                </p:cTn>
-                              </p:par>
-                              <p:par>
-                                <p:cTn id="19" presetID="1" presetClass="entr" presetSubtype="0" fill="hold" grpId="0" nodeType="withEffect">
-                                  <p:stCondLst>
-                                    <p:cond delay="0"/>
-                                  </p:stCondLst>
-                                  <p:childTnLst>
-                                    <p:set>
-                                      <p:cBhvr>
-                                        <p:cTn id="20" dur="1" fill="hold">
-                                          <p:stCondLst>
-                                            <p:cond delay="0"/>
-                                          </p:stCondLst>
-                                        </p:cTn>
-                                        <p:tgtEl>
-                                          <p:spTgt spid="4">
-                                            <p:txEl>
-                                              <p:pRg st="5" end="5"/>
-                                            </p:txEl>
-                                          </p:spTgt>
-                                        </p:tgtEl>
-                                        <p:attrNameLst>
-                                          <p:attrName>style.visibility</p:attrName>
-                                        </p:attrNameLst>
-                                      </p:cBhvr>
-                                      <p:to>
-                                        <p:strVal val="visible"/>
-                                      </p:to>
-                                    </p:set>
-                                  </p:childTnLst>
-                                </p:cTn>
-                              </p:par>
-                              <p:par>
-                                <p:cTn id="21" presetID="1" presetClass="entr" presetSubtype="0" fill="hold" grpId="0" nodeType="withEffect">
-                                  <p:stCondLst>
-                                    <p:cond delay="0"/>
-                                  </p:stCondLst>
-                                  <p:childTnLst>
-                                    <p:set>
-                                      <p:cBhvr>
-                                        <p:cTn id="22" dur="1" fill="hold">
-                                          <p:stCondLst>
-                                            <p:cond delay="0"/>
-                                          </p:stCondLst>
-                                        </p:cTn>
-                                        <p:tgtEl>
-                                          <p:spTgt spid="4">
-                                            <p:txEl>
-                                              <p:pRg st="6" end="6"/>
-                                            </p:txEl>
-                                          </p:spTgt>
-                                        </p:tgtEl>
-                                        <p:attrNameLst>
-                                          <p:attrName>style.visibility</p:attrName>
-                                        </p:attrNameLst>
-                                      </p:cBhvr>
-                                      <p:to>
-                                        <p:strVal val="visible"/>
-                                      </p:to>
-                                    </p:set>
-                                  </p:childTnLst>
-                                </p:cTn>
-                              </p:par>
-                              <p:par>
-                                <p:cTn id="23" presetID="1" presetClass="entr" presetSubtype="0" fill="hold" grpId="0" nodeType="withEffect">
-                                  <p:stCondLst>
-                                    <p:cond delay="0"/>
-                                  </p:stCondLst>
-                                  <p:childTnLst>
-                                    <p:set>
-                                      <p:cBhvr>
-                                        <p:cTn id="24" dur="1" fill="hold">
-                                          <p:stCondLst>
-                                            <p:cond delay="0"/>
-                                          </p:stCondLst>
-                                        </p:cTn>
-                                        <p:tgtEl>
-                                          <p:spTgt spid="4">
-                                            <p:txEl>
-                                              <p:pRg st="7" end="7"/>
-                                            </p:txEl>
-                                          </p:spTgt>
-                                        </p:tgtEl>
-                                        <p:attrNameLst>
-                                          <p:attrName>style.visibility</p:attrName>
-                                        </p:attrNameLst>
-                                      </p:cBhvr>
-                                      <p:to>
-                                        <p:strVal val="visible"/>
-                                      </p:to>
-                                    </p:set>
-                                  </p:childTnLst>
-                                </p:cTn>
-                              </p:par>
-                              <p:par>
-                                <p:cTn id="25" presetID="1" presetClass="entr" presetSubtype="0" fill="hold" grpId="0" nodeType="withEffect">
-                                  <p:stCondLst>
-                                    <p:cond delay="0"/>
-                                  </p:stCondLst>
-                                  <p:childTnLst>
-                                    <p:set>
-                                      <p:cBhvr>
-                                        <p:cTn id="26" dur="1" fill="hold">
-                                          <p:stCondLst>
-                                            <p:cond delay="0"/>
-                                          </p:stCondLst>
-                                        </p:cTn>
-                                        <p:tgtEl>
-                                          <p:spTgt spid="4">
-                                            <p:txEl>
-                                              <p:pRg st="8" end="8"/>
-                                            </p:txEl>
-                                          </p:spTgt>
+                                          <p:spTgt spid="14"/>
                                         </p:tgtEl>
                                         <p:attrNameLst>
                                           <p:attrName>style.visibility</p:attrName>
@@ -8860,36 +11023,32 @@
                     </p:cTn>
                   </p:par>
                   <p:par>
-                    <p:cTn id="27" fill="hold">
+                    <p:cTn id="19" fill="hold">
                       <p:stCondLst>
                         <p:cond delay="indefinite"/>
                       </p:stCondLst>
                       <p:childTnLst>
                         <p:par>
-                          <p:cTn id="28" fill="hold">
+                          <p:cTn id="20" fill="hold">
                             <p:stCondLst>
                               <p:cond delay="0"/>
                             </p:stCondLst>
                             <p:childTnLst>
                               <p:par>
-                                <p:cTn id="29" presetID="1" presetClass="entr" presetSubtype="0" fill="hold" grpId="0" nodeType="clickEffect">
+                                <p:cTn id="21" presetID="1" presetClass="entr" presetSubtype="0" fill="hold" grpId="0" nodeType="clickEffect">
                                   <p:stCondLst>
                                     <p:cond delay="0"/>
                                   </p:stCondLst>
                                   <p:childTnLst>
                                     <p:set>
                                       <p:cBhvr>
-                                        <p:cTn id="30" dur="1" fill="hold">
+                                        <p:cTn id="22" dur="1" fill="hold">
                                           <p:stCondLst>
                                             <p:cond delay="0"/>
                                           </p:stCondLst>
                                         </p:cTn>
                                         <p:tgtEl>
-                                          <p:spTgt spid="4">
-                                            <p:txEl>
-                                              <p:pRg st="9" end="9"/>
-                                            </p:txEl>
-                                          </p:spTgt>
+                                          <p:spTgt spid="15"/>
                                         </p:tgtEl>
                                         <p:attrNameLst>
                                           <p:attrName>style.visibility</p:attrName>
@@ -8909,59 +11068,32 @@
                     </p:cTn>
                   </p:par>
                   <p:par>
-                    <p:cTn id="31" fill="hold">
+                    <p:cTn id="23" fill="hold">
                       <p:stCondLst>
                         <p:cond delay="indefinite"/>
                       </p:stCondLst>
                       <p:childTnLst>
                         <p:par>
-                          <p:cTn id="32" fill="hold">
+                          <p:cTn id="24" fill="hold">
                             <p:stCondLst>
                               <p:cond delay="0"/>
                             </p:stCondLst>
                             <p:childTnLst>
                               <p:par>
-                                <p:cTn id="33" presetID="1" presetClass="entr" presetSubtype="0" fill="hold" nodeType="clickEffect">
+                                <p:cTn id="25" presetID="1" presetClass="entr" presetSubtype="0" fill="hold" grpId="0" nodeType="clickEffect">
                                   <p:stCondLst>
                                     <p:cond delay="0"/>
                                   </p:stCondLst>
                                   <p:childTnLst>
                                     <p:set>
                                       <p:cBhvr>
-                                        <p:cTn id="34" dur="1" fill="hold">
+                                        <p:cTn id="26" dur="1" fill="hold">
                                           <p:stCondLst>
                                             <p:cond delay="0"/>
                                           </p:stCondLst>
                                         </p:cTn>
                                         <p:tgtEl>
-                                          <p:spTgt spid="1026"/>
-                                        </p:tgtEl>
-                                        <p:attrNameLst>
-                                          <p:attrName>style.visibility</p:attrName>
-                                        </p:attrNameLst>
-                                      </p:cBhvr>
-                                      <p:to>
-                                        <p:strVal val="visible"/>
-                                      </p:to>
-                                    </p:set>
-                                  </p:childTnLst>
-                                </p:cTn>
-                              </p:par>
-                              <p:par>
-                                <p:cTn id="35" presetID="1" presetClass="entr" presetSubtype="0" fill="hold" grpId="0" nodeType="withEffect">
-                                  <p:stCondLst>
-                                    <p:cond delay="0"/>
-                                  </p:stCondLst>
-                                  <p:childTnLst>
-                                    <p:set>
-                                      <p:cBhvr>
-                                        <p:cTn id="36" dur="1" fill="hold">
-                                          <p:stCondLst>
-                                            <p:cond delay="0"/>
-                                          </p:stCondLst>
-                                        </p:cTn>
-                                        <p:tgtEl>
-                                          <p:spTgt spid="5"/>
+                                          <p:spTgt spid="16"/>
                                         </p:tgtEl>
                                         <p:attrNameLst>
                                           <p:attrName>style.visibility</p:attrName>
@@ -9002,119 +11134,13 @@
       </p:par>
     </p:tnLst>
     <p:bldLst>
-      <p:bldP spid="4" grpId="0" uiExpand="1" build="p" bldLvl="2"/>
-      <p:bldP spid="5" grpId="0" animBg="1"/>
+      <p:bldP spid="11" grpId="0"/>
+      <p:bldP spid="12" grpId="0"/>
+      <p:bldP spid="13" grpId="0"/>
+      <p:bldP spid="14" grpId="0"/>
+      <p:bldP spid="15" grpId="0"/>
+      <p:bldP spid="16" grpId="0"/>
     </p:bldLst>
-  </p:timing>
-</p:sld>
-</file>
-
-<file path=ppt/slides/slide9.xml><?xml version="1.0" encoding="utf-8"?>
-<p:sld xmlns:a="http://schemas.openxmlformats.org/drawingml/2006/main" xmlns:r="http://schemas.openxmlformats.org/officeDocument/2006/relationships" xmlns:p="http://schemas.openxmlformats.org/presentationml/2006/main">
-  <p:cSld>
-    <p:spTree>
-      <p:nvGrpSpPr>
-        <p:cNvPr id="1" name=""/>
-        <p:cNvGrpSpPr/>
-        <p:nvPr/>
-      </p:nvGrpSpPr>
-      <p:grpSpPr>
-        <a:xfrm>
-          <a:off x="0" y="0"/>
-          <a:ext cx="0" cy="0"/>
-          <a:chOff x="0" y="0"/>
-          <a:chExt cx="0" cy="0"/>
-        </a:xfrm>
-      </p:grpSpPr>
-      <p:sp>
-        <p:nvSpPr>
-          <p:cNvPr id="2" name="Title 1"/>
-          <p:cNvSpPr>
-            <a:spLocks noGrp="1"/>
-          </p:cNvSpPr>
-          <p:nvPr>
-            <p:ph type="title"/>
-          </p:nvPr>
-        </p:nvSpPr>
-        <p:spPr/>
-        <p:txBody>
-          <a:bodyPr/>
-          <a:lstStyle/>
-          <a:p>
-            <a:r>
-              <a:rPr lang="en-US" dirty="0" smtClean="0"/>
-              <a:t>Ordinary differential equations</a:t>
-            </a:r>
-            <a:endParaRPr lang="en-US" dirty="0"/>
-          </a:p>
-        </p:txBody>
-      </p:sp>
-      <p:sp>
-        <p:nvSpPr>
-          <p:cNvPr id="3" name="Content Placeholder 2"/>
-          <p:cNvSpPr>
-            <a:spLocks noGrp="1"/>
-          </p:cNvSpPr>
-          <p:nvPr>
-            <p:ph idx="1"/>
-          </p:nvPr>
-        </p:nvSpPr>
-        <p:spPr/>
-        <p:txBody>
-          <a:bodyPr/>
-          <a:lstStyle/>
-          <a:p>
-            <a:r>
-              <a:rPr lang="en-US" dirty="0" smtClean="0"/>
-              <a:t>Straightforward: Boost::</a:t>
-            </a:r>
-            <a:r>
-              <a:rPr lang="en-US" dirty="0" err="1" smtClean="0"/>
-              <a:t>odeint</a:t>
-            </a:r>
-            <a:endParaRPr lang="en-US" dirty="0"/>
-          </a:p>
-        </p:txBody>
-      </p:sp>
-      <p:sp>
-        <p:nvSpPr>
-          <p:cNvPr id="4" name="Slide Number Placeholder 3"/>
-          <p:cNvSpPr>
-            <a:spLocks noGrp="1"/>
-          </p:cNvSpPr>
-          <p:nvPr>
-            <p:ph type="sldNum" sz="quarter" idx="12"/>
-          </p:nvPr>
-        </p:nvSpPr>
-        <p:spPr/>
-        <p:txBody>
-          <a:bodyPr/>
-          <a:lstStyle/>
-          <a:p>
-            <a:fld id="{9CEF4966-5219-4577-B301-14467D565841}" type="slidenum">
-              <a:rPr lang="en-US" smtClean="0"/>
-              <a:t>9</a:t>
-            </a:fld>
-            <a:endParaRPr lang="en-US"/>
-          </a:p>
-        </p:txBody>
-      </p:sp>
-    </p:spTree>
-    <p:extLst>
-      <p:ext uri="{BB962C8B-B14F-4D97-AF65-F5344CB8AC3E}">
-        <p14:creationId xmlns:p14="http://schemas.microsoft.com/office/powerpoint/2010/main" val="3264396598"/>
-      </p:ext>
-    </p:extLst>
-  </p:cSld>
-  <p:clrMapOvr>
-    <a:masterClrMapping/>
-  </p:clrMapOvr>
-  <p:timing>
-    <p:tnLst>
-      <p:par>
-        <p:cTn id="1" dur="indefinite" restart="never" nodeType="tmRoot"/>
-      </p:par>
-    </p:tnLst>
   </p:timing>
 </p:sld>
 </file>

</xml_diff>

<commit_message>
Added slides on Armadillo
</commit_message>
<xml_diff>
--- a/CPlusPlus/12_essential_cpp_numerics.pptx
+++ b/CPlusPlus/12_essential_cpp_numerics.pptx
@@ -5,7 +5,7 @@
     <p:sldMasterId id="2147483660" r:id="rId1"/>
   </p:sldMasterIdLst>
   <p:notesMasterIdLst>
-    <p:notesMasterId r:id="rId19"/>
+    <p:notesMasterId r:id="rId20"/>
   </p:notesMasterIdLst>
   <p:sldIdLst>
     <p:sldId id="257" r:id="rId2"/>
@@ -23,8 +23,9 @@
     <p:sldId id="271" r:id="rId14"/>
     <p:sldId id="272" r:id="rId15"/>
     <p:sldId id="273" r:id="rId16"/>
-    <p:sldId id="263" r:id="rId17"/>
-    <p:sldId id="260" r:id="rId18"/>
+    <p:sldId id="274" r:id="rId17"/>
+    <p:sldId id="263" r:id="rId18"/>
+    <p:sldId id="260" r:id="rId19"/>
   </p:sldIdLst>
   <p:sldSz cx="9144000" cy="6858000" type="screen4x3"/>
   <p:notesSz cx="6858000" cy="9144000"/>
@@ -213,7 +214,7 @@
           <a:p>
             <a:fld id="{79B8B1BA-E8A9-48CD-886E-2AED8C4BE354}" type="datetimeFigureOut">
               <a:rPr lang="en-US" smtClean="0"/>
-              <a:t>2017-04-03</a:t>
+              <a:t>2017-04-04</a:t>
             </a:fld>
             <a:endParaRPr lang="en-US"/>
           </a:p>
@@ -612,7 +613,7 @@
           <a:p>
             <a:fld id="{ABE0EDF4-4C0E-4772-84AE-1357C6001391}" type="datetime1">
               <a:rPr lang="en-US" smtClean="0"/>
-              <a:t>2017-04-03</a:t>
+              <a:t>2017-04-04</a:t>
             </a:fld>
             <a:endParaRPr lang="en-US"/>
           </a:p>
@@ -782,7 +783,7 @@
           <a:p>
             <a:fld id="{88C05809-344B-440B-9F88-C5B18C79382B}" type="datetime1">
               <a:rPr lang="en-US" smtClean="0"/>
-              <a:t>2017-04-03</a:t>
+              <a:t>2017-04-04</a:t>
             </a:fld>
             <a:endParaRPr lang="en-US"/>
           </a:p>
@@ -962,7 +963,7 @@
           <a:p>
             <a:fld id="{90F74260-95EE-4CD2-908E-53F4ED138E6A}" type="datetime1">
               <a:rPr lang="en-US" smtClean="0"/>
-              <a:t>2017-04-03</a:t>
+              <a:t>2017-04-04</a:t>
             </a:fld>
             <a:endParaRPr lang="en-US"/>
           </a:p>
@@ -1132,7 +1133,7 @@
           <a:p>
             <a:fld id="{1E3FA7D4-BD38-43A8-9130-CCA4F61A0EF1}" type="datetime1">
               <a:rPr lang="en-US" smtClean="0"/>
-              <a:t>2017-04-03</a:t>
+              <a:t>2017-04-04</a:t>
             </a:fld>
             <a:endParaRPr lang="en-US"/>
           </a:p>
@@ -1376,7 +1377,7 @@
           <a:p>
             <a:fld id="{096F3732-D81D-4EEE-A6C0-1A86B50EC6E7}" type="datetime1">
               <a:rPr lang="en-US" smtClean="0"/>
-              <a:t>2017-04-03</a:t>
+              <a:t>2017-04-04</a:t>
             </a:fld>
             <a:endParaRPr lang="en-US"/>
           </a:p>
@@ -1608,7 +1609,7 @@
           <a:p>
             <a:fld id="{08790459-F51D-4E85-A354-E358228D776E}" type="datetime1">
               <a:rPr lang="en-US" smtClean="0"/>
-              <a:t>2017-04-03</a:t>
+              <a:t>2017-04-04</a:t>
             </a:fld>
             <a:endParaRPr lang="en-US"/>
           </a:p>
@@ -1975,7 +1976,7 @@
           <a:p>
             <a:fld id="{B95FD88B-5497-4442-BF08-DF52AECDDAFE}" type="datetime1">
               <a:rPr lang="en-US" smtClean="0"/>
-              <a:t>2017-04-03</a:t>
+              <a:t>2017-04-04</a:t>
             </a:fld>
             <a:endParaRPr lang="en-US"/>
           </a:p>
@@ -2093,7 +2094,7 @@
           <a:p>
             <a:fld id="{CF2C86E3-CF93-475C-AE85-C652B2D2F9B5}" type="datetime1">
               <a:rPr lang="en-US" smtClean="0"/>
-              <a:t>2017-04-03</a:t>
+              <a:t>2017-04-04</a:t>
             </a:fld>
             <a:endParaRPr lang="en-US"/>
           </a:p>
@@ -2188,7 +2189,7 @@
           <a:p>
             <a:fld id="{F7F6E503-4705-4A51-BD29-968EA406E3C8}" type="datetime1">
               <a:rPr lang="en-US" smtClean="0"/>
-              <a:t>2017-04-03</a:t>
+              <a:t>2017-04-04</a:t>
             </a:fld>
             <a:endParaRPr lang="en-US"/>
           </a:p>
@@ -2465,7 +2466,7 @@
           <a:p>
             <a:fld id="{AF0FBBBB-E740-40DF-A365-D9B13EA44EB5}" type="datetime1">
               <a:rPr lang="en-US" smtClean="0"/>
-              <a:t>2017-04-03</a:t>
+              <a:t>2017-04-04</a:t>
             </a:fld>
             <a:endParaRPr lang="en-US"/>
           </a:p>
@@ -2722,7 +2723,7 @@
           <a:p>
             <a:fld id="{72BE145B-3D39-424D-9562-97A98B9610A2}" type="datetime1">
               <a:rPr lang="en-US" smtClean="0"/>
-              <a:t>2017-04-03</a:t>
+              <a:t>2017-04-04</a:t>
             </a:fld>
             <a:endParaRPr lang="en-US"/>
           </a:p>
@@ -2935,7 +2936,7 @@
           <a:p>
             <a:fld id="{623F5BA7-E58A-4B83-91F8-3B23CADD8CED}" type="datetime1">
               <a:rPr lang="en-US" smtClean="0"/>
-              <a:t>2017-04-03</a:t>
+              <a:t>2017-04-04</a:t>
             </a:fld>
             <a:endParaRPr lang="en-US"/>
           </a:p>
@@ -5245,10 +5246,6 @@
               </a:rPr>
               <a:t>…</a:t>
             </a:r>
-            <a:endParaRPr lang="en-US" sz="1600" dirty="0" smtClean="0">
-              <a:latin typeface="Courier New" pitchFamily="49" charset="0"/>
-              <a:cs typeface="Courier New" pitchFamily="49" charset="0"/>
-            </a:endParaRPr>
           </a:p>
         </p:txBody>
       </p:sp>
@@ -6214,10 +6211,6 @@
               </a:rPr>
               <a:t>&gt;(0.0, 0.1, 1.0);</a:t>
             </a:r>
-            <a:endParaRPr lang="en-US" sz="1600" dirty="0" smtClean="0">
-              <a:latin typeface="Courier New" pitchFamily="49" charset="0"/>
-              <a:cs typeface="Courier New" pitchFamily="49" charset="0"/>
-            </a:endParaRPr>
           </a:p>
         </p:txBody>
       </p:sp>
@@ -6315,10 +6308,6 @@
               </a:rPr>
               <a:t>&gt;(5);</a:t>
             </a:r>
-            <a:endParaRPr lang="en-US" sz="1600" dirty="0" smtClean="0">
-              <a:latin typeface="Courier New" pitchFamily="49" charset="0"/>
-              <a:cs typeface="Courier New" pitchFamily="49" charset="0"/>
-            </a:endParaRPr>
           </a:p>
           <a:p>
             <a:r>
@@ -7982,6 +7971,235 @@
       </p:grpSpPr>
       <p:sp>
         <p:nvSpPr>
+          <p:cNvPr id="7" name="TextBox 6"/>
+          <p:cNvSpPr txBox="1"/>
+          <p:nvPr/>
+        </p:nvSpPr>
+        <p:spPr>
+          <a:xfrm>
+            <a:off x="714682" y="3523933"/>
+            <a:ext cx="7062634" cy="1323439"/>
+          </a:xfrm>
+          <a:prstGeom prst="rect">
+            <a:avLst/>
+          </a:prstGeom>
+          <a:solidFill>
+            <a:schemeClr val="bg1">
+              <a:lumMod val="75000"/>
+            </a:schemeClr>
+          </a:solidFill>
+          <a:ln>
+            <a:noFill/>
+          </a:ln>
+        </p:spPr>
+        <p:txBody>
+          <a:bodyPr wrap="square" rtlCol="0">
+            <a:spAutoFit/>
+          </a:bodyPr>
+          <a:lstStyle/>
+          <a:p>
+            <a:r>
+              <a:rPr lang="en-US" sz="1600" dirty="0" smtClean="0">
+                <a:latin typeface="Courier New" pitchFamily="49" charset="0"/>
+                <a:cs typeface="Courier New" pitchFamily="49" charset="0"/>
+              </a:rPr>
+              <a:t>…</a:t>
+            </a:r>
+          </a:p>
+          <a:p>
+            <a:r>
+              <a:rPr lang="en-US" sz="1600" dirty="0" smtClean="0">
+                <a:latin typeface="Courier New" pitchFamily="49" charset="0"/>
+                <a:cs typeface="Courier New" pitchFamily="49" charset="0"/>
+              </a:rPr>
+              <a:t>mat B = </a:t>
+            </a:r>
+            <a:r>
+              <a:rPr lang="en-US" sz="1600" dirty="0" err="1" smtClean="0">
+                <a:latin typeface="Courier New" pitchFamily="49" charset="0"/>
+                <a:cs typeface="Courier New" pitchFamily="49" charset="0"/>
+              </a:rPr>
+              <a:t>A.submat</a:t>
+            </a:r>
+            <a:r>
+              <a:rPr lang="en-US" sz="1600" dirty="0" smtClean="0">
+                <a:latin typeface="Courier New" pitchFamily="49" charset="0"/>
+                <a:cs typeface="Courier New" pitchFamily="49" charset="0"/>
+              </a:rPr>
+              <a:t>(span(</a:t>
+            </a:r>
+            <a:r>
+              <a:rPr lang="en-US" sz="1600" dirty="0" err="1" smtClean="0">
+                <a:latin typeface="Courier New" pitchFamily="49" charset="0"/>
+                <a:cs typeface="Courier New" pitchFamily="49" charset="0"/>
+              </a:rPr>
+              <a:t>min_row</a:t>
+            </a:r>
+            <a:r>
+              <a:rPr lang="en-US" sz="1600" dirty="0" smtClean="0">
+                <a:latin typeface="Courier New" pitchFamily="49" charset="0"/>
+                <a:cs typeface="Courier New" pitchFamily="49" charset="0"/>
+              </a:rPr>
+              <a:t>, </a:t>
+            </a:r>
+            <a:r>
+              <a:rPr lang="en-US" sz="1600" dirty="0" err="1" smtClean="0">
+                <a:latin typeface="Courier New" pitchFamily="49" charset="0"/>
+                <a:cs typeface="Courier New" pitchFamily="49" charset="0"/>
+              </a:rPr>
+              <a:t>max_row</a:t>
+            </a:r>
+            <a:r>
+              <a:rPr lang="en-US" sz="1600" dirty="0" smtClean="0">
+                <a:latin typeface="Courier New" pitchFamily="49" charset="0"/>
+                <a:cs typeface="Courier New" pitchFamily="49" charset="0"/>
+              </a:rPr>
+              <a:t>),</a:t>
+            </a:r>
+          </a:p>
+          <a:p>
+            <a:r>
+              <a:rPr lang="en-US" sz="1600" dirty="0">
+                <a:latin typeface="Courier New" pitchFamily="49" charset="0"/>
+                <a:cs typeface="Courier New" pitchFamily="49" charset="0"/>
+              </a:rPr>
+              <a:t> </a:t>
+            </a:r>
+            <a:r>
+              <a:rPr lang="en-US" sz="1600" dirty="0" smtClean="0">
+                <a:latin typeface="Courier New" pitchFamily="49" charset="0"/>
+                <a:cs typeface="Courier New" pitchFamily="49" charset="0"/>
+              </a:rPr>
+              <a:t>                </a:t>
+            </a:r>
+            <a:r>
+              <a:rPr lang="en-US" sz="1600" dirty="0" smtClean="0">
+                <a:latin typeface="Courier New" pitchFamily="49" charset="0"/>
+                <a:cs typeface="Courier New" pitchFamily="49" charset="0"/>
+              </a:rPr>
+              <a:t>span(</a:t>
+            </a:r>
+            <a:r>
+              <a:rPr lang="en-US" sz="1600" dirty="0" err="1" smtClean="0">
+                <a:latin typeface="Courier New" pitchFamily="49" charset="0"/>
+                <a:cs typeface="Courier New" pitchFamily="49" charset="0"/>
+              </a:rPr>
+              <a:t>min_col</a:t>
+            </a:r>
+            <a:r>
+              <a:rPr lang="en-US" sz="1600" dirty="0" smtClean="0">
+                <a:latin typeface="Courier New" pitchFamily="49" charset="0"/>
+                <a:cs typeface="Courier New" pitchFamily="49" charset="0"/>
+              </a:rPr>
+              <a:t>, </a:t>
+            </a:r>
+            <a:r>
+              <a:rPr lang="en-US" sz="1600" dirty="0" err="1" smtClean="0">
+                <a:latin typeface="Courier New" pitchFamily="49" charset="0"/>
+                <a:cs typeface="Courier New" pitchFamily="49" charset="0"/>
+              </a:rPr>
+              <a:t>max_col</a:t>
+            </a:r>
+            <a:r>
+              <a:rPr lang="en-US" sz="1600" dirty="0" smtClean="0">
+                <a:latin typeface="Courier New" pitchFamily="49" charset="0"/>
+                <a:cs typeface="Courier New" pitchFamily="49" charset="0"/>
+              </a:rPr>
+              <a:t>));</a:t>
+            </a:r>
+          </a:p>
+          <a:p>
+            <a:r>
+              <a:rPr lang="en-US" sz="1600" dirty="0" err="1" smtClean="0">
+                <a:latin typeface="Courier New" pitchFamily="49" charset="0"/>
+                <a:cs typeface="Courier New" pitchFamily="49" charset="0"/>
+              </a:rPr>
+              <a:t>rowvec</a:t>
+            </a:r>
+            <a:r>
+              <a:rPr lang="en-US" sz="1600" dirty="0" smtClean="0">
+                <a:latin typeface="Courier New" pitchFamily="49" charset="0"/>
+                <a:cs typeface="Courier New" pitchFamily="49" charset="0"/>
+              </a:rPr>
+              <a:t> x = </a:t>
+            </a:r>
+            <a:r>
+              <a:rPr lang="en-US" sz="1600" dirty="0" err="1" smtClean="0">
+                <a:latin typeface="Courier New" pitchFamily="49" charset="0"/>
+                <a:cs typeface="Courier New" pitchFamily="49" charset="0"/>
+              </a:rPr>
+              <a:t>A.row</a:t>
+            </a:r>
+            <a:r>
+              <a:rPr lang="en-US" sz="1600" dirty="0" smtClean="0">
+                <a:latin typeface="Courier New" pitchFamily="49" charset="0"/>
+                <a:cs typeface="Courier New" pitchFamily="49" charset="0"/>
+              </a:rPr>
+              <a:t>(</a:t>
+            </a:r>
+            <a:r>
+              <a:rPr lang="en-US" sz="1600" dirty="0" err="1" smtClean="0">
+                <a:latin typeface="Courier New" pitchFamily="49" charset="0"/>
+                <a:cs typeface="Courier New" pitchFamily="49" charset="0"/>
+              </a:rPr>
+              <a:t>row_nr</a:t>
+            </a:r>
+            <a:r>
+              <a:rPr lang="en-US" sz="1600" dirty="0" smtClean="0">
+                <a:latin typeface="Courier New" pitchFamily="49" charset="0"/>
+                <a:cs typeface="Courier New" pitchFamily="49" charset="0"/>
+              </a:rPr>
+              <a:t>);</a:t>
+            </a:r>
+          </a:p>
+          <a:p>
+            <a:r>
+              <a:rPr lang="en-US" sz="1600" dirty="0" err="1" smtClean="0">
+                <a:latin typeface="Courier New" pitchFamily="49" charset="0"/>
+                <a:cs typeface="Courier New" pitchFamily="49" charset="0"/>
+              </a:rPr>
+              <a:t>vec</a:t>
+            </a:r>
+            <a:r>
+              <a:rPr lang="en-US" sz="1600" dirty="0" smtClean="0">
+                <a:latin typeface="Courier New" pitchFamily="49" charset="0"/>
+                <a:cs typeface="Courier New" pitchFamily="49" charset="0"/>
+              </a:rPr>
+              <a:t> y = </a:t>
+            </a:r>
+            <a:r>
+              <a:rPr lang="en-US" sz="1600" dirty="0" err="1" smtClean="0">
+                <a:latin typeface="Courier New" pitchFamily="49" charset="0"/>
+                <a:cs typeface="Courier New" pitchFamily="49" charset="0"/>
+              </a:rPr>
+              <a:t>A.col</a:t>
+            </a:r>
+            <a:r>
+              <a:rPr lang="en-US" sz="1600" dirty="0" smtClean="0">
+                <a:latin typeface="Courier New" pitchFamily="49" charset="0"/>
+                <a:cs typeface="Courier New" pitchFamily="49" charset="0"/>
+              </a:rPr>
+              <a:t>(</a:t>
+            </a:r>
+            <a:r>
+              <a:rPr lang="en-US" sz="1600" dirty="0" err="1" smtClean="0">
+                <a:latin typeface="Courier New" pitchFamily="49" charset="0"/>
+                <a:cs typeface="Courier New" pitchFamily="49" charset="0"/>
+              </a:rPr>
+              <a:t>col_nr</a:t>
+            </a:r>
+            <a:r>
+              <a:rPr lang="en-US" sz="1600" dirty="0" smtClean="0">
+                <a:latin typeface="Courier New" pitchFamily="49" charset="0"/>
+                <a:cs typeface="Courier New" pitchFamily="49" charset="0"/>
+              </a:rPr>
+              <a:t>);</a:t>
+            </a:r>
+          </a:p>
+        </p:txBody>
+      </p:sp>
+      <p:sp>
+        <p:nvSpPr>
           <p:cNvPr id="2" name="Title 1"/>
           <p:cNvSpPr>
             <a:spLocks noGrp="1"/>
@@ -7997,7 +8215,11 @@
           <a:p>
             <a:r>
               <a:rPr lang="en-US" dirty="0" smtClean="0"/>
-              <a:t>Matrix element access</a:t>
+              <a:t>Matrix </a:t>
+            </a:r>
+            <a:r>
+              <a:rPr lang="en-US" dirty="0" smtClean="0"/>
+              <a:t>access</a:t>
             </a:r>
             <a:endParaRPr lang="en-US" dirty="0"/>
           </a:p>
@@ -8026,6 +8248,359 @@
           </a:p>
         </p:txBody>
       </p:sp>
+      <p:sp>
+        <p:nvSpPr>
+          <p:cNvPr id="4" name="TextBox 3"/>
+          <p:cNvSpPr txBox="1"/>
+          <p:nvPr/>
+        </p:nvSpPr>
+        <p:spPr>
+          <a:xfrm>
+            <a:off x="714682" y="1932534"/>
+            <a:ext cx="7062634" cy="1077218"/>
+          </a:xfrm>
+          <a:prstGeom prst="rect">
+            <a:avLst/>
+          </a:prstGeom>
+          <a:solidFill>
+            <a:schemeClr val="bg1">
+              <a:lumMod val="75000"/>
+            </a:schemeClr>
+          </a:solidFill>
+          <a:ln>
+            <a:noFill/>
+          </a:ln>
+        </p:spPr>
+        <p:txBody>
+          <a:bodyPr wrap="square" rtlCol="0">
+            <a:spAutoFit/>
+          </a:bodyPr>
+          <a:lstStyle/>
+          <a:p>
+            <a:r>
+              <a:rPr lang="en-US" sz="1600" dirty="0" smtClean="0">
+                <a:latin typeface="Courier New" pitchFamily="49" charset="0"/>
+                <a:cs typeface="Courier New" pitchFamily="49" charset="0"/>
+              </a:rPr>
+              <a:t>…</a:t>
+            </a:r>
+          </a:p>
+          <a:p>
+            <a:r>
+              <a:rPr lang="en-US" sz="1600" dirty="0" smtClean="0">
+                <a:latin typeface="Courier New" pitchFamily="49" charset="0"/>
+                <a:cs typeface="Courier New" pitchFamily="49" charset="0"/>
+              </a:rPr>
+              <a:t>for (</a:t>
+            </a:r>
+            <a:r>
+              <a:rPr lang="en-US" sz="1600" dirty="0" err="1" smtClean="0">
+                <a:latin typeface="Courier New" pitchFamily="49" charset="0"/>
+                <a:cs typeface="Courier New" pitchFamily="49" charset="0"/>
+              </a:rPr>
+              <a:t>size_t</a:t>
+            </a:r>
+            <a:r>
+              <a:rPr lang="en-US" sz="1600" dirty="0" smtClean="0">
+                <a:latin typeface="Courier New" pitchFamily="49" charset="0"/>
+                <a:cs typeface="Courier New" pitchFamily="49" charset="0"/>
+              </a:rPr>
+              <a:t> j = 0; j &lt; </a:t>
+            </a:r>
+            <a:r>
+              <a:rPr lang="en-US" sz="1600" dirty="0" err="1" smtClean="0">
+                <a:latin typeface="Courier New" pitchFamily="49" charset="0"/>
+                <a:cs typeface="Courier New" pitchFamily="49" charset="0"/>
+              </a:rPr>
+              <a:t>A.n_cols</a:t>
+            </a:r>
+            <a:r>
+              <a:rPr lang="en-US" sz="1600" dirty="0" smtClean="0">
+                <a:latin typeface="Courier New" pitchFamily="49" charset="0"/>
+                <a:cs typeface="Courier New" pitchFamily="49" charset="0"/>
+              </a:rPr>
+              <a:t>; </a:t>
+            </a:r>
+            <a:r>
+              <a:rPr lang="en-US" sz="1600" dirty="0" err="1" smtClean="0">
+                <a:latin typeface="Courier New" pitchFamily="49" charset="0"/>
+                <a:cs typeface="Courier New" pitchFamily="49" charset="0"/>
+              </a:rPr>
+              <a:t>j++</a:t>
+            </a:r>
+            <a:r>
+              <a:rPr lang="en-US" sz="1600" dirty="0" smtClean="0">
+                <a:latin typeface="Courier New" pitchFamily="49" charset="0"/>
+                <a:cs typeface="Courier New" pitchFamily="49" charset="0"/>
+              </a:rPr>
+              <a:t>)</a:t>
+            </a:r>
+          </a:p>
+          <a:p>
+            <a:r>
+              <a:rPr lang="en-US" sz="1600" dirty="0">
+                <a:latin typeface="Courier New" pitchFamily="49" charset="0"/>
+                <a:cs typeface="Courier New" pitchFamily="49" charset="0"/>
+              </a:rPr>
+              <a:t> </a:t>
+            </a:r>
+            <a:r>
+              <a:rPr lang="en-US" sz="1600" dirty="0" smtClean="0">
+                <a:latin typeface="Courier New" pitchFamily="49" charset="0"/>
+                <a:cs typeface="Courier New" pitchFamily="49" charset="0"/>
+              </a:rPr>
+              <a:t>   for (</a:t>
+            </a:r>
+            <a:r>
+              <a:rPr lang="en-US" sz="1600" dirty="0" err="1" smtClean="0">
+                <a:latin typeface="Courier New" pitchFamily="49" charset="0"/>
+                <a:cs typeface="Courier New" pitchFamily="49" charset="0"/>
+              </a:rPr>
+              <a:t>size_t</a:t>
+            </a:r>
+            <a:r>
+              <a:rPr lang="en-US" sz="1600" dirty="0" smtClean="0">
+                <a:latin typeface="Courier New" pitchFamily="49" charset="0"/>
+                <a:cs typeface="Courier New" pitchFamily="49" charset="0"/>
+              </a:rPr>
+              <a:t> </a:t>
+            </a:r>
+            <a:r>
+              <a:rPr lang="en-US" sz="1600" dirty="0" err="1" smtClean="0">
+                <a:latin typeface="Courier New" pitchFamily="49" charset="0"/>
+                <a:cs typeface="Courier New" pitchFamily="49" charset="0"/>
+              </a:rPr>
+              <a:t>i</a:t>
+            </a:r>
+            <a:r>
+              <a:rPr lang="en-US" sz="1600" dirty="0" smtClean="0">
+                <a:latin typeface="Courier New" pitchFamily="49" charset="0"/>
+                <a:cs typeface="Courier New" pitchFamily="49" charset="0"/>
+              </a:rPr>
+              <a:t> = 0; </a:t>
+            </a:r>
+            <a:r>
+              <a:rPr lang="en-US" sz="1600" dirty="0" err="1" smtClean="0">
+                <a:latin typeface="Courier New" pitchFamily="49" charset="0"/>
+                <a:cs typeface="Courier New" pitchFamily="49" charset="0"/>
+              </a:rPr>
+              <a:t>i</a:t>
+            </a:r>
+            <a:r>
+              <a:rPr lang="en-US" sz="1600" dirty="0" smtClean="0">
+                <a:latin typeface="Courier New" pitchFamily="49" charset="0"/>
+                <a:cs typeface="Courier New" pitchFamily="49" charset="0"/>
+              </a:rPr>
+              <a:t> &lt; </a:t>
+            </a:r>
+            <a:r>
+              <a:rPr lang="en-US" sz="1600" dirty="0" err="1" smtClean="0">
+                <a:latin typeface="Courier New" pitchFamily="49" charset="0"/>
+                <a:cs typeface="Courier New" pitchFamily="49" charset="0"/>
+              </a:rPr>
+              <a:t>A.n_rows</a:t>
+            </a:r>
+            <a:r>
+              <a:rPr lang="en-US" sz="1600" dirty="0" smtClean="0">
+                <a:latin typeface="Courier New" pitchFamily="49" charset="0"/>
+                <a:cs typeface="Courier New" pitchFamily="49" charset="0"/>
+              </a:rPr>
+              <a:t>; </a:t>
+            </a:r>
+            <a:r>
+              <a:rPr lang="en-US" sz="1600" dirty="0" err="1" smtClean="0">
+                <a:latin typeface="Courier New" pitchFamily="49" charset="0"/>
+                <a:cs typeface="Courier New" pitchFamily="49" charset="0"/>
+              </a:rPr>
+              <a:t>i</a:t>
+            </a:r>
+            <a:r>
+              <a:rPr lang="en-US" sz="1600" dirty="0" smtClean="0">
+                <a:latin typeface="Courier New" pitchFamily="49" charset="0"/>
+                <a:cs typeface="Courier New" pitchFamily="49" charset="0"/>
+              </a:rPr>
+              <a:t>++)</a:t>
+            </a:r>
+          </a:p>
+          <a:p>
+            <a:r>
+              <a:rPr lang="en-US" sz="1600" dirty="0">
+                <a:latin typeface="Courier New" pitchFamily="49" charset="0"/>
+                <a:cs typeface="Courier New" pitchFamily="49" charset="0"/>
+              </a:rPr>
+              <a:t> </a:t>
+            </a:r>
+            <a:r>
+              <a:rPr lang="en-US" sz="1600" dirty="0" smtClean="0">
+                <a:latin typeface="Courier New" pitchFamily="49" charset="0"/>
+                <a:cs typeface="Courier New" pitchFamily="49" charset="0"/>
+              </a:rPr>
+              <a:t>       A(</a:t>
+            </a:r>
+            <a:r>
+              <a:rPr lang="en-US" sz="1600" dirty="0" err="1" smtClean="0">
+                <a:latin typeface="Courier New" pitchFamily="49" charset="0"/>
+                <a:cs typeface="Courier New" pitchFamily="49" charset="0"/>
+              </a:rPr>
+              <a:t>i</a:t>
+            </a:r>
+            <a:r>
+              <a:rPr lang="en-US" sz="1600" dirty="0" smtClean="0">
+                <a:latin typeface="Courier New" pitchFamily="49" charset="0"/>
+                <a:cs typeface="Courier New" pitchFamily="49" charset="0"/>
+              </a:rPr>
+              <a:t>, j) = f(</a:t>
+            </a:r>
+            <a:r>
+              <a:rPr lang="en-US" sz="1600" dirty="0" err="1" smtClean="0">
+                <a:latin typeface="Courier New" pitchFamily="49" charset="0"/>
+                <a:cs typeface="Courier New" pitchFamily="49" charset="0"/>
+              </a:rPr>
+              <a:t>i</a:t>
+            </a:r>
+            <a:r>
+              <a:rPr lang="en-US" sz="1600" dirty="0" smtClean="0">
+                <a:latin typeface="Courier New" pitchFamily="49" charset="0"/>
+                <a:cs typeface="Courier New" pitchFamily="49" charset="0"/>
+              </a:rPr>
+              <a:t>, j);</a:t>
+            </a:r>
+            <a:endParaRPr lang="en-US" sz="1600" dirty="0" smtClean="0">
+              <a:latin typeface="Courier New" pitchFamily="49" charset="0"/>
+              <a:cs typeface="Courier New" pitchFamily="49" charset="0"/>
+            </a:endParaRPr>
+          </a:p>
+        </p:txBody>
+      </p:sp>
+      <p:sp>
+        <p:nvSpPr>
+          <p:cNvPr id="5" name="TextBox 4"/>
+          <p:cNvSpPr txBox="1"/>
+          <p:nvPr/>
+        </p:nvSpPr>
+        <p:spPr>
+          <a:xfrm flipH="1">
+            <a:off x="4273592" y="2872667"/>
+            <a:ext cx="3073628" cy="830997"/>
+          </a:xfrm>
+          <a:prstGeom prst="rect">
+            <a:avLst/>
+          </a:prstGeom>
+          <a:solidFill>
+            <a:schemeClr val="bg1"/>
+          </a:solidFill>
+          <a:ln>
+            <a:solidFill>
+              <a:schemeClr val="tx1"/>
+            </a:solidFill>
+          </a:ln>
+        </p:spPr>
+        <p:txBody>
+          <a:bodyPr wrap="square" rtlCol="0">
+            <a:spAutoFit/>
+          </a:bodyPr>
+          <a:lstStyle/>
+          <a:p>
+            <a:r>
+              <a:rPr lang="en-US" sz="2400" dirty="0" smtClean="0"/>
+              <a:t>Note: elements stored</a:t>
+            </a:r>
+            <a:br>
+              <a:rPr lang="en-US" sz="2400" dirty="0" smtClean="0"/>
+            </a:br>
+            <a:r>
+              <a:rPr lang="en-US" sz="2400" dirty="0" smtClean="0"/>
+              <a:t>           </a:t>
+            </a:r>
+            <a:r>
+              <a:rPr lang="en-US" sz="2400" dirty="0" err="1" smtClean="0"/>
+              <a:t>columnwise</a:t>
+            </a:r>
+            <a:endParaRPr lang="en-US" sz="2400" dirty="0"/>
+          </a:p>
+        </p:txBody>
+      </p:sp>
+      <p:sp>
+        <p:nvSpPr>
+          <p:cNvPr id="6" name="TextBox 5"/>
+          <p:cNvSpPr txBox="1"/>
+          <p:nvPr/>
+        </p:nvSpPr>
+        <p:spPr>
+          <a:xfrm>
+            <a:off x="714682" y="5127743"/>
+            <a:ext cx="7062634" cy="1077218"/>
+          </a:xfrm>
+          <a:prstGeom prst="rect">
+            <a:avLst/>
+          </a:prstGeom>
+          <a:solidFill>
+            <a:schemeClr val="bg1">
+              <a:lumMod val="75000"/>
+            </a:schemeClr>
+          </a:solidFill>
+          <a:ln>
+            <a:noFill/>
+          </a:ln>
+        </p:spPr>
+        <p:txBody>
+          <a:bodyPr wrap="square" rtlCol="0">
+            <a:spAutoFit/>
+          </a:bodyPr>
+          <a:lstStyle/>
+          <a:p>
+            <a:r>
+              <a:rPr lang="en-US" sz="1600" dirty="0" smtClean="0">
+                <a:latin typeface="Courier New" pitchFamily="49" charset="0"/>
+                <a:cs typeface="Courier New" pitchFamily="49" charset="0"/>
+              </a:rPr>
+              <a:t>…</a:t>
+            </a:r>
+          </a:p>
+          <a:p>
+            <a:r>
+              <a:rPr lang="en-US" sz="1600" dirty="0" smtClean="0">
+                <a:latin typeface="Courier New" pitchFamily="49" charset="0"/>
+                <a:cs typeface="Courier New" pitchFamily="49" charset="0"/>
+              </a:rPr>
+              <a:t>double a, b, c;</a:t>
+            </a:r>
+          </a:p>
+          <a:p>
+            <a:r>
+              <a:rPr lang="en-US" sz="1600" dirty="0" smtClean="0">
+                <a:latin typeface="Courier New" pitchFamily="49" charset="0"/>
+                <a:cs typeface="Courier New" pitchFamily="49" charset="0"/>
+              </a:rPr>
+              <a:t>…</a:t>
+            </a:r>
+            <a:endParaRPr lang="en-US" sz="1600" dirty="0" smtClean="0">
+              <a:latin typeface="Courier New" pitchFamily="49" charset="0"/>
+              <a:cs typeface="Courier New" pitchFamily="49" charset="0"/>
+            </a:endParaRPr>
+          </a:p>
+          <a:p>
+            <a:r>
+              <a:rPr lang="en-US" sz="1600" dirty="0" err="1" smtClean="0">
+                <a:latin typeface="Courier New" pitchFamily="49" charset="0"/>
+                <a:cs typeface="Courier New" pitchFamily="49" charset="0"/>
+              </a:rPr>
+              <a:t>A.transform</a:t>
+            </a:r>
+            <a:r>
+              <a:rPr lang="en-US" sz="1600" dirty="0" smtClean="0">
+                <a:latin typeface="Courier New" pitchFamily="49" charset="0"/>
+                <a:cs typeface="Courier New" pitchFamily="49" charset="0"/>
+              </a:rPr>
+              <a:t>([=] (double x) { return a*x*x + b*x + c; });</a:t>
+            </a:r>
+            <a:endParaRPr lang="en-US" sz="1600" dirty="0" smtClean="0">
+              <a:latin typeface="Courier New" pitchFamily="49" charset="0"/>
+              <a:cs typeface="Courier New" pitchFamily="49" charset="0"/>
+            </a:endParaRPr>
+          </a:p>
+        </p:txBody>
+      </p:sp>
     </p:spTree>
     <p:extLst>
       <p:ext uri="{BB962C8B-B14F-4D97-AF65-F5344CB8AC3E}">
@@ -8039,9 +8614,221 @@
   <p:timing>
     <p:tnLst>
       <p:par>
-        <p:cTn id="1" dur="indefinite" restart="never" nodeType="tmRoot"/>
+        <p:cTn id="1" dur="indefinite" restart="never" nodeType="tmRoot">
+          <p:childTnLst>
+            <p:seq concurrent="1" nextAc="seek">
+              <p:cTn id="2" dur="indefinite" nodeType="mainSeq">
+                <p:childTnLst>
+                  <p:par>
+                    <p:cTn id="3" fill="hold">
+                      <p:stCondLst>
+                        <p:cond delay="indefinite"/>
+                        <p:cond evt="onBegin" delay="0">
+                          <p:tn val="2"/>
+                        </p:cond>
+                      </p:stCondLst>
+                      <p:childTnLst>
+                        <p:par>
+                          <p:cTn id="4" fill="hold">
+                            <p:stCondLst>
+                              <p:cond delay="0"/>
+                            </p:stCondLst>
+                            <p:childTnLst>
+                              <p:par>
+                                <p:cTn id="5" presetID="1" presetClass="entr" presetSubtype="0" fill="hold" grpId="0" nodeType="withEffect">
+                                  <p:stCondLst>
+                                    <p:cond delay="0"/>
+                                  </p:stCondLst>
+                                  <p:childTnLst>
+                                    <p:set>
+                                      <p:cBhvr>
+                                        <p:cTn id="6" dur="1" fill="hold">
+                                          <p:stCondLst>
+                                            <p:cond delay="0"/>
+                                          </p:stCondLst>
+                                        </p:cTn>
+                                        <p:tgtEl>
+                                          <p:spTgt spid="4"/>
+                                        </p:tgtEl>
+                                        <p:attrNameLst>
+                                          <p:attrName>style.visibility</p:attrName>
+                                        </p:attrNameLst>
+                                      </p:cBhvr>
+                                      <p:to>
+                                        <p:strVal val="visible"/>
+                                      </p:to>
+                                    </p:set>
+                                  </p:childTnLst>
+                                </p:cTn>
+                              </p:par>
+                            </p:childTnLst>
+                          </p:cTn>
+                        </p:par>
+                      </p:childTnLst>
+                    </p:cTn>
+                  </p:par>
+                  <p:par>
+                    <p:cTn id="7" fill="hold">
+                      <p:stCondLst>
+                        <p:cond delay="indefinite"/>
+                      </p:stCondLst>
+                      <p:childTnLst>
+                        <p:par>
+                          <p:cTn id="8" fill="hold">
+                            <p:stCondLst>
+                              <p:cond delay="0"/>
+                            </p:stCondLst>
+                            <p:childTnLst>
+                              <p:par>
+                                <p:cTn id="9" presetID="1" presetClass="entr" presetSubtype="0" fill="hold" grpId="0" nodeType="clickEffect">
+                                  <p:stCondLst>
+                                    <p:cond delay="0"/>
+                                  </p:stCondLst>
+                                  <p:childTnLst>
+                                    <p:set>
+                                      <p:cBhvr>
+                                        <p:cTn id="10" dur="1" fill="hold">
+                                          <p:stCondLst>
+                                            <p:cond delay="0"/>
+                                          </p:stCondLst>
+                                        </p:cTn>
+                                        <p:tgtEl>
+                                          <p:spTgt spid="6"/>
+                                        </p:tgtEl>
+                                        <p:attrNameLst>
+                                          <p:attrName>style.visibility</p:attrName>
+                                        </p:attrNameLst>
+                                      </p:cBhvr>
+                                      <p:to>
+                                        <p:strVal val="visible"/>
+                                      </p:to>
+                                    </p:set>
+                                  </p:childTnLst>
+                                </p:cTn>
+                              </p:par>
+                            </p:childTnLst>
+                          </p:cTn>
+                        </p:par>
+                      </p:childTnLst>
+                    </p:cTn>
+                  </p:par>
+                  <p:par>
+                    <p:cTn id="11" fill="hold">
+                      <p:stCondLst>
+                        <p:cond delay="indefinite"/>
+                      </p:stCondLst>
+                      <p:childTnLst>
+                        <p:par>
+                          <p:cTn id="12" fill="hold">
+                            <p:stCondLst>
+                              <p:cond delay="0"/>
+                            </p:stCondLst>
+                            <p:childTnLst>
+                              <p:par>
+                                <p:cTn id="13" presetID="1" presetClass="entr" presetSubtype="0" fill="hold" grpId="0" nodeType="clickEffect">
+                                  <p:stCondLst>
+                                    <p:cond delay="0"/>
+                                  </p:stCondLst>
+                                  <p:childTnLst>
+                                    <p:set>
+                                      <p:cBhvr>
+                                        <p:cTn id="14" dur="1" fill="hold">
+                                          <p:stCondLst>
+                                            <p:cond delay="0"/>
+                                          </p:stCondLst>
+                                        </p:cTn>
+                                        <p:tgtEl>
+                                          <p:spTgt spid="7"/>
+                                        </p:tgtEl>
+                                        <p:attrNameLst>
+                                          <p:attrName>style.visibility</p:attrName>
+                                        </p:attrNameLst>
+                                      </p:cBhvr>
+                                      <p:to>
+                                        <p:strVal val="visible"/>
+                                      </p:to>
+                                    </p:set>
+                                  </p:childTnLst>
+                                </p:cTn>
+                              </p:par>
+                            </p:childTnLst>
+                          </p:cTn>
+                        </p:par>
+                      </p:childTnLst>
+                    </p:cTn>
+                  </p:par>
+                  <p:par>
+                    <p:cTn id="15" fill="hold">
+                      <p:stCondLst>
+                        <p:cond delay="indefinite"/>
+                      </p:stCondLst>
+                      <p:childTnLst>
+                        <p:par>
+                          <p:cTn id="16" fill="hold">
+                            <p:stCondLst>
+                              <p:cond delay="0"/>
+                            </p:stCondLst>
+                            <p:childTnLst>
+                              <p:par>
+                                <p:cTn id="17" presetID="1" presetClass="entr" presetSubtype="0" fill="hold" grpId="0" nodeType="clickEffect">
+                                  <p:stCondLst>
+                                    <p:cond delay="0"/>
+                                  </p:stCondLst>
+                                  <p:childTnLst>
+                                    <p:set>
+                                      <p:cBhvr>
+                                        <p:cTn id="18" dur="1" fill="hold">
+                                          <p:stCondLst>
+                                            <p:cond delay="0"/>
+                                          </p:stCondLst>
+                                        </p:cTn>
+                                        <p:tgtEl>
+                                          <p:spTgt spid="5"/>
+                                        </p:tgtEl>
+                                        <p:attrNameLst>
+                                          <p:attrName>style.visibility</p:attrName>
+                                        </p:attrNameLst>
+                                      </p:cBhvr>
+                                      <p:to>
+                                        <p:strVal val="visible"/>
+                                      </p:to>
+                                    </p:set>
+                                  </p:childTnLst>
+                                </p:cTn>
+                              </p:par>
+                            </p:childTnLst>
+                          </p:cTn>
+                        </p:par>
+                      </p:childTnLst>
+                    </p:cTn>
+                  </p:par>
+                </p:childTnLst>
+              </p:cTn>
+              <p:prevCondLst>
+                <p:cond evt="onPrev" delay="0">
+                  <p:tgtEl>
+                    <p:sldTgt/>
+                  </p:tgtEl>
+                </p:cond>
+              </p:prevCondLst>
+              <p:nextCondLst>
+                <p:cond evt="onNext" delay="0">
+                  <p:tgtEl>
+                    <p:sldTgt/>
+                  </p:tgtEl>
+                </p:cond>
+              </p:nextCondLst>
+            </p:seq>
+          </p:childTnLst>
+        </p:cTn>
       </p:par>
     </p:tnLst>
+    <p:bldLst>
+      <p:bldP spid="7" grpId="0" animBg="1"/>
+      <p:bldP spid="4" grpId="0" animBg="1"/>
+      <p:bldP spid="5" grpId="0" animBg="1"/>
+      <p:bldP spid="6" grpId="0" animBg="1"/>
+    </p:bldLst>
   </p:timing>
 </p:sld>
 </file>
@@ -8080,7 +8867,7 @@
           <a:p>
             <a:r>
               <a:rPr lang="en-US" dirty="0" smtClean="0"/>
-              <a:t>Ordinary differential equations</a:t>
+              <a:t>Linear algebra</a:t>
             </a:r>
             <a:endParaRPr lang="en-US" dirty="0"/>
           </a:p>
@@ -8088,7 +8875,7 @@
       </p:sp>
       <p:sp>
         <p:nvSpPr>
-          <p:cNvPr id="3" name="Content Placeholder 2"/>
+          <p:cNvPr id="4" name="Content Placeholder 3"/>
           <p:cNvSpPr>
             <a:spLocks noGrp="1"/>
           </p:cNvSpPr>
@@ -8103,19 +8890,66 @@
           <a:p>
             <a:r>
               <a:rPr lang="en-US" dirty="0" smtClean="0"/>
-              <a:t>Straightforward: Boost::</a:t>
-            </a:r>
-            <a:r>
-              <a:rPr lang="en-US" dirty="0" err="1" smtClean="0"/>
-              <a:t>odeint</a:t>
-            </a:r>
+              <a:t>Many decomposition methods, e.g., SVD</a:t>
+            </a:r>
+          </a:p>
+          <a:p>
             <a:endParaRPr lang="en-US" dirty="0"/>
+          </a:p>
+          <a:p>
+            <a:endParaRPr lang="en-US" dirty="0" smtClean="0"/>
+          </a:p>
+          <a:p>
+            <a:endParaRPr lang="en-US" dirty="0"/>
+          </a:p>
+          <a:p>
+            <a:endParaRPr lang="en-US" dirty="0" smtClean="0"/>
+          </a:p>
+          <a:p>
+            <a:endParaRPr lang="en-US" dirty="0" smtClean="0"/>
+          </a:p>
+          <a:p>
+            <a:r>
+              <a:rPr lang="en-US" dirty="0" smtClean="0"/>
+              <a:t>Matrix transpose: </a:t>
+            </a:r>
+            <a:r>
+              <a:rPr lang="en-US" dirty="0" smtClean="0">
+                <a:latin typeface="Courier New" panose="02070309020205020404" pitchFamily="49" charset="0"/>
+                <a:cs typeface="Courier New" panose="02070309020205020404" pitchFamily="49" charset="0"/>
+              </a:rPr>
+              <a:t>A.t()</a:t>
+            </a:r>
+          </a:p>
+          <a:p>
+            <a:r>
+              <a:rPr lang="en-US" dirty="0" smtClean="0"/>
+              <a:t>Matrix inverse: </a:t>
+            </a:r>
+            <a:r>
+              <a:rPr lang="en-US" dirty="0" err="1" smtClean="0">
+                <a:latin typeface="Courier New" panose="02070309020205020404" pitchFamily="49" charset="0"/>
+                <a:cs typeface="Courier New" panose="02070309020205020404" pitchFamily="49" charset="0"/>
+              </a:rPr>
+              <a:t>A.i</a:t>
+            </a:r>
+            <a:r>
+              <a:rPr lang="en-US" dirty="0" smtClean="0">
+                <a:latin typeface="Courier New" panose="02070309020205020404" pitchFamily="49" charset="0"/>
+                <a:cs typeface="Courier New" panose="02070309020205020404" pitchFamily="49" charset="0"/>
+              </a:rPr>
+              <a:t>()</a:t>
+            </a:r>
+            <a:endParaRPr lang="en-US" dirty="0">
+              <a:latin typeface="Courier New" panose="02070309020205020404" pitchFamily="49" charset="0"/>
+              <a:cs typeface="Courier New" panose="02070309020205020404" pitchFamily="49" charset="0"/>
+            </a:endParaRPr>
           </a:p>
         </p:txBody>
       </p:sp>
       <p:sp>
         <p:nvSpPr>
-          <p:cNvPr id="4" name="Slide Number Placeholder 3"/>
+          <p:cNvPr id="3" name="Slide Number Placeholder 2"/>
           <p:cNvSpPr>
             <a:spLocks noGrp="1"/>
           </p:cNvSpPr>
@@ -8136,10 +8970,221 @@
           </a:p>
         </p:txBody>
       </p:sp>
+      <p:sp>
+        <p:nvSpPr>
+          <p:cNvPr id="5" name="TextBox 4"/>
+          <p:cNvSpPr txBox="1"/>
+          <p:nvPr/>
+        </p:nvSpPr>
+        <p:spPr>
+          <a:xfrm>
+            <a:off x="714682" y="2345489"/>
+            <a:ext cx="7062634" cy="2062103"/>
+          </a:xfrm>
+          <a:prstGeom prst="rect">
+            <a:avLst/>
+          </a:prstGeom>
+          <a:solidFill>
+            <a:schemeClr val="bg1">
+              <a:lumMod val="75000"/>
+            </a:schemeClr>
+          </a:solidFill>
+          <a:ln>
+            <a:noFill/>
+          </a:ln>
+        </p:spPr>
+        <p:txBody>
+          <a:bodyPr wrap="square" rtlCol="0">
+            <a:spAutoFit/>
+          </a:bodyPr>
+          <a:lstStyle/>
+          <a:p>
+            <a:r>
+              <a:rPr lang="en-US" sz="1600" dirty="0" smtClean="0">
+                <a:latin typeface="Courier New" pitchFamily="49" charset="0"/>
+                <a:cs typeface="Courier New" pitchFamily="49" charset="0"/>
+              </a:rPr>
+              <a:t>…</a:t>
+            </a:r>
+          </a:p>
+          <a:p>
+            <a:r>
+              <a:rPr lang="en-US" sz="1600" dirty="0" smtClean="0">
+                <a:latin typeface="Courier New" pitchFamily="49" charset="0"/>
+                <a:cs typeface="Courier New" pitchFamily="49" charset="0"/>
+              </a:rPr>
+              <a:t>mat A(</a:t>
+            </a:r>
+            <a:r>
+              <a:rPr lang="en-US" sz="1600" dirty="0" err="1" smtClean="0">
+                <a:latin typeface="Courier New" pitchFamily="49" charset="0"/>
+                <a:cs typeface="Courier New" pitchFamily="49" charset="0"/>
+              </a:rPr>
+              <a:t>nr_rows</a:t>
+            </a:r>
+            <a:r>
+              <a:rPr lang="en-US" sz="1600" dirty="0" smtClean="0">
+                <a:latin typeface="Courier New" pitchFamily="49" charset="0"/>
+                <a:cs typeface="Courier New" pitchFamily="49" charset="0"/>
+              </a:rPr>
+              <a:t>, </a:t>
+            </a:r>
+            <a:r>
+              <a:rPr lang="en-US" sz="1600" dirty="0" err="1" smtClean="0">
+                <a:latin typeface="Courier New" pitchFamily="49" charset="0"/>
+                <a:cs typeface="Courier New" pitchFamily="49" charset="0"/>
+              </a:rPr>
+              <a:t>nr_cols</a:t>
+            </a:r>
+            <a:r>
+              <a:rPr lang="en-US" sz="1600" dirty="0" smtClean="0">
+                <a:latin typeface="Courier New" pitchFamily="49" charset="0"/>
+                <a:cs typeface="Courier New" pitchFamily="49" charset="0"/>
+              </a:rPr>
+              <a:t>);</a:t>
+            </a:r>
+          </a:p>
+          <a:p>
+            <a:r>
+              <a:rPr lang="en-US" sz="1600" dirty="0" smtClean="0">
+                <a:latin typeface="Courier New" pitchFamily="49" charset="0"/>
+                <a:cs typeface="Courier New" pitchFamily="49" charset="0"/>
+              </a:rPr>
+              <a:t>…</a:t>
+            </a:r>
+          </a:p>
+          <a:p>
+            <a:r>
+              <a:rPr lang="en-US" sz="1600" dirty="0" smtClean="0">
+                <a:latin typeface="Courier New" pitchFamily="49" charset="0"/>
+                <a:cs typeface="Courier New" pitchFamily="49" charset="0"/>
+              </a:rPr>
+              <a:t>mat U, V;</a:t>
+            </a:r>
+          </a:p>
+          <a:p>
+            <a:r>
+              <a:rPr lang="en-US" sz="1600" dirty="0" err="1" smtClean="0">
+                <a:latin typeface="Courier New" pitchFamily="49" charset="0"/>
+                <a:cs typeface="Courier New" pitchFamily="49" charset="0"/>
+              </a:rPr>
+              <a:t>vec</a:t>
+            </a:r>
+            <a:r>
+              <a:rPr lang="en-US" sz="1600" dirty="0" smtClean="0">
+                <a:latin typeface="Courier New" pitchFamily="49" charset="0"/>
+                <a:cs typeface="Courier New" pitchFamily="49" charset="0"/>
+              </a:rPr>
+              <a:t> </a:t>
+            </a:r>
+            <a:r>
+              <a:rPr lang="en-US" sz="1600" dirty="0">
+                <a:latin typeface="Courier New" pitchFamily="49" charset="0"/>
+                <a:cs typeface="Courier New" pitchFamily="49" charset="0"/>
+              </a:rPr>
+              <a:t>s;</a:t>
+            </a:r>
+          </a:p>
+          <a:p>
+            <a:r>
+              <a:rPr lang="en-US" sz="1600" dirty="0" err="1" smtClean="0">
+                <a:latin typeface="Courier New" pitchFamily="49" charset="0"/>
+                <a:cs typeface="Courier New" pitchFamily="49" charset="0"/>
+              </a:rPr>
+              <a:t>svd</a:t>
+            </a:r>
+            <a:r>
+              <a:rPr lang="en-US" sz="1600" dirty="0" smtClean="0">
+                <a:latin typeface="Courier New" pitchFamily="49" charset="0"/>
+                <a:cs typeface="Courier New" pitchFamily="49" charset="0"/>
+              </a:rPr>
+              <a:t>(U</a:t>
+            </a:r>
+            <a:r>
+              <a:rPr lang="en-US" sz="1600" dirty="0">
+                <a:latin typeface="Courier New" pitchFamily="49" charset="0"/>
+                <a:cs typeface="Courier New" pitchFamily="49" charset="0"/>
+              </a:rPr>
+              <a:t>, s, V, A);</a:t>
+            </a:r>
+          </a:p>
+          <a:p>
+            <a:r>
+              <a:rPr lang="en-US" sz="1600" dirty="0" smtClean="0">
+                <a:latin typeface="Courier New" pitchFamily="49" charset="0"/>
+                <a:cs typeface="Courier New" pitchFamily="49" charset="0"/>
+              </a:rPr>
+              <a:t>mat S </a:t>
+            </a:r>
+            <a:r>
+              <a:rPr lang="en-US" sz="1600" dirty="0">
+                <a:latin typeface="Courier New" pitchFamily="49" charset="0"/>
+                <a:cs typeface="Courier New" pitchFamily="49" charset="0"/>
+              </a:rPr>
+              <a:t>= </a:t>
+            </a:r>
+            <a:r>
+              <a:rPr lang="en-US" sz="1600" dirty="0" err="1">
+                <a:latin typeface="Courier New" pitchFamily="49" charset="0"/>
+                <a:cs typeface="Courier New" pitchFamily="49" charset="0"/>
+              </a:rPr>
+              <a:t>diagmat</a:t>
+            </a:r>
+            <a:r>
+              <a:rPr lang="en-US" sz="1600" dirty="0">
+                <a:latin typeface="Courier New" pitchFamily="49" charset="0"/>
+                <a:cs typeface="Courier New" pitchFamily="49" charset="0"/>
+              </a:rPr>
+              <a:t>(s);</a:t>
+            </a:r>
+          </a:p>
+          <a:p>
+            <a:r>
+              <a:rPr lang="en-US" sz="1600" dirty="0" smtClean="0">
+                <a:latin typeface="Courier New" pitchFamily="49" charset="0"/>
+                <a:cs typeface="Courier New" pitchFamily="49" charset="0"/>
+              </a:rPr>
+              <a:t>mat </a:t>
+            </a:r>
+            <a:r>
+              <a:rPr lang="en-US" sz="1600" dirty="0" err="1" smtClean="0">
+                <a:latin typeface="Courier New" pitchFamily="49" charset="0"/>
+                <a:cs typeface="Courier New" pitchFamily="49" charset="0"/>
+              </a:rPr>
+              <a:t>A_p</a:t>
+            </a:r>
+            <a:r>
+              <a:rPr lang="en-US" sz="1600" dirty="0" smtClean="0">
+                <a:latin typeface="Courier New" pitchFamily="49" charset="0"/>
+                <a:cs typeface="Courier New" pitchFamily="49" charset="0"/>
+              </a:rPr>
+              <a:t> = (U*S)*</a:t>
+            </a:r>
+            <a:r>
+              <a:rPr lang="en-US" sz="1600" dirty="0">
+                <a:latin typeface="Courier New" pitchFamily="49" charset="0"/>
+                <a:cs typeface="Courier New" pitchFamily="49" charset="0"/>
+              </a:rPr>
+              <a:t>V.t</a:t>
+            </a:r>
+            <a:r>
+              <a:rPr lang="en-US" sz="1600" dirty="0" smtClean="0">
+                <a:latin typeface="Courier New" pitchFamily="49" charset="0"/>
+                <a:cs typeface="Courier New" pitchFamily="49" charset="0"/>
+              </a:rPr>
+              <a:t>();</a:t>
+            </a:r>
+            <a:endParaRPr lang="en-US" sz="1600" dirty="0" smtClean="0">
+              <a:latin typeface="Courier New" pitchFamily="49" charset="0"/>
+              <a:cs typeface="Courier New" pitchFamily="49" charset="0"/>
+            </a:endParaRPr>
+          </a:p>
+        </p:txBody>
+      </p:sp>
     </p:spTree>
     <p:extLst>
       <p:ext uri="{BB962C8B-B14F-4D97-AF65-F5344CB8AC3E}">
-        <p14:creationId xmlns:p14="http://schemas.microsoft.com/office/powerpoint/2010/main" val="3264396598"/>
+        <p14:creationId xmlns:p14="http://schemas.microsoft.com/office/powerpoint/2010/main" val="596986867"/>
       </p:ext>
     </p:extLst>
   </p:cSld>
@@ -8149,9 +9194,213 @@
   <p:timing>
     <p:tnLst>
       <p:par>
-        <p:cTn id="1" dur="indefinite" restart="never" nodeType="tmRoot"/>
+        <p:cTn id="1" dur="indefinite" restart="never" nodeType="tmRoot">
+          <p:childTnLst>
+            <p:seq concurrent="1" nextAc="seek">
+              <p:cTn id="2" dur="indefinite" nodeType="mainSeq">
+                <p:childTnLst>
+                  <p:par>
+                    <p:cTn id="3" fill="hold">
+                      <p:stCondLst>
+                        <p:cond delay="indefinite"/>
+                        <p:cond evt="onBegin" delay="0">
+                          <p:tn val="2"/>
+                        </p:cond>
+                      </p:stCondLst>
+                      <p:childTnLst>
+                        <p:par>
+                          <p:cTn id="4" fill="hold">
+                            <p:stCondLst>
+                              <p:cond delay="0"/>
+                            </p:stCondLst>
+                            <p:childTnLst>
+                              <p:par>
+                                <p:cTn id="5" presetID="1" presetClass="entr" presetSubtype="0" fill="hold" grpId="0" nodeType="withEffect">
+                                  <p:stCondLst>
+                                    <p:cond delay="0"/>
+                                  </p:stCondLst>
+                                  <p:childTnLst>
+                                    <p:set>
+                                      <p:cBhvr>
+                                        <p:cTn id="6" dur="1" fill="hold">
+                                          <p:stCondLst>
+                                            <p:cond delay="0"/>
+                                          </p:stCondLst>
+                                        </p:cTn>
+                                        <p:tgtEl>
+                                          <p:spTgt spid="4">
+                                            <p:txEl>
+                                              <p:pRg st="0" end="0"/>
+                                            </p:txEl>
+                                          </p:spTgt>
+                                        </p:tgtEl>
+                                        <p:attrNameLst>
+                                          <p:attrName>style.visibility</p:attrName>
+                                        </p:attrNameLst>
+                                      </p:cBhvr>
+                                      <p:to>
+                                        <p:strVal val="visible"/>
+                                      </p:to>
+                                    </p:set>
+                                  </p:childTnLst>
+                                </p:cTn>
+                              </p:par>
+                              <p:par>
+                                <p:cTn id="7" presetID="1" presetClass="entr" presetSubtype="0" fill="hold" grpId="0" nodeType="withEffect">
+                                  <p:stCondLst>
+                                    <p:cond delay="0"/>
+                                  </p:stCondLst>
+                                  <p:childTnLst>
+                                    <p:set>
+                                      <p:cBhvr>
+                                        <p:cTn id="8" dur="1" fill="hold">
+                                          <p:stCondLst>
+                                            <p:cond delay="0"/>
+                                          </p:stCondLst>
+                                        </p:cTn>
+                                        <p:tgtEl>
+                                          <p:spTgt spid="5"/>
+                                        </p:tgtEl>
+                                        <p:attrNameLst>
+                                          <p:attrName>style.visibility</p:attrName>
+                                        </p:attrNameLst>
+                                      </p:cBhvr>
+                                      <p:to>
+                                        <p:strVal val="visible"/>
+                                      </p:to>
+                                    </p:set>
+                                  </p:childTnLst>
+                                </p:cTn>
+                              </p:par>
+                            </p:childTnLst>
+                          </p:cTn>
+                        </p:par>
+                      </p:childTnLst>
+                    </p:cTn>
+                  </p:par>
+                  <p:par>
+                    <p:cTn id="9" fill="hold">
+                      <p:stCondLst>
+                        <p:cond delay="indefinite"/>
+                      </p:stCondLst>
+                      <p:childTnLst>
+                        <p:par>
+                          <p:cTn id="10" fill="hold">
+                            <p:stCondLst>
+                              <p:cond delay="0"/>
+                            </p:stCondLst>
+                            <p:childTnLst>
+                              <p:par>
+                                <p:cTn id="11" presetID="1" presetClass="entr" presetSubtype="0" fill="hold" grpId="0" nodeType="clickEffect">
+                                  <p:stCondLst>
+                                    <p:cond delay="0"/>
+                                  </p:stCondLst>
+                                  <p:childTnLst>
+                                    <p:set>
+                                      <p:cBhvr>
+                                        <p:cTn id="12" dur="1" fill="hold">
+                                          <p:stCondLst>
+                                            <p:cond delay="0"/>
+                                          </p:stCondLst>
+                                        </p:cTn>
+                                        <p:tgtEl>
+                                          <p:spTgt spid="4">
+                                            <p:txEl>
+                                              <p:pRg st="6" end="6"/>
+                                            </p:txEl>
+                                          </p:spTgt>
+                                        </p:tgtEl>
+                                        <p:attrNameLst>
+                                          <p:attrName>style.visibility</p:attrName>
+                                        </p:attrNameLst>
+                                      </p:cBhvr>
+                                      <p:to>
+                                        <p:strVal val="visible"/>
+                                      </p:to>
+                                    </p:set>
+                                  </p:childTnLst>
+                                </p:cTn>
+                              </p:par>
+                            </p:childTnLst>
+                          </p:cTn>
+                        </p:par>
+                      </p:childTnLst>
+                    </p:cTn>
+                  </p:par>
+                  <p:par>
+                    <p:cTn id="13" fill="hold">
+                      <p:stCondLst>
+                        <p:cond delay="indefinite"/>
+                      </p:stCondLst>
+                      <p:childTnLst>
+                        <p:par>
+                          <p:cTn id="14" fill="hold">
+                            <p:stCondLst>
+                              <p:cond delay="0"/>
+                            </p:stCondLst>
+                            <p:childTnLst>
+                              <p:par>
+                                <p:cTn id="15" presetID="1" presetClass="entr" presetSubtype="0" fill="hold" grpId="0" nodeType="clickEffect">
+                                  <p:stCondLst>
+                                    <p:cond delay="0"/>
+                                  </p:stCondLst>
+                                  <p:childTnLst>
+                                    <p:set>
+                                      <p:cBhvr>
+                                        <p:cTn id="16" dur="1" fill="hold">
+                                          <p:stCondLst>
+                                            <p:cond delay="0"/>
+                                          </p:stCondLst>
+                                        </p:cTn>
+                                        <p:tgtEl>
+                                          <p:spTgt spid="4">
+                                            <p:txEl>
+                                              <p:pRg st="7" end="7"/>
+                                            </p:txEl>
+                                          </p:spTgt>
+                                        </p:tgtEl>
+                                        <p:attrNameLst>
+                                          <p:attrName>style.visibility</p:attrName>
+                                        </p:attrNameLst>
+                                      </p:cBhvr>
+                                      <p:to>
+                                        <p:strVal val="visible"/>
+                                      </p:to>
+                                    </p:set>
+                                  </p:childTnLst>
+                                </p:cTn>
+                              </p:par>
+                            </p:childTnLst>
+                          </p:cTn>
+                        </p:par>
+                      </p:childTnLst>
+                    </p:cTn>
+                  </p:par>
+                </p:childTnLst>
+              </p:cTn>
+              <p:prevCondLst>
+                <p:cond evt="onPrev" delay="0">
+                  <p:tgtEl>
+                    <p:sldTgt/>
+                  </p:tgtEl>
+                </p:cond>
+              </p:prevCondLst>
+              <p:nextCondLst>
+                <p:cond evt="onNext" delay="0">
+                  <p:tgtEl>
+                    <p:sldTgt/>
+                  </p:tgtEl>
+                </p:cond>
+              </p:nextCondLst>
+            </p:seq>
+          </p:childTnLst>
+        </p:cTn>
       </p:par>
     </p:tnLst>
+    <p:bldLst>
+      <p:bldP spid="4" grpId="0" uiExpand="1" build="p"/>
+      <p:bldP spid="5" grpId="0" animBg="1"/>
+    </p:bldLst>
   </p:timing>
 </p:sld>
 </file>
@@ -8190,6 +9439,116 @@
           <a:p>
             <a:r>
               <a:rPr lang="en-US" dirty="0" smtClean="0"/>
+              <a:t>Ordinary differential equations</a:t>
+            </a:r>
+            <a:endParaRPr lang="en-US" dirty="0"/>
+          </a:p>
+        </p:txBody>
+      </p:sp>
+      <p:sp>
+        <p:nvSpPr>
+          <p:cNvPr id="3" name="Content Placeholder 2"/>
+          <p:cNvSpPr>
+            <a:spLocks noGrp="1"/>
+          </p:cNvSpPr>
+          <p:nvPr>
+            <p:ph idx="1"/>
+          </p:nvPr>
+        </p:nvSpPr>
+        <p:spPr/>
+        <p:txBody>
+          <a:bodyPr/>
+          <a:lstStyle/>
+          <a:p>
+            <a:r>
+              <a:rPr lang="en-US" dirty="0" smtClean="0"/>
+              <a:t>Straightforward: Boost::</a:t>
+            </a:r>
+            <a:r>
+              <a:rPr lang="en-US" dirty="0" err="1" smtClean="0"/>
+              <a:t>odeint</a:t>
+            </a:r>
+            <a:endParaRPr lang="en-US" dirty="0"/>
+          </a:p>
+        </p:txBody>
+      </p:sp>
+      <p:sp>
+        <p:nvSpPr>
+          <p:cNvPr id="4" name="Slide Number Placeholder 3"/>
+          <p:cNvSpPr>
+            <a:spLocks noGrp="1"/>
+          </p:cNvSpPr>
+          <p:nvPr>
+            <p:ph type="sldNum" sz="quarter" idx="12"/>
+          </p:nvPr>
+        </p:nvSpPr>
+        <p:spPr/>
+        <p:txBody>
+          <a:bodyPr/>
+          <a:lstStyle/>
+          <a:p>
+            <a:fld id="{9CEF4966-5219-4577-B301-14467D565841}" type="slidenum">
+              <a:rPr lang="en-US" smtClean="0"/>
+              <a:t>17</a:t>
+            </a:fld>
+            <a:endParaRPr lang="en-US"/>
+          </a:p>
+        </p:txBody>
+      </p:sp>
+    </p:spTree>
+    <p:extLst>
+      <p:ext uri="{BB962C8B-B14F-4D97-AF65-F5344CB8AC3E}">
+        <p14:creationId xmlns:p14="http://schemas.microsoft.com/office/powerpoint/2010/main" val="3264396598"/>
+      </p:ext>
+    </p:extLst>
+  </p:cSld>
+  <p:clrMapOvr>
+    <a:masterClrMapping/>
+  </p:clrMapOvr>
+  <p:timing>
+    <p:tnLst>
+      <p:par>
+        <p:cTn id="1" dur="indefinite" restart="never" nodeType="tmRoot"/>
+      </p:par>
+    </p:tnLst>
+  </p:timing>
+</p:sld>
+</file>
+
+<file path=ppt/slides/slide18.xml><?xml version="1.0" encoding="utf-8"?>
+<p:sld xmlns:a="http://schemas.openxmlformats.org/drawingml/2006/main" xmlns:r="http://schemas.openxmlformats.org/officeDocument/2006/relationships" xmlns:p="http://schemas.openxmlformats.org/presentationml/2006/main">
+  <p:cSld>
+    <p:spTree>
+      <p:nvGrpSpPr>
+        <p:cNvPr id="1" name=""/>
+        <p:cNvGrpSpPr/>
+        <p:nvPr/>
+      </p:nvGrpSpPr>
+      <p:grpSpPr>
+        <a:xfrm>
+          <a:off x="0" y="0"/>
+          <a:ext cx="0" cy="0"/>
+          <a:chOff x="0" y="0"/>
+          <a:chExt cx="0" cy="0"/>
+        </a:xfrm>
+      </p:grpSpPr>
+      <p:sp>
+        <p:nvSpPr>
+          <p:cNvPr id="2" name="Title 1"/>
+          <p:cNvSpPr>
+            <a:spLocks noGrp="1"/>
+          </p:cNvSpPr>
+          <p:nvPr>
+            <p:ph type="title"/>
+          </p:nvPr>
+        </p:nvSpPr>
+        <p:spPr/>
+        <p:txBody>
+          <a:bodyPr/>
+          <a:lstStyle/>
+          <a:p>
+            <a:r>
+              <a:rPr lang="en-US" dirty="0" smtClean="0"/>
               <a:t>What was left out/added?</a:t>
             </a:r>
             <a:endParaRPr lang="en-US" dirty="0"/>
@@ -8267,7 +9626,7 @@
           <a:p>
             <a:fld id="{9CEF4966-5219-4577-B301-14467D565841}" type="slidenum">
               <a:rPr lang="en-US" smtClean="0"/>
-              <a:t>17</a:t>
+              <a:t>18</a:t>
             </a:fld>
             <a:endParaRPr lang="en-US"/>
           </a:p>

</xml_diff>

<commit_message>
Added slildes on Boost::odeint
</commit_message>
<xml_diff>
--- a/CPlusPlus/12_essential_cpp_numerics.pptx
+++ b/CPlusPlus/12_essential_cpp_numerics.pptx
@@ -5,7 +5,7 @@
     <p:sldMasterId id="2147483660" r:id="rId1"/>
   </p:sldMasterIdLst>
   <p:notesMasterIdLst>
-    <p:notesMasterId r:id="rId20"/>
+    <p:notesMasterId r:id="rId21"/>
   </p:notesMasterIdLst>
   <p:sldIdLst>
     <p:sldId id="257" r:id="rId2"/>
@@ -25,7 +25,8 @@
     <p:sldId id="273" r:id="rId16"/>
     <p:sldId id="274" r:id="rId17"/>
     <p:sldId id="263" r:id="rId18"/>
-    <p:sldId id="260" r:id="rId19"/>
+    <p:sldId id="275" r:id="rId19"/>
+    <p:sldId id="260" r:id="rId20"/>
   </p:sldIdLst>
   <p:sldSz cx="9144000" cy="6858000" type="screen4x3"/>
   <p:notesSz cx="6858000" cy="9144000"/>
@@ -9439,7 +9440,11 @@
           <a:p>
             <a:r>
               <a:rPr lang="en-US" dirty="0" smtClean="0"/>
-              <a:t>Ordinary differential equations</a:t>
+              <a:t>ODEs with Boost::</a:t>
+            </a:r>
+            <a:r>
+              <a:rPr lang="en-US" dirty="0" err="1" smtClean="0"/>
+              <a:t>odeint</a:t>
             </a:r>
             <a:endParaRPr lang="en-US" dirty="0"/>
           </a:p>
@@ -9461,14 +9466,38 @@
           <a:lstStyle/>
           <a:p>
             <a:r>
+              <a:rPr lang="en-US" dirty="0"/>
+              <a:t>D</a:t>
+            </a:r>
+            <a:r>
               <a:rPr lang="en-US" dirty="0" smtClean="0"/>
-              <a:t>Straightforward: Boost::</a:t>
-            </a:r>
-            <a:r>
-              <a:rPr lang="en-US" dirty="0" err="1" smtClean="0"/>
-              <a:t>odeint</a:t>
-            </a:r>
+              <a:t>eclarations</a:t>
+            </a:r>
+          </a:p>
+          <a:p>
+            <a:pPr lvl="1"/>
             <a:endParaRPr lang="en-US" dirty="0"/>
+          </a:p>
+          <a:p>
+            <a:pPr lvl="1"/>
+            <a:endParaRPr lang="en-US" dirty="0" smtClean="0"/>
+          </a:p>
+          <a:p>
+            <a:pPr lvl="1"/>
+            <a:endParaRPr lang="en-US" dirty="0"/>
+          </a:p>
+          <a:p>
+            <a:endParaRPr lang="en-US" dirty="0" smtClean="0"/>
+          </a:p>
+          <a:p>
+            <a:r>
+              <a:rPr lang="en-US" dirty="0" smtClean="0"/>
+              <a:t>Define e</a:t>
+            </a:r>
+            <a:r>
+              <a:rPr lang="en-US" dirty="0" smtClean="0"/>
+              <a:t>quations</a:t>
+            </a:r>
           </a:p>
         </p:txBody>
       </p:sp>
@@ -9495,6 +9524,445 @@
           </a:p>
         </p:txBody>
       </p:sp>
+      <p:sp>
+        <p:nvSpPr>
+          <p:cNvPr id="5" name="TextBox 4"/>
+          <p:cNvSpPr txBox="1"/>
+          <p:nvPr/>
+        </p:nvSpPr>
+        <p:spPr>
+          <a:xfrm>
+            <a:off x="628650" y="2384818"/>
+            <a:ext cx="8377698" cy="1323439"/>
+          </a:xfrm>
+          <a:prstGeom prst="rect">
+            <a:avLst/>
+          </a:prstGeom>
+          <a:solidFill>
+            <a:schemeClr val="bg1">
+              <a:lumMod val="75000"/>
+            </a:schemeClr>
+          </a:solidFill>
+          <a:ln>
+            <a:noFill/>
+          </a:ln>
+        </p:spPr>
+        <p:txBody>
+          <a:bodyPr wrap="square" rtlCol="0">
+            <a:spAutoFit/>
+          </a:bodyPr>
+          <a:lstStyle/>
+          <a:p>
+            <a:r>
+              <a:rPr lang="en-US" sz="1600" dirty="0">
+                <a:latin typeface="Courier New" pitchFamily="49" charset="0"/>
+                <a:cs typeface="Courier New" pitchFamily="49" charset="0"/>
+              </a:rPr>
+              <a:t>#include </a:t>
+            </a:r>
+            <a:r>
+              <a:rPr lang="en-US" sz="1600" dirty="0" smtClean="0">
+                <a:latin typeface="Courier New" pitchFamily="49" charset="0"/>
+                <a:cs typeface="Courier New" pitchFamily="49" charset="0"/>
+              </a:rPr>
+              <a:t>&lt;array&gt;</a:t>
+            </a:r>
+          </a:p>
+          <a:p>
+            <a:r>
+              <a:rPr lang="en-US" sz="1600" dirty="0" smtClean="0">
+                <a:latin typeface="Courier New" pitchFamily="49" charset="0"/>
+                <a:cs typeface="Courier New" pitchFamily="49" charset="0"/>
+              </a:rPr>
+              <a:t>#include &lt;functional&gt;</a:t>
+            </a:r>
+            <a:endParaRPr lang="en-US" sz="1600" dirty="0">
+              <a:latin typeface="Courier New" pitchFamily="49" charset="0"/>
+              <a:cs typeface="Courier New" pitchFamily="49" charset="0"/>
+            </a:endParaRPr>
+          </a:p>
+          <a:p>
+            <a:r>
+              <a:rPr lang="en-US" sz="1600" dirty="0" smtClean="0">
+                <a:latin typeface="Courier New" pitchFamily="49" charset="0"/>
+                <a:cs typeface="Courier New" pitchFamily="49" charset="0"/>
+              </a:rPr>
+              <a:t>#</a:t>
+            </a:r>
+            <a:r>
+              <a:rPr lang="en-US" sz="1600" dirty="0">
+                <a:latin typeface="Courier New" pitchFamily="49" charset="0"/>
+                <a:cs typeface="Courier New" pitchFamily="49" charset="0"/>
+              </a:rPr>
+              <a:t>include &lt;boost/numeric/odeint.hpp&gt;</a:t>
+            </a:r>
+          </a:p>
+          <a:p>
+            <a:r>
+              <a:rPr lang="en-US" sz="1600" dirty="0" smtClean="0">
+                <a:latin typeface="Courier New" pitchFamily="49" charset="0"/>
+                <a:cs typeface="Courier New" pitchFamily="49" charset="0"/>
+              </a:rPr>
+              <a:t>using </a:t>
+            </a:r>
+            <a:r>
+              <a:rPr lang="en-US" sz="1600" dirty="0">
+                <a:latin typeface="Courier New" pitchFamily="49" charset="0"/>
+                <a:cs typeface="Courier New" pitchFamily="49" charset="0"/>
+              </a:rPr>
+              <a:t>namespace boost::numeric::</a:t>
+            </a:r>
+            <a:r>
+              <a:rPr lang="en-US" sz="1600" dirty="0" err="1">
+                <a:latin typeface="Courier New" pitchFamily="49" charset="0"/>
+                <a:cs typeface="Courier New" pitchFamily="49" charset="0"/>
+              </a:rPr>
+              <a:t>odeint</a:t>
+            </a:r>
+            <a:r>
+              <a:rPr lang="en-US" sz="1600" dirty="0">
+                <a:latin typeface="Courier New" pitchFamily="49" charset="0"/>
+                <a:cs typeface="Courier New" pitchFamily="49" charset="0"/>
+              </a:rPr>
+              <a:t>;</a:t>
+            </a:r>
+          </a:p>
+          <a:p>
+            <a:r>
+              <a:rPr lang="en-US" sz="1600" dirty="0" smtClean="0">
+                <a:latin typeface="Courier New" pitchFamily="49" charset="0"/>
+                <a:cs typeface="Courier New" pitchFamily="49" charset="0"/>
+              </a:rPr>
+              <a:t>using </a:t>
+            </a:r>
+            <a:r>
+              <a:rPr lang="en-US" sz="1600" dirty="0" err="1" smtClean="0">
+                <a:latin typeface="Courier New" pitchFamily="49" charset="0"/>
+                <a:cs typeface="Courier New" pitchFamily="49" charset="0"/>
+              </a:rPr>
+              <a:t>state_type</a:t>
+            </a:r>
+            <a:r>
+              <a:rPr lang="en-US" sz="1600" dirty="0" smtClean="0">
+                <a:latin typeface="Courier New" pitchFamily="49" charset="0"/>
+                <a:cs typeface="Courier New" pitchFamily="49" charset="0"/>
+              </a:rPr>
+              <a:t> = array&lt;double</a:t>
+            </a:r>
+            <a:r>
+              <a:rPr lang="en-US" sz="1600" dirty="0">
+                <a:latin typeface="Courier New" pitchFamily="49" charset="0"/>
+                <a:cs typeface="Courier New" pitchFamily="49" charset="0"/>
+              </a:rPr>
+              <a:t>, 3</a:t>
+            </a:r>
+            <a:r>
+              <a:rPr lang="en-US" sz="1600" dirty="0" smtClean="0">
+                <a:latin typeface="Courier New" pitchFamily="49" charset="0"/>
+                <a:cs typeface="Courier New" pitchFamily="49" charset="0"/>
+              </a:rPr>
+              <a:t>&gt;;</a:t>
+            </a:r>
+            <a:endParaRPr lang="en-US" sz="1600" dirty="0">
+              <a:latin typeface="Courier New" pitchFamily="49" charset="0"/>
+              <a:cs typeface="Courier New" pitchFamily="49" charset="0"/>
+            </a:endParaRPr>
+          </a:p>
+        </p:txBody>
+      </p:sp>
+      <p:sp>
+        <p:nvSpPr>
+          <p:cNvPr id="6" name="TextBox 5"/>
+          <p:cNvSpPr txBox="1"/>
+          <p:nvPr/>
+        </p:nvSpPr>
+        <p:spPr>
+          <a:xfrm>
+            <a:off x="628650" y="4516119"/>
+            <a:ext cx="8377698" cy="1569660"/>
+          </a:xfrm>
+          <a:prstGeom prst="rect">
+            <a:avLst/>
+          </a:prstGeom>
+          <a:solidFill>
+            <a:schemeClr val="bg1">
+              <a:lumMod val="75000"/>
+            </a:schemeClr>
+          </a:solidFill>
+          <a:ln>
+            <a:noFill/>
+          </a:ln>
+        </p:spPr>
+        <p:txBody>
+          <a:bodyPr wrap="square" rtlCol="0">
+            <a:spAutoFit/>
+          </a:bodyPr>
+          <a:lstStyle/>
+          <a:p>
+            <a:r>
+              <a:rPr lang="en-US" sz="1600" dirty="0" smtClean="0">
+                <a:latin typeface="Courier New" pitchFamily="49" charset="0"/>
+                <a:cs typeface="Courier New" pitchFamily="49" charset="0"/>
+              </a:rPr>
+              <a:t>void </a:t>
+            </a:r>
+            <a:r>
+              <a:rPr lang="en-US" sz="1600" dirty="0" err="1">
+                <a:latin typeface="Courier New" pitchFamily="49" charset="0"/>
+                <a:cs typeface="Courier New" pitchFamily="49" charset="0"/>
+              </a:rPr>
+              <a:t>lorenz_param</a:t>
+            </a:r>
+            <a:r>
+              <a:rPr lang="en-US" sz="1600" dirty="0">
+                <a:latin typeface="Courier New" pitchFamily="49" charset="0"/>
+                <a:cs typeface="Courier New" pitchFamily="49" charset="0"/>
+              </a:rPr>
+              <a:t>(</a:t>
+            </a:r>
+            <a:r>
+              <a:rPr lang="en-US" sz="1600" dirty="0" err="1">
+                <a:latin typeface="Courier New" pitchFamily="49" charset="0"/>
+                <a:cs typeface="Courier New" pitchFamily="49" charset="0"/>
+              </a:rPr>
+              <a:t>const</a:t>
+            </a:r>
+            <a:r>
+              <a:rPr lang="en-US" sz="1600" dirty="0">
+                <a:latin typeface="Courier New" pitchFamily="49" charset="0"/>
+                <a:cs typeface="Courier New" pitchFamily="49" charset="0"/>
+              </a:rPr>
+              <a:t> </a:t>
+            </a:r>
+            <a:r>
+              <a:rPr lang="en-US" sz="1600" dirty="0" err="1">
+                <a:latin typeface="Courier New" pitchFamily="49" charset="0"/>
+                <a:cs typeface="Courier New" pitchFamily="49" charset="0"/>
+              </a:rPr>
+              <a:t>state_type</a:t>
+            </a:r>
+            <a:r>
+              <a:rPr lang="en-US" sz="1600" dirty="0">
+                <a:latin typeface="Courier New" pitchFamily="49" charset="0"/>
+                <a:cs typeface="Courier New" pitchFamily="49" charset="0"/>
+              </a:rPr>
+              <a:t>&amp; x, </a:t>
+            </a:r>
+            <a:r>
+              <a:rPr lang="en-US" sz="1600" dirty="0" err="1">
+                <a:latin typeface="Courier New" pitchFamily="49" charset="0"/>
+                <a:cs typeface="Courier New" pitchFamily="49" charset="0"/>
+              </a:rPr>
+              <a:t>state_type</a:t>
+            </a:r>
+            <a:r>
+              <a:rPr lang="en-US" sz="1600" dirty="0">
+                <a:latin typeface="Courier New" pitchFamily="49" charset="0"/>
+                <a:cs typeface="Courier New" pitchFamily="49" charset="0"/>
+              </a:rPr>
+              <a:t>&amp; </a:t>
+            </a:r>
+            <a:r>
+              <a:rPr lang="en-US" sz="1600" dirty="0" err="1">
+                <a:latin typeface="Courier New" pitchFamily="49" charset="0"/>
+                <a:cs typeface="Courier New" pitchFamily="49" charset="0"/>
+              </a:rPr>
+              <a:t>dxdt</a:t>
+            </a:r>
+            <a:r>
+              <a:rPr lang="en-US" sz="1600" dirty="0">
+                <a:latin typeface="Courier New" pitchFamily="49" charset="0"/>
+                <a:cs typeface="Courier New" pitchFamily="49" charset="0"/>
+              </a:rPr>
+              <a:t>, double t,</a:t>
+            </a:r>
+          </a:p>
+          <a:p>
+            <a:r>
+              <a:rPr lang="en-US" sz="1600" dirty="0">
+                <a:latin typeface="Courier New" pitchFamily="49" charset="0"/>
+                <a:cs typeface="Courier New" pitchFamily="49" charset="0"/>
+              </a:rPr>
+              <a:t>                  double sigma, double R, double b) {</a:t>
+            </a:r>
+          </a:p>
+          <a:p>
+            <a:r>
+              <a:rPr lang="en-US" sz="1600" dirty="0">
+                <a:latin typeface="Courier New" pitchFamily="49" charset="0"/>
+                <a:cs typeface="Courier New" pitchFamily="49" charset="0"/>
+              </a:rPr>
+              <a:t>    </a:t>
+            </a:r>
+            <a:r>
+              <a:rPr lang="en-US" sz="1600" dirty="0" err="1">
+                <a:latin typeface="Courier New" pitchFamily="49" charset="0"/>
+                <a:cs typeface="Courier New" pitchFamily="49" charset="0"/>
+              </a:rPr>
+              <a:t>dxdt</a:t>
+            </a:r>
+            <a:r>
+              <a:rPr lang="en-US" sz="1600" dirty="0">
+                <a:latin typeface="Courier New" pitchFamily="49" charset="0"/>
+                <a:cs typeface="Courier New" pitchFamily="49" charset="0"/>
+              </a:rPr>
+              <a:t>[0] = sigma*(x[1] - x[0]);</a:t>
+            </a:r>
+          </a:p>
+          <a:p>
+            <a:r>
+              <a:rPr lang="en-US" sz="1600" dirty="0">
+                <a:latin typeface="Courier New" pitchFamily="49" charset="0"/>
+                <a:cs typeface="Courier New" pitchFamily="49" charset="0"/>
+              </a:rPr>
+              <a:t>    </a:t>
+            </a:r>
+            <a:r>
+              <a:rPr lang="en-US" sz="1600" dirty="0" err="1">
+                <a:latin typeface="Courier New" pitchFamily="49" charset="0"/>
+                <a:cs typeface="Courier New" pitchFamily="49" charset="0"/>
+              </a:rPr>
+              <a:t>dxdt</a:t>
+            </a:r>
+            <a:r>
+              <a:rPr lang="en-US" sz="1600" dirty="0">
+                <a:latin typeface="Courier New" pitchFamily="49" charset="0"/>
+                <a:cs typeface="Courier New" pitchFamily="49" charset="0"/>
+              </a:rPr>
+              <a:t>[1] = R*x[0] - x[1] - x[0]*x[2];</a:t>
+            </a:r>
+          </a:p>
+          <a:p>
+            <a:r>
+              <a:rPr lang="en-US" sz="1600" dirty="0">
+                <a:latin typeface="Courier New" pitchFamily="49" charset="0"/>
+                <a:cs typeface="Courier New" pitchFamily="49" charset="0"/>
+              </a:rPr>
+              <a:t>    </a:t>
+            </a:r>
+            <a:r>
+              <a:rPr lang="en-US" sz="1600" dirty="0" err="1">
+                <a:latin typeface="Courier New" pitchFamily="49" charset="0"/>
+                <a:cs typeface="Courier New" pitchFamily="49" charset="0"/>
+              </a:rPr>
+              <a:t>dxdt</a:t>
+            </a:r>
+            <a:r>
+              <a:rPr lang="en-US" sz="1600" dirty="0">
+                <a:latin typeface="Courier New" pitchFamily="49" charset="0"/>
+                <a:cs typeface="Courier New" pitchFamily="49" charset="0"/>
+              </a:rPr>
+              <a:t>[2] = -b*x[2] + x[0]*x[1];</a:t>
+            </a:r>
+          </a:p>
+          <a:p>
+            <a:r>
+              <a:rPr lang="en-US" sz="1600" dirty="0" smtClean="0">
+                <a:latin typeface="Courier New" pitchFamily="49" charset="0"/>
+                <a:cs typeface="Courier New" pitchFamily="49" charset="0"/>
+              </a:rPr>
+              <a:t>}</a:t>
+            </a:r>
+            <a:endParaRPr lang="en-US" sz="1600" dirty="0">
+              <a:latin typeface="Courier New" pitchFamily="49" charset="0"/>
+              <a:cs typeface="Courier New" pitchFamily="49" charset="0"/>
+            </a:endParaRPr>
+          </a:p>
+        </p:txBody>
+      </p:sp>
+      <p:grpSp>
+        <p:nvGrpSpPr>
+          <p:cNvPr id="8" name="Group 7"/>
+          <p:cNvGrpSpPr/>
+          <p:nvPr/>
+        </p:nvGrpSpPr>
+        <p:grpSpPr>
+          <a:xfrm>
+            <a:off x="3607865" y="5926918"/>
+            <a:ext cx="1354858" cy="730476"/>
+            <a:chOff x="1413600" y="5820374"/>
+            <a:chExt cx="1354858" cy="730476"/>
+          </a:xfrm>
+        </p:grpSpPr>
+        <p:sp>
+          <p:nvSpPr>
+            <p:cNvPr id="9" name="TextBox 8"/>
+            <p:cNvSpPr txBox="1"/>
+            <p:nvPr/>
+          </p:nvSpPr>
+          <p:spPr>
+            <a:xfrm>
+              <a:off x="1413600" y="6181518"/>
+              <a:ext cx="1354858" cy="369332"/>
+            </a:xfrm>
+            <a:prstGeom prst="rect">
+              <a:avLst/>
+            </a:prstGeom>
+            <a:solidFill>
+              <a:schemeClr val="bg1"/>
+            </a:solidFill>
+            <a:ln>
+              <a:solidFill>
+                <a:schemeClr val="tx1"/>
+              </a:solidFill>
+            </a:ln>
+          </p:spPr>
+          <p:txBody>
+            <a:bodyPr wrap="none" rtlCol="0">
+              <a:spAutoFit/>
+            </a:bodyPr>
+            <a:lstStyle/>
+            <a:p>
+              <a:r>
+                <a:rPr lang="en-US" dirty="0" smtClean="0"/>
+                <a:t>RHS of ODEs</a:t>
+              </a:r>
+              <a:endParaRPr lang="en-US" dirty="0">
+                <a:latin typeface="Courier New" panose="02070309020205020404" pitchFamily="49" charset="0"/>
+                <a:cs typeface="Courier New" panose="02070309020205020404" pitchFamily="49" charset="0"/>
+              </a:endParaRPr>
+            </a:p>
+          </p:txBody>
+        </p:sp>
+        <p:cxnSp>
+          <p:nvCxnSpPr>
+            <p:cNvPr id="10" name="Straight Arrow Connector 9"/>
+            <p:cNvCxnSpPr>
+              <a:stCxn id="9" idx="0"/>
+            </p:cNvCxnSpPr>
+            <p:nvPr/>
+          </p:nvCxnSpPr>
+          <p:spPr>
+            <a:xfrm flipH="1" flipV="1">
+              <a:off x="1525541" y="5820374"/>
+              <a:ext cx="565488" cy="361144"/>
+            </a:xfrm>
+            <a:prstGeom prst="straightConnector1">
+              <a:avLst/>
+            </a:prstGeom>
+            <a:ln>
+              <a:solidFill>
+                <a:schemeClr val="tx1"/>
+              </a:solidFill>
+              <a:tailEnd type="stealth" w="lg" len="lg"/>
+            </a:ln>
+          </p:spPr>
+          <p:style>
+            <a:lnRef idx="1">
+              <a:schemeClr val="accent1"/>
+            </a:lnRef>
+            <a:fillRef idx="0">
+              <a:schemeClr val="accent1"/>
+            </a:fillRef>
+            <a:effectRef idx="0">
+              <a:schemeClr val="accent1"/>
+            </a:effectRef>
+            <a:fontRef idx="minor">
+              <a:schemeClr val="tx1"/>
+            </a:fontRef>
+          </p:style>
+        </p:cxnSp>
+      </p:grpSp>
     </p:spTree>
     <p:extLst>
       <p:ext uri="{BB962C8B-B14F-4D97-AF65-F5344CB8AC3E}">
@@ -9508,9 +9976,237 @@
   <p:timing>
     <p:tnLst>
       <p:par>
-        <p:cTn id="1" dur="indefinite" restart="never" nodeType="tmRoot"/>
+        <p:cTn id="1" dur="indefinite" restart="never" nodeType="tmRoot">
+          <p:childTnLst>
+            <p:seq concurrent="1" nextAc="seek">
+              <p:cTn id="2" dur="indefinite" nodeType="mainSeq">
+                <p:childTnLst>
+                  <p:par>
+                    <p:cTn id="3" fill="hold">
+                      <p:stCondLst>
+                        <p:cond delay="indefinite"/>
+                        <p:cond evt="onBegin" delay="0">
+                          <p:tn val="2"/>
+                        </p:cond>
+                      </p:stCondLst>
+                      <p:childTnLst>
+                        <p:par>
+                          <p:cTn id="4" fill="hold">
+                            <p:stCondLst>
+                              <p:cond delay="0"/>
+                            </p:stCondLst>
+                            <p:childTnLst>
+                              <p:par>
+                                <p:cTn id="5" presetID="1" presetClass="entr" presetSubtype="0" fill="hold" grpId="0" nodeType="withEffect">
+                                  <p:stCondLst>
+                                    <p:cond delay="0"/>
+                                  </p:stCondLst>
+                                  <p:childTnLst>
+                                    <p:set>
+                                      <p:cBhvr>
+                                        <p:cTn id="6" dur="1" fill="hold">
+                                          <p:stCondLst>
+                                            <p:cond delay="0"/>
+                                          </p:stCondLst>
+                                        </p:cTn>
+                                        <p:tgtEl>
+                                          <p:spTgt spid="3">
+                                            <p:txEl>
+                                              <p:pRg st="0" end="0"/>
+                                            </p:txEl>
+                                          </p:spTgt>
+                                        </p:tgtEl>
+                                        <p:attrNameLst>
+                                          <p:attrName>style.visibility</p:attrName>
+                                        </p:attrNameLst>
+                                      </p:cBhvr>
+                                      <p:to>
+                                        <p:strVal val="visible"/>
+                                      </p:to>
+                                    </p:set>
+                                  </p:childTnLst>
+                                </p:cTn>
+                              </p:par>
+                              <p:par>
+                                <p:cTn id="7" presetID="1" presetClass="entr" presetSubtype="0" fill="hold" grpId="0" nodeType="withEffect">
+                                  <p:stCondLst>
+                                    <p:cond delay="0"/>
+                                  </p:stCondLst>
+                                  <p:childTnLst>
+                                    <p:set>
+                                      <p:cBhvr>
+                                        <p:cTn id="8" dur="1" fill="hold">
+                                          <p:stCondLst>
+                                            <p:cond delay="0"/>
+                                          </p:stCondLst>
+                                        </p:cTn>
+                                        <p:tgtEl>
+                                          <p:spTgt spid="5"/>
+                                        </p:tgtEl>
+                                        <p:attrNameLst>
+                                          <p:attrName>style.visibility</p:attrName>
+                                        </p:attrNameLst>
+                                      </p:cBhvr>
+                                      <p:to>
+                                        <p:strVal val="visible"/>
+                                      </p:to>
+                                    </p:set>
+                                  </p:childTnLst>
+                                </p:cTn>
+                              </p:par>
+                            </p:childTnLst>
+                          </p:cTn>
+                        </p:par>
+                      </p:childTnLst>
+                    </p:cTn>
+                  </p:par>
+                  <p:par>
+                    <p:cTn id="9" fill="hold">
+                      <p:stCondLst>
+                        <p:cond delay="indefinite"/>
+                      </p:stCondLst>
+                      <p:childTnLst>
+                        <p:par>
+                          <p:cTn id="10" fill="hold">
+                            <p:stCondLst>
+                              <p:cond delay="0"/>
+                            </p:stCondLst>
+                            <p:childTnLst>
+                              <p:par>
+                                <p:cTn id="11" presetID="1" presetClass="entr" presetSubtype="0" fill="hold" grpId="0" nodeType="clickEffect">
+                                  <p:stCondLst>
+                                    <p:cond delay="0"/>
+                                  </p:stCondLst>
+                                  <p:childTnLst>
+                                    <p:set>
+                                      <p:cBhvr>
+                                        <p:cTn id="12" dur="1" fill="hold">
+                                          <p:stCondLst>
+                                            <p:cond delay="0"/>
+                                          </p:stCondLst>
+                                        </p:cTn>
+                                        <p:tgtEl>
+                                          <p:spTgt spid="3">
+                                            <p:txEl>
+                                              <p:pRg st="5" end="5"/>
+                                            </p:txEl>
+                                          </p:spTgt>
+                                        </p:tgtEl>
+                                        <p:attrNameLst>
+                                          <p:attrName>style.visibility</p:attrName>
+                                        </p:attrNameLst>
+                                      </p:cBhvr>
+                                      <p:to>
+                                        <p:strVal val="visible"/>
+                                      </p:to>
+                                    </p:set>
+                                  </p:childTnLst>
+                                </p:cTn>
+                              </p:par>
+                              <p:par>
+                                <p:cTn id="13" presetID="1" presetClass="entr" presetSubtype="0" fill="hold" grpId="0" nodeType="withEffect">
+                                  <p:stCondLst>
+                                    <p:cond delay="0"/>
+                                  </p:stCondLst>
+                                  <p:childTnLst>
+                                    <p:set>
+                                      <p:cBhvr>
+                                        <p:cTn id="14" dur="1" fill="hold">
+                                          <p:stCondLst>
+                                            <p:cond delay="0"/>
+                                          </p:stCondLst>
+                                        </p:cTn>
+                                        <p:tgtEl>
+                                          <p:spTgt spid="6"/>
+                                        </p:tgtEl>
+                                        <p:attrNameLst>
+                                          <p:attrName>style.visibility</p:attrName>
+                                        </p:attrNameLst>
+                                      </p:cBhvr>
+                                      <p:to>
+                                        <p:strVal val="visible"/>
+                                      </p:to>
+                                    </p:set>
+                                  </p:childTnLst>
+                                </p:cTn>
+                              </p:par>
+                            </p:childTnLst>
+                          </p:cTn>
+                        </p:par>
+                      </p:childTnLst>
+                    </p:cTn>
+                  </p:par>
+                  <p:par>
+                    <p:cTn id="15" fill="hold">
+                      <p:stCondLst>
+                        <p:cond delay="indefinite"/>
+                      </p:stCondLst>
+                      <p:childTnLst>
+                        <p:par>
+                          <p:cTn id="16" fill="hold">
+                            <p:stCondLst>
+                              <p:cond delay="0"/>
+                            </p:stCondLst>
+                            <p:childTnLst>
+                              <p:par>
+                                <p:cTn id="17" presetID="1" presetClass="entr" presetSubtype="0" fill="hold" nodeType="clickEffect">
+                                  <p:stCondLst>
+                                    <p:cond delay="0"/>
+                                  </p:stCondLst>
+                                  <p:childTnLst>
+                                    <p:set>
+                                      <p:cBhvr>
+                                        <p:cTn id="18" dur="1" fill="hold">
+                                          <p:stCondLst>
+                                            <p:cond delay="0"/>
+                                          </p:stCondLst>
+                                        </p:cTn>
+                                        <p:tgtEl>
+                                          <p:spTgt spid="8"/>
+                                        </p:tgtEl>
+                                        <p:attrNameLst>
+                                          <p:attrName>style.visibility</p:attrName>
+                                        </p:attrNameLst>
+                                      </p:cBhvr>
+                                      <p:to>
+                                        <p:strVal val="visible"/>
+                                      </p:to>
+                                    </p:set>
+                                  </p:childTnLst>
+                                </p:cTn>
+                              </p:par>
+                            </p:childTnLst>
+                          </p:cTn>
+                        </p:par>
+                      </p:childTnLst>
+                    </p:cTn>
+                  </p:par>
+                </p:childTnLst>
+              </p:cTn>
+              <p:prevCondLst>
+                <p:cond evt="onPrev" delay="0">
+                  <p:tgtEl>
+                    <p:sldTgt/>
+                  </p:tgtEl>
+                </p:cond>
+              </p:prevCondLst>
+              <p:nextCondLst>
+                <p:cond evt="onNext" delay="0">
+                  <p:tgtEl>
+                    <p:sldTgt/>
+                  </p:tgtEl>
+                </p:cond>
+              </p:nextCondLst>
+            </p:seq>
+          </p:childTnLst>
+        </p:cTn>
       </p:par>
     </p:tnLst>
+    <p:bldLst>
+      <p:bldP spid="3" grpId="0" uiExpand="1" build="p"/>
+      <p:bldP spid="5" grpId="0" animBg="1"/>
+      <p:bldP spid="6" grpId="0" animBg="1"/>
+    </p:bldLst>
   </p:timing>
 </p:sld>
 </file>
@@ -9549,6 +10245,910 @@
           <a:p>
             <a:r>
               <a:rPr lang="en-US" dirty="0" smtClean="0"/>
+              <a:t>Solving ODEs</a:t>
+            </a:r>
+            <a:endParaRPr lang="en-US" dirty="0"/>
+          </a:p>
+        </p:txBody>
+      </p:sp>
+      <p:sp>
+        <p:nvSpPr>
+          <p:cNvPr id="3" name="Content Placeholder 2"/>
+          <p:cNvSpPr>
+            <a:spLocks noGrp="1"/>
+          </p:cNvSpPr>
+          <p:nvPr>
+            <p:ph idx="1"/>
+          </p:nvPr>
+        </p:nvSpPr>
+        <p:spPr/>
+        <p:txBody>
+          <a:bodyPr/>
+          <a:lstStyle/>
+          <a:p>
+            <a:r>
+              <a:rPr lang="en-US" dirty="0" smtClean="0"/>
+              <a:t>Writing steps</a:t>
+            </a:r>
+          </a:p>
+          <a:p>
+            <a:endParaRPr lang="en-US" dirty="0"/>
+          </a:p>
+          <a:p>
+            <a:endParaRPr lang="en-US" dirty="0" smtClean="0"/>
+          </a:p>
+          <a:p>
+            <a:endParaRPr lang="en-US" dirty="0" smtClean="0"/>
+          </a:p>
+          <a:p>
+            <a:r>
+              <a:rPr lang="en-US" dirty="0" smtClean="0"/>
+              <a:t>Integration</a:t>
+            </a:r>
+            <a:endParaRPr lang="en-US" dirty="0"/>
+          </a:p>
+        </p:txBody>
+      </p:sp>
+      <p:sp>
+        <p:nvSpPr>
+          <p:cNvPr id="4" name="Slide Number Placeholder 3"/>
+          <p:cNvSpPr>
+            <a:spLocks noGrp="1"/>
+          </p:cNvSpPr>
+          <p:nvPr>
+            <p:ph type="sldNum" sz="quarter" idx="12"/>
+          </p:nvPr>
+        </p:nvSpPr>
+        <p:spPr/>
+        <p:txBody>
+          <a:bodyPr/>
+          <a:lstStyle/>
+          <a:p>
+            <a:fld id="{9CEF4966-5219-4577-B301-14467D565841}" type="slidenum">
+              <a:rPr lang="en-US" smtClean="0"/>
+              <a:t>18</a:t>
+            </a:fld>
+            <a:endParaRPr lang="en-US"/>
+          </a:p>
+        </p:txBody>
+      </p:sp>
+      <p:sp>
+        <p:nvSpPr>
+          <p:cNvPr id="6" name="TextBox 5"/>
+          <p:cNvSpPr txBox="1"/>
+          <p:nvPr/>
+        </p:nvSpPr>
+        <p:spPr>
+          <a:xfrm>
+            <a:off x="628650" y="2345145"/>
+            <a:ext cx="8377698" cy="1077218"/>
+          </a:xfrm>
+          <a:prstGeom prst="rect">
+            <a:avLst/>
+          </a:prstGeom>
+          <a:solidFill>
+            <a:schemeClr val="bg1">
+              <a:lumMod val="75000"/>
+            </a:schemeClr>
+          </a:solidFill>
+          <a:ln>
+            <a:noFill/>
+          </a:ln>
+        </p:spPr>
+        <p:txBody>
+          <a:bodyPr wrap="square" rtlCol="0">
+            <a:spAutoFit/>
+          </a:bodyPr>
+          <a:lstStyle/>
+          <a:p>
+            <a:r>
+              <a:rPr lang="en-US" sz="1600" dirty="0" smtClean="0">
+                <a:latin typeface="Courier New" pitchFamily="49" charset="0"/>
+                <a:cs typeface="Courier New" pitchFamily="49" charset="0"/>
+              </a:rPr>
+              <a:t>void </a:t>
+            </a:r>
+            <a:r>
+              <a:rPr lang="en-US" sz="1600" dirty="0" err="1">
+                <a:latin typeface="Courier New" pitchFamily="49" charset="0"/>
+                <a:cs typeface="Courier New" pitchFamily="49" charset="0"/>
+              </a:rPr>
+              <a:t>write_lorenz</a:t>
+            </a:r>
+            <a:r>
+              <a:rPr lang="en-US" sz="1600" dirty="0">
+                <a:latin typeface="Courier New" pitchFamily="49" charset="0"/>
+                <a:cs typeface="Courier New" pitchFamily="49" charset="0"/>
+              </a:rPr>
+              <a:t>(</a:t>
+            </a:r>
+            <a:r>
+              <a:rPr lang="en-US" sz="1600" dirty="0" err="1">
+                <a:latin typeface="Courier New" pitchFamily="49" charset="0"/>
+                <a:cs typeface="Courier New" pitchFamily="49" charset="0"/>
+              </a:rPr>
+              <a:t>const</a:t>
+            </a:r>
+            <a:r>
+              <a:rPr lang="en-US" sz="1600" dirty="0">
+                <a:latin typeface="Courier New" pitchFamily="49" charset="0"/>
+                <a:cs typeface="Courier New" pitchFamily="49" charset="0"/>
+              </a:rPr>
+              <a:t> </a:t>
+            </a:r>
+            <a:r>
+              <a:rPr lang="en-US" sz="1600" dirty="0" err="1">
+                <a:latin typeface="Courier New" pitchFamily="49" charset="0"/>
+                <a:cs typeface="Courier New" pitchFamily="49" charset="0"/>
+              </a:rPr>
+              <a:t>state_type</a:t>
+            </a:r>
+            <a:r>
+              <a:rPr lang="en-US" sz="1600" dirty="0">
+                <a:latin typeface="Courier New" pitchFamily="49" charset="0"/>
+                <a:cs typeface="Courier New" pitchFamily="49" charset="0"/>
+              </a:rPr>
+              <a:t>&amp; x, </a:t>
+            </a:r>
+            <a:r>
+              <a:rPr lang="en-US" sz="1600" dirty="0" err="1">
+                <a:latin typeface="Courier New" pitchFamily="49" charset="0"/>
+                <a:cs typeface="Courier New" pitchFamily="49" charset="0"/>
+              </a:rPr>
+              <a:t>const</a:t>
+            </a:r>
+            <a:r>
+              <a:rPr lang="en-US" sz="1600" dirty="0">
+                <a:latin typeface="Courier New" pitchFamily="49" charset="0"/>
+                <a:cs typeface="Courier New" pitchFamily="49" charset="0"/>
+              </a:rPr>
+              <a:t> double t) {</a:t>
+            </a:r>
+          </a:p>
+          <a:p>
+            <a:r>
+              <a:rPr lang="en-US" sz="1600" dirty="0">
+                <a:latin typeface="Courier New" pitchFamily="49" charset="0"/>
+                <a:cs typeface="Courier New" pitchFamily="49" charset="0"/>
+              </a:rPr>
+              <a:t>    </a:t>
+            </a:r>
+            <a:r>
+              <a:rPr lang="en-US" sz="1600" dirty="0" err="1">
+                <a:latin typeface="Courier New" pitchFamily="49" charset="0"/>
+                <a:cs typeface="Courier New" pitchFamily="49" charset="0"/>
+              </a:rPr>
+              <a:t>cout</a:t>
+            </a:r>
+            <a:r>
+              <a:rPr lang="en-US" sz="1600" dirty="0">
+                <a:latin typeface="Courier New" pitchFamily="49" charset="0"/>
+                <a:cs typeface="Courier New" pitchFamily="49" charset="0"/>
+              </a:rPr>
+              <a:t> &lt;&lt; t &lt;&lt; '\t' &lt;&lt; x[0] &lt;&lt; '\t' &lt;&lt; x[1] &lt;&lt; '\t</a:t>
+            </a:r>
+            <a:r>
+              <a:rPr lang="en-US" sz="1600" dirty="0" smtClean="0">
+                <a:latin typeface="Courier New" pitchFamily="49" charset="0"/>
+                <a:cs typeface="Courier New" pitchFamily="49" charset="0"/>
+              </a:rPr>
+              <a:t>' &lt;&lt; </a:t>
+            </a:r>
+            <a:r>
+              <a:rPr lang="en-US" sz="1600" dirty="0">
+                <a:latin typeface="Courier New" pitchFamily="49" charset="0"/>
+                <a:cs typeface="Courier New" pitchFamily="49" charset="0"/>
+              </a:rPr>
+              <a:t>x[2</a:t>
+            </a:r>
+            <a:r>
+              <a:rPr lang="en-US" sz="1600" dirty="0" smtClean="0">
+                <a:latin typeface="Courier New" pitchFamily="49" charset="0"/>
+                <a:cs typeface="Courier New" pitchFamily="49" charset="0"/>
+              </a:rPr>
+              <a:t>]</a:t>
+            </a:r>
+            <a:br>
+              <a:rPr lang="en-US" sz="1600" dirty="0" smtClean="0">
+                <a:latin typeface="Courier New" pitchFamily="49" charset="0"/>
+                <a:cs typeface="Courier New" pitchFamily="49" charset="0"/>
+              </a:rPr>
+            </a:br>
+            <a:r>
+              <a:rPr lang="en-US" sz="1600" dirty="0" smtClean="0">
+                <a:latin typeface="Courier New" pitchFamily="49" charset="0"/>
+                <a:cs typeface="Courier New" pitchFamily="49" charset="0"/>
+              </a:rPr>
+              <a:t>         &lt;&lt; </a:t>
+            </a:r>
+            <a:r>
+              <a:rPr lang="en-US" sz="1600" dirty="0" err="1">
+                <a:latin typeface="Courier New" pitchFamily="49" charset="0"/>
+                <a:cs typeface="Courier New" pitchFamily="49" charset="0"/>
+              </a:rPr>
+              <a:t>endl</a:t>
+            </a:r>
+            <a:r>
+              <a:rPr lang="en-US" sz="1600" dirty="0">
+                <a:latin typeface="Courier New" pitchFamily="49" charset="0"/>
+                <a:cs typeface="Courier New" pitchFamily="49" charset="0"/>
+              </a:rPr>
+              <a:t>;</a:t>
+            </a:r>
+          </a:p>
+          <a:p>
+            <a:r>
+              <a:rPr lang="en-US" sz="1600" dirty="0">
+                <a:latin typeface="Courier New" pitchFamily="49" charset="0"/>
+                <a:cs typeface="Courier New" pitchFamily="49" charset="0"/>
+              </a:rPr>
+              <a:t>}</a:t>
+            </a:r>
+          </a:p>
+        </p:txBody>
+      </p:sp>
+      <p:sp>
+        <p:nvSpPr>
+          <p:cNvPr id="7" name="TextBox 6"/>
+          <p:cNvSpPr txBox="1"/>
+          <p:nvPr/>
+        </p:nvSpPr>
+        <p:spPr>
+          <a:xfrm>
+            <a:off x="628650" y="4361081"/>
+            <a:ext cx="8377698" cy="1815882"/>
+          </a:xfrm>
+          <a:prstGeom prst="rect">
+            <a:avLst/>
+          </a:prstGeom>
+          <a:solidFill>
+            <a:schemeClr val="bg1">
+              <a:lumMod val="75000"/>
+            </a:schemeClr>
+          </a:solidFill>
+          <a:ln>
+            <a:noFill/>
+          </a:ln>
+        </p:spPr>
+        <p:txBody>
+          <a:bodyPr wrap="square" rtlCol="0">
+            <a:spAutoFit/>
+          </a:bodyPr>
+          <a:lstStyle/>
+          <a:p>
+            <a:r>
+              <a:rPr lang="en-US" sz="1600" dirty="0" err="1" smtClean="0">
+                <a:latin typeface="Courier New" pitchFamily="49" charset="0"/>
+                <a:cs typeface="Courier New" pitchFamily="49" charset="0"/>
+              </a:rPr>
+              <a:t>const</a:t>
+            </a:r>
+            <a:r>
+              <a:rPr lang="en-US" sz="1600" dirty="0" smtClean="0">
+                <a:latin typeface="Courier New" pitchFamily="49" charset="0"/>
+                <a:cs typeface="Courier New" pitchFamily="49" charset="0"/>
+              </a:rPr>
+              <a:t> </a:t>
+            </a:r>
+            <a:r>
+              <a:rPr lang="en-US" sz="1600" dirty="0">
+                <a:latin typeface="Courier New" pitchFamily="49" charset="0"/>
+                <a:cs typeface="Courier New" pitchFamily="49" charset="0"/>
+              </a:rPr>
+              <a:t>double sigma = 10.0;</a:t>
+            </a:r>
+          </a:p>
+          <a:p>
+            <a:r>
+              <a:rPr lang="en-US" sz="1600" dirty="0" err="1" smtClean="0">
+                <a:latin typeface="Courier New" pitchFamily="49" charset="0"/>
+                <a:cs typeface="Courier New" pitchFamily="49" charset="0"/>
+              </a:rPr>
+              <a:t>const</a:t>
+            </a:r>
+            <a:r>
+              <a:rPr lang="en-US" sz="1600" dirty="0" smtClean="0">
+                <a:latin typeface="Courier New" pitchFamily="49" charset="0"/>
+                <a:cs typeface="Courier New" pitchFamily="49" charset="0"/>
+              </a:rPr>
+              <a:t> </a:t>
+            </a:r>
+            <a:r>
+              <a:rPr lang="en-US" sz="1600" dirty="0">
+                <a:latin typeface="Courier New" pitchFamily="49" charset="0"/>
+                <a:cs typeface="Courier New" pitchFamily="49" charset="0"/>
+              </a:rPr>
+              <a:t>double R = 28.0;</a:t>
+            </a:r>
+          </a:p>
+          <a:p>
+            <a:r>
+              <a:rPr lang="en-US" sz="1600" dirty="0" err="1" smtClean="0">
+                <a:latin typeface="Courier New" pitchFamily="49" charset="0"/>
+                <a:cs typeface="Courier New" pitchFamily="49" charset="0"/>
+              </a:rPr>
+              <a:t>const</a:t>
+            </a:r>
+            <a:r>
+              <a:rPr lang="en-US" sz="1600" dirty="0" smtClean="0">
+                <a:latin typeface="Courier New" pitchFamily="49" charset="0"/>
+                <a:cs typeface="Courier New" pitchFamily="49" charset="0"/>
+              </a:rPr>
+              <a:t> </a:t>
+            </a:r>
+            <a:r>
+              <a:rPr lang="en-US" sz="1600" dirty="0">
+                <a:latin typeface="Courier New" pitchFamily="49" charset="0"/>
+                <a:cs typeface="Courier New" pitchFamily="49" charset="0"/>
+              </a:rPr>
+              <a:t>double b = 8.0/3.0;</a:t>
+            </a:r>
+          </a:p>
+          <a:p>
+            <a:r>
+              <a:rPr lang="en-US" sz="1600" dirty="0" smtClean="0">
+                <a:latin typeface="Courier New" pitchFamily="49" charset="0"/>
+                <a:cs typeface="Courier New" pitchFamily="49" charset="0"/>
+              </a:rPr>
+              <a:t>using </a:t>
+            </a:r>
+            <a:r>
+              <a:rPr lang="en-US" sz="1600" dirty="0">
+                <a:latin typeface="Courier New" pitchFamily="49" charset="0"/>
+                <a:cs typeface="Courier New" pitchFamily="49" charset="0"/>
+              </a:rPr>
+              <a:t>namespace </a:t>
+            </a:r>
+            <a:r>
+              <a:rPr lang="en-US" sz="1600" dirty="0" err="1">
+                <a:latin typeface="Courier New" pitchFamily="49" charset="0"/>
+                <a:cs typeface="Courier New" pitchFamily="49" charset="0"/>
+              </a:rPr>
+              <a:t>std</a:t>
+            </a:r>
+            <a:r>
+              <a:rPr lang="en-US" sz="1600" dirty="0">
+                <a:latin typeface="Courier New" pitchFamily="49" charset="0"/>
+                <a:cs typeface="Courier New" pitchFamily="49" charset="0"/>
+              </a:rPr>
+              <a:t>::placeholders;</a:t>
+            </a:r>
+          </a:p>
+          <a:p>
+            <a:r>
+              <a:rPr lang="en-US" sz="1600" dirty="0" smtClean="0">
+                <a:latin typeface="Courier New" pitchFamily="49" charset="0"/>
+                <a:cs typeface="Courier New" pitchFamily="49" charset="0"/>
+              </a:rPr>
+              <a:t>auto </a:t>
+            </a:r>
+            <a:r>
+              <a:rPr lang="en-US" sz="1600" dirty="0" err="1">
+                <a:latin typeface="Courier New" pitchFamily="49" charset="0"/>
+                <a:cs typeface="Courier New" pitchFamily="49" charset="0"/>
+              </a:rPr>
+              <a:t>lorenz</a:t>
+            </a:r>
+            <a:r>
+              <a:rPr lang="en-US" sz="1600" dirty="0">
+                <a:latin typeface="Courier New" pitchFamily="49" charset="0"/>
+                <a:cs typeface="Courier New" pitchFamily="49" charset="0"/>
+              </a:rPr>
+              <a:t> = bind(</a:t>
+            </a:r>
+            <a:r>
+              <a:rPr lang="en-US" sz="1600" dirty="0" err="1">
+                <a:latin typeface="Courier New" pitchFamily="49" charset="0"/>
+                <a:cs typeface="Courier New" pitchFamily="49" charset="0"/>
+              </a:rPr>
+              <a:t>lorenz_param</a:t>
+            </a:r>
+            <a:r>
+              <a:rPr lang="en-US" sz="1600" dirty="0">
+                <a:latin typeface="Courier New" pitchFamily="49" charset="0"/>
+                <a:cs typeface="Courier New" pitchFamily="49" charset="0"/>
+              </a:rPr>
+              <a:t>, _1, _2, _3, sigma, R, b);</a:t>
+            </a:r>
+          </a:p>
+          <a:p>
+            <a:r>
+              <a:rPr lang="en-US" sz="1600" dirty="0" err="1" smtClean="0">
+                <a:latin typeface="Courier New" pitchFamily="49" charset="0"/>
+                <a:cs typeface="Courier New" pitchFamily="49" charset="0"/>
+              </a:rPr>
+              <a:t>state_type</a:t>
+            </a:r>
+            <a:r>
+              <a:rPr lang="en-US" sz="1600" dirty="0" smtClean="0">
+                <a:latin typeface="Courier New" pitchFamily="49" charset="0"/>
+                <a:cs typeface="Courier New" pitchFamily="49" charset="0"/>
+              </a:rPr>
+              <a:t> </a:t>
+            </a:r>
+            <a:r>
+              <a:rPr lang="en-US" sz="1600" dirty="0">
+                <a:latin typeface="Courier New" pitchFamily="49" charset="0"/>
+                <a:cs typeface="Courier New" pitchFamily="49" charset="0"/>
+              </a:rPr>
+              <a:t>x = { 10.0, 1.0, 1.0 </a:t>
+            </a:r>
+            <a:r>
+              <a:rPr lang="en-US" sz="1600" dirty="0" smtClean="0">
+                <a:latin typeface="Courier New" pitchFamily="49" charset="0"/>
+                <a:cs typeface="Courier New" pitchFamily="49" charset="0"/>
+              </a:rPr>
+              <a:t>};</a:t>
+            </a:r>
+            <a:endParaRPr lang="en-US" sz="1600" dirty="0">
+              <a:latin typeface="Courier New" pitchFamily="49" charset="0"/>
+              <a:cs typeface="Courier New" pitchFamily="49" charset="0"/>
+            </a:endParaRPr>
+          </a:p>
+          <a:p>
+            <a:r>
+              <a:rPr lang="en-US" sz="1600" dirty="0" smtClean="0">
+                <a:latin typeface="Courier New" pitchFamily="49" charset="0"/>
+                <a:cs typeface="Courier New" pitchFamily="49" charset="0"/>
+              </a:rPr>
+              <a:t>integrate(</a:t>
+            </a:r>
+            <a:r>
+              <a:rPr lang="en-US" sz="1600" dirty="0" err="1" smtClean="0">
+                <a:latin typeface="Courier New" pitchFamily="49" charset="0"/>
+                <a:cs typeface="Courier New" pitchFamily="49" charset="0"/>
+              </a:rPr>
+              <a:t>lorenz</a:t>
+            </a:r>
+            <a:r>
+              <a:rPr lang="en-US" sz="1600" dirty="0">
+                <a:latin typeface="Courier New" pitchFamily="49" charset="0"/>
+                <a:cs typeface="Courier New" pitchFamily="49" charset="0"/>
+              </a:rPr>
+              <a:t>, x, 0.0, </a:t>
+            </a:r>
+            <a:r>
+              <a:rPr lang="en-US" sz="1600" dirty="0" err="1" smtClean="0">
+                <a:latin typeface="Courier New" pitchFamily="49" charset="0"/>
+                <a:cs typeface="Courier New" pitchFamily="49" charset="0"/>
+              </a:rPr>
+              <a:t>max_t</a:t>
+            </a:r>
+            <a:r>
+              <a:rPr lang="en-US" sz="1600" dirty="0" smtClean="0">
+                <a:latin typeface="Courier New" pitchFamily="49" charset="0"/>
+                <a:cs typeface="Courier New" pitchFamily="49" charset="0"/>
+              </a:rPr>
+              <a:t>, </a:t>
+            </a:r>
+            <a:r>
+              <a:rPr lang="en-US" sz="1600" dirty="0" err="1" smtClean="0">
+                <a:latin typeface="Courier New" pitchFamily="49" charset="0"/>
+                <a:cs typeface="Courier New" pitchFamily="49" charset="0"/>
+              </a:rPr>
+              <a:t>delta_t</a:t>
+            </a:r>
+            <a:r>
+              <a:rPr lang="en-US" sz="1600" dirty="0" smtClean="0">
+                <a:latin typeface="Courier New" pitchFamily="49" charset="0"/>
+                <a:cs typeface="Courier New" pitchFamily="49" charset="0"/>
+              </a:rPr>
+              <a:t>, </a:t>
+            </a:r>
+            <a:r>
+              <a:rPr lang="en-US" sz="1600" dirty="0" err="1" smtClean="0">
+                <a:latin typeface="Courier New" pitchFamily="49" charset="0"/>
+                <a:cs typeface="Courier New" pitchFamily="49" charset="0"/>
+              </a:rPr>
+              <a:t>write_lorenz</a:t>
+            </a:r>
+            <a:r>
+              <a:rPr lang="en-US" sz="1600" dirty="0" smtClean="0">
+                <a:latin typeface="Courier New" pitchFamily="49" charset="0"/>
+                <a:cs typeface="Courier New" pitchFamily="49" charset="0"/>
+              </a:rPr>
+              <a:t>);</a:t>
+            </a:r>
+            <a:endParaRPr lang="en-US" sz="1600" dirty="0">
+              <a:latin typeface="Courier New" pitchFamily="49" charset="0"/>
+              <a:cs typeface="Courier New" pitchFamily="49" charset="0"/>
+            </a:endParaRPr>
+          </a:p>
+        </p:txBody>
+      </p:sp>
+      <p:grpSp>
+        <p:nvGrpSpPr>
+          <p:cNvPr id="8" name="Group 7"/>
+          <p:cNvGrpSpPr/>
+          <p:nvPr/>
+        </p:nvGrpSpPr>
+        <p:grpSpPr>
+          <a:xfrm>
+            <a:off x="5673220" y="4529216"/>
+            <a:ext cx="2259282" cy="829366"/>
+            <a:chOff x="745587" y="6181518"/>
+            <a:chExt cx="2259282" cy="829366"/>
+          </a:xfrm>
+        </p:grpSpPr>
+        <p:sp>
+          <p:nvSpPr>
+            <p:cNvPr id="9" name="TextBox 8"/>
+            <p:cNvSpPr txBox="1"/>
+            <p:nvPr/>
+          </p:nvSpPr>
+          <p:spPr>
+            <a:xfrm>
+              <a:off x="1413600" y="6181518"/>
+              <a:ext cx="1591269" cy="646331"/>
+            </a:xfrm>
+            <a:prstGeom prst="rect">
+              <a:avLst/>
+            </a:prstGeom>
+            <a:solidFill>
+              <a:schemeClr val="bg1"/>
+            </a:solidFill>
+            <a:ln>
+              <a:solidFill>
+                <a:schemeClr val="tx1"/>
+              </a:solidFill>
+            </a:ln>
+          </p:spPr>
+          <p:txBody>
+            <a:bodyPr wrap="none" rtlCol="0">
+              <a:spAutoFit/>
+            </a:bodyPr>
+            <a:lstStyle/>
+            <a:p>
+              <a:r>
+                <a:rPr lang="en-US" dirty="0" smtClean="0"/>
+                <a:t>Use </a:t>
+              </a:r>
+              <a:r>
+                <a:rPr lang="en-US" dirty="0" smtClean="0">
+                  <a:latin typeface="Courier New" panose="02070309020205020404" pitchFamily="49" charset="0"/>
+                  <a:cs typeface="Courier New" panose="02070309020205020404" pitchFamily="49" charset="0"/>
+                </a:rPr>
+                <a:t>bind</a:t>
+              </a:r>
+              <a:r>
+                <a:rPr lang="en-US" dirty="0" smtClean="0"/>
+                <a:t> to</a:t>
+              </a:r>
+              <a:br>
+                <a:rPr lang="en-US" dirty="0" smtClean="0"/>
+              </a:br>
+              <a:r>
+                <a:rPr lang="en-US" dirty="0" smtClean="0"/>
+                <a:t>set parameters</a:t>
+              </a:r>
+              <a:endParaRPr lang="en-US" dirty="0">
+                <a:latin typeface="Courier New" panose="02070309020205020404" pitchFamily="49" charset="0"/>
+                <a:cs typeface="Courier New" panose="02070309020205020404" pitchFamily="49" charset="0"/>
+              </a:endParaRPr>
+            </a:p>
+          </p:txBody>
+        </p:sp>
+        <p:cxnSp>
+          <p:nvCxnSpPr>
+            <p:cNvPr id="10" name="Straight Arrow Connector 9"/>
+            <p:cNvCxnSpPr>
+              <a:stCxn id="9" idx="1"/>
+            </p:cNvCxnSpPr>
+            <p:nvPr/>
+          </p:nvCxnSpPr>
+          <p:spPr>
+            <a:xfrm flipH="1">
+              <a:off x="745587" y="6504684"/>
+              <a:ext cx="668013" cy="506200"/>
+            </a:xfrm>
+            <a:prstGeom prst="straightConnector1">
+              <a:avLst/>
+            </a:prstGeom>
+            <a:ln>
+              <a:solidFill>
+                <a:schemeClr val="tx1"/>
+              </a:solidFill>
+              <a:tailEnd type="stealth" w="lg" len="lg"/>
+            </a:ln>
+          </p:spPr>
+          <p:style>
+            <a:lnRef idx="1">
+              <a:schemeClr val="accent1"/>
+            </a:lnRef>
+            <a:fillRef idx="0">
+              <a:schemeClr val="accent1"/>
+            </a:fillRef>
+            <a:effectRef idx="0">
+              <a:schemeClr val="accent1"/>
+            </a:effectRef>
+            <a:fontRef idx="minor">
+              <a:schemeClr val="tx1"/>
+            </a:fontRef>
+          </p:style>
+        </p:cxnSp>
+      </p:grpSp>
+    </p:spTree>
+    <p:extLst>
+      <p:ext uri="{BB962C8B-B14F-4D97-AF65-F5344CB8AC3E}">
+        <p14:creationId xmlns:p14="http://schemas.microsoft.com/office/powerpoint/2010/main" val="2823044051"/>
+      </p:ext>
+    </p:extLst>
+  </p:cSld>
+  <p:clrMapOvr>
+    <a:masterClrMapping/>
+  </p:clrMapOvr>
+  <p:timing>
+    <p:tnLst>
+      <p:par>
+        <p:cTn id="1" dur="indefinite" restart="never" nodeType="tmRoot">
+          <p:childTnLst>
+            <p:seq concurrent="1" nextAc="seek">
+              <p:cTn id="2" dur="indefinite" nodeType="mainSeq">
+                <p:childTnLst>
+                  <p:par>
+                    <p:cTn id="3" fill="hold">
+                      <p:stCondLst>
+                        <p:cond delay="indefinite"/>
+                        <p:cond evt="onBegin" delay="0">
+                          <p:tn val="2"/>
+                        </p:cond>
+                      </p:stCondLst>
+                      <p:childTnLst>
+                        <p:par>
+                          <p:cTn id="4" fill="hold">
+                            <p:stCondLst>
+                              <p:cond delay="0"/>
+                            </p:stCondLst>
+                            <p:childTnLst>
+                              <p:par>
+                                <p:cTn id="5" presetID="1" presetClass="entr" presetSubtype="0" fill="hold" grpId="0" nodeType="withEffect">
+                                  <p:stCondLst>
+                                    <p:cond delay="0"/>
+                                  </p:stCondLst>
+                                  <p:childTnLst>
+                                    <p:set>
+                                      <p:cBhvr>
+                                        <p:cTn id="6" dur="1" fill="hold">
+                                          <p:stCondLst>
+                                            <p:cond delay="0"/>
+                                          </p:stCondLst>
+                                        </p:cTn>
+                                        <p:tgtEl>
+                                          <p:spTgt spid="3">
+                                            <p:txEl>
+                                              <p:pRg st="0" end="0"/>
+                                            </p:txEl>
+                                          </p:spTgt>
+                                        </p:tgtEl>
+                                        <p:attrNameLst>
+                                          <p:attrName>style.visibility</p:attrName>
+                                        </p:attrNameLst>
+                                      </p:cBhvr>
+                                      <p:to>
+                                        <p:strVal val="visible"/>
+                                      </p:to>
+                                    </p:set>
+                                  </p:childTnLst>
+                                </p:cTn>
+                              </p:par>
+                              <p:par>
+                                <p:cTn id="7" presetID="1" presetClass="entr" presetSubtype="0" fill="hold" grpId="0" nodeType="withEffect">
+                                  <p:stCondLst>
+                                    <p:cond delay="0"/>
+                                  </p:stCondLst>
+                                  <p:childTnLst>
+                                    <p:set>
+                                      <p:cBhvr>
+                                        <p:cTn id="8" dur="1" fill="hold">
+                                          <p:stCondLst>
+                                            <p:cond delay="0"/>
+                                          </p:stCondLst>
+                                        </p:cTn>
+                                        <p:tgtEl>
+                                          <p:spTgt spid="6"/>
+                                        </p:tgtEl>
+                                        <p:attrNameLst>
+                                          <p:attrName>style.visibility</p:attrName>
+                                        </p:attrNameLst>
+                                      </p:cBhvr>
+                                      <p:to>
+                                        <p:strVal val="visible"/>
+                                      </p:to>
+                                    </p:set>
+                                  </p:childTnLst>
+                                </p:cTn>
+                              </p:par>
+                            </p:childTnLst>
+                          </p:cTn>
+                        </p:par>
+                      </p:childTnLst>
+                    </p:cTn>
+                  </p:par>
+                  <p:par>
+                    <p:cTn id="9" fill="hold">
+                      <p:stCondLst>
+                        <p:cond delay="indefinite"/>
+                      </p:stCondLst>
+                      <p:childTnLst>
+                        <p:par>
+                          <p:cTn id="10" fill="hold">
+                            <p:stCondLst>
+                              <p:cond delay="0"/>
+                            </p:stCondLst>
+                            <p:childTnLst>
+                              <p:par>
+                                <p:cTn id="11" presetID="1" presetClass="entr" presetSubtype="0" fill="hold" grpId="0" nodeType="clickEffect">
+                                  <p:stCondLst>
+                                    <p:cond delay="0"/>
+                                  </p:stCondLst>
+                                  <p:childTnLst>
+                                    <p:set>
+                                      <p:cBhvr>
+                                        <p:cTn id="12" dur="1" fill="hold">
+                                          <p:stCondLst>
+                                            <p:cond delay="0"/>
+                                          </p:stCondLst>
+                                        </p:cTn>
+                                        <p:tgtEl>
+                                          <p:spTgt spid="3">
+                                            <p:txEl>
+                                              <p:pRg st="4" end="4"/>
+                                            </p:txEl>
+                                          </p:spTgt>
+                                        </p:tgtEl>
+                                        <p:attrNameLst>
+                                          <p:attrName>style.visibility</p:attrName>
+                                        </p:attrNameLst>
+                                      </p:cBhvr>
+                                      <p:to>
+                                        <p:strVal val="visible"/>
+                                      </p:to>
+                                    </p:set>
+                                  </p:childTnLst>
+                                </p:cTn>
+                              </p:par>
+                              <p:par>
+                                <p:cTn id="13" presetID="1" presetClass="entr" presetSubtype="0" fill="hold" grpId="0" nodeType="withEffect">
+                                  <p:stCondLst>
+                                    <p:cond delay="0"/>
+                                  </p:stCondLst>
+                                  <p:childTnLst>
+                                    <p:set>
+                                      <p:cBhvr>
+                                        <p:cTn id="14" dur="1" fill="hold">
+                                          <p:stCondLst>
+                                            <p:cond delay="0"/>
+                                          </p:stCondLst>
+                                        </p:cTn>
+                                        <p:tgtEl>
+                                          <p:spTgt spid="7"/>
+                                        </p:tgtEl>
+                                        <p:attrNameLst>
+                                          <p:attrName>style.visibility</p:attrName>
+                                        </p:attrNameLst>
+                                      </p:cBhvr>
+                                      <p:to>
+                                        <p:strVal val="visible"/>
+                                      </p:to>
+                                    </p:set>
+                                  </p:childTnLst>
+                                </p:cTn>
+                              </p:par>
+                            </p:childTnLst>
+                          </p:cTn>
+                        </p:par>
+                      </p:childTnLst>
+                    </p:cTn>
+                  </p:par>
+                  <p:par>
+                    <p:cTn id="15" fill="hold">
+                      <p:stCondLst>
+                        <p:cond delay="indefinite"/>
+                      </p:stCondLst>
+                      <p:childTnLst>
+                        <p:par>
+                          <p:cTn id="16" fill="hold">
+                            <p:stCondLst>
+                              <p:cond delay="0"/>
+                            </p:stCondLst>
+                            <p:childTnLst>
+                              <p:par>
+                                <p:cTn id="17" presetID="1" presetClass="entr" presetSubtype="0" fill="hold" nodeType="clickEffect">
+                                  <p:stCondLst>
+                                    <p:cond delay="0"/>
+                                  </p:stCondLst>
+                                  <p:childTnLst>
+                                    <p:set>
+                                      <p:cBhvr>
+                                        <p:cTn id="18" dur="1" fill="hold">
+                                          <p:stCondLst>
+                                            <p:cond delay="0"/>
+                                          </p:stCondLst>
+                                        </p:cTn>
+                                        <p:tgtEl>
+                                          <p:spTgt spid="8"/>
+                                        </p:tgtEl>
+                                        <p:attrNameLst>
+                                          <p:attrName>style.visibility</p:attrName>
+                                        </p:attrNameLst>
+                                      </p:cBhvr>
+                                      <p:to>
+                                        <p:strVal val="visible"/>
+                                      </p:to>
+                                    </p:set>
+                                  </p:childTnLst>
+                                </p:cTn>
+                              </p:par>
+                            </p:childTnLst>
+                          </p:cTn>
+                        </p:par>
+                      </p:childTnLst>
+                    </p:cTn>
+                  </p:par>
+                </p:childTnLst>
+              </p:cTn>
+              <p:prevCondLst>
+                <p:cond evt="onPrev" delay="0">
+                  <p:tgtEl>
+                    <p:sldTgt/>
+                  </p:tgtEl>
+                </p:cond>
+              </p:prevCondLst>
+              <p:nextCondLst>
+                <p:cond evt="onNext" delay="0">
+                  <p:tgtEl>
+                    <p:sldTgt/>
+                  </p:tgtEl>
+                </p:cond>
+              </p:nextCondLst>
+            </p:seq>
+          </p:childTnLst>
+        </p:cTn>
+      </p:par>
+    </p:tnLst>
+    <p:bldLst>
+      <p:bldP spid="3" grpId="0" uiExpand="1" build="p"/>
+      <p:bldP spid="6" grpId="0" animBg="1"/>
+      <p:bldP spid="7" grpId="0" animBg="1"/>
+    </p:bldLst>
+  </p:timing>
+</p:sld>
+</file>
+
+<file path=ppt/slides/slide19.xml><?xml version="1.0" encoding="utf-8"?>
+<p:sld xmlns:a="http://schemas.openxmlformats.org/drawingml/2006/main" xmlns:r="http://schemas.openxmlformats.org/officeDocument/2006/relationships" xmlns:p="http://schemas.openxmlformats.org/presentationml/2006/main">
+  <p:cSld>
+    <p:spTree>
+      <p:nvGrpSpPr>
+        <p:cNvPr id="1" name=""/>
+        <p:cNvGrpSpPr/>
+        <p:nvPr/>
+      </p:nvGrpSpPr>
+      <p:grpSpPr>
+        <a:xfrm>
+          <a:off x="0" y="0"/>
+          <a:ext cx="0" cy="0"/>
+          <a:chOff x="0" y="0"/>
+          <a:chExt cx="0" cy="0"/>
+        </a:xfrm>
+      </p:grpSpPr>
+      <p:sp>
+        <p:nvSpPr>
+          <p:cNvPr id="2" name="Title 1"/>
+          <p:cNvSpPr>
+            <a:spLocks noGrp="1"/>
+          </p:cNvSpPr>
+          <p:nvPr>
+            <p:ph type="title"/>
+          </p:nvPr>
+        </p:nvSpPr>
+        <p:spPr/>
+        <p:txBody>
+          <a:bodyPr/>
+          <a:lstStyle/>
+          <a:p>
+            <a:r>
+              <a:rPr lang="en-US" dirty="0" smtClean="0"/>
               <a:t>What was left out/added?</a:t>
             </a:r>
             <a:endParaRPr lang="en-US" dirty="0"/>
@@ -9626,7 +11226,7 @@
           <a:p>
             <a:fld id="{9CEF4966-5219-4577-B301-14467D565841}" type="slidenum">
               <a:rPr lang="en-US" smtClean="0"/>
-              <a:t>18</a:t>
+              <a:t>19</a:t>
             </a:fld>
             <a:endParaRPr lang="en-US"/>
           </a:p>

</xml_diff>

<commit_message>
Added plot for Lorentz system
</commit_message>
<xml_diff>
--- a/CPlusPlus/12_essential_cpp_numerics.pptx
+++ b/CPlusPlus/12_essential_cpp_numerics.pptx
@@ -8071,14 +8071,7 @@
                 <a:latin typeface="Courier New" pitchFamily="49" charset="0"/>
                 <a:cs typeface="Courier New" pitchFamily="49" charset="0"/>
               </a:rPr>
-              <a:t>                </a:t>
-            </a:r>
-            <a:r>
-              <a:rPr lang="en-US" sz="1600" dirty="0" smtClean="0">
-                <a:latin typeface="Courier New" pitchFamily="49" charset="0"/>
-                <a:cs typeface="Courier New" pitchFamily="49" charset="0"/>
-              </a:rPr>
-              <a:t>span(</a:t>
+              <a:t>                span(</a:t>
             </a:r>
             <a:r>
               <a:rPr lang="en-US" sz="1600" dirty="0" err="1" smtClean="0">
@@ -8216,11 +8209,7 @@
           <a:p>
             <a:r>
               <a:rPr lang="en-US" dirty="0" smtClean="0"/>
-              <a:t>Matrix </a:t>
-            </a:r>
-            <a:r>
-              <a:rPr lang="en-US" dirty="0" smtClean="0"/>
-              <a:t>access</a:t>
+              <a:t>Matrix access</a:t>
             </a:r>
             <a:endParaRPr lang="en-US" dirty="0"/>
           </a:p>
@@ -8466,10 +8455,6 @@
               </a:rPr>
               <a:t>, j);</a:t>
             </a:r>
-            <a:endParaRPr lang="en-US" sz="1600" dirty="0" smtClean="0">
-              <a:latin typeface="Courier New" pitchFamily="49" charset="0"/>
-              <a:cs typeface="Courier New" pitchFamily="49" charset="0"/>
-            </a:endParaRPr>
           </a:p>
         </p:txBody>
       </p:sp>
@@ -8575,10 +8560,6 @@
               </a:rPr>
               <a:t>…</a:t>
             </a:r>
-            <a:endParaRPr lang="en-US" sz="1600" dirty="0" smtClean="0">
-              <a:latin typeface="Courier New" pitchFamily="49" charset="0"/>
-              <a:cs typeface="Courier New" pitchFamily="49" charset="0"/>
-            </a:endParaRPr>
           </a:p>
           <a:p>
             <a:r>
@@ -8595,10 +8576,6 @@
               </a:rPr>
               <a:t>([=] (double x) { return a*x*x + b*x + c; });</a:t>
             </a:r>
-            <a:endParaRPr lang="en-US" sz="1600" dirty="0" smtClean="0">
-              <a:latin typeface="Courier New" pitchFamily="49" charset="0"/>
-              <a:cs typeface="Courier New" pitchFamily="49" charset="0"/>
-            </a:endParaRPr>
           </a:p>
         </p:txBody>
       </p:sp>
@@ -9175,10 +9152,6 @@
               </a:rPr>
               <a:t>();</a:t>
             </a:r>
-            <a:endParaRPr lang="en-US" sz="1600" dirty="0" smtClean="0">
-              <a:latin typeface="Courier New" pitchFamily="49" charset="0"/>
-              <a:cs typeface="Courier New" pitchFamily="49" charset="0"/>
-            </a:endParaRPr>
           </a:p>
         </p:txBody>
       </p:sp>
@@ -9492,11 +9465,7 @@
           <a:p>
             <a:r>
               <a:rPr lang="en-US" dirty="0" smtClean="0"/>
-              <a:t>Define e</a:t>
-            </a:r>
-            <a:r>
-              <a:rPr lang="en-US" dirty="0" smtClean="0"/>
-              <a:t>quations</a:t>
+              <a:t>Define equations</a:t>
             </a:r>
           </a:p>
         </p:txBody>
@@ -10867,6 +10836,30 @@
           </p:style>
         </p:cxnSp>
       </p:grpSp>
+      <p:pic>
+        <p:nvPicPr>
+          <p:cNvPr id="5" name="Picture 4"/>
+          <p:cNvPicPr>
+            <a:picLocks noChangeAspect="1"/>
+          </p:cNvPicPr>
+          <p:nvPr/>
+        </p:nvPicPr>
+        <p:blipFill>
+          <a:blip r:embed="rId2"/>
+          <a:stretch>
+            <a:fillRect/>
+          </a:stretch>
+        </p:blipFill>
+        <p:spPr>
+          <a:xfrm>
+            <a:off x="6128075" y="217589"/>
+            <a:ext cx="2717149" cy="2037862"/>
+          </a:xfrm>
+          <a:prstGeom prst="rect">
+            <a:avLst/>
+          </a:prstGeom>
+        </p:spPr>
+      </p:pic>
     </p:spTree>
     <p:extLst>
       <p:ext uri="{BB962C8B-B14F-4D97-AF65-F5344CB8AC3E}">

</xml_diff>